<commit_message>
Budowanie raportu - Product - Analiza pareto dla przychodów/sprzedanych produktów w podziale na kategorie; Szczegółowa tabela kategorii i produktów
</commit_message>
<xml_diff>
--- a/BrazilianECommerce/Background/Backgrounds.pptx
+++ b/BrazilianECommerce/Background/Backgrounds.pptx
@@ -7,7 +7,8 @@
   <p:sldIdLst>
     <p:sldId id="256" r:id="rId2"/>
     <p:sldId id="260" r:id="rId3"/>
-    <p:sldId id="259" r:id="rId4"/>
+    <p:sldId id="261" r:id="rId4"/>
+    <p:sldId id="259" r:id="rId5"/>
   </p:sldIdLst>
   <p:sldSz cx="24384000" cy="13716000"/>
   <p:notesSz cx="6858000" cy="9144000"/>
@@ -245,7 +246,7 @@
           <a:p>
             <a:fld id="{B4AF9752-CF4F-4FCB-AD1E-762587F45785}" type="datetimeFigureOut">
               <a:rPr lang="pl-PL" smtClean="0"/>
-              <a:t>06.10.2024</a:t>
+              <a:t>11.10.2024</a:t>
             </a:fld>
             <a:endParaRPr lang="pl-PL"/>
           </a:p>
@@ -415,7 +416,7 @@
           <a:p>
             <a:fld id="{B4AF9752-CF4F-4FCB-AD1E-762587F45785}" type="datetimeFigureOut">
               <a:rPr lang="pl-PL" smtClean="0"/>
-              <a:t>06.10.2024</a:t>
+              <a:t>11.10.2024</a:t>
             </a:fld>
             <a:endParaRPr lang="pl-PL"/>
           </a:p>
@@ -595,7 +596,7 @@
           <a:p>
             <a:fld id="{B4AF9752-CF4F-4FCB-AD1E-762587F45785}" type="datetimeFigureOut">
               <a:rPr lang="pl-PL" smtClean="0"/>
-              <a:t>06.10.2024</a:t>
+              <a:t>11.10.2024</a:t>
             </a:fld>
             <a:endParaRPr lang="pl-PL"/>
           </a:p>
@@ -765,7 +766,7 @@
           <a:p>
             <a:fld id="{B4AF9752-CF4F-4FCB-AD1E-762587F45785}" type="datetimeFigureOut">
               <a:rPr lang="pl-PL" smtClean="0"/>
-              <a:t>06.10.2024</a:t>
+              <a:t>11.10.2024</a:t>
             </a:fld>
             <a:endParaRPr lang="pl-PL"/>
           </a:p>
@@ -1011,7 +1012,7 @@
           <a:p>
             <a:fld id="{B4AF9752-CF4F-4FCB-AD1E-762587F45785}" type="datetimeFigureOut">
               <a:rPr lang="pl-PL" smtClean="0"/>
-              <a:t>06.10.2024</a:t>
+              <a:t>11.10.2024</a:t>
             </a:fld>
             <a:endParaRPr lang="pl-PL"/>
           </a:p>
@@ -1243,7 +1244,7 @@
           <a:p>
             <a:fld id="{B4AF9752-CF4F-4FCB-AD1E-762587F45785}" type="datetimeFigureOut">
               <a:rPr lang="pl-PL" smtClean="0"/>
-              <a:t>06.10.2024</a:t>
+              <a:t>11.10.2024</a:t>
             </a:fld>
             <a:endParaRPr lang="pl-PL"/>
           </a:p>
@@ -1610,7 +1611,7 @@
           <a:p>
             <a:fld id="{B4AF9752-CF4F-4FCB-AD1E-762587F45785}" type="datetimeFigureOut">
               <a:rPr lang="pl-PL" smtClean="0"/>
-              <a:t>06.10.2024</a:t>
+              <a:t>11.10.2024</a:t>
             </a:fld>
             <a:endParaRPr lang="pl-PL"/>
           </a:p>
@@ -1728,7 +1729,7 @@
           <a:p>
             <a:fld id="{B4AF9752-CF4F-4FCB-AD1E-762587F45785}" type="datetimeFigureOut">
               <a:rPr lang="pl-PL" smtClean="0"/>
-              <a:t>06.10.2024</a:t>
+              <a:t>11.10.2024</a:t>
             </a:fld>
             <a:endParaRPr lang="pl-PL"/>
           </a:p>
@@ -1823,7 +1824,7 @@
           <a:p>
             <a:fld id="{B4AF9752-CF4F-4FCB-AD1E-762587F45785}" type="datetimeFigureOut">
               <a:rPr lang="pl-PL" smtClean="0"/>
-              <a:t>06.10.2024</a:t>
+              <a:t>11.10.2024</a:t>
             </a:fld>
             <a:endParaRPr lang="pl-PL"/>
           </a:p>
@@ -2100,7 +2101,7 @@
           <a:p>
             <a:fld id="{B4AF9752-CF4F-4FCB-AD1E-762587F45785}" type="datetimeFigureOut">
               <a:rPr lang="pl-PL" smtClean="0"/>
-              <a:t>06.10.2024</a:t>
+              <a:t>11.10.2024</a:t>
             </a:fld>
             <a:endParaRPr lang="pl-PL"/>
           </a:p>
@@ -2357,7 +2358,7 @@
           <a:p>
             <a:fld id="{B4AF9752-CF4F-4FCB-AD1E-762587F45785}" type="datetimeFigureOut">
               <a:rPr lang="pl-PL" smtClean="0"/>
-              <a:t>06.10.2024</a:t>
+              <a:t>11.10.2024</a:t>
             </a:fld>
             <a:endParaRPr lang="pl-PL"/>
           </a:p>
@@ -2570,7 +2571,7 @@
           <a:p>
             <a:fld id="{B4AF9752-CF4F-4FCB-AD1E-762587F45785}" type="datetimeFigureOut">
               <a:rPr lang="pl-PL" smtClean="0"/>
-              <a:t>06.10.2024</a:t>
+              <a:t>11.10.2024</a:t>
             </a:fld>
             <a:endParaRPr lang="pl-PL"/>
           </a:p>
@@ -5757,6 +5758,1418 @@
       </p:grpSpPr>
       <p:grpSp>
         <p:nvGrpSpPr>
+          <p:cNvPr id="6" name="Backgrounds">
+            <a:extLst>
+              <a:ext uri="{FF2B5EF4-FFF2-40B4-BE49-F238E27FC236}">
+                <a16:creationId xmlns:a16="http://schemas.microsoft.com/office/drawing/2014/main" id="{5BE192BD-2182-D858-1776-9B1F943D3726}"/>
+              </a:ext>
+            </a:extLst>
+          </p:cNvPr>
+          <p:cNvGrpSpPr/>
+          <p:nvPr/>
+        </p:nvGrpSpPr>
+        <p:grpSpPr>
+          <a:xfrm>
+            <a:off x="0" y="0"/>
+            <a:ext cx="24384000" cy="13716000"/>
+            <a:chOff x="0" y="0"/>
+            <a:chExt cx="24384000" cy="13716000"/>
+          </a:xfrm>
+        </p:grpSpPr>
+        <p:sp>
+          <p:nvSpPr>
+            <p:cNvPr id="8" name="Canvas_BG">
+              <a:extLst>
+                <a:ext uri="{FF2B5EF4-FFF2-40B4-BE49-F238E27FC236}">
+                  <a16:creationId xmlns:a16="http://schemas.microsoft.com/office/drawing/2014/main" id="{107A83FF-6F34-9166-FDA5-FF2A441354C4}"/>
+                </a:ext>
+              </a:extLst>
+            </p:cNvPr>
+            <p:cNvSpPr>
+              <a:spLocks/>
+            </p:cNvSpPr>
+            <p:nvPr/>
+          </p:nvSpPr>
+          <p:spPr>
+            <a:xfrm>
+              <a:off x="1219200" y="0"/>
+              <a:ext cx="23164800" cy="13716000"/>
+            </a:xfrm>
+            <a:prstGeom prst="rect">
+              <a:avLst/>
+            </a:prstGeom>
+            <a:solidFill>
+              <a:srgbClr val="FBFBFB"/>
+            </a:solidFill>
+            <a:ln>
+              <a:noFill/>
+            </a:ln>
+          </p:spPr>
+          <p:style>
+            <a:lnRef idx="2">
+              <a:schemeClr val="accent1">
+                <a:shade val="15000"/>
+              </a:schemeClr>
+            </a:lnRef>
+            <a:fillRef idx="1">
+              <a:schemeClr val="accent1"/>
+            </a:fillRef>
+            <a:effectRef idx="0">
+              <a:schemeClr val="accent1"/>
+            </a:effectRef>
+            <a:fontRef idx="minor">
+              <a:schemeClr val="lt1"/>
+            </a:fontRef>
+          </p:style>
+          <p:txBody>
+            <a:bodyPr rtlCol="0" anchor="ctr"/>
+            <a:lstStyle/>
+            <a:p>
+              <a:pPr algn="ctr"/>
+              <a:endParaRPr lang="pl-PL" dirty="0">
+                <a:latin typeface="Din" panose="02000504040000020003" pitchFamily="2" charset="0"/>
+              </a:endParaRPr>
+            </a:p>
+          </p:txBody>
+        </p:sp>
+        <p:sp>
+          <p:nvSpPr>
+            <p:cNvPr id="7" name="Navigation_BG">
+              <a:extLst>
+                <a:ext uri="{FF2B5EF4-FFF2-40B4-BE49-F238E27FC236}">
+                  <a16:creationId xmlns:a16="http://schemas.microsoft.com/office/drawing/2014/main" id="{96ECBF68-D8E5-02F8-ED61-C5A371ECEFB1}"/>
+                </a:ext>
+              </a:extLst>
+            </p:cNvPr>
+            <p:cNvSpPr>
+              <a:spLocks/>
+            </p:cNvSpPr>
+            <p:nvPr/>
+          </p:nvSpPr>
+          <p:spPr>
+            <a:xfrm>
+              <a:off x="0" y="0"/>
+              <a:ext cx="1219200" cy="13716000"/>
+            </a:xfrm>
+            <a:prstGeom prst="rect">
+              <a:avLst/>
+            </a:prstGeom>
+            <a:gradFill flip="none" rotWithShape="1">
+              <a:gsLst>
+                <a:gs pos="0">
+                  <a:srgbClr val="375881"/>
+                </a:gs>
+                <a:gs pos="23000">
+                  <a:srgbClr val="314E72"/>
+                </a:gs>
+                <a:gs pos="69000">
+                  <a:srgbClr val="2B4564"/>
+                </a:gs>
+                <a:gs pos="97000">
+                  <a:srgbClr val="233851"/>
+                </a:gs>
+              </a:gsLst>
+              <a:path path="circle">
+                <a:fillToRect l="50000" t="50000" r="50000" b="50000"/>
+              </a:path>
+              <a:tileRect/>
+            </a:gradFill>
+            <a:ln>
+              <a:noFill/>
+            </a:ln>
+          </p:spPr>
+          <p:style>
+            <a:lnRef idx="2">
+              <a:schemeClr val="accent1">
+                <a:shade val="15000"/>
+              </a:schemeClr>
+            </a:lnRef>
+            <a:fillRef idx="1">
+              <a:schemeClr val="accent1"/>
+            </a:fillRef>
+            <a:effectRef idx="0">
+              <a:schemeClr val="accent1"/>
+            </a:effectRef>
+            <a:fontRef idx="minor">
+              <a:schemeClr val="lt1"/>
+            </a:fontRef>
+          </p:style>
+          <p:txBody>
+            <a:bodyPr rtlCol="0" anchor="ctr"/>
+            <a:lstStyle/>
+            <a:p>
+              <a:pPr algn="ctr"/>
+              <a:endParaRPr lang="pl-PL"/>
+            </a:p>
+          </p:txBody>
+        </p:sp>
+        <p:grpSp>
+          <p:nvGrpSpPr>
+            <p:cNvPr id="45" name="Chart_Backgrounds">
+              <a:extLst>
+                <a:ext uri="{FF2B5EF4-FFF2-40B4-BE49-F238E27FC236}">
+                  <a16:creationId xmlns:a16="http://schemas.microsoft.com/office/drawing/2014/main" id="{04B07420-461E-5790-CE3A-C073A76DDC27}"/>
+                </a:ext>
+              </a:extLst>
+            </p:cNvPr>
+            <p:cNvGrpSpPr>
+              <a:grpSpLocks/>
+            </p:cNvGrpSpPr>
+            <p:nvPr/>
+          </p:nvGrpSpPr>
+          <p:grpSpPr>
+            <a:xfrm>
+              <a:off x="1828800" y="1581150"/>
+              <a:ext cx="21945600" cy="11525250"/>
+              <a:chOff x="1828800" y="1581150"/>
+              <a:chExt cx="21945600" cy="11525250"/>
+            </a:xfrm>
+          </p:grpSpPr>
+          <p:sp>
+            <p:nvSpPr>
+              <p:cNvPr id="44" name="3.2_Chart_BG">
+                <a:extLst>
+                  <a:ext uri="{FF2B5EF4-FFF2-40B4-BE49-F238E27FC236}">
+                    <a16:creationId xmlns:a16="http://schemas.microsoft.com/office/drawing/2014/main" id="{FB35D492-74F6-1167-AB44-0D0B2A794CB9}"/>
+                  </a:ext>
+                </a:extLst>
+              </p:cNvPr>
+              <p:cNvSpPr>
+                <a:spLocks/>
+              </p:cNvSpPr>
+              <p:nvPr/>
+            </p:nvSpPr>
+            <p:spPr>
+              <a:xfrm>
+                <a:off x="13030200" y="8953500"/>
+                <a:ext cx="10744200" cy="4152900"/>
+              </a:xfrm>
+              <a:prstGeom prst="rect">
+                <a:avLst/>
+              </a:prstGeom>
+              <a:solidFill>
+                <a:schemeClr val="bg1"/>
+              </a:solidFill>
+              <a:ln w="3175">
+                <a:solidFill>
+                  <a:srgbClr val="B1B8C5"/>
+                </a:solidFill>
+              </a:ln>
+              <a:effectLst>
+                <a:outerShdw blurRad="203200" dist="63500" dir="2700000" algn="tl" rotWithShape="0">
+                  <a:prstClr val="black">
+                    <a:alpha val="5000"/>
+                  </a:prstClr>
+                </a:outerShdw>
+              </a:effectLst>
+            </p:spPr>
+            <p:style>
+              <a:lnRef idx="2">
+                <a:schemeClr val="accent1">
+                  <a:shade val="15000"/>
+                </a:schemeClr>
+              </a:lnRef>
+              <a:fillRef idx="1">
+                <a:schemeClr val="accent1"/>
+              </a:fillRef>
+              <a:effectRef idx="0">
+                <a:schemeClr val="accent1"/>
+              </a:effectRef>
+              <a:fontRef idx="minor">
+                <a:schemeClr val="lt1"/>
+              </a:fontRef>
+            </p:style>
+            <p:txBody>
+              <a:bodyPr rtlCol="0" anchor="ctr"/>
+              <a:lstStyle/>
+              <a:p>
+                <a:pPr algn="ctr"/>
+                <a:endParaRPr lang="pl-PL">
+                  <a:latin typeface="Din" panose="02000504040000020003" pitchFamily="2" charset="0"/>
+                </a:endParaRPr>
+              </a:p>
+            </p:txBody>
+          </p:sp>
+          <p:sp>
+            <p:nvSpPr>
+              <p:cNvPr id="43" name="3.1_Chart_BG">
+                <a:extLst>
+                  <a:ext uri="{FF2B5EF4-FFF2-40B4-BE49-F238E27FC236}">
+                    <a16:creationId xmlns:a16="http://schemas.microsoft.com/office/drawing/2014/main" id="{983D6567-0339-D205-8CCC-3AFF6D8D0AC1}"/>
+                  </a:ext>
+                </a:extLst>
+              </p:cNvPr>
+              <p:cNvSpPr>
+                <a:spLocks/>
+              </p:cNvSpPr>
+              <p:nvPr/>
+            </p:nvSpPr>
+            <p:spPr>
+              <a:xfrm>
+                <a:off x="1828800" y="8953500"/>
+                <a:ext cx="10744200" cy="4152900"/>
+              </a:xfrm>
+              <a:prstGeom prst="rect">
+                <a:avLst/>
+              </a:prstGeom>
+              <a:solidFill>
+                <a:schemeClr val="bg1"/>
+              </a:solidFill>
+              <a:ln w="3175">
+                <a:solidFill>
+                  <a:srgbClr val="B1B8C5"/>
+                </a:solidFill>
+              </a:ln>
+              <a:effectLst>
+                <a:outerShdw blurRad="203200" dist="63500" dir="2700000" algn="tl" rotWithShape="0">
+                  <a:prstClr val="black">
+                    <a:alpha val="5000"/>
+                  </a:prstClr>
+                </a:outerShdw>
+              </a:effectLst>
+            </p:spPr>
+            <p:style>
+              <a:lnRef idx="2">
+                <a:schemeClr val="accent1">
+                  <a:shade val="15000"/>
+                </a:schemeClr>
+              </a:lnRef>
+              <a:fillRef idx="1">
+                <a:schemeClr val="accent1"/>
+              </a:fillRef>
+              <a:effectRef idx="0">
+                <a:schemeClr val="accent1"/>
+              </a:effectRef>
+              <a:fontRef idx="minor">
+                <a:schemeClr val="lt1"/>
+              </a:fontRef>
+            </p:style>
+            <p:txBody>
+              <a:bodyPr rtlCol="0" anchor="ctr"/>
+              <a:lstStyle/>
+              <a:p>
+                <a:pPr algn="ctr"/>
+                <a:endParaRPr lang="pl-PL">
+                  <a:latin typeface="Din" panose="02000504040000020003" pitchFamily="2" charset="0"/>
+                </a:endParaRPr>
+              </a:p>
+            </p:txBody>
+          </p:sp>
+          <p:sp>
+            <p:nvSpPr>
+              <p:cNvPr id="42" name="2.2_Chart_BG">
+                <a:extLst>
+                  <a:ext uri="{FF2B5EF4-FFF2-40B4-BE49-F238E27FC236}">
+                    <a16:creationId xmlns:a16="http://schemas.microsoft.com/office/drawing/2014/main" id="{48762949-D8C8-A905-3D78-58C155FF6D8E}"/>
+                  </a:ext>
+                </a:extLst>
+              </p:cNvPr>
+              <p:cNvSpPr>
+                <a:spLocks/>
+              </p:cNvSpPr>
+              <p:nvPr/>
+            </p:nvSpPr>
+            <p:spPr>
+              <a:xfrm>
+                <a:off x="13030200" y="4343400"/>
+                <a:ext cx="10744200" cy="4152900"/>
+              </a:xfrm>
+              <a:prstGeom prst="rect">
+                <a:avLst/>
+              </a:prstGeom>
+              <a:solidFill>
+                <a:schemeClr val="bg1"/>
+              </a:solidFill>
+              <a:ln w="3175">
+                <a:solidFill>
+                  <a:srgbClr val="B1B8C5"/>
+                </a:solidFill>
+              </a:ln>
+              <a:effectLst>
+                <a:outerShdw blurRad="203200" dist="63500" dir="2700000" algn="tl" rotWithShape="0">
+                  <a:prstClr val="black">
+                    <a:alpha val="5000"/>
+                  </a:prstClr>
+                </a:outerShdw>
+              </a:effectLst>
+            </p:spPr>
+            <p:style>
+              <a:lnRef idx="2">
+                <a:schemeClr val="accent1">
+                  <a:shade val="15000"/>
+                </a:schemeClr>
+              </a:lnRef>
+              <a:fillRef idx="1">
+                <a:schemeClr val="accent1"/>
+              </a:fillRef>
+              <a:effectRef idx="0">
+                <a:schemeClr val="accent1"/>
+              </a:effectRef>
+              <a:fontRef idx="minor">
+                <a:schemeClr val="lt1"/>
+              </a:fontRef>
+            </p:style>
+            <p:txBody>
+              <a:bodyPr rtlCol="0" anchor="ctr"/>
+              <a:lstStyle/>
+              <a:p>
+                <a:pPr algn="ctr"/>
+                <a:endParaRPr lang="pl-PL">
+                  <a:latin typeface="Din" panose="02000504040000020003" pitchFamily="2" charset="0"/>
+                </a:endParaRPr>
+              </a:p>
+            </p:txBody>
+          </p:sp>
+          <p:sp>
+            <p:nvSpPr>
+              <p:cNvPr id="41" name="2.1_Chart_BG">
+                <a:extLst>
+                  <a:ext uri="{FF2B5EF4-FFF2-40B4-BE49-F238E27FC236}">
+                    <a16:creationId xmlns:a16="http://schemas.microsoft.com/office/drawing/2014/main" id="{93046E24-79A1-E992-5964-9F00E433B134}"/>
+                  </a:ext>
+                </a:extLst>
+              </p:cNvPr>
+              <p:cNvSpPr>
+                <a:spLocks/>
+              </p:cNvSpPr>
+              <p:nvPr/>
+            </p:nvSpPr>
+            <p:spPr>
+              <a:xfrm>
+                <a:off x="1828800" y="4343400"/>
+                <a:ext cx="10744200" cy="4152900"/>
+              </a:xfrm>
+              <a:prstGeom prst="rect">
+                <a:avLst/>
+              </a:prstGeom>
+              <a:solidFill>
+                <a:schemeClr val="bg1"/>
+              </a:solidFill>
+              <a:ln w="3175">
+                <a:solidFill>
+                  <a:srgbClr val="B1B8C5"/>
+                </a:solidFill>
+              </a:ln>
+              <a:effectLst>
+                <a:outerShdw blurRad="203200" dist="63500" dir="2700000" algn="tl" rotWithShape="0">
+                  <a:prstClr val="black">
+                    <a:alpha val="5000"/>
+                  </a:prstClr>
+                </a:outerShdw>
+              </a:effectLst>
+            </p:spPr>
+            <p:style>
+              <a:lnRef idx="2">
+                <a:schemeClr val="accent1">
+                  <a:shade val="15000"/>
+                </a:schemeClr>
+              </a:lnRef>
+              <a:fillRef idx="1">
+                <a:schemeClr val="accent1"/>
+              </a:fillRef>
+              <a:effectRef idx="0">
+                <a:schemeClr val="accent1"/>
+              </a:effectRef>
+              <a:fontRef idx="minor">
+                <a:schemeClr val="lt1"/>
+              </a:fontRef>
+            </p:style>
+            <p:txBody>
+              <a:bodyPr rtlCol="0" anchor="ctr"/>
+              <a:lstStyle/>
+              <a:p>
+                <a:pPr algn="ctr"/>
+                <a:endParaRPr lang="pl-PL">
+                  <a:latin typeface="Din" panose="02000504040000020003" pitchFamily="2" charset="0"/>
+                </a:endParaRPr>
+              </a:p>
+            </p:txBody>
+          </p:sp>
+          <p:sp>
+            <p:nvSpPr>
+              <p:cNvPr id="39" name="1_Chart_BG">
+                <a:extLst>
+                  <a:ext uri="{FF2B5EF4-FFF2-40B4-BE49-F238E27FC236}">
+                    <a16:creationId xmlns:a16="http://schemas.microsoft.com/office/drawing/2014/main" id="{69E4849E-C540-F7C5-02C5-D4864113B474}"/>
+                  </a:ext>
+                </a:extLst>
+              </p:cNvPr>
+              <p:cNvSpPr>
+                <a:spLocks/>
+              </p:cNvSpPr>
+              <p:nvPr/>
+            </p:nvSpPr>
+            <p:spPr>
+              <a:xfrm>
+                <a:off x="1828800" y="1581150"/>
+                <a:ext cx="21945600" cy="2305050"/>
+              </a:xfrm>
+              <a:prstGeom prst="rect">
+                <a:avLst/>
+              </a:prstGeom>
+              <a:solidFill>
+                <a:schemeClr val="bg1"/>
+              </a:solidFill>
+              <a:ln w="3175">
+                <a:solidFill>
+                  <a:srgbClr val="B1B8C5"/>
+                </a:solidFill>
+              </a:ln>
+              <a:effectLst>
+                <a:outerShdw blurRad="203200" dist="63500" dir="2700000" algn="tl" rotWithShape="0">
+                  <a:prstClr val="black">
+                    <a:alpha val="5000"/>
+                  </a:prstClr>
+                </a:outerShdw>
+              </a:effectLst>
+            </p:spPr>
+            <p:style>
+              <a:lnRef idx="2">
+                <a:schemeClr val="accent1">
+                  <a:shade val="15000"/>
+                </a:schemeClr>
+              </a:lnRef>
+              <a:fillRef idx="1">
+                <a:schemeClr val="accent1"/>
+              </a:fillRef>
+              <a:effectRef idx="0">
+                <a:schemeClr val="accent1"/>
+              </a:effectRef>
+              <a:fontRef idx="minor">
+                <a:schemeClr val="lt1"/>
+              </a:fontRef>
+            </p:style>
+            <p:txBody>
+              <a:bodyPr rtlCol="0" anchor="ctr"/>
+              <a:lstStyle/>
+              <a:p>
+                <a:pPr algn="ctr"/>
+                <a:endParaRPr lang="pl-PL">
+                  <a:latin typeface="Din" panose="02000504040000020003" pitchFamily="2" charset="0"/>
+                </a:endParaRPr>
+              </a:p>
+            </p:txBody>
+          </p:sp>
+        </p:grpSp>
+      </p:grpSp>
+      <p:grpSp>
+        <p:nvGrpSpPr>
+          <p:cNvPr id="18" name="Navigation_Icons">
+            <a:extLst>
+              <a:ext uri="{FF2B5EF4-FFF2-40B4-BE49-F238E27FC236}">
+                <a16:creationId xmlns:a16="http://schemas.microsoft.com/office/drawing/2014/main" id="{34F3B614-D77C-6DB9-9B7F-1C571F943CC3}"/>
+              </a:ext>
+            </a:extLst>
+          </p:cNvPr>
+          <p:cNvGrpSpPr>
+            <a:grpSpLocks noGrp="1" noUngrp="1" noRot="1" noMove="1" noResize="1"/>
+          </p:cNvGrpSpPr>
+          <p:nvPr/>
+        </p:nvGrpSpPr>
+        <p:grpSpPr>
+          <a:xfrm>
+            <a:off x="264900" y="7701191"/>
+            <a:ext cx="687600" cy="5405209"/>
+            <a:chOff x="264900" y="7701191"/>
+            <a:chExt cx="687600" cy="5405209"/>
+          </a:xfrm>
+        </p:grpSpPr>
+        <p:pic>
+          <p:nvPicPr>
+            <p:cNvPr id="19" name="Customer" descr="A white person with black background&#10;&#10;Description automatically generated" hidden="1">
+              <a:extLst>
+                <a:ext uri="{FF2B5EF4-FFF2-40B4-BE49-F238E27FC236}">
+                  <a16:creationId xmlns:a16="http://schemas.microsoft.com/office/drawing/2014/main" id="{34404271-7B4D-92D4-408E-2707F8AB708F}"/>
+                </a:ext>
+              </a:extLst>
+            </p:cNvPr>
+            <p:cNvPicPr>
+              <a:picLocks noGrp="1" noRot="1" noChangeAspect="1" noMove="1" noResize="1" noEditPoints="1" noAdjustHandles="1" noChangeArrowheads="1" noChangeShapeType="1" noCrop="1"/>
+            </p:cNvPicPr>
+            <p:nvPr/>
+          </p:nvPicPr>
+          <p:blipFill>
+            <a:blip r:embed="rId2">
+              <a:extLst>
+                <a:ext uri="{28A0092B-C50C-407E-A947-70E740481C1C}">
+                  <a14:useLocalDpi xmlns:a14="http://schemas.microsoft.com/office/drawing/2010/main" val="0"/>
+                </a:ext>
+              </a:extLst>
+            </a:blip>
+            <a:stretch>
+              <a:fillRect/>
+            </a:stretch>
+          </p:blipFill>
+          <p:spPr>
+            <a:xfrm>
+              <a:off x="266700" y="11488391"/>
+              <a:ext cx="685800" cy="677537"/>
+            </a:xfrm>
+            <a:prstGeom prst="rect">
+              <a:avLst/>
+            </a:prstGeom>
+          </p:spPr>
+        </p:pic>
+        <p:pic>
+          <p:nvPicPr>
+            <p:cNvPr id="31" name="Retention" hidden="1">
+              <a:extLst>
+                <a:ext uri="{FF2B5EF4-FFF2-40B4-BE49-F238E27FC236}">
+                  <a16:creationId xmlns:a16="http://schemas.microsoft.com/office/drawing/2014/main" id="{9E6125AA-6E70-F2E1-9175-DDAA0C00D03B}"/>
+                </a:ext>
+              </a:extLst>
+            </p:cNvPr>
+            <p:cNvPicPr>
+              <a:picLocks noGrp="1" noRot="1" noChangeAspect="1" noMove="1" noResize="1" noEditPoints="1" noAdjustHandles="1" noChangeArrowheads="1" noChangeShapeType="1" noCrop="1"/>
+            </p:cNvPicPr>
+            <p:nvPr/>
+          </p:nvPicPr>
+          <p:blipFill>
+            <a:blip r:embed="rId3">
+              <a:extLst>
+                <a:ext uri="{28A0092B-C50C-407E-A947-70E740481C1C}">
+                  <a14:useLocalDpi xmlns:a14="http://schemas.microsoft.com/office/drawing/2010/main" val="0"/>
+                </a:ext>
+              </a:extLst>
+            </a:blip>
+            <a:stretch>
+              <a:fillRect/>
+            </a:stretch>
+          </p:blipFill>
+          <p:spPr>
+            <a:xfrm>
+              <a:off x="266700" y="12435191"/>
+              <a:ext cx="685800" cy="671209"/>
+            </a:xfrm>
+            <a:prstGeom prst="rect">
+              <a:avLst/>
+            </a:prstGeom>
+          </p:spPr>
+        </p:pic>
+        <p:pic>
+          <p:nvPicPr>
+            <p:cNvPr id="21" name="Delivery" hidden="1">
+              <a:extLst>
+                <a:ext uri="{FF2B5EF4-FFF2-40B4-BE49-F238E27FC236}">
+                  <a16:creationId xmlns:a16="http://schemas.microsoft.com/office/drawing/2014/main" id="{2E55DD9D-10A9-8668-3AA7-C1DA19213834}"/>
+                </a:ext>
+              </a:extLst>
+            </p:cNvPr>
+            <p:cNvPicPr>
+              <a:picLocks noGrp="1" noRot="1" noChangeAspect="1" noMove="1" noResize="1" noEditPoints="1" noAdjustHandles="1" noChangeArrowheads="1" noChangeShapeType="1" noCrop="1"/>
+            </p:cNvPicPr>
+            <p:nvPr/>
+          </p:nvPicPr>
+          <p:blipFill>
+            <a:blip r:embed="rId4">
+              <a:extLst>
+                <a:ext uri="{28A0092B-C50C-407E-A947-70E740481C1C}">
+                  <a14:useLocalDpi xmlns:a14="http://schemas.microsoft.com/office/drawing/2010/main" val="0"/>
+                </a:ext>
+              </a:extLst>
+            </a:blip>
+            <a:stretch>
+              <a:fillRect/>
+            </a:stretch>
+          </p:blipFill>
+          <p:spPr>
+            <a:xfrm>
+              <a:off x="266700" y="10631591"/>
+              <a:ext cx="685800" cy="496111"/>
+            </a:xfrm>
+            <a:prstGeom prst="rect">
+              <a:avLst/>
+            </a:prstGeom>
+          </p:spPr>
+        </p:pic>
+        <p:pic>
+          <p:nvPicPr>
+            <p:cNvPr id="17" name="Product_Active">
+              <a:extLst>
+                <a:ext uri="{FF2B5EF4-FFF2-40B4-BE49-F238E27FC236}">
+                  <a16:creationId xmlns:a16="http://schemas.microsoft.com/office/drawing/2014/main" id="{645C83B4-2202-A81A-2B71-E6F4EF594CEE}"/>
+                </a:ext>
+              </a:extLst>
+            </p:cNvPr>
+            <p:cNvPicPr>
+              <a:picLocks noGrp="1" noRot="1" noChangeAspect="1" noMove="1" noResize="1" noEditPoints="1" noAdjustHandles="1" noChangeArrowheads="1" noChangeShapeType="1" noCrop="1"/>
+            </p:cNvPicPr>
+            <p:nvPr/>
+          </p:nvPicPr>
+          <p:blipFill>
+            <a:blip r:embed="rId5">
+              <a:extLst>
+                <a:ext uri="{28A0092B-C50C-407E-A947-70E740481C1C}">
+                  <a14:useLocalDpi xmlns:a14="http://schemas.microsoft.com/office/drawing/2010/main" val="0"/>
+                </a:ext>
+              </a:extLst>
+            </a:blip>
+            <a:stretch>
+              <a:fillRect/>
+            </a:stretch>
+          </p:blipFill>
+          <p:spPr>
+            <a:xfrm>
+              <a:off x="264900" y="9594000"/>
+              <a:ext cx="687600" cy="687600"/>
+            </a:xfrm>
+            <a:prstGeom prst="rect">
+              <a:avLst/>
+            </a:prstGeom>
+          </p:spPr>
+        </p:pic>
+        <p:pic>
+          <p:nvPicPr>
+            <p:cNvPr id="33" name="Sales" hidden="1">
+              <a:extLst>
+                <a:ext uri="{FF2B5EF4-FFF2-40B4-BE49-F238E27FC236}">
+                  <a16:creationId xmlns:a16="http://schemas.microsoft.com/office/drawing/2014/main" id="{CF5A9ED8-F64A-99ED-10E5-433533D48A5A}"/>
+                </a:ext>
+              </a:extLst>
+            </p:cNvPr>
+            <p:cNvPicPr>
+              <a:picLocks noGrp="1" noRot="1" noChangeAspect="1" noMove="1" noResize="1" noEditPoints="1" noAdjustHandles="1" noChangeArrowheads="1" noChangeShapeType="1" noCrop="1"/>
+            </p:cNvPicPr>
+            <p:nvPr/>
+          </p:nvPicPr>
+          <p:blipFill>
+            <a:blip r:embed="rId6">
+              <a:extLst>
+                <a:ext uri="{28A0092B-C50C-407E-A947-70E740481C1C}">
+                  <a14:useLocalDpi xmlns:a14="http://schemas.microsoft.com/office/drawing/2010/main" val="0"/>
+                </a:ext>
+              </a:extLst>
+            </a:blip>
+            <a:stretch>
+              <a:fillRect/>
+            </a:stretch>
+          </p:blipFill>
+          <p:spPr>
+            <a:xfrm>
+              <a:off x="266700" y="8647991"/>
+              <a:ext cx="685800" cy="671209"/>
+            </a:xfrm>
+            <a:prstGeom prst="rect">
+              <a:avLst/>
+            </a:prstGeom>
+          </p:spPr>
+        </p:pic>
+        <p:pic>
+          <p:nvPicPr>
+            <p:cNvPr id="27" name="Overview" descr="A black and white bar chart&#10;&#10;Description automatically generated" hidden="1">
+              <a:extLst>
+                <a:ext uri="{FF2B5EF4-FFF2-40B4-BE49-F238E27FC236}">
+                  <a16:creationId xmlns:a16="http://schemas.microsoft.com/office/drawing/2014/main" id="{A4EFBC23-2DB6-68F1-7E3E-630BA7A0EA91}"/>
+                </a:ext>
+              </a:extLst>
+            </p:cNvPr>
+            <p:cNvPicPr>
+              <a:picLocks noGrp="1" noRot="1" noChangeAspect="1" noMove="1" noResize="1" noEditPoints="1" noAdjustHandles="1" noChangeArrowheads="1" noChangeShapeType="1" noCrop="1"/>
+            </p:cNvPicPr>
+            <p:nvPr/>
+          </p:nvPicPr>
+          <p:blipFill>
+            <a:blip r:embed="rId7">
+              <a:extLst>
+                <a:ext uri="{28A0092B-C50C-407E-A947-70E740481C1C}">
+                  <a14:useLocalDpi xmlns:a14="http://schemas.microsoft.com/office/drawing/2010/main" val="0"/>
+                </a:ext>
+              </a:extLst>
+            </a:blip>
+            <a:stretch>
+              <a:fillRect/>
+            </a:stretch>
+          </p:blipFill>
+          <p:spPr>
+            <a:xfrm>
+              <a:off x="266700" y="7701191"/>
+              <a:ext cx="685800" cy="678426"/>
+            </a:xfrm>
+            <a:prstGeom prst="rect">
+              <a:avLst/>
+            </a:prstGeom>
+          </p:spPr>
+        </p:pic>
+      </p:grpSp>
+      <p:grpSp>
+        <p:nvGrpSpPr>
+          <p:cNvPr id="36" name="Filter_Icons" hidden="1">
+            <a:extLst>
+              <a:ext uri="{FF2B5EF4-FFF2-40B4-BE49-F238E27FC236}">
+                <a16:creationId xmlns:a16="http://schemas.microsoft.com/office/drawing/2014/main" id="{55EA662A-9608-0E24-7544-CB16F74BB291}"/>
+              </a:ext>
+            </a:extLst>
+          </p:cNvPr>
+          <p:cNvGrpSpPr>
+            <a:grpSpLocks noGrp="1" noUngrp="1" noRot="1" noMove="1" noResize="1"/>
+          </p:cNvGrpSpPr>
+          <p:nvPr/>
+        </p:nvGrpSpPr>
+        <p:grpSpPr>
+          <a:xfrm>
+            <a:off x="266700" y="266700"/>
+            <a:ext cx="685800" cy="1565340"/>
+            <a:chOff x="266700" y="266700"/>
+            <a:chExt cx="685800" cy="1565340"/>
+          </a:xfrm>
+        </p:grpSpPr>
+        <p:pic>
+          <p:nvPicPr>
+            <p:cNvPr id="23" name="Filter">
+              <a:extLst>
+                <a:ext uri="{FF2B5EF4-FFF2-40B4-BE49-F238E27FC236}">
+                  <a16:creationId xmlns:a16="http://schemas.microsoft.com/office/drawing/2014/main" id="{0D31A7DD-06A0-277A-C8C8-9EEE57F3023A}"/>
+                </a:ext>
+              </a:extLst>
+            </p:cNvPr>
+            <p:cNvPicPr>
+              <a:picLocks noGrp="1" noRot="1" noChangeAspect="1" noMove="1" noResize="1" noEditPoints="1" noAdjustHandles="1" noChangeArrowheads="1" noChangeShapeType="1" noCrop="1"/>
+            </p:cNvPicPr>
+            <p:nvPr/>
+          </p:nvPicPr>
+          <p:blipFill>
+            <a:blip r:embed="rId8">
+              <a:extLst>
+                <a:ext uri="{28A0092B-C50C-407E-A947-70E740481C1C}">
+                  <a14:useLocalDpi xmlns:a14="http://schemas.microsoft.com/office/drawing/2010/main" val="0"/>
+                </a:ext>
+              </a:extLst>
+            </a:blip>
+            <a:stretch>
+              <a:fillRect/>
+            </a:stretch>
+          </p:blipFill>
+          <p:spPr>
+            <a:xfrm>
+              <a:off x="266700" y="1219200"/>
+              <a:ext cx="685800" cy="612840"/>
+            </a:xfrm>
+            <a:prstGeom prst="rect">
+              <a:avLst/>
+            </a:prstGeom>
+          </p:spPr>
+        </p:pic>
+        <p:pic>
+          <p:nvPicPr>
+            <p:cNvPr id="35" name="Clear_Filters">
+              <a:extLst>
+                <a:ext uri="{FF2B5EF4-FFF2-40B4-BE49-F238E27FC236}">
+                  <a16:creationId xmlns:a16="http://schemas.microsoft.com/office/drawing/2014/main" id="{CBD63BE9-A275-DB5C-AC04-D6942FAB87BF}"/>
+                </a:ext>
+              </a:extLst>
+            </p:cNvPr>
+            <p:cNvPicPr>
+              <a:picLocks noGrp="1" noRot="1" noChangeAspect="1" noMove="1" noResize="1" noEditPoints="1" noAdjustHandles="1" noChangeArrowheads="1" noChangeShapeType="1" noCrop="1"/>
+            </p:cNvPicPr>
+            <p:nvPr/>
+          </p:nvPicPr>
+          <p:blipFill>
+            <a:blip r:embed="rId9">
+              <a:extLst>
+                <a:ext uri="{28A0092B-C50C-407E-A947-70E740481C1C}">
+                  <a14:useLocalDpi xmlns:a14="http://schemas.microsoft.com/office/drawing/2010/main" val="0"/>
+                </a:ext>
+              </a:extLst>
+            </a:blip>
+            <a:stretch>
+              <a:fillRect/>
+            </a:stretch>
+          </p:blipFill>
+          <p:spPr>
+            <a:xfrm>
+              <a:off x="266700" y="266700"/>
+              <a:ext cx="685800" cy="685800"/>
+            </a:xfrm>
+            <a:prstGeom prst="rect">
+              <a:avLst/>
+            </a:prstGeom>
+          </p:spPr>
+        </p:pic>
+      </p:grpSp>
+      <p:grpSp>
+        <p:nvGrpSpPr>
+          <p:cNvPr id="15" name="Margins" hidden="1">
+            <a:extLst>
+              <a:ext uri="{FF2B5EF4-FFF2-40B4-BE49-F238E27FC236}">
+                <a16:creationId xmlns:a16="http://schemas.microsoft.com/office/drawing/2014/main" id="{3A7668E8-5B3C-6507-FA98-4CC00C9EA2A8}"/>
+              </a:ext>
+            </a:extLst>
+          </p:cNvPr>
+          <p:cNvGrpSpPr>
+            <a:grpSpLocks noGrp="1" noUngrp="1" noRot="1" noMove="1" noResize="1"/>
+          </p:cNvGrpSpPr>
+          <p:nvPr/>
+        </p:nvGrpSpPr>
+        <p:grpSpPr>
+          <a:xfrm>
+            <a:off x="1219200" y="0"/>
+            <a:ext cx="23164800" cy="13716000"/>
+            <a:chOff x="1219200" y="0"/>
+            <a:chExt cx="23164800" cy="13716000"/>
+          </a:xfrm>
+        </p:grpSpPr>
+        <p:grpSp>
+          <p:nvGrpSpPr>
+            <p:cNvPr id="13" name="Main">
+              <a:extLst>
+                <a:ext uri="{FF2B5EF4-FFF2-40B4-BE49-F238E27FC236}">
+                  <a16:creationId xmlns:a16="http://schemas.microsoft.com/office/drawing/2014/main" id="{F6F54732-847D-5C13-1DBD-FEC62B2DA619}"/>
+                </a:ext>
+              </a:extLst>
+            </p:cNvPr>
+            <p:cNvGrpSpPr>
+              <a:grpSpLocks noGrp="1" noUngrp="1" noRot="1" noMove="1" noResize="1"/>
+            </p:cNvGrpSpPr>
+            <p:nvPr/>
+          </p:nvGrpSpPr>
+          <p:grpSpPr>
+            <a:xfrm>
+              <a:off x="1219200" y="0"/>
+              <a:ext cx="23164800" cy="13716000"/>
+              <a:chOff x="1219200" y="0"/>
+              <a:chExt cx="23164800" cy="13716000"/>
+            </a:xfrm>
+          </p:grpSpPr>
+          <p:sp>
+            <p:nvSpPr>
+              <p:cNvPr id="4" name="H_Bottom_Margin">
+                <a:extLst>
+                  <a:ext uri="{FF2B5EF4-FFF2-40B4-BE49-F238E27FC236}">
+                    <a16:creationId xmlns:a16="http://schemas.microsoft.com/office/drawing/2014/main" id="{D9C46175-3CDD-2884-0097-0307AA41B9C2}"/>
+                  </a:ext>
+                </a:extLst>
+              </p:cNvPr>
+              <p:cNvSpPr>
+                <a:spLocks noGrp="1" noRot="1" noMove="1" noResize="1" noEditPoints="1" noAdjustHandles="1" noChangeArrowheads="1" noChangeShapeType="1"/>
+              </p:cNvSpPr>
+              <p:nvPr/>
+            </p:nvSpPr>
+            <p:spPr>
+              <a:xfrm>
+                <a:off x="1219200" y="13106400"/>
+                <a:ext cx="23164800" cy="609600"/>
+              </a:xfrm>
+              <a:prstGeom prst="rect">
+                <a:avLst/>
+              </a:prstGeom>
+              <a:solidFill>
+                <a:schemeClr val="accent2">
+                  <a:alpha val="30000"/>
+                </a:schemeClr>
+              </a:solidFill>
+              <a:ln>
+                <a:noFill/>
+              </a:ln>
+            </p:spPr>
+            <p:style>
+              <a:lnRef idx="2">
+                <a:schemeClr val="accent2">
+                  <a:shade val="15000"/>
+                </a:schemeClr>
+              </a:lnRef>
+              <a:fillRef idx="1">
+                <a:schemeClr val="accent2"/>
+              </a:fillRef>
+              <a:effectRef idx="0">
+                <a:schemeClr val="accent2"/>
+              </a:effectRef>
+              <a:fontRef idx="minor">
+                <a:schemeClr val="lt1"/>
+              </a:fontRef>
+            </p:style>
+            <p:txBody>
+              <a:bodyPr rtlCol="0" anchor="ctr"/>
+              <a:lstStyle/>
+              <a:p>
+                <a:pPr algn="ctr"/>
+                <a:endParaRPr lang="pl-PL"/>
+              </a:p>
+            </p:txBody>
+          </p:sp>
+          <p:sp>
+            <p:nvSpPr>
+              <p:cNvPr id="2" name="V_Left_Margin">
+                <a:extLst>
+                  <a:ext uri="{FF2B5EF4-FFF2-40B4-BE49-F238E27FC236}">
+                    <a16:creationId xmlns:a16="http://schemas.microsoft.com/office/drawing/2014/main" id="{EFBEE9D4-C37E-263C-5A6F-A2CA6967FA20}"/>
+                  </a:ext>
+                </a:extLst>
+              </p:cNvPr>
+              <p:cNvSpPr>
+                <a:spLocks noGrp="1" noRot="1" noMove="1" noResize="1" noEditPoints="1" noAdjustHandles="1" noChangeArrowheads="1" noChangeShapeType="1"/>
+              </p:cNvSpPr>
+              <p:nvPr/>
+            </p:nvSpPr>
+            <p:spPr>
+              <a:xfrm>
+                <a:off x="1219200" y="0"/>
+                <a:ext cx="609600" cy="13716000"/>
+              </a:xfrm>
+              <a:prstGeom prst="rect">
+                <a:avLst/>
+              </a:prstGeom>
+              <a:solidFill>
+                <a:schemeClr val="accent2">
+                  <a:alpha val="30000"/>
+                </a:schemeClr>
+              </a:solidFill>
+              <a:ln>
+                <a:noFill/>
+              </a:ln>
+            </p:spPr>
+            <p:style>
+              <a:lnRef idx="2">
+                <a:schemeClr val="accent2">
+                  <a:shade val="15000"/>
+                </a:schemeClr>
+              </a:lnRef>
+              <a:fillRef idx="1">
+                <a:schemeClr val="accent2"/>
+              </a:fillRef>
+              <a:effectRef idx="0">
+                <a:schemeClr val="accent2"/>
+              </a:effectRef>
+              <a:fontRef idx="minor">
+                <a:schemeClr val="lt1"/>
+              </a:fontRef>
+            </p:style>
+            <p:txBody>
+              <a:bodyPr rtlCol="0" anchor="ctr"/>
+              <a:lstStyle/>
+              <a:p>
+                <a:pPr algn="ctr"/>
+                <a:endParaRPr lang="pl-PL"/>
+              </a:p>
+            </p:txBody>
+          </p:sp>
+          <p:sp>
+            <p:nvSpPr>
+              <p:cNvPr id="3" name="V_Right_Margin">
+                <a:extLst>
+                  <a:ext uri="{FF2B5EF4-FFF2-40B4-BE49-F238E27FC236}">
+                    <a16:creationId xmlns:a16="http://schemas.microsoft.com/office/drawing/2014/main" id="{A7BB4A29-D641-7786-2AE0-59780B2DBF51}"/>
+                  </a:ext>
+                </a:extLst>
+              </p:cNvPr>
+              <p:cNvSpPr>
+                <a:spLocks noGrp="1" noRot="1" noMove="1" noResize="1" noEditPoints="1" noAdjustHandles="1" noChangeArrowheads="1" noChangeShapeType="1"/>
+              </p:cNvSpPr>
+              <p:nvPr/>
+            </p:nvSpPr>
+            <p:spPr>
+              <a:xfrm>
+                <a:off x="23774400" y="0"/>
+                <a:ext cx="609600" cy="13716000"/>
+              </a:xfrm>
+              <a:prstGeom prst="rect">
+                <a:avLst/>
+              </a:prstGeom>
+              <a:solidFill>
+                <a:schemeClr val="accent2">
+                  <a:alpha val="30000"/>
+                </a:schemeClr>
+              </a:solidFill>
+              <a:ln>
+                <a:noFill/>
+              </a:ln>
+            </p:spPr>
+            <p:style>
+              <a:lnRef idx="2">
+                <a:schemeClr val="accent2">
+                  <a:shade val="15000"/>
+                </a:schemeClr>
+              </a:lnRef>
+              <a:fillRef idx="1">
+                <a:schemeClr val="accent2"/>
+              </a:fillRef>
+              <a:effectRef idx="0">
+                <a:schemeClr val="accent2"/>
+              </a:effectRef>
+              <a:fontRef idx="minor">
+                <a:schemeClr val="lt1"/>
+              </a:fontRef>
+            </p:style>
+            <p:txBody>
+              <a:bodyPr rtlCol="0" anchor="ctr"/>
+              <a:lstStyle/>
+              <a:p>
+                <a:pPr algn="ctr"/>
+                <a:endParaRPr lang="pl-PL"/>
+              </a:p>
+            </p:txBody>
+          </p:sp>
+        </p:grpSp>
+        <p:grpSp>
+          <p:nvGrpSpPr>
+            <p:cNvPr id="14" name="Sub">
+              <a:extLst>
+                <a:ext uri="{FF2B5EF4-FFF2-40B4-BE49-F238E27FC236}">
+                  <a16:creationId xmlns:a16="http://schemas.microsoft.com/office/drawing/2014/main" id="{E869BBD6-CD1C-0A5B-97C4-2994694AAC50}"/>
+                </a:ext>
+              </a:extLst>
+            </p:cNvPr>
+            <p:cNvGrpSpPr>
+              <a:grpSpLocks noGrp="1" noUngrp="1" noRot="1" noMove="1" noResize="1"/>
+            </p:cNvGrpSpPr>
+            <p:nvPr/>
+          </p:nvGrpSpPr>
+          <p:grpSpPr>
+            <a:xfrm>
+              <a:off x="1219200" y="0"/>
+              <a:ext cx="23164800" cy="13716000"/>
+              <a:chOff x="1219200" y="0"/>
+              <a:chExt cx="23164800" cy="13716000"/>
+            </a:xfrm>
+          </p:grpSpPr>
+          <p:sp>
+            <p:nvSpPr>
+              <p:cNvPr id="11" name="H_3_Margin">
+                <a:extLst>
+                  <a:ext uri="{FF2B5EF4-FFF2-40B4-BE49-F238E27FC236}">
+                    <a16:creationId xmlns:a16="http://schemas.microsoft.com/office/drawing/2014/main" id="{7735B8AF-7C32-2059-5571-CFE9A6CAB35E}"/>
+                  </a:ext>
+                </a:extLst>
+              </p:cNvPr>
+              <p:cNvSpPr>
+                <a:spLocks noGrp="1" noRot="1" noMove="1" noResize="1" noEditPoints="1" noAdjustHandles="1" noChangeArrowheads="1" noChangeShapeType="1"/>
+              </p:cNvSpPr>
+              <p:nvPr/>
+            </p:nvSpPr>
+            <p:spPr>
+              <a:xfrm>
+                <a:off x="1219200" y="8496300"/>
+                <a:ext cx="23164800" cy="457200"/>
+              </a:xfrm>
+              <a:prstGeom prst="rect">
+                <a:avLst/>
+              </a:prstGeom>
+              <a:solidFill>
+                <a:schemeClr val="accent2">
+                  <a:alpha val="10000"/>
+                </a:schemeClr>
+              </a:solidFill>
+              <a:ln>
+                <a:noFill/>
+              </a:ln>
+            </p:spPr>
+            <p:style>
+              <a:lnRef idx="2">
+                <a:schemeClr val="accent2">
+                  <a:shade val="15000"/>
+                </a:schemeClr>
+              </a:lnRef>
+              <a:fillRef idx="1">
+                <a:schemeClr val="accent2"/>
+              </a:fillRef>
+              <a:effectRef idx="0">
+                <a:schemeClr val="accent2"/>
+              </a:effectRef>
+              <a:fontRef idx="minor">
+                <a:schemeClr val="lt1"/>
+              </a:fontRef>
+            </p:style>
+            <p:txBody>
+              <a:bodyPr rtlCol="0" anchor="ctr"/>
+              <a:lstStyle/>
+              <a:p>
+                <a:pPr algn="ctr"/>
+                <a:endParaRPr lang="pl-PL"/>
+              </a:p>
+            </p:txBody>
+          </p:sp>
+          <p:sp>
+            <p:nvSpPr>
+              <p:cNvPr id="10" name="H_2_Margin">
+                <a:extLst>
+                  <a:ext uri="{FF2B5EF4-FFF2-40B4-BE49-F238E27FC236}">
+                    <a16:creationId xmlns:a16="http://schemas.microsoft.com/office/drawing/2014/main" id="{63F25BB1-C29B-A354-2A7A-D2ED388B2734}"/>
+                  </a:ext>
+                </a:extLst>
+              </p:cNvPr>
+              <p:cNvSpPr>
+                <a:spLocks noGrp="1" noRot="1" noMove="1" noResize="1" noEditPoints="1" noAdjustHandles="1" noChangeArrowheads="1" noChangeShapeType="1"/>
+              </p:cNvSpPr>
+              <p:nvPr/>
+            </p:nvSpPr>
+            <p:spPr>
+              <a:xfrm>
+                <a:off x="1219200" y="3886200"/>
+                <a:ext cx="23164800" cy="457200"/>
+              </a:xfrm>
+              <a:prstGeom prst="rect">
+                <a:avLst/>
+              </a:prstGeom>
+              <a:solidFill>
+                <a:schemeClr val="accent2">
+                  <a:alpha val="10000"/>
+                </a:schemeClr>
+              </a:solidFill>
+              <a:ln>
+                <a:noFill/>
+              </a:ln>
+            </p:spPr>
+            <p:style>
+              <a:lnRef idx="2">
+                <a:schemeClr val="accent2">
+                  <a:shade val="15000"/>
+                </a:schemeClr>
+              </a:lnRef>
+              <a:fillRef idx="1">
+                <a:schemeClr val="accent2"/>
+              </a:fillRef>
+              <a:effectRef idx="0">
+                <a:schemeClr val="accent2"/>
+              </a:effectRef>
+              <a:fontRef idx="minor">
+                <a:schemeClr val="lt1"/>
+              </a:fontRef>
+            </p:style>
+            <p:txBody>
+              <a:bodyPr rtlCol="0" anchor="ctr"/>
+              <a:lstStyle/>
+              <a:p>
+                <a:pPr algn="ctr"/>
+                <a:endParaRPr lang="pl-PL"/>
+              </a:p>
+            </p:txBody>
+          </p:sp>
+          <p:sp>
+            <p:nvSpPr>
+              <p:cNvPr id="5" name="H_1_Margin">
+                <a:extLst>
+                  <a:ext uri="{FF2B5EF4-FFF2-40B4-BE49-F238E27FC236}">
+                    <a16:creationId xmlns:a16="http://schemas.microsoft.com/office/drawing/2014/main" id="{9968A711-BA69-1CB6-F295-6BAD89359B6F}"/>
+                  </a:ext>
+                </a:extLst>
+              </p:cNvPr>
+              <p:cNvSpPr>
+                <a:spLocks noGrp="1" noRot="1" noMove="1" noResize="1" noEditPoints="1" noAdjustHandles="1" noChangeArrowheads="1" noChangeShapeType="1"/>
+              </p:cNvSpPr>
+              <p:nvPr/>
+            </p:nvSpPr>
+            <p:spPr>
+              <a:xfrm>
+                <a:off x="1219200" y="1143000"/>
+                <a:ext cx="23164800" cy="457200"/>
+              </a:xfrm>
+              <a:prstGeom prst="rect">
+                <a:avLst/>
+              </a:prstGeom>
+              <a:solidFill>
+                <a:schemeClr val="accent2">
+                  <a:alpha val="10000"/>
+                </a:schemeClr>
+              </a:solidFill>
+              <a:ln>
+                <a:noFill/>
+              </a:ln>
+            </p:spPr>
+            <p:style>
+              <a:lnRef idx="2">
+                <a:schemeClr val="accent2">
+                  <a:shade val="15000"/>
+                </a:schemeClr>
+              </a:lnRef>
+              <a:fillRef idx="1">
+                <a:schemeClr val="accent2"/>
+              </a:fillRef>
+              <a:effectRef idx="0">
+                <a:schemeClr val="accent2"/>
+              </a:effectRef>
+              <a:fontRef idx="minor">
+                <a:schemeClr val="lt1"/>
+              </a:fontRef>
+            </p:style>
+            <p:txBody>
+              <a:bodyPr rtlCol="0" anchor="ctr"/>
+              <a:lstStyle/>
+              <a:p>
+                <a:pPr algn="ctr"/>
+                <a:endParaRPr lang="pl-PL"/>
+              </a:p>
+            </p:txBody>
+          </p:sp>
+          <p:sp>
+            <p:nvSpPr>
+              <p:cNvPr id="12" name="V_Center_Margin">
+                <a:extLst>
+                  <a:ext uri="{FF2B5EF4-FFF2-40B4-BE49-F238E27FC236}">
+                    <a16:creationId xmlns:a16="http://schemas.microsoft.com/office/drawing/2014/main" id="{64EA36DC-E110-36BA-53BE-5305ADE6E04A}"/>
+                  </a:ext>
+                </a:extLst>
+              </p:cNvPr>
+              <p:cNvSpPr>
+                <a:spLocks noGrp="1" noRot="1" noMove="1" noResize="1" noEditPoints="1" noAdjustHandles="1" noChangeArrowheads="1" noChangeShapeType="1"/>
+              </p:cNvSpPr>
+              <p:nvPr/>
+            </p:nvSpPr>
+            <p:spPr>
+              <a:xfrm>
+                <a:off x="12573000" y="0"/>
+                <a:ext cx="457200" cy="13716000"/>
+              </a:xfrm>
+              <a:prstGeom prst="rect">
+                <a:avLst/>
+              </a:prstGeom>
+              <a:solidFill>
+                <a:schemeClr val="accent2">
+                  <a:alpha val="10000"/>
+                </a:schemeClr>
+              </a:solidFill>
+              <a:ln>
+                <a:noFill/>
+              </a:ln>
+            </p:spPr>
+            <p:style>
+              <a:lnRef idx="2">
+                <a:schemeClr val="accent2">
+                  <a:shade val="15000"/>
+                </a:schemeClr>
+              </a:lnRef>
+              <a:fillRef idx="1">
+                <a:schemeClr val="accent2"/>
+              </a:fillRef>
+              <a:effectRef idx="0">
+                <a:schemeClr val="accent2"/>
+              </a:effectRef>
+              <a:fontRef idx="minor">
+                <a:schemeClr val="lt1"/>
+              </a:fontRef>
+            </p:style>
+            <p:txBody>
+              <a:bodyPr rtlCol="0" anchor="ctr"/>
+              <a:lstStyle/>
+              <a:p>
+                <a:pPr algn="ctr"/>
+                <a:endParaRPr lang="pl-PL"/>
+              </a:p>
+            </p:txBody>
+          </p:sp>
+        </p:grpSp>
+      </p:grpSp>
+      <p:sp>
+        <p:nvSpPr>
+          <p:cNvPr id="9" name="Text_Results_By" hidden="1">
+            <a:extLst>
+              <a:ext uri="{FF2B5EF4-FFF2-40B4-BE49-F238E27FC236}">
+                <a16:creationId xmlns:a16="http://schemas.microsoft.com/office/drawing/2014/main" id="{7658BB83-70B6-06BD-2168-03FCCE59DAF2}"/>
+              </a:ext>
+            </a:extLst>
+          </p:cNvPr>
+          <p:cNvSpPr txBox="1">
+            <a:spLocks noGrp="1" noRot="1" noMove="1" noResize="1" noEditPoints="1" noAdjustHandles="1" noChangeArrowheads="1" noChangeShapeType="1"/>
+          </p:cNvSpPr>
+          <p:nvPr/>
+        </p:nvSpPr>
+        <p:spPr>
+          <a:xfrm>
+            <a:off x="1873250" y="1202323"/>
+            <a:ext cx="21901150" cy="338554"/>
+          </a:xfrm>
+          <a:prstGeom prst="rect">
+            <a:avLst/>
+          </a:prstGeom>
+          <a:noFill/>
+        </p:spPr>
+        <p:txBody>
+          <a:bodyPr wrap="square" rtlCol="0">
+            <a:spAutoFit/>
+          </a:bodyPr>
+          <a:lstStyle/>
+          <a:p>
+            <a:r>
+              <a:rPr lang="pl-PL" sz="1600" dirty="0">
+                <a:solidFill>
+                  <a:srgbClr val="344C69"/>
+                </a:solidFill>
+                <a:latin typeface="DIN" panose="02000504040000020003" pitchFamily="2" charset="0"/>
+              </a:rPr>
+              <a:t>Show results by</a:t>
+            </a:r>
+          </a:p>
+        </p:txBody>
+      </p:sp>
+      <p:sp>
+        <p:nvSpPr>
+          <p:cNvPr id="22" name="Title">
+            <a:extLst>
+              <a:ext uri="{FF2B5EF4-FFF2-40B4-BE49-F238E27FC236}">
+                <a16:creationId xmlns:a16="http://schemas.microsoft.com/office/drawing/2014/main" id="{E8225F30-BC0F-8F7B-9723-5F424DE87109}"/>
+              </a:ext>
+            </a:extLst>
+          </p:cNvPr>
+          <p:cNvSpPr txBox="1">
+            <a:spLocks noGrp="1" noRot="1" noMove="1" noResize="1" noEditPoints="1" noAdjustHandles="1" noChangeArrowheads="1" noChangeShapeType="1"/>
+          </p:cNvSpPr>
+          <p:nvPr/>
+        </p:nvSpPr>
+        <p:spPr>
+          <a:xfrm>
+            <a:off x="1828800" y="190500"/>
+            <a:ext cx="21945600" cy="1015663"/>
+          </a:xfrm>
+          <a:prstGeom prst="rect">
+            <a:avLst/>
+          </a:prstGeom>
+          <a:noFill/>
+        </p:spPr>
+        <p:txBody>
+          <a:bodyPr wrap="square" rtlCol="0">
+            <a:spAutoFit/>
+          </a:bodyPr>
+          <a:lstStyle/>
+          <a:p>
+            <a:r>
+              <a:rPr lang="pl-PL" sz="6000" dirty="0">
+                <a:solidFill>
+                  <a:srgbClr val="344C69"/>
+                </a:solidFill>
+                <a:effectLst>
+                  <a:outerShdw blurRad="38100" dist="38100" dir="2700000" algn="tl">
+                    <a:srgbClr val="000000">
+                      <a:alpha val="43137"/>
+                    </a:srgbClr>
+                  </a:outerShdw>
+                </a:effectLst>
+                <a:latin typeface="DIN" panose="02000504040000020003" pitchFamily="2" charset="0"/>
+              </a:rPr>
+              <a:t>Product Analysis</a:t>
+            </a:r>
+          </a:p>
+        </p:txBody>
+      </p:sp>
+    </p:spTree>
+    <p:extLst>
+      <p:ext uri="{BB962C8B-B14F-4D97-AF65-F5344CB8AC3E}">
+        <p14:creationId xmlns:p14="http://schemas.microsoft.com/office/powerpoint/2010/main" val="2792815164"/>
+      </p:ext>
+    </p:extLst>
+  </p:cSld>
+  <p:clrMapOvr>
+    <a:masterClrMapping/>
+  </p:clrMapOvr>
+</p:sld>
+</file>
+
+<file path=ppt/slides/slide4.xml><?xml version="1.0" encoding="utf-8"?>
+<p:sld xmlns:a="http://schemas.openxmlformats.org/drawingml/2006/main" xmlns:r="http://schemas.openxmlformats.org/officeDocument/2006/relationships" xmlns:p="http://schemas.openxmlformats.org/presentationml/2006/main">
+  <p:cSld>
+    <p:spTree>
+      <p:nvGrpSpPr>
+        <p:cNvPr id="1" name=""/>
+        <p:cNvGrpSpPr/>
+        <p:nvPr/>
+      </p:nvGrpSpPr>
+      <p:grpSpPr>
+        <a:xfrm>
+          <a:off x="0" y="0"/>
+          <a:ext cx="0" cy="0"/>
+          <a:chOff x="0" y="0"/>
+          <a:chExt cx="0" cy="0"/>
+        </a:xfrm>
+      </p:grpSpPr>
+      <p:grpSp>
+        <p:nvGrpSpPr>
           <p:cNvPr id="46" name="Backgrounds">
             <a:extLst>
               <a:ext uri="{FF2B5EF4-FFF2-40B4-BE49-F238E27FC236}">

</xml_diff>

<commit_message>
Budowanie raportu - Product - Przychody/sprzedane produkty vs oceny w podziale na kategorie i produkty; Trend wyników recenzji zamówień
</commit_message>
<xml_diff>
--- a/BrazilianECommerce/Background/Backgrounds.pptx
+++ b/BrazilianECommerce/Background/Backgrounds.pptx
@@ -246,7 +246,7 @@
           <a:p>
             <a:fld id="{B4AF9752-CF4F-4FCB-AD1E-762587F45785}" type="datetimeFigureOut">
               <a:rPr lang="pl-PL" smtClean="0"/>
-              <a:t>11.10.2024</a:t>
+              <a:t>19.10.2024</a:t>
             </a:fld>
             <a:endParaRPr lang="pl-PL"/>
           </a:p>
@@ -416,7 +416,7 @@
           <a:p>
             <a:fld id="{B4AF9752-CF4F-4FCB-AD1E-762587F45785}" type="datetimeFigureOut">
               <a:rPr lang="pl-PL" smtClean="0"/>
-              <a:t>11.10.2024</a:t>
+              <a:t>19.10.2024</a:t>
             </a:fld>
             <a:endParaRPr lang="pl-PL"/>
           </a:p>
@@ -596,7 +596,7 @@
           <a:p>
             <a:fld id="{B4AF9752-CF4F-4FCB-AD1E-762587F45785}" type="datetimeFigureOut">
               <a:rPr lang="pl-PL" smtClean="0"/>
-              <a:t>11.10.2024</a:t>
+              <a:t>19.10.2024</a:t>
             </a:fld>
             <a:endParaRPr lang="pl-PL"/>
           </a:p>
@@ -766,7 +766,7 @@
           <a:p>
             <a:fld id="{B4AF9752-CF4F-4FCB-AD1E-762587F45785}" type="datetimeFigureOut">
               <a:rPr lang="pl-PL" smtClean="0"/>
-              <a:t>11.10.2024</a:t>
+              <a:t>19.10.2024</a:t>
             </a:fld>
             <a:endParaRPr lang="pl-PL"/>
           </a:p>
@@ -1012,7 +1012,7 @@
           <a:p>
             <a:fld id="{B4AF9752-CF4F-4FCB-AD1E-762587F45785}" type="datetimeFigureOut">
               <a:rPr lang="pl-PL" smtClean="0"/>
-              <a:t>11.10.2024</a:t>
+              <a:t>19.10.2024</a:t>
             </a:fld>
             <a:endParaRPr lang="pl-PL"/>
           </a:p>
@@ -1244,7 +1244,7 @@
           <a:p>
             <a:fld id="{B4AF9752-CF4F-4FCB-AD1E-762587F45785}" type="datetimeFigureOut">
               <a:rPr lang="pl-PL" smtClean="0"/>
-              <a:t>11.10.2024</a:t>
+              <a:t>19.10.2024</a:t>
             </a:fld>
             <a:endParaRPr lang="pl-PL"/>
           </a:p>
@@ -1611,7 +1611,7 @@
           <a:p>
             <a:fld id="{B4AF9752-CF4F-4FCB-AD1E-762587F45785}" type="datetimeFigureOut">
               <a:rPr lang="pl-PL" smtClean="0"/>
-              <a:t>11.10.2024</a:t>
+              <a:t>19.10.2024</a:t>
             </a:fld>
             <a:endParaRPr lang="pl-PL"/>
           </a:p>
@@ -1729,7 +1729,7 @@
           <a:p>
             <a:fld id="{B4AF9752-CF4F-4FCB-AD1E-762587F45785}" type="datetimeFigureOut">
               <a:rPr lang="pl-PL" smtClean="0"/>
-              <a:t>11.10.2024</a:t>
+              <a:t>19.10.2024</a:t>
             </a:fld>
             <a:endParaRPr lang="pl-PL"/>
           </a:p>
@@ -1824,7 +1824,7 @@
           <a:p>
             <a:fld id="{B4AF9752-CF4F-4FCB-AD1E-762587F45785}" type="datetimeFigureOut">
               <a:rPr lang="pl-PL" smtClean="0"/>
-              <a:t>11.10.2024</a:t>
+              <a:t>19.10.2024</a:t>
             </a:fld>
             <a:endParaRPr lang="pl-PL"/>
           </a:p>
@@ -2101,7 +2101,7 @@
           <a:p>
             <a:fld id="{B4AF9752-CF4F-4FCB-AD1E-762587F45785}" type="datetimeFigureOut">
               <a:rPr lang="pl-PL" smtClean="0"/>
-              <a:t>11.10.2024</a:t>
+              <a:t>19.10.2024</a:t>
             </a:fld>
             <a:endParaRPr lang="pl-PL"/>
           </a:p>
@@ -2358,7 +2358,7 @@
           <a:p>
             <a:fld id="{B4AF9752-CF4F-4FCB-AD1E-762587F45785}" type="datetimeFigureOut">
               <a:rPr lang="pl-PL" smtClean="0"/>
-              <a:t>11.10.2024</a:t>
+              <a:t>19.10.2024</a:t>
             </a:fld>
             <a:endParaRPr lang="pl-PL"/>
           </a:p>
@@ -2571,7 +2571,7 @@
           <a:p>
             <a:fld id="{B4AF9752-CF4F-4FCB-AD1E-762587F45785}" type="datetimeFigureOut">
               <a:rPr lang="pl-PL" smtClean="0"/>
-              <a:t>11.10.2024</a:t>
+              <a:t>19.10.2024</a:t>
             </a:fld>
             <a:endParaRPr lang="pl-PL"/>
           </a:p>
@@ -5721,7 +5721,7 @@
                 </a:effectLst>
                 <a:latin typeface="DIN" panose="02000504040000020003" pitchFamily="2" charset="0"/>
               </a:rPr>
-              <a:t>Sales Analysis</a:t>
+              <a:t>Sales Performance Analysis</a:t>
             </a:r>
           </a:p>
         </p:txBody>
@@ -7133,7 +7133,7 @@
                 </a:effectLst>
                 <a:latin typeface="DIN" panose="02000504040000020003" pitchFamily="2" charset="0"/>
               </a:rPr>
-              <a:t>Product Analysis</a:t>
+              <a:t>Product Performance Analysis</a:t>
             </a:r>
           </a:p>
         </p:txBody>

</xml_diff>

<commit_message>
Budowanie raportu - Delivery - Szczegóły czasu dostawy w rozbiciu na procesy; Kluczowe wskaźniki wpływające na czas dostawy
</commit_message>
<xml_diff>
--- a/BrazilianECommerce/Background/Backgrounds.pptx
+++ b/BrazilianECommerce/Background/Backgrounds.pptx
@@ -8,7 +8,9 @@
     <p:sldId id="256" r:id="rId2"/>
     <p:sldId id="260" r:id="rId3"/>
     <p:sldId id="261" r:id="rId4"/>
-    <p:sldId id="259" r:id="rId5"/>
+    <p:sldId id="262" r:id="rId5"/>
+    <p:sldId id="263" r:id="rId6"/>
+    <p:sldId id="259" r:id="rId7"/>
   </p:sldIdLst>
   <p:sldSz cx="24384000" cy="13716000"/>
   <p:notesSz cx="6858000" cy="9144000"/>
@@ -246,7 +248,7 @@
           <a:p>
             <a:fld id="{B4AF9752-CF4F-4FCB-AD1E-762587F45785}" type="datetimeFigureOut">
               <a:rPr lang="pl-PL" smtClean="0"/>
-              <a:t>19.10.2024</a:t>
+              <a:t>20.10.2024</a:t>
             </a:fld>
             <a:endParaRPr lang="pl-PL"/>
           </a:p>
@@ -416,7 +418,7 @@
           <a:p>
             <a:fld id="{B4AF9752-CF4F-4FCB-AD1E-762587F45785}" type="datetimeFigureOut">
               <a:rPr lang="pl-PL" smtClean="0"/>
-              <a:t>19.10.2024</a:t>
+              <a:t>20.10.2024</a:t>
             </a:fld>
             <a:endParaRPr lang="pl-PL"/>
           </a:p>
@@ -596,7 +598,7 @@
           <a:p>
             <a:fld id="{B4AF9752-CF4F-4FCB-AD1E-762587F45785}" type="datetimeFigureOut">
               <a:rPr lang="pl-PL" smtClean="0"/>
-              <a:t>19.10.2024</a:t>
+              <a:t>20.10.2024</a:t>
             </a:fld>
             <a:endParaRPr lang="pl-PL"/>
           </a:p>
@@ -766,7 +768,7 @@
           <a:p>
             <a:fld id="{B4AF9752-CF4F-4FCB-AD1E-762587F45785}" type="datetimeFigureOut">
               <a:rPr lang="pl-PL" smtClean="0"/>
-              <a:t>19.10.2024</a:t>
+              <a:t>20.10.2024</a:t>
             </a:fld>
             <a:endParaRPr lang="pl-PL"/>
           </a:p>
@@ -1012,7 +1014,7 @@
           <a:p>
             <a:fld id="{B4AF9752-CF4F-4FCB-AD1E-762587F45785}" type="datetimeFigureOut">
               <a:rPr lang="pl-PL" smtClean="0"/>
-              <a:t>19.10.2024</a:t>
+              <a:t>20.10.2024</a:t>
             </a:fld>
             <a:endParaRPr lang="pl-PL"/>
           </a:p>
@@ -1244,7 +1246,7 @@
           <a:p>
             <a:fld id="{B4AF9752-CF4F-4FCB-AD1E-762587F45785}" type="datetimeFigureOut">
               <a:rPr lang="pl-PL" smtClean="0"/>
-              <a:t>19.10.2024</a:t>
+              <a:t>20.10.2024</a:t>
             </a:fld>
             <a:endParaRPr lang="pl-PL"/>
           </a:p>
@@ -1611,7 +1613,7 @@
           <a:p>
             <a:fld id="{B4AF9752-CF4F-4FCB-AD1E-762587F45785}" type="datetimeFigureOut">
               <a:rPr lang="pl-PL" smtClean="0"/>
-              <a:t>19.10.2024</a:t>
+              <a:t>20.10.2024</a:t>
             </a:fld>
             <a:endParaRPr lang="pl-PL"/>
           </a:p>
@@ -1729,7 +1731,7 @@
           <a:p>
             <a:fld id="{B4AF9752-CF4F-4FCB-AD1E-762587F45785}" type="datetimeFigureOut">
               <a:rPr lang="pl-PL" smtClean="0"/>
-              <a:t>19.10.2024</a:t>
+              <a:t>20.10.2024</a:t>
             </a:fld>
             <a:endParaRPr lang="pl-PL"/>
           </a:p>
@@ -1824,7 +1826,7 @@
           <a:p>
             <a:fld id="{B4AF9752-CF4F-4FCB-AD1E-762587F45785}" type="datetimeFigureOut">
               <a:rPr lang="pl-PL" smtClean="0"/>
-              <a:t>19.10.2024</a:t>
+              <a:t>20.10.2024</a:t>
             </a:fld>
             <a:endParaRPr lang="pl-PL"/>
           </a:p>
@@ -2101,7 +2103,7 @@
           <a:p>
             <a:fld id="{B4AF9752-CF4F-4FCB-AD1E-762587F45785}" type="datetimeFigureOut">
               <a:rPr lang="pl-PL" smtClean="0"/>
-              <a:t>19.10.2024</a:t>
+              <a:t>20.10.2024</a:t>
             </a:fld>
             <a:endParaRPr lang="pl-PL"/>
           </a:p>
@@ -2358,7 +2360,7 @@
           <a:p>
             <a:fld id="{B4AF9752-CF4F-4FCB-AD1E-762587F45785}" type="datetimeFigureOut">
               <a:rPr lang="pl-PL" smtClean="0"/>
-              <a:t>19.10.2024</a:t>
+              <a:t>20.10.2024</a:t>
             </a:fld>
             <a:endParaRPr lang="pl-PL"/>
           </a:p>
@@ -2571,7 +2573,7 @@
           <a:p>
             <a:fld id="{B4AF9752-CF4F-4FCB-AD1E-762587F45785}" type="datetimeFigureOut">
               <a:rPr lang="pl-PL" smtClean="0"/>
-              <a:t>19.10.2024</a:t>
+              <a:t>20.10.2024</a:t>
             </a:fld>
             <a:endParaRPr lang="pl-PL"/>
           </a:p>
@@ -7170,6 +7172,3664 @@
       </p:grpSpPr>
       <p:grpSp>
         <p:nvGrpSpPr>
+          <p:cNvPr id="6" name="Backgrounds">
+            <a:extLst>
+              <a:ext uri="{FF2B5EF4-FFF2-40B4-BE49-F238E27FC236}">
+                <a16:creationId xmlns:a16="http://schemas.microsoft.com/office/drawing/2014/main" id="{5BE192BD-2182-D858-1776-9B1F943D3726}"/>
+              </a:ext>
+            </a:extLst>
+          </p:cNvPr>
+          <p:cNvGrpSpPr>
+            <a:grpSpLocks noGrp="1" noUngrp="1" noRot="1" noMove="1" noResize="1"/>
+          </p:cNvGrpSpPr>
+          <p:nvPr/>
+        </p:nvGrpSpPr>
+        <p:grpSpPr>
+          <a:xfrm>
+            <a:off x="0" y="0"/>
+            <a:ext cx="24384000" cy="13716000"/>
+            <a:chOff x="0" y="0"/>
+            <a:chExt cx="24384000" cy="13716000"/>
+          </a:xfrm>
+        </p:grpSpPr>
+        <p:sp>
+          <p:nvSpPr>
+            <p:cNvPr id="8" name="Canvas_BG">
+              <a:extLst>
+                <a:ext uri="{FF2B5EF4-FFF2-40B4-BE49-F238E27FC236}">
+                  <a16:creationId xmlns:a16="http://schemas.microsoft.com/office/drawing/2014/main" id="{107A83FF-6F34-9166-FDA5-FF2A441354C4}"/>
+                </a:ext>
+              </a:extLst>
+            </p:cNvPr>
+            <p:cNvSpPr>
+              <a:spLocks noGrp="1" noRot="1" noMove="1" noResize="1" noEditPoints="1" noAdjustHandles="1" noChangeArrowheads="1" noChangeShapeType="1"/>
+            </p:cNvSpPr>
+            <p:nvPr/>
+          </p:nvSpPr>
+          <p:spPr>
+            <a:xfrm>
+              <a:off x="1219200" y="0"/>
+              <a:ext cx="23164800" cy="13716000"/>
+            </a:xfrm>
+            <a:prstGeom prst="rect">
+              <a:avLst/>
+            </a:prstGeom>
+            <a:solidFill>
+              <a:srgbClr val="FBFBFB"/>
+            </a:solidFill>
+            <a:ln>
+              <a:noFill/>
+            </a:ln>
+          </p:spPr>
+          <p:style>
+            <a:lnRef idx="2">
+              <a:schemeClr val="accent1">
+                <a:shade val="15000"/>
+              </a:schemeClr>
+            </a:lnRef>
+            <a:fillRef idx="1">
+              <a:schemeClr val="accent1"/>
+            </a:fillRef>
+            <a:effectRef idx="0">
+              <a:schemeClr val="accent1"/>
+            </a:effectRef>
+            <a:fontRef idx="minor">
+              <a:schemeClr val="lt1"/>
+            </a:fontRef>
+          </p:style>
+          <p:txBody>
+            <a:bodyPr rtlCol="0" anchor="ctr"/>
+            <a:lstStyle/>
+            <a:p>
+              <a:pPr algn="ctr"/>
+              <a:endParaRPr lang="pl-PL" dirty="0">
+                <a:latin typeface="Din" panose="02000504040000020003" pitchFamily="2" charset="0"/>
+              </a:endParaRPr>
+            </a:p>
+          </p:txBody>
+        </p:sp>
+        <p:sp>
+          <p:nvSpPr>
+            <p:cNvPr id="7" name="Navigation_BG">
+              <a:extLst>
+                <a:ext uri="{FF2B5EF4-FFF2-40B4-BE49-F238E27FC236}">
+                  <a16:creationId xmlns:a16="http://schemas.microsoft.com/office/drawing/2014/main" id="{96ECBF68-D8E5-02F8-ED61-C5A371ECEFB1}"/>
+                </a:ext>
+              </a:extLst>
+            </p:cNvPr>
+            <p:cNvSpPr>
+              <a:spLocks noGrp="1" noRot="1" noMove="1" noResize="1" noEditPoints="1" noAdjustHandles="1" noChangeArrowheads="1" noChangeShapeType="1"/>
+            </p:cNvSpPr>
+            <p:nvPr/>
+          </p:nvSpPr>
+          <p:spPr>
+            <a:xfrm>
+              <a:off x="0" y="0"/>
+              <a:ext cx="1219200" cy="13716000"/>
+            </a:xfrm>
+            <a:prstGeom prst="rect">
+              <a:avLst/>
+            </a:prstGeom>
+            <a:gradFill flip="none" rotWithShape="1">
+              <a:gsLst>
+                <a:gs pos="0">
+                  <a:srgbClr val="375881"/>
+                </a:gs>
+                <a:gs pos="23000">
+                  <a:srgbClr val="314E72"/>
+                </a:gs>
+                <a:gs pos="69000">
+                  <a:srgbClr val="2B4564"/>
+                </a:gs>
+                <a:gs pos="97000">
+                  <a:srgbClr val="233851"/>
+                </a:gs>
+              </a:gsLst>
+              <a:path path="circle">
+                <a:fillToRect l="50000" t="50000" r="50000" b="50000"/>
+              </a:path>
+              <a:tileRect/>
+            </a:gradFill>
+            <a:ln>
+              <a:noFill/>
+            </a:ln>
+          </p:spPr>
+          <p:style>
+            <a:lnRef idx="2">
+              <a:schemeClr val="accent1">
+                <a:shade val="15000"/>
+              </a:schemeClr>
+            </a:lnRef>
+            <a:fillRef idx="1">
+              <a:schemeClr val="accent1"/>
+            </a:fillRef>
+            <a:effectRef idx="0">
+              <a:schemeClr val="accent1"/>
+            </a:effectRef>
+            <a:fontRef idx="minor">
+              <a:schemeClr val="lt1"/>
+            </a:fontRef>
+          </p:style>
+          <p:txBody>
+            <a:bodyPr rtlCol="0" anchor="ctr"/>
+            <a:lstStyle/>
+            <a:p>
+              <a:pPr algn="ctr"/>
+              <a:endParaRPr lang="pl-PL"/>
+            </a:p>
+          </p:txBody>
+        </p:sp>
+        <p:grpSp>
+          <p:nvGrpSpPr>
+            <p:cNvPr id="45" name="Chart_Backgrounds">
+              <a:extLst>
+                <a:ext uri="{FF2B5EF4-FFF2-40B4-BE49-F238E27FC236}">
+                  <a16:creationId xmlns:a16="http://schemas.microsoft.com/office/drawing/2014/main" id="{04B07420-461E-5790-CE3A-C073A76DDC27}"/>
+                </a:ext>
+              </a:extLst>
+            </p:cNvPr>
+            <p:cNvGrpSpPr>
+              <a:grpSpLocks noGrp="1" noUngrp="1" noRot="1" noMove="1" noResize="1"/>
+            </p:cNvGrpSpPr>
+            <p:nvPr/>
+          </p:nvGrpSpPr>
+          <p:grpSpPr>
+            <a:xfrm>
+              <a:off x="1828800" y="1581150"/>
+              <a:ext cx="21945600" cy="11525250"/>
+              <a:chOff x="1828800" y="1581150"/>
+              <a:chExt cx="21945600" cy="11525250"/>
+            </a:xfrm>
+          </p:grpSpPr>
+          <p:sp>
+            <p:nvSpPr>
+              <p:cNvPr id="44" name="3.2_Chart_BG">
+                <a:extLst>
+                  <a:ext uri="{FF2B5EF4-FFF2-40B4-BE49-F238E27FC236}">
+                    <a16:creationId xmlns:a16="http://schemas.microsoft.com/office/drawing/2014/main" id="{FB35D492-74F6-1167-AB44-0D0B2A794CB9}"/>
+                  </a:ext>
+                </a:extLst>
+              </p:cNvPr>
+              <p:cNvSpPr>
+                <a:spLocks noGrp="1" noRot="1" noMove="1" noResize="1" noEditPoints="1" noAdjustHandles="1" noChangeArrowheads="1" noChangeShapeType="1"/>
+              </p:cNvSpPr>
+              <p:nvPr/>
+            </p:nvSpPr>
+            <p:spPr>
+              <a:xfrm>
+                <a:off x="13030200" y="8953500"/>
+                <a:ext cx="10744200" cy="4152900"/>
+              </a:xfrm>
+              <a:prstGeom prst="rect">
+                <a:avLst/>
+              </a:prstGeom>
+              <a:solidFill>
+                <a:schemeClr val="bg1"/>
+              </a:solidFill>
+              <a:ln w="3175">
+                <a:solidFill>
+                  <a:srgbClr val="B1B8C5"/>
+                </a:solidFill>
+              </a:ln>
+              <a:effectLst>
+                <a:outerShdw blurRad="203200" dist="63500" dir="2700000" algn="tl" rotWithShape="0">
+                  <a:prstClr val="black">
+                    <a:alpha val="5000"/>
+                  </a:prstClr>
+                </a:outerShdw>
+              </a:effectLst>
+            </p:spPr>
+            <p:style>
+              <a:lnRef idx="2">
+                <a:schemeClr val="accent1">
+                  <a:shade val="15000"/>
+                </a:schemeClr>
+              </a:lnRef>
+              <a:fillRef idx="1">
+                <a:schemeClr val="accent1"/>
+              </a:fillRef>
+              <a:effectRef idx="0">
+                <a:schemeClr val="accent1"/>
+              </a:effectRef>
+              <a:fontRef idx="minor">
+                <a:schemeClr val="lt1"/>
+              </a:fontRef>
+            </p:style>
+            <p:txBody>
+              <a:bodyPr rtlCol="0" anchor="ctr"/>
+              <a:lstStyle/>
+              <a:p>
+                <a:pPr algn="ctr"/>
+                <a:endParaRPr lang="pl-PL">
+                  <a:latin typeface="Din" panose="02000504040000020003" pitchFamily="2" charset="0"/>
+                </a:endParaRPr>
+              </a:p>
+            </p:txBody>
+          </p:sp>
+          <p:sp>
+            <p:nvSpPr>
+              <p:cNvPr id="43" name="3.1_Chart_BG">
+                <a:extLst>
+                  <a:ext uri="{FF2B5EF4-FFF2-40B4-BE49-F238E27FC236}">
+                    <a16:creationId xmlns:a16="http://schemas.microsoft.com/office/drawing/2014/main" id="{983D6567-0339-D205-8CCC-3AFF6D8D0AC1}"/>
+                  </a:ext>
+                </a:extLst>
+              </p:cNvPr>
+              <p:cNvSpPr>
+                <a:spLocks noGrp="1" noRot="1" noMove="1" noResize="1" noEditPoints="1" noAdjustHandles="1" noChangeArrowheads="1" noChangeShapeType="1"/>
+              </p:cNvSpPr>
+              <p:nvPr/>
+            </p:nvSpPr>
+            <p:spPr>
+              <a:xfrm>
+                <a:off x="1828800" y="8953500"/>
+                <a:ext cx="10744200" cy="4152900"/>
+              </a:xfrm>
+              <a:prstGeom prst="rect">
+                <a:avLst/>
+              </a:prstGeom>
+              <a:solidFill>
+                <a:schemeClr val="bg1"/>
+              </a:solidFill>
+              <a:ln w="3175">
+                <a:solidFill>
+                  <a:srgbClr val="B1B8C5"/>
+                </a:solidFill>
+              </a:ln>
+              <a:effectLst>
+                <a:outerShdw blurRad="203200" dist="63500" dir="2700000" algn="tl" rotWithShape="0">
+                  <a:prstClr val="black">
+                    <a:alpha val="5000"/>
+                  </a:prstClr>
+                </a:outerShdw>
+              </a:effectLst>
+            </p:spPr>
+            <p:style>
+              <a:lnRef idx="2">
+                <a:schemeClr val="accent1">
+                  <a:shade val="15000"/>
+                </a:schemeClr>
+              </a:lnRef>
+              <a:fillRef idx="1">
+                <a:schemeClr val="accent1"/>
+              </a:fillRef>
+              <a:effectRef idx="0">
+                <a:schemeClr val="accent1"/>
+              </a:effectRef>
+              <a:fontRef idx="minor">
+                <a:schemeClr val="lt1"/>
+              </a:fontRef>
+            </p:style>
+            <p:txBody>
+              <a:bodyPr rtlCol="0" anchor="ctr"/>
+              <a:lstStyle/>
+              <a:p>
+                <a:pPr algn="ctr"/>
+                <a:endParaRPr lang="pl-PL">
+                  <a:latin typeface="Din" panose="02000504040000020003" pitchFamily="2" charset="0"/>
+                </a:endParaRPr>
+              </a:p>
+            </p:txBody>
+          </p:sp>
+          <p:sp>
+            <p:nvSpPr>
+              <p:cNvPr id="42" name="2.2_Chart_BG">
+                <a:extLst>
+                  <a:ext uri="{FF2B5EF4-FFF2-40B4-BE49-F238E27FC236}">
+                    <a16:creationId xmlns:a16="http://schemas.microsoft.com/office/drawing/2014/main" id="{48762949-D8C8-A905-3D78-58C155FF6D8E}"/>
+                  </a:ext>
+                </a:extLst>
+              </p:cNvPr>
+              <p:cNvSpPr>
+                <a:spLocks noGrp="1" noRot="1" noMove="1" noResize="1" noEditPoints="1" noAdjustHandles="1" noChangeArrowheads="1" noChangeShapeType="1"/>
+              </p:cNvSpPr>
+              <p:nvPr/>
+            </p:nvSpPr>
+            <p:spPr>
+              <a:xfrm>
+                <a:off x="13030200" y="1581150"/>
+                <a:ext cx="10744200" cy="6915150"/>
+              </a:xfrm>
+              <a:prstGeom prst="rect">
+                <a:avLst/>
+              </a:prstGeom>
+              <a:solidFill>
+                <a:schemeClr val="bg1"/>
+              </a:solidFill>
+              <a:ln w="3175">
+                <a:solidFill>
+                  <a:srgbClr val="B1B8C5"/>
+                </a:solidFill>
+              </a:ln>
+              <a:effectLst>
+                <a:outerShdw blurRad="203200" dist="63500" dir="2700000" algn="tl" rotWithShape="0">
+                  <a:prstClr val="black">
+                    <a:alpha val="5000"/>
+                  </a:prstClr>
+                </a:outerShdw>
+              </a:effectLst>
+            </p:spPr>
+            <p:style>
+              <a:lnRef idx="2">
+                <a:schemeClr val="accent1">
+                  <a:shade val="15000"/>
+                </a:schemeClr>
+              </a:lnRef>
+              <a:fillRef idx="1">
+                <a:schemeClr val="accent1"/>
+              </a:fillRef>
+              <a:effectRef idx="0">
+                <a:schemeClr val="accent1"/>
+              </a:effectRef>
+              <a:fontRef idx="minor">
+                <a:schemeClr val="lt1"/>
+              </a:fontRef>
+            </p:style>
+            <p:txBody>
+              <a:bodyPr rtlCol="0" anchor="ctr"/>
+              <a:lstStyle/>
+              <a:p>
+                <a:pPr algn="ctr"/>
+                <a:endParaRPr lang="pl-PL">
+                  <a:latin typeface="Din" panose="02000504040000020003" pitchFamily="2" charset="0"/>
+                </a:endParaRPr>
+              </a:p>
+            </p:txBody>
+          </p:sp>
+          <p:sp>
+            <p:nvSpPr>
+              <p:cNvPr id="41" name="2.1_Chart_BG">
+                <a:extLst>
+                  <a:ext uri="{FF2B5EF4-FFF2-40B4-BE49-F238E27FC236}">
+                    <a16:creationId xmlns:a16="http://schemas.microsoft.com/office/drawing/2014/main" id="{93046E24-79A1-E992-5964-9F00E433B134}"/>
+                  </a:ext>
+                </a:extLst>
+              </p:cNvPr>
+              <p:cNvSpPr>
+                <a:spLocks noGrp="1" noRot="1" noMove="1" noResize="1" noEditPoints="1" noAdjustHandles="1" noChangeArrowheads="1" noChangeShapeType="1"/>
+              </p:cNvSpPr>
+              <p:nvPr/>
+            </p:nvSpPr>
+            <p:spPr>
+              <a:xfrm>
+                <a:off x="1828800" y="4343400"/>
+                <a:ext cx="10744200" cy="4152900"/>
+              </a:xfrm>
+              <a:prstGeom prst="rect">
+                <a:avLst/>
+              </a:prstGeom>
+              <a:solidFill>
+                <a:schemeClr val="bg1"/>
+              </a:solidFill>
+              <a:ln w="3175">
+                <a:solidFill>
+                  <a:srgbClr val="B1B8C5"/>
+                </a:solidFill>
+              </a:ln>
+              <a:effectLst>
+                <a:outerShdw blurRad="203200" dist="63500" dir="2700000" algn="tl" rotWithShape="0">
+                  <a:prstClr val="black">
+                    <a:alpha val="5000"/>
+                  </a:prstClr>
+                </a:outerShdw>
+              </a:effectLst>
+            </p:spPr>
+            <p:style>
+              <a:lnRef idx="2">
+                <a:schemeClr val="accent1">
+                  <a:shade val="15000"/>
+                </a:schemeClr>
+              </a:lnRef>
+              <a:fillRef idx="1">
+                <a:schemeClr val="accent1"/>
+              </a:fillRef>
+              <a:effectRef idx="0">
+                <a:schemeClr val="accent1"/>
+              </a:effectRef>
+              <a:fontRef idx="minor">
+                <a:schemeClr val="lt1"/>
+              </a:fontRef>
+            </p:style>
+            <p:txBody>
+              <a:bodyPr rtlCol="0" anchor="ctr"/>
+              <a:lstStyle/>
+              <a:p>
+                <a:pPr algn="ctr"/>
+                <a:endParaRPr lang="pl-PL">
+                  <a:latin typeface="Din" panose="02000504040000020003" pitchFamily="2" charset="0"/>
+                </a:endParaRPr>
+              </a:p>
+            </p:txBody>
+          </p:sp>
+          <p:sp>
+            <p:nvSpPr>
+              <p:cNvPr id="39" name="1_Chart_BG">
+                <a:extLst>
+                  <a:ext uri="{FF2B5EF4-FFF2-40B4-BE49-F238E27FC236}">
+                    <a16:creationId xmlns:a16="http://schemas.microsoft.com/office/drawing/2014/main" id="{69E4849E-C540-F7C5-02C5-D4864113B474}"/>
+                  </a:ext>
+                </a:extLst>
+              </p:cNvPr>
+              <p:cNvSpPr>
+                <a:spLocks noGrp="1" noRot="1" noMove="1" noResize="1" noEditPoints="1" noAdjustHandles="1" noChangeArrowheads="1" noChangeShapeType="1"/>
+              </p:cNvSpPr>
+              <p:nvPr/>
+            </p:nvSpPr>
+            <p:spPr>
+              <a:xfrm>
+                <a:off x="1828800" y="1581150"/>
+                <a:ext cx="10744200" cy="2305050"/>
+              </a:xfrm>
+              <a:prstGeom prst="rect">
+                <a:avLst/>
+              </a:prstGeom>
+              <a:solidFill>
+                <a:schemeClr val="bg1"/>
+              </a:solidFill>
+              <a:ln w="3175">
+                <a:solidFill>
+                  <a:srgbClr val="B1B8C5"/>
+                </a:solidFill>
+              </a:ln>
+              <a:effectLst>
+                <a:outerShdw blurRad="203200" dist="63500" dir="2700000" algn="tl" rotWithShape="0">
+                  <a:prstClr val="black">
+                    <a:alpha val="5000"/>
+                  </a:prstClr>
+                </a:outerShdw>
+              </a:effectLst>
+            </p:spPr>
+            <p:style>
+              <a:lnRef idx="2">
+                <a:schemeClr val="accent1">
+                  <a:shade val="15000"/>
+                </a:schemeClr>
+              </a:lnRef>
+              <a:fillRef idx="1">
+                <a:schemeClr val="accent1"/>
+              </a:fillRef>
+              <a:effectRef idx="0">
+                <a:schemeClr val="accent1"/>
+              </a:effectRef>
+              <a:fontRef idx="minor">
+                <a:schemeClr val="lt1"/>
+              </a:fontRef>
+            </p:style>
+            <p:txBody>
+              <a:bodyPr rtlCol="0" anchor="ctr"/>
+              <a:lstStyle/>
+              <a:p>
+                <a:pPr algn="ctr"/>
+                <a:endParaRPr lang="pl-PL">
+                  <a:latin typeface="Din" panose="02000504040000020003" pitchFamily="2" charset="0"/>
+                </a:endParaRPr>
+              </a:p>
+            </p:txBody>
+          </p:sp>
+        </p:grpSp>
+      </p:grpSp>
+      <p:grpSp>
+        <p:nvGrpSpPr>
+          <p:cNvPr id="18" name="Navigation_Icons">
+            <a:extLst>
+              <a:ext uri="{FF2B5EF4-FFF2-40B4-BE49-F238E27FC236}">
+                <a16:creationId xmlns:a16="http://schemas.microsoft.com/office/drawing/2014/main" id="{395E1018-9B2A-8758-C346-55DC0300B81D}"/>
+              </a:ext>
+            </a:extLst>
+          </p:cNvPr>
+          <p:cNvGrpSpPr>
+            <a:grpSpLocks noGrp="1" noUngrp="1" noRot="1" noMove="1" noResize="1"/>
+          </p:cNvGrpSpPr>
+          <p:nvPr/>
+        </p:nvGrpSpPr>
+        <p:grpSpPr>
+          <a:xfrm>
+            <a:off x="266700" y="7701191"/>
+            <a:ext cx="687601" cy="5405209"/>
+            <a:chOff x="266700" y="7701191"/>
+            <a:chExt cx="687601" cy="5405209"/>
+          </a:xfrm>
+        </p:grpSpPr>
+        <p:pic>
+          <p:nvPicPr>
+            <p:cNvPr id="19" name="Customer" descr="A white person with black background&#10;&#10;Description automatically generated" hidden="1">
+              <a:extLst>
+                <a:ext uri="{FF2B5EF4-FFF2-40B4-BE49-F238E27FC236}">
+                  <a16:creationId xmlns:a16="http://schemas.microsoft.com/office/drawing/2014/main" id="{34404271-7B4D-92D4-408E-2707F8AB708F}"/>
+                </a:ext>
+              </a:extLst>
+            </p:cNvPr>
+            <p:cNvPicPr>
+              <a:picLocks noGrp="1" noRot="1" noChangeAspect="1" noMove="1" noResize="1" noEditPoints="1" noAdjustHandles="1" noChangeArrowheads="1" noChangeShapeType="1" noCrop="1"/>
+            </p:cNvPicPr>
+            <p:nvPr/>
+          </p:nvPicPr>
+          <p:blipFill>
+            <a:blip r:embed="rId2">
+              <a:extLst>
+                <a:ext uri="{28A0092B-C50C-407E-A947-70E740481C1C}">
+                  <a14:useLocalDpi xmlns:a14="http://schemas.microsoft.com/office/drawing/2010/main" val="0"/>
+                </a:ext>
+              </a:extLst>
+            </a:blip>
+            <a:stretch>
+              <a:fillRect/>
+            </a:stretch>
+          </p:blipFill>
+          <p:spPr>
+            <a:xfrm>
+              <a:off x="266700" y="11488391"/>
+              <a:ext cx="685800" cy="677537"/>
+            </a:xfrm>
+            <a:prstGeom prst="rect">
+              <a:avLst/>
+            </a:prstGeom>
+          </p:spPr>
+        </p:pic>
+        <p:pic>
+          <p:nvPicPr>
+            <p:cNvPr id="31" name="Retention" hidden="1">
+              <a:extLst>
+                <a:ext uri="{FF2B5EF4-FFF2-40B4-BE49-F238E27FC236}">
+                  <a16:creationId xmlns:a16="http://schemas.microsoft.com/office/drawing/2014/main" id="{9E6125AA-6E70-F2E1-9175-DDAA0C00D03B}"/>
+                </a:ext>
+              </a:extLst>
+            </p:cNvPr>
+            <p:cNvPicPr>
+              <a:picLocks noGrp="1" noRot="1" noChangeAspect="1" noMove="1" noResize="1" noEditPoints="1" noAdjustHandles="1" noChangeArrowheads="1" noChangeShapeType="1" noCrop="1"/>
+            </p:cNvPicPr>
+            <p:nvPr/>
+          </p:nvPicPr>
+          <p:blipFill>
+            <a:blip r:embed="rId3">
+              <a:extLst>
+                <a:ext uri="{28A0092B-C50C-407E-A947-70E740481C1C}">
+                  <a14:useLocalDpi xmlns:a14="http://schemas.microsoft.com/office/drawing/2010/main" val="0"/>
+                </a:ext>
+              </a:extLst>
+            </a:blip>
+            <a:stretch>
+              <a:fillRect/>
+            </a:stretch>
+          </p:blipFill>
+          <p:spPr>
+            <a:xfrm>
+              <a:off x="266700" y="12435191"/>
+              <a:ext cx="685800" cy="671209"/>
+            </a:xfrm>
+            <a:prstGeom prst="rect">
+              <a:avLst/>
+            </a:prstGeom>
+          </p:spPr>
+        </p:pic>
+        <p:pic>
+          <p:nvPicPr>
+            <p:cNvPr id="17" name="Delivery_Active">
+              <a:extLst>
+                <a:ext uri="{FF2B5EF4-FFF2-40B4-BE49-F238E27FC236}">
+                  <a16:creationId xmlns:a16="http://schemas.microsoft.com/office/drawing/2014/main" id="{A6BB39AE-8F90-FD67-DFB7-141158E71DCA}"/>
+                </a:ext>
+              </a:extLst>
+            </p:cNvPr>
+            <p:cNvPicPr>
+              <a:picLocks noGrp="1" noRot="1" noChangeAspect="1" noMove="1" noResize="1" noEditPoints="1" noAdjustHandles="1" noChangeArrowheads="1" noChangeShapeType="1" noCrop="1"/>
+            </p:cNvPicPr>
+            <p:nvPr/>
+          </p:nvPicPr>
+          <p:blipFill>
+            <a:blip r:embed="rId4">
+              <a:extLst>
+                <a:ext uri="{28A0092B-C50C-407E-A947-70E740481C1C}">
+                  <a14:useLocalDpi xmlns:a14="http://schemas.microsoft.com/office/drawing/2010/main" val="0"/>
+                </a:ext>
+              </a:extLst>
+            </a:blip>
+            <a:stretch>
+              <a:fillRect/>
+            </a:stretch>
+          </p:blipFill>
+          <p:spPr>
+            <a:xfrm>
+              <a:off x="266701" y="10631590"/>
+              <a:ext cx="687600" cy="508225"/>
+            </a:xfrm>
+            <a:prstGeom prst="rect">
+              <a:avLst/>
+            </a:prstGeom>
+          </p:spPr>
+        </p:pic>
+        <p:pic>
+          <p:nvPicPr>
+            <p:cNvPr id="29" name="Product" hidden="1">
+              <a:extLst>
+                <a:ext uri="{FF2B5EF4-FFF2-40B4-BE49-F238E27FC236}">
+                  <a16:creationId xmlns:a16="http://schemas.microsoft.com/office/drawing/2014/main" id="{80E31AE1-D341-3938-E0BD-BF35A0B911A6}"/>
+                </a:ext>
+              </a:extLst>
+            </p:cNvPr>
+            <p:cNvPicPr>
+              <a:picLocks noGrp="1" noRot="1" noChangeAspect="1" noMove="1" noResize="1" noEditPoints="1" noAdjustHandles="1" noChangeArrowheads="1" noChangeShapeType="1" noCrop="1"/>
+            </p:cNvPicPr>
+            <p:nvPr/>
+          </p:nvPicPr>
+          <p:blipFill>
+            <a:blip r:embed="rId5">
+              <a:extLst>
+                <a:ext uri="{28A0092B-C50C-407E-A947-70E740481C1C}">
+                  <a14:useLocalDpi xmlns:a14="http://schemas.microsoft.com/office/drawing/2010/main" val="0"/>
+                </a:ext>
+              </a:extLst>
+            </a:blip>
+            <a:stretch>
+              <a:fillRect/>
+            </a:stretch>
+          </p:blipFill>
+          <p:spPr>
+            <a:xfrm>
+              <a:off x="266700" y="9594791"/>
+              <a:ext cx="685800" cy="671209"/>
+            </a:xfrm>
+            <a:prstGeom prst="rect">
+              <a:avLst/>
+            </a:prstGeom>
+          </p:spPr>
+        </p:pic>
+        <p:pic>
+          <p:nvPicPr>
+            <p:cNvPr id="33" name="Sales" hidden="1">
+              <a:extLst>
+                <a:ext uri="{FF2B5EF4-FFF2-40B4-BE49-F238E27FC236}">
+                  <a16:creationId xmlns:a16="http://schemas.microsoft.com/office/drawing/2014/main" id="{CF5A9ED8-F64A-99ED-10E5-433533D48A5A}"/>
+                </a:ext>
+              </a:extLst>
+            </p:cNvPr>
+            <p:cNvPicPr>
+              <a:picLocks noGrp="1" noRot="1" noChangeAspect="1" noMove="1" noResize="1" noEditPoints="1" noAdjustHandles="1" noChangeArrowheads="1" noChangeShapeType="1" noCrop="1"/>
+            </p:cNvPicPr>
+            <p:nvPr/>
+          </p:nvPicPr>
+          <p:blipFill>
+            <a:blip r:embed="rId6">
+              <a:extLst>
+                <a:ext uri="{28A0092B-C50C-407E-A947-70E740481C1C}">
+                  <a14:useLocalDpi xmlns:a14="http://schemas.microsoft.com/office/drawing/2010/main" val="0"/>
+                </a:ext>
+              </a:extLst>
+            </a:blip>
+            <a:stretch>
+              <a:fillRect/>
+            </a:stretch>
+          </p:blipFill>
+          <p:spPr>
+            <a:xfrm>
+              <a:off x="266700" y="8647991"/>
+              <a:ext cx="685800" cy="671209"/>
+            </a:xfrm>
+            <a:prstGeom prst="rect">
+              <a:avLst/>
+            </a:prstGeom>
+          </p:spPr>
+        </p:pic>
+        <p:pic>
+          <p:nvPicPr>
+            <p:cNvPr id="27" name="Overview" descr="A black and white bar chart&#10;&#10;Description automatically generated" hidden="1">
+              <a:extLst>
+                <a:ext uri="{FF2B5EF4-FFF2-40B4-BE49-F238E27FC236}">
+                  <a16:creationId xmlns:a16="http://schemas.microsoft.com/office/drawing/2014/main" id="{A4EFBC23-2DB6-68F1-7E3E-630BA7A0EA91}"/>
+                </a:ext>
+              </a:extLst>
+            </p:cNvPr>
+            <p:cNvPicPr>
+              <a:picLocks noGrp="1" noRot="1" noChangeAspect="1" noMove="1" noResize="1" noEditPoints="1" noAdjustHandles="1" noChangeArrowheads="1" noChangeShapeType="1" noCrop="1"/>
+            </p:cNvPicPr>
+            <p:nvPr/>
+          </p:nvPicPr>
+          <p:blipFill>
+            <a:blip r:embed="rId7">
+              <a:extLst>
+                <a:ext uri="{28A0092B-C50C-407E-A947-70E740481C1C}">
+                  <a14:useLocalDpi xmlns:a14="http://schemas.microsoft.com/office/drawing/2010/main" val="0"/>
+                </a:ext>
+              </a:extLst>
+            </a:blip>
+            <a:stretch>
+              <a:fillRect/>
+            </a:stretch>
+          </p:blipFill>
+          <p:spPr>
+            <a:xfrm>
+              <a:off x="266700" y="7701191"/>
+              <a:ext cx="685800" cy="678426"/>
+            </a:xfrm>
+            <a:prstGeom prst="rect">
+              <a:avLst/>
+            </a:prstGeom>
+          </p:spPr>
+        </p:pic>
+      </p:grpSp>
+      <p:grpSp>
+        <p:nvGrpSpPr>
+          <p:cNvPr id="36" name="Filter_Icons" hidden="1">
+            <a:extLst>
+              <a:ext uri="{FF2B5EF4-FFF2-40B4-BE49-F238E27FC236}">
+                <a16:creationId xmlns:a16="http://schemas.microsoft.com/office/drawing/2014/main" id="{55EA662A-9608-0E24-7544-CB16F74BB291}"/>
+              </a:ext>
+            </a:extLst>
+          </p:cNvPr>
+          <p:cNvGrpSpPr>
+            <a:grpSpLocks noGrp="1" noUngrp="1" noRot="1" noMove="1" noResize="1"/>
+          </p:cNvGrpSpPr>
+          <p:nvPr/>
+        </p:nvGrpSpPr>
+        <p:grpSpPr>
+          <a:xfrm>
+            <a:off x="266700" y="266700"/>
+            <a:ext cx="685800" cy="1565340"/>
+            <a:chOff x="266700" y="266700"/>
+            <a:chExt cx="685800" cy="1565340"/>
+          </a:xfrm>
+        </p:grpSpPr>
+        <p:pic>
+          <p:nvPicPr>
+            <p:cNvPr id="23" name="Filter">
+              <a:extLst>
+                <a:ext uri="{FF2B5EF4-FFF2-40B4-BE49-F238E27FC236}">
+                  <a16:creationId xmlns:a16="http://schemas.microsoft.com/office/drawing/2014/main" id="{0D31A7DD-06A0-277A-C8C8-9EEE57F3023A}"/>
+                </a:ext>
+              </a:extLst>
+            </p:cNvPr>
+            <p:cNvPicPr>
+              <a:picLocks noGrp="1" noRot="1" noChangeAspect="1" noMove="1" noResize="1" noEditPoints="1" noAdjustHandles="1" noChangeArrowheads="1" noChangeShapeType="1" noCrop="1"/>
+            </p:cNvPicPr>
+            <p:nvPr/>
+          </p:nvPicPr>
+          <p:blipFill>
+            <a:blip r:embed="rId8">
+              <a:extLst>
+                <a:ext uri="{28A0092B-C50C-407E-A947-70E740481C1C}">
+                  <a14:useLocalDpi xmlns:a14="http://schemas.microsoft.com/office/drawing/2010/main" val="0"/>
+                </a:ext>
+              </a:extLst>
+            </a:blip>
+            <a:stretch>
+              <a:fillRect/>
+            </a:stretch>
+          </p:blipFill>
+          <p:spPr>
+            <a:xfrm>
+              <a:off x="266700" y="1219200"/>
+              <a:ext cx="685800" cy="612840"/>
+            </a:xfrm>
+            <a:prstGeom prst="rect">
+              <a:avLst/>
+            </a:prstGeom>
+          </p:spPr>
+        </p:pic>
+        <p:pic>
+          <p:nvPicPr>
+            <p:cNvPr id="35" name="Clear_Filters">
+              <a:extLst>
+                <a:ext uri="{FF2B5EF4-FFF2-40B4-BE49-F238E27FC236}">
+                  <a16:creationId xmlns:a16="http://schemas.microsoft.com/office/drawing/2014/main" id="{CBD63BE9-A275-DB5C-AC04-D6942FAB87BF}"/>
+                </a:ext>
+              </a:extLst>
+            </p:cNvPr>
+            <p:cNvPicPr>
+              <a:picLocks noGrp="1" noRot="1" noChangeAspect="1" noMove="1" noResize="1" noEditPoints="1" noAdjustHandles="1" noChangeArrowheads="1" noChangeShapeType="1" noCrop="1"/>
+            </p:cNvPicPr>
+            <p:nvPr/>
+          </p:nvPicPr>
+          <p:blipFill>
+            <a:blip r:embed="rId9">
+              <a:extLst>
+                <a:ext uri="{28A0092B-C50C-407E-A947-70E740481C1C}">
+                  <a14:useLocalDpi xmlns:a14="http://schemas.microsoft.com/office/drawing/2010/main" val="0"/>
+                </a:ext>
+              </a:extLst>
+            </a:blip>
+            <a:stretch>
+              <a:fillRect/>
+            </a:stretch>
+          </p:blipFill>
+          <p:spPr>
+            <a:xfrm>
+              <a:off x="266700" y="266700"/>
+              <a:ext cx="685800" cy="685800"/>
+            </a:xfrm>
+            <a:prstGeom prst="rect">
+              <a:avLst/>
+            </a:prstGeom>
+          </p:spPr>
+        </p:pic>
+      </p:grpSp>
+      <p:grpSp>
+        <p:nvGrpSpPr>
+          <p:cNvPr id="15" name="Margins" hidden="1">
+            <a:extLst>
+              <a:ext uri="{FF2B5EF4-FFF2-40B4-BE49-F238E27FC236}">
+                <a16:creationId xmlns:a16="http://schemas.microsoft.com/office/drawing/2014/main" id="{3A7668E8-5B3C-6507-FA98-4CC00C9EA2A8}"/>
+              </a:ext>
+            </a:extLst>
+          </p:cNvPr>
+          <p:cNvGrpSpPr>
+            <a:grpSpLocks noGrp="1" noUngrp="1" noRot="1" noMove="1" noResize="1"/>
+          </p:cNvGrpSpPr>
+          <p:nvPr/>
+        </p:nvGrpSpPr>
+        <p:grpSpPr>
+          <a:xfrm>
+            <a:off x="1219200" y="0"/>
+            <a:ext cx="23164800" cy="13716000"/>
+            <a:chOff x="1219200" y="0"/>
+            <a:chExt cx="23164800" cy="13716000"/>
+          </a:xfrm>
+        </p:grpSpPr>
+        <p:grpSp>
+          <p:nvGrpSpPr>
+            <p:cNvPr id="13" name="Main">
+              <a:extLst>
+                <a:ext uri="{FF2B5EF4-FFF2-40B4-BE49-F238E27FC236}">
+                  <a16:creationId xmlns:a16="http://schemas.microsoft.com/office/drawing/2014/main" id="{F6F54732-847D-5C13-1DBD-FEC62B2DA619}"/>
+                </a:ext>
+              </a:extLst>
+            </p:cNvPr>
+            <p:cNvGrpSpPr>
+              <a:grpSpLocks noGrp="1" noUngrp="1" noRot="1" noMove="1" noResize="1"/>
+            </p:cNvGrpSpPr>
+            <p:nvPr/>
+          </p:nvGrpSpPr>
+          <p:grpSpPr>
+            <a:xfrm>
+              <a:off x="1219200" y="0"/>
+              <a:ext cx="23164800" cy="13716000"/>
+              <a:chOff x="1219200" y="0"/>
+              <a:chExt cx="23164800" cy="13716000"/>
+            </a:xfrm>
+          </p:grpSpPr>
+          <p:sp>
+            <p:nvSpPr>
+              <p:cNvPr id="4" name="H_Bottom_Margin">
+                <a:extLst>
+                  <a:ext uri="{FF2B5EF4-FFF2-40B4-BE49-F238E27FC236}">
+                    <a16:creationId xmlns:a16="http://schemas.microsoft.com/office/drawing/2014/main" id="{D9C46175-3CDD-2884-0097-0307AA41B9C2}"/>
+                  </a:ext>
+                </a:extLst>
+              </p:cNvPr>
+              <p:cNvSpPr>
+                <a:spLocks noGrp="1" noRot="1" noMove="1" noResize="1" noEditPoints="1" noAdjustHandles="1" noChangeArrowheads="1" noChangeShapeType="1"/>
+              </p:cNvSpPr>
+              <p:nvPr/>
+            </p:nvSpPr>
+            <p:spPr>
+              <a:xfrm>
+                <a:off x="1219200" y="13106400"/>
+                <a:ext cx="23164800" cy="609600"/>
+              </a:xfrm>
+              <a:prstGeom prst="rect">
+                <a:avLst/>
+              </a:prstGeom>
+              <a:solidFill>
+                <a:schemeClr val="accent2">
+                  <a:alpha val="30000"/>
+                </a:schemeClr>
+              </a:solidFill>
+              <a:ln>
+                <a:noFill/>
+              </a:ln>
+            </p:spPr>
+            <p:style>
+              <a:lnRef idx="2">
+                <a:schemeClr val="accent2">
+                  <a:shade val="15000"/>
+                </a:schemeClr>
+              </a:lnRef>
+              <a:fillRef idx="1">
+                <a:schemeClr val="accent2"/>
+              </a:fillRef>
+              <a:effectRef idx="0">
+                <a:schemeClr val="accent2"/>
+              </a:effectRef>
+              <a:fontRef idx="minor">
+                <a:schemeClr val="lt1"/>
+              </a:fontRef>
+            </p:style>
+            <p:txBody>
+              <a:bodyPr rtlCol="0" anchor="ctr"/>
+              <a:lstStyle/>
+              <a:p>
+                <a:pPr algn="ctr"/>
+                <a:endParaRPr lang="pl-PL"/>
+              </a:p>
+            </p:txBody>
+          </p:sp>
+          <p:sp>
+            <p:nvSpPr>
+              <p:cNvPr id="2" name="V_Left_Margin">
+                <a:extLst>
+                  <a:ext uri="{FF2B5EF4-FFF2-40B4-BE49-F238E27FC236}">
+                    <a16:creationId xmlns:a16="http://schemas.microsoft.com/office/drawing/2014/main" id="{EFBEE9D4-C37E-263C-5A6F-A2CA6967FA20}"/>
+                  </a:ext>
+                </a:extLst>
+              </p:cNvPr>
+              <p:cNvSpPr>
+                <a:spLocks noGrp="1" noRot="1" noMove="1" noResize="1" noEditPoints="1" noAdjustHandles="1" noChangeArrowheads="1" noChangeShapeType="1"/>
+              </p:cNvSpPr>
+              <p:nvPr/>
+            </p:nvSpPr>
+            <p:spPr>
+              <a:xfrm>
+                <a:off x="1219200" y="0"/>
+                <a:ext cx="609600" cy="13716000"/>
+              </a:xfrm>
+              <a:prstGeom prst="rect">
+                <a:avLst/>
+              </a:prstGeom>
+              <a:solidFill>
+                <a:schemeClr val="accent2">
+                  <a:alpha val="30000"/>
+                </a:schemeClr>
+              </a:solidFill>
+              <a:ln>
+                <a:noFill/>
+              </a:ln>
+            </p:spPr>
+            <p:style>
+              <a:lnRef idx="2">
+                <a:schemeClr val="accent2">
+                  <a:shade val="15000"/>
+                </a:schemeClr>
+              </a:lnRef>
+              <a:fillRef idx="1">
+                <a:schemeClr val="accent2"/>
+              </a:fillRef>
+              <a:effectRef idx="0">
+                <a:schemeClr val="accent2"/>
+              </a:effectRef>
+              <a:fontRef idx="minor">
+                <a:schemeClr val="lt1"/>
+              </a:fontRef>
+            </p:style>
+            <p:txBody>
+              <a:bodyPr rtlCol="0" anchor="ctr"/>
+              <a:lstStyle/>
+              <a:p>
+                <a:pPr algn="ctr"/>
+                <a:endParaRPr lang="pl-PL"/>
+              </a:p>
+            </p:txBody>
+          </p:sp>
+          <p:sp>
+            <p:nvSpPr>
+              <p:cNvPr id="3" name="V_Right_Margin">
+                <a:extLst>
+                  <a:ext uri="{FF2B5EF4-FFF2-40B4-BE49-F238E27FC236}">
+                    <a16:creationId xmlns:a16="http://schemas.microsoft.com/office/drawing/2014/main" id="{A7BB4A29-D641-7786-2AE0-59780B2DBF51}"/>
+                  </a:ext>
+                </a:extLst>
+              </p:cNvPr>
+              <p:cNvSpPr>
+                <a:spLocks noGrp="1" noRot="1" noMove="1" noResize="1" noEditPoints="1" noAdjustHandles="1" noChangeArrowheads="1" noChangeShapeType="1"/>
+              </p:cNvSpPr>
+              <p:nvPr/>
+            </p:nvSpPr>
+            <p:spPr>
+              <a:xfrm>
+                <a:off x="23774400" y="0"/>
+                <a:ext cx="609600" cy="13716000"/>
+              </a:xfrm>
+              <a:prstGeom prst="rect">
+                <a:avLst/>
+              </a:prstGeom>
+              <a:solidFill>
+                <a:schemeClr val="accent2">
+                  <a:alpha val="30000"/>
+                </a:schemeClr>
+              </a:solidFill>
+              <a:ln>
+                <a:noFill/>
+              </a:ln>
+            </p:spPr>
+            <p:style>
+              <a:lnRef idx="2">
+                <a:schemeClr val="accent2">
+                  <a:shade val="15000"/>
+                </a:schemeClr>
+              </a:lnRef>
+              <a:fillRef idx="1">
+                <a:schemeClr val="accent2"/>
+              </a:fillRef>
+              <a:effectRef idx="0">
+                <a:schemeClr val="accent2"/>
+              </a:effectRef>
+              <a:fontRef idx="minor">
+                <a:schemeClr val="lt1"/>
+              </a:fontRef>
+            </p:style>
+            <p:txBody>
+              <a:bodyPr rtlCol="0" anchor="ctr"/>
+              <a:lstStyle/>
+              <a:p>
+                <a:pPr algn="ctr"/>
+                <a:endParaRPr lang="pl-PL"/>
+              </a:p>
+            </p:txBody>
+          </p:sp>
+        </p:grpSp>
+        <p:grpSp>
+          <p:nvGrpSpPr>
+            <p:cNvPr id="14" name="Sub">
+              <a:extLst>
+                <a:ext uri="{FF2B5EF4-FFF2-40B4-BE49-F238E27FC236}">
+                  <a16:creationId xmlns:a16="http://schemas.microsoft.com/office/drawing/2014/main" id="{E869BBD6-CD1C-0A5B-97C4-2994694AAC50}"/>
+                </a:ext>
+              </a:extLst>
+            </p:cNvPr>
+            <p:cNvGrpSpPr>
+              <a:grpSpLocks noGrp="1" noUngrp="1" noRot="1" noMove="1" noResize="1"/>
+            </p:cNvGrpSpPr>
+            <p:nvPr/>
+          </p:nvGrpSpPr>
+          <p:grpSpPr>
+            <a:xfrm>
+              <a:off x="1219200" y="0"/>
+              <a:ext cx="23164800" cy="13716000"/>
+              <a:chOff x="1219200" y="0"/>
+              <a:chExt cx="23164800" cy="13716000"/>
+            </a:xfrm>
+          </p:grpSpPr>
+          <p:sp>
+            <p:nvSpPr>
+              <p:cNvPr id="11" name="H_3_Margin">
+                <a:extLst>
+                  <a:ext uri="{FF2B5EF4-FFF2-40B4-BE49-F238E27FC236}">
+                    <a16:creationId xmlns:a16="http://schemas.microsoft.com/office/drawing/2014/main" id="{7735B8AF-7C32-2059-5571-CFE9A6CAB35E}"/>
+                  </a:ext>
+                </a:extLst>
+              </p:cNvPr>
+              <p:cNvSpPr>
+                <a:spLocks noGrp="1" noRot="1" noMove="1" noResize="1" noEditPoints="1" noAdjustHandles="1" noChangeArrowheads="1" noChangeShapeType="1"/>
+              </p:cNvSpPr>
+              <p:nvPr/>
+            </p:nvSpPr>
+            <p:spPr>
+              <a:xfrm>
+                <a:off x="1219200" y="8496300"/>
+                <a:ext cx="23164800" cy="457200"/>
+              </a:xfrm>
+              <a:prstGeom prst="rect">
+                <a:avLst/>
+              </a:prstGeom>
+              <a:solidFill>
+                <a:schemeClr val="accent2">
+                  <a:alpha val="10000"/>
+                </a:schemeClr>
+              </a:solidFill>
+              <a:ln>
+                <a:noFill/>
+              </a:ln>
+            </p:spPr>
+            <p:style>
+              <a:lnRef idx="2">
+                <a:schemeClr val="accent2">
+                  <a:shade val="15000"/>
+                </a:schemeClr>
+              </a:lnRef>
+              <a:fillRef idx="1">
+                <a:schemeClr val="accent2"/>
+              </a:fillRef>
+              <a:effectRef idx="0">
+                <a:schemeClr val="accent2"/>
+              </a:effectRef>
+              <a:fontRef idx="minor">
+                <a:schemeClr val="lt1"/>
+              </a:fontRef>
+            </p:style>
+            <p:txBody>
+              <a:bodyPr rtlCol="0" anchor="ctr"/>
+              <a:lstStyle/>
+              <a:p>
+                <a:pPr algn="ctr"/>
+                <a:endParaRPr lang="pl-PL"/>
+              </a:p>
+            </p:txBody>
+          </p:sp>
+          <p:sp>
+            <p:nvSpPr>
+              <p:cNvPr id="10" name="H_2_Margin">
+                <a:extLst>
+                  <a:ext uri="{FF2B5EF4-FFF2-40B4-BE49-F238E27FC236}">
+                    <a16:creationId xmlns:a16="http://schemas.microsoft.com/office/drawing/2014/main" id="{63F25BB1-C29B-A354-2A7A-D2ED388B2734}"/>
+                  </a:ext>
+                </a:extLst>
+              </p:cNvPr>
+              <p:cNvSpPr>
+                <a:spLocks noGrp="1" noRot="1" noMove="1" noResize="1" noEditPoints="1" noAdjustHandles="1" noChangeArrowheads="1" noChangeShapeType="1"/>
+              </p:cNvSpPr>
+              <p:nvPr/>
+            </p:nvSpPr>
+            <p:spPr>
+              <a:xfrm>
+                <a:off x="1219200" y="3886200"/>
+                <a:ext cx="23164800" cy="457200"/>
+              </a:xfrm>
+              <a:prstGeom prst="rect">
+                <a:avLst/>
+              </a:prstGeom>
+              <a:solidFill>
+                <a:schemeClr val="accent2">
+                  <a:alpha val="10000"/>
+                </a:schemeClr>
+              </a:solidFill>
+              <a:ln>
+                <a:noFill/>
+              </a:ln>
+            </p:spPr>
+            <p:style>
+              <a:lnRef idx="2">
+                <a:schemeClr val="accent2">
+                  <a:shade val="15000"/>
+                </a:schemeClr>
+              </a:lnRef>
+              <a:fillRef idx="1">
+                <a:schemeClr val="accent2"/>
+              </a:fillRef>
+              <a:effectRef idx="0">
+                <a:schemeClr val="accent2"/>
+              </a:effectRef>
+              <a:fontRef idx="minor">
+                <a:schemeClr val="lt1"/>
+              </a:fontRef>
+            </p:style>
+            <p:txBody>
+              <a:bodyPr rtlCol="0" anchor="ctr"/>
+              <a:lstStyle/>
+              <a:p>
+                <a:pPr algn="ctr"/>
+                <a:endParaRPr lang="pl-PL"/>
+              </a:p>
+            </p:txBody>
+          </p:sp>
+          <p:sp>
+            <p:nvSpPr>
+              <p:cNvPr id="5" name="H_1_Margin">
+                <a:extLst>
+                  <a:ext uri="{FF2B5EF4-FFF2-40B4-BE49-F238E27FC236}">
+                    <a16:creationId xmlns:a16="http://schemas.microsoft.com/office/drawing/2014/main" id="{9968A711-BA69-1CB6-F295-6BAD89359B6F}"/>
+                  </a:ext>
+                </a:extLst>
+              </p:cNvPr>
+              <p:cNvSpPr>
+                <a:spLocks noGrp="1" noRot="1" noMove="1" noResize="1" noEditPoints="1" noAdjustHandles="1" noChangeArrowheads="1" noChangeShapeType="1"/>
+              </p:cNvSpPr>
+              <p:nvPr/>
+            </p:nvSpPr>
+            <p:spPr>
+              <a:xfrm>
+                <a:off x="1219200" y="1143000"/>
+                <a:ext cx="23164800" cy="457200"/>
+              </a:xfrm>
+              <a:prstGeom prst="rect">
+                <a:avLst/>
+              </a:prstGeom>
+              <a:solidFill>
+                <a:schemeClr val="accent2">
+                  <a:alpha val="10000"/>
+                </a:schemeClr>
+              </a:solidFill>
+              <a:ln>
+                <a:noFill/>
+              </a:ln>
+            </p:spPr>
+            <p:style>
+              <a:lnRef idx="2">
+                <a:schemeClr val="accent2">
+                  <a:shade val="15000"/>
+                </a:schemeClr>
+              </a:lnRef>
+              <a:fillRef idx="1">
+                <a:schemeClr val="accent2"/>
+              </a:fillRef>
+              <a:effectRef idx="0">
+                <a:schemeClr val="accent2"/>
+              </a:effectRef>
+              <a:fontRef idx="minor">
+                <a:schemeClr val="lt1"/>
+              </a:fontRef>
+            </p:style>
+            <p:txBody>
+              <a:bodyPr rtlCol="0" anchor="ctr"/>
+              <a:lstStyle/>
+              <a:p>
+                <a:pPr algn="ctr"/>
+                <a:endParaRPr lang="pl-PL"/>
+              </a:p>
+            </p:txBody>
+          </p:sp>
+          <p:sp>
+            <p:nvSpPr>
+              <p:cNvPr id="12" name="V_Center_Margin">
+                <a:extLst>
+                  <a:ext uri="{FF2B5EF4-FFF2-40B4-BE49-F238E27FC236}">
+                    <a16:creationId xmlns:a16="http://schemas.microsoft.com/office/drawing/2014/main" id="{64EA36DC-E110-36BA-53BE-5305ADE6E04A}"/>
+                  </a:ext>
+                </a:extLst>
+              </p:cNvPr>
+              <p:cNvSpPr>
+                <a:spLocks noGrp="1" noRot="1" noMove="1" noResize="1" noEditPoints="1" noAdjustHandles="1" noChangeArrowheads="1" noChangeShapeType="1"/>
+              </p:cNvSpPr>
+              <p:nvPr/>
+            </p:nvSpPr>
+            <p:spPr>
+              <a:xfrm>
+                <a:off x="12573000" y="0"/>
+                <a:ext cx="457200" cy="13716000"/>
+              </a:xfrm>
+              <a:prstGeom prst="rect">
+                <a:avLst/>
+              </a:prstGeom>
+              <a:solidFill>
+                <a:schemeClr val="accent2">
+                  <a:alpha val="10000"/>
+                </a:schemeClr>
+              </a:solidFill>
+              <a:ln>
+                <a:noFill/>
+              </a:ln>
+            </p:spPr>
+            <p:style>
+              <a:lnRef idx="2">
+                <a:schemeClr val="accent2">
+                  <a:shade val="15000"/>
+                </a:schemeClr>
+              </a:lnRef>
+              <a:fillRef idx="1">
+                <a:schemeClr val="accent2"/>
+              </a:fillRef>
+              <a:effectRef idx="0">
+                <a:schemeClr val="accent2"/>
+              </a:effectRef>
+              <a:fontRef idx="minor">
+                <a:schemeClr val="lt1"/>
+              </a:fontRef>
+            </p:style>
+            <p:txBody>
+              <a:bodyPr rtlCol="0" anchor="ctr"/>
+              <a:lstStyle/>
+              <a:p>
+                <a:pPr algn="ctr"/>
+                <a:endParaRPr lang="pl-PL"/>
+              </a:p>
+            </p:txBody>
+          </p:sp>
+        </p:grpSp>
+      </p:grpSp>
+      <p:sp>
+        <p:nvSpPr>
+          <p:cNvPr id="9" name="Text_Results_By" hidden="1">
+            <a:extLst>
+              <a:ext uri="{FF2B5EF4-FFF2-40B4-BE49-F238E27FC236}">
+                <a16:creationId xmlns:a16="http://schemas.microsoft.com/office/drawing/2014/main" id="{7658BB83-70B6-06BD-2168-03FCCE59DAF2}"/>
+              </a:ext>
+            </a:extLst>
+          </p:cNvPr>
+          <p:cNvSpPr txBox="1">
+            <a:spLocks noGrp="1" noRot="1" noMove="1" noResize="1" noEditPoints="1" noAdjustHandles="1" noChangeArrowheads="1" noChangeShapeType="1"/>
+          </p:cNvSpPr>
+          <p:nvPr/>
+        </p:nvSpPr>
+        <p:spPr>
+          <a:xfrm>
+            <a:off x="1873250" y="1202323"/>
+            <a:ext cx="21901150" cy="338554"/>
+          </a:xfrm>
+          <a:prstGeom prst="rect">
+            <a:avLst/>
+          </a:prstGeom>
+          <a:noFill/>
+        </p:spPr>
+        <p:txBody>
+          <a:bodyPr wrap="square" rtlCol="0">
+            <a:spAutoFit/>
+          </a:bodyPr>
+          <a:lstStyle/>
+          <a:p>
+            <a:r>
+              <a:rPr lang="pl-PL" sz="1600" dirty="0">
+                <a:solidFill>
+                  <a:srgbClr val="344C69"/>
+                </a:solidFill>
+                <a:latin typeface="DIN" panose="02000504040000020003" pitchFamily="2" charset="0"/>
+              </a:rPr>
+              <a:t>Show results by</a:t>
+            </a:r>
+          </a:p>
+        </p:txBody>
+      </p:sp>
+      <p:sp>
+        <p:nvSpPr>
+          <p:cNvPr id="22" name="Title">
+            <a:extLst>
+              <a:ext uri="{FF2B5EF4-FFF2-40B4-BE49-F238E27FC236}">
+                <a16:creationId xmlns:a16="http://schemas.microsoft.com/office/drawing/2014/main" id="{E8225F30-BC0F-8F7B-9723-5F424DE87109}"/>
+              </a:ext>
+            </a:extLst>
+          </p:cNvPr>
+          <p:cNvSpPr txBox="1">
+            <a:spLocks noGrp="1" noRot="1" noMove="1" noResize="1" noEditPoints="1" noAdjustHandles="1" noChangeArrowheads="1" noChangeShapeType="1"/>
+          </p:cNvSpPr>
+          <p:nvPr/>
+        </p:nvSpPr>
+        <p:spPr>
+          <a:xfrm>
+            <a:off x="1828800" y="190500"/>
+            <a:ext cx="21945600" cy="1015663"/>
+          </a:xfrm>
+          <a:prstGeom prst="rect">
+            <a:avLst/>
+          </a:prstGeom>
+          <a:noFill/>
+        </p:spPr>
+        <p:txBody>
+          <a:bodyPr wrap="square" rtlCol="0">
+            <a:spAutoFit/>
+          </a:bodyPr>
+          <a:lstStyle/>
+          <a:p>
+            <a:r>
+              <a:rPr lang="pl-PL" sz="6000" dirty="0">
+                <a:solidFill>
+                  <a:srgbClr val="344C69"/>
+                </a:solidFill>
+                <a:effectLst>
+                  <a:outerShdw blurRad="38100" dist="38100" dir="2700000" algn="tl">
+                    <a:srgbClr val="000000">
+                      <a:alpha val="43137"/>
+                    </a:srgbClr>
+                  </a:outerShdw>
+                </a:effectLst>
+                <a:latin typeface="DIN" panose="02000504040000020003" pitchFamily="2" charset="0"/>
+              </a:rPr>
+              <a:t>Delivery Performance Analysis</a:t>
+            </a:r>
+          </a:p>
+        </p:txBody>
+      </p:sp>
+    </p:spTree>
+    <p:extLst>
+      <p:ext uri="{BB962C8B-B14F-4D97-AF65-F5344CB8AC3E}">
+        <p14:creationId xmlns:p14="http://schemas.microsoft.com/office/powerpoint/2010/main" val="2361358370"/>
+      </p:ext>
+    </p:extLst>
+  </p:cSld>
+  <p:clrMapOvr>
+    <a:masterClrMapping/>
+  </p:clrMapOvr>
+</p:sld>
+</file>
+
+<file path=ppt/slides/slide5.xml><?xml version="1.0" encoding="utf-8"?>
+<p:sld xmlns:a="http://schemas.openxmlformats.org/drawingml/2006/main" xmlns:r="http://schemas.openxmlformats.org/officeDocument/2006/relationships" xmlns:p="http://schemas.openxmlformats.org/presentationml/2006/main">
+  <p:cSld>
+    <p:spTree>
+      <p:nvGrpSpPr>
+        <p:cNvPr id="1" name=""/>
+        <p:cNvGrpSpPr/>
+        <p:nvPr/>
+      </p:nvGrpSpPr>
+      <p:grpSpPr>
+        <a:xfrm>
+          <a:off x="0" y="0"/>
+          <a:ext cx="0" cy="0"/>
+          <a:chOff x="0" y="0"/>
+          <a:chExt cx="0" cy="0"/>
+        </a:xfrm>
+      </p:grpSpPr>
+      <p:grpSp>
+        <p:nvGrpSpPr>
+          <p:cNvPr id="6" name="Backgrounds">
+            <a:extLst>
+              <a:ext uri="{FF2B5EF4-FFF2-40B4-BE49-F238E27FC236}">
+                <a16:creationId xmlns:a16="http://schemas.microsoft.com/office/drawing/2014/main" id="{5BE192BD-2182-D858-1776-9B1F943D3726}"/>
+              </a:ext>
+            </a:extLst>
+          </p:cNvPr>
+          <p:cNvGrpSpPr>
+            <a:grpSpLocks noGrp="1" noUngrp="1" noRot="1" noMove="1" noResize="1"/>
+          </p:cNvGrpSpPr>
+          <p:nvPr/>
+        </p:nvGrpSpPr>
+        <p:grpSpPr>
+          <a:xfrm>
+            <a:off x="0" y="0"/>
+            <a:ext cx="24384000" cy="13716000"/>
+            <a:chOff x="0" y="0"/>
+            <a:chExt cx="24384000" cy="13716000"/>
+          </a:xfrm>
+        </p:grpSpPr>
+        <p:sp>
+          <p:nvSpPr>
+            <p:cNvPr id="8" name="Canvas_BG">
+              <a:extLst>
+                <a:ext uri="{FF2B5EF4-FFF2-40B4-BE49-F238E27FC236}">
+                  <a16:creationId xmlns:a16="http://schemas.microsoft.com/office/drawing/2014/main" id="{107A83FF-6F34-9166-FDA5-FF2A441354C4}"/>
+                </a:ext>
+              </a:extLst>
+            </p:cNvPr>
+            <p:cNvSpPr>
+              <a:spLocks noGrp="1" noRot="1" noMove="1" noResize="1" noEditPoints="1" noAdjustHandles="1" noChangeArrowheads="1" noChangeShapeType="1"/>
+            </p:cNvSpPr>
+            <p:nvPr/>
+          </p:nvSpPr>
+          <p:spPr>
+            <a:xfrm>
+              <a:off x="1219200" y="0"/>
+              <a:ext cx="23164800" cy="13716000"/>
+            </a:xfrm>
+            <a:prstGeom prst="rect">
+              <a:avLst/>
+            </a:prstGeom>
+            <a:solidFill>
+              <a:srgbClr val="FBFBFB"/>
+            </a:solidFill>
+            <a:ln>
+              <a:noFill/>
+            </a:ln>
+          </p:spPr>
+          <p:style>
+            <a:lnRef idx="2">
+              <a:schemeClr val="accent1">
+                <a:shade val="15000"/>
+              </a:schemeClr>
+            </a:lnRef>
+            <a:fillRef idx="1">
+              <a:schemeClr val="accent1"/>
+            </a:fillRef>
+            <a:effectRef idx="0">
+              <a:schemeClr val="accent1"/>
+            </a:effectRef>
+            <a:fontRef idx="minor">
+              <a:schemeClr val="lt1"/>
+            </a:fontRef>
+          </p:style>
+          <p:txBody>
+            <a:bodyPr rtlCol="0" anchor="ctr"/>
+            <a:lstStyle/>
+            <a:p>
+              <a:pPr algn="ctr"/>
+              <a:endParaRPr lang="pl-PL" dirty="0">
+                <a:latin typeface="Din" panose="02000504040000020003" pitchFamily="2" charset="0"/>
+              </a:endParaRPr>
+            </a:p>
+          </p:txBody>
+        </p:sp>
+        <p:sp>
+          <p:nvSpPr>
+            <p:cNvPr id="7" name="Navigation_BG">
+              <a:extLst>
+                <a:ext uri="{FF2B5EF4-FFF2-40B4-BE49-F238E27FC236}">
+                  <a16:creationId xmlns:a16="http://schemas.microsoft.com/office/drawing/2014/main" id="{96ECBF68-D8E5-02F8-ED61-C5A371ECEFB1}"/>
+                </a:ext>
+              </a:extLst>
+            </p:cNvPr>
+            <p:cNvSpPr>
+              <a:spLocks noGrp="1" noRot="1" noMove="1" noResize="1" noEditPoints="1" noAdjustHandles="1" noChangeArrowheads="1" noChangeShapeType="1"/>
+            </p:cNvSpPr>
+            <p:nvPr/>
+          </p:nvSpPr>
+          <p:spPr>
+            <a:xfrm>
+              <a:off x="0" y="0"/>
+              <a:ext cx="1219200" cy="13716000"/>
+            </a:xfrm>
+            <a:prstGeom prst="rect">
+              <a:avLst/>
+            </a:prstGeom>
+            <a:gradFill flip="none" rotWithShape="1">
+              <a:gsLst>
+                <a:gs pos="0">
+                  <a:srgbClr val="375881"/>
+                </a:gs>
+                <a:gs pos="23000">
+                  <a:srgbClr val="314E72"/>
+                </a:gs>
+                <a:gs pos="69000">
+                  <a:srgbClr val="2B4564"/>
+                </a:gs>
+                <a:gs pos="97000">
+                  <a:srgbClr val="233851"/>
+                </a:gs>
+              </a:gsLst>
+              <a:path path="circle">
+                <a:fillToRect l="50000" t="50000" r="50000" b="50000"/>
+              </a:path>
+              <a:tileRect/>
+            </a:gradFill>
+            <a:ln>
+              <a:noFill/>
+            </a:ln>
+          </p:spPr>
+          <p:style>
+            <a:lnRef idx="2">
+              <a:schemeClr val="accent1">
+                <a:shade val="15000"/>
+              </a:schemeClr>
+            </a:lnRef>
+            <a:fillRef idx="1">
+              <a:schemeClr val="accent1"/>
+            </a:fillRef>
+            <a:effectRef idx="0">
+              <a:schemeClr val="accent1"/>
+            </a:effectRef>
+            <a:fontRef idx="minor">
+              <a:schemeClr val="lt1"/>
+            </a:fontRef>
+          </p:style>
+          <p:txBody>
+            <a:bodyPr rtlCol="0" anchor="ctr"/>
+            <a:lstStyle/>
+            <a:p>
+              <a:pPr algn="ctr"/>
+              <a:endParaRPr lang="pl-PL"/>
+            </a:p>
+          </p:txBody>
+        </p:sp>
+        <p:grpSp>
+          <p:nvGrpSpPr>
+            <p:cNvPr id="45" name="Chart_Backgrounds">
+              <a:extLst>
+                <a:ext uri="{FF2B5EF4-FFF2-40B4-BE49-F238E27FC236}">
+                  <a16:creationId xmlns:a16="http://schemas.microsoft.com/office/drawing/2014/main" id="{04B07420-461E-5790-CE3A-C073A76DDC27}"/>
+                </a:ext>
+              </a:extLst>
+            </p:cNvPr>
+            <p:cNvGrpSpPr>
+              <a:grpSpLocks noGrp="1" noUngrp="1" noRot="1" noMove="1" noResize="1"/>
+            </p:cNvGrpSpPr>
+            <p:nvPr/>
+          </p:nvGrpSpPr>
+          <p:grpSpPr>
+            <a:xfrm>
+              <a:off x="1828800" y="1581150"/>
+              <a:ext cx="21945600" cy="11525250"/>
+              <a:chOff x="1828800" y="1581150"/>
+              <a:chExt cx="21945600" cy="11525250"/>
+            </a:xfrm>
+          </p:grpSpPr>
+          <p:sp>
+            <p:nvSpPr>
+              <p:cNvPr id="44" name="3.2_Chart_BG">
+                <a:extLst>
+                  <a:ext uri="{FF2B5EF4-FFF2-40B4-BE49-F238E27FC236}">
+                    <a16:creationId xmlns:a16="http://schemas.microsoft.com/office/drawing/2014/main" id="{FB35D492-74F6-1167-AB44-0D0B2A794CB9}"/>
+                  </a:ext>
+                </a:extLst>
+              </p:cNvPr>
+              <p:cNvSpPr>
+                <a:spLocks noGrp="1" noRot="1" noMove="1" noResize="1" noEditPoints="1" noAdjustHandles="1" noChangeArrowheads="1" noChangeShapeType="1"/>
+              </p:cNvSpPr>
+              <p:nvPr/>
+            </p:nvSpPr>
+            <p:spPr>
+              <a:xfrm>
+                <a:off x="13030200" y="8953500"/>
+                <a:ext cx="10744200" cy="4152900"/>
+              </a:xfrm>
+              <a:prstGeom prst="rect">
+                <a:avLst/>
+              </a:prstGeom>
+              <a:solidFill>
+                <a:schemeClr val="bg1"/>
+              </a:solidFill>
+              <a:ln w="3175">
+                <a:solidFill>
+                  <a:srgbClr val="B1B8C5"/>
+                </a:solidFill>
+              </a:ln>
+              <a:effectLst>
+                <a:outerShdw blurRad="203200" dist="63500" dir="2700000" algn="tl" rotWithShape="0">
+                  <a:prstClr val="black">
+                    <a:alpha val="5000"/>
+                  </a:prstClr>
+                </a:outerShdw>
+              </a:effectLst>
+            </p:spPr>
+            <p:style>
+              <a:lnRef idx="2">
+                <a:schemeClr val="accent1">
+                  <a:shade val="15000"/>
+                </a:schemeClr>
+              </a:lnRef>
+              <a:fillRef idx="1">
+                <a:schemeClr val="accent1"/>
+              </a:fillRef>
+              <a:effectRef idx="0">
+                <a:schemeClr val="accent1"/>
+              </a:effectRef>
+              <a:fontRef idx="minor">
+                <a:schemeClr val="lt1"/>
+              </a:fontRef>
+            </p:style>
+            <p:txBody>
+              <a:bodyPr rtlCol="0" anchor="ctr"/>
+              <a:lstStyle/>
+              <a:p>
+                <a:pPr algn="ctr"/>
+                <a:endParaRPr lang="pl-PL">
+                  <a:latin typeface="Din" panose="02000504040000020003" pitchFamily="2" charset="0"/>
+                </a:endParaRPr>
+              </a:p>
+            </p:txBody>
+          </p:sp>
+          <p:sp>
+            <p:nvSpPr>
+              <p:cNvPr id="43" name="3.1_Chart_BG">
+                <a:extLst>
+                  <a:ext uri="{FF2B5EF4-FFF2-40B4-BE49-F238E27FC236}">
+                    <a16:creationId xmlns:a16="http://schemas.microsoft.com/office/drawing/2014/main" id="{983D6567-0339-D205-8CCC-3AFF6D8D0AC1}"/>
+                  </a:ext>
+                </a:extLst>
+              </p:cNvPr>
+              <p:cNvSpPr>
+                <a:spLocks noGrp="1" noRot="1" noMove="1" noResize="1" noEditPoints="1" noAdjustHandles="1" noChangeArrowheads="1" noChangeShapeType="1"/>
+              </p:cNvSpPr>
+              <p:nvPr/>
+            </p:nvSpPr>
+            <p:spPr>
+              <a:xfrm>
+                <a:off x="1828800" y="8953500"/>
+                <a:ext cx="10744200" cy="4152900"/>
+              </a:xfrm>
+              <a:prstGeom prst="rect">
+                <a:avLst/>
+              </a:prstGeom>
+              <a:solidFill>
+                <a:schemeClr val="bg1"/>
+              </a:solidFill>
+              <a:ln w="3175">
+                <a:solidFill>
+                  <a:srgbClr val="B1B8C5"/>
+                </a:solidFill>
+              </a:ln>
+              <a:effectLst>
+                <a:outerShdw blurRad="203200" dist="63500" dir="2700000" algn="tl" rotWithShape="0">
+                  <a:prstClr val="black">
+                    <a:alpha val="5000"/>
+                  </a:prstClr>
+                </a:outerShdw>
+              </a:effectLst>
+            </p:spPr>
+            <p:style>
+              <a:lnRef idx="2">
+                <a:schemeClr val="accent1">
+                  <a:shade val="15000"/>
+                </a:schemeClr>
+              </a:lnRef>
+              <a:fillRef idx="1">
+                <a:schemeClr val="accent1"/>
+              </a:fillRef>
+              <a:effectRef idx="0">
+                <a:schemeClr val="accent1"/>
+              </a:effectRef>
+              <a:fontRef idx="minor">
+                <a:schemeClr val="lt1"/>
+              </a:fontRef>
+            </p:style>
+            <p:txBody>
+              <a:bodyPr rtlCol="0" anchor="ctr"/>
+              <a:lstStyle/>
+              <a:p>
+                <a:pPr algn="ctr"/>
+                <a:endParaRPr lang="pl-PL">
+                  <a:latin typeface="Din" panose="02000504040000020003" pitchFamily="2" charset="0"/>
+                </a:endParaRPr>
+              </a:p>
+            </p:txBody>
+          </p:sp>
+          <p:sp>
+            <p:nvSpPr>
+              <p:cNvPr id="42" name="2.2_Chart_BG">
+                <a:extLst>
+                  <a:ext uri="{FF2B5EF4-FFF2-40B4-BE49-F238E27FC236}">
+                    <a16:creationId xmlns:a16="http://schemas.microsoft.com/office/drawing/2014/main" id="{48762949-D8C8-A905-3D78-58C155FF6D8E}"/>
+                  </a:ext>
+                </a:extLst>
+              </p:cNvPr>
+              <p:cNvSpPr>
+                <a:spLocks noGrp="1" noRot="1" noMove="1" noResize="1" noEditPoints="1" noAdjustHandles="1" noChangeArrowheads="1" noChangeShapeType="1"/>
+              </p:cNvSpPr>
+              <p:nvPr/>
+            </p:nvSpPr>
+            <p:spPr>
+              <a:xfrm>
+                <a:off x="13030200" y="1581150"/>
+                <a:ext cx="10744200" cy="6915150"/>
+              </a:xfrm>
+              <a:prstGeom prst="rect">
+                <a:avLst/>
+              </a:prstGeom>
+              <a:solidFill>
+                <a:schemeClr val="bg1"/>
+              </a:solidFill>
+              <a:ln w="3175">
+                <a:solidFill>
+                  <a:srgbClr val="B1B8C5"/>
+                </a:solidFill>
+              </a:ln>
+              <a:effectLst>
+                <a:outerShdw blurRad="203200" dist="63500" dir="2700000" algn="tl" rotWithShape="0">
+                  <a:prstClr val="black">
+                    <a:alpha val="5000"/>
+                  </a:prstClr>
+                </a:outerShdw>
+              </a:effectLst>
+            </p:spPr>
+            <p:style>
+              <a:lnRef idx="2">
+                <a:schemeClr val="accent1">
+                  <a:shade val="15000"/>
+                </a:schemeClr>
+              </a:lnRef>
+              <a:fillRef idx="1">
+                <a:schemeClr val="accent1"/>
+              </a:fillRef>
+              <a:effectRef idx="0">
+                <a:schemeClr val="accent1"/>
+              </a:effectRef>
+              <a:fontRef idx="minor">
+                <a:schemeClr val="lt1"/>
+              </a:fontRef>
+            </p:style>
+            <p:txBody>
+              <a:bodyPr rtlCol="0" anchor="ctr"/>
+              <a:lstStyle/>
+              <a:p>
+                <a:pPr algn="ctr"/>
+                <a:endParaRPr lang="pl-PL">
+                  <a:latin typeface="Din" panose="02000504040000020003" pitchFamily="2" charset="0"/>
+                </a:endParaRPr>
+              </a:p>
+            </p:txBody>
+          </p:sp>
+          <p:sp>
+            <p:nvSpPr>
+              <p:cNvPr id="41" name="2.1_Chart_BG">
+                <a:extLst>
+                  <a:ext uri="{FF2B5EF4-FFF2-40B4-BE49-F238E27FC236}">
+                    <a16:creationId xmlns:a16="http://schemas.microsoft.com/office/drawing/2014/main" id="{93046E24-79A1-E992-5964-9F00E433B134}"/>
+                  </a:ext>
+                </a:extLst>
+              </p:cNvPr>
+              <p:cNvSpPr>
+                <a:spLocks noGrp="1" noRot="1" noMove="1" noResize="1" noEditPoints="1" noAdjustHandles="1" noChangeArrowheads="1" noChangeShapeType="1"/>
+              </p:cNvSpPr>
+              <p:nvPr/>
+            </p:nvSpPr>
+            <p:spPr>
+              <a:xfrm>
+                <a:off x="1828800" y="4343400"/>
+                <a:ext cx="10744200" cy="4152900"/>
+              </a:xfrm>
+              <a:prstGeom prst="rect">
+                <a:avLst/>
+              </a:prstGeom>
+              <a:solidFill>
+                <a:schemeClr val="bg1"/>
+              </a:solidFill>
+              <a:ln w="3175">
+                <a:solidFill>
+                  <a:srgbClr val="B1B8C5"/>
+                </a:solidFill>
+              </a:ln>
+              <a:effectLst>
+                <a:outerShdw blurRad="203200" dist="63500" dir="2700000" algn="tl" rotWithShape="0">
+                  <a:prstClr val="black">
+                    <a:alpha val="5000"/>
+                  </a:prstClr>
+                </a:outerShdw>
+              </a:effectLst>
+            </p:spPr>
+            <p:style>
+              <a:lnRef idx="2">
+                <a:schemeClr val="accent1">
+                  <a:shade val="15000"/>
+                </a:schemeClr>
+              </a:lnRef>
+              <a:fillRef idx="1">
+                <a:schemeClr val="accent1"/>
+              </a:fillRef>
+              <a:effectRef idx="0">
+                <a:schemeClr val="accent1"/>
+              </a:effectRef>
+              <a:fontRef idx="minor">
+                <a:schemeClr val="lt1"/>
+              </a:fontRef>
+            </p:style>
+            <p:txBody>
+              <a:bodyPr rtlCol="0" anchor="ctr"/>
+              <a:lstStyle/>
+              <a:p>
+                <a:pPr algn="ctr"/>
+                <a:endParaRPr lang="pl-PL">
+                  <a:latin typeface="Din" panose="02000504040000020003" pitchFamily="2" charset="0"/>
+                </a:endParaRPr>
+              </a:p>
+            </p:txBody>
+          </p:sp>
+          <p:sp>
+            <p:nvSpPr>
+              <p:cNvPr id="39" name="1_Chart_BG">
+                <a:extLst>
+                  <a:ext uri="{FF2B5EF4-FFF2-40B4-BE49-F238E27FC236}">
+                    <a16:creationId xmlns:a16="http://schemas.microsoft.com/office/drawing/2014/main" id="{69E4849E-C540-F7C5-02C5-D4864113B474}"/>
+                  </a:ext>
+                </a:extLst>
+              </p:cNvPr>
+              <p:cNvSpPr>
+                <a:spLocks noGrp="1" noRot="1" noMove="1" noResize="1" noEditPoints="1" noAdjustHandles="1" noChangeArrowheads="1" noChangeShapeType="1"/>
+              </p:cNvSpPr>
+              <p:nvPr/>
+            </p:nvSpPr>
+            <p:spPr>
+              <a:xfrm>
+                <a:off x="1828800" y="1581150"/>
+                <a:ext cx="10744200" cy="2305050"/>
+              </a:xfrm>
+              <a:prstGeom prst="rect">
+                <a:avLst/>
+              </a:prstGeom>
+              <a:solidFill>
+                <a:schemeClr val="bg1"/>
+              </a:solidFill>
+              <a:ln w="3175">
+                <a:solidFill>
+                  <a:srgbClr val="B1B8C5"/>
+                </a:solidFill>
+              </a:ln>
+              <a:effectLst>
+                <a:outerShdw blurRad="203200" dist="63500" dir="2700000" algn="tl" rotWithShape="0">
+                  <a:prstClr val="black">
+                    <a:alpha val="5000"/>
+                  </a:prstClr>
+                </a:outerShdw>
+              </a:effectLst>
+            </p:spPr>
+            <p:style>
+              <a:lnRef idx="2">
+                <a:schemeClr val="accent1">
+                  <a:shade val="15000"/>
+                </a:schemeClr>
+              </a:lnRef>
+              <a:fillRef idx="1">
+                <a:schemeClr val="accent1"/>
+              </a:fillRef>
+              <a:effectRef idx="0">
+                <a:schemeClr val="accent1"/>
+              </a:effectRef>
+              <a:fontRef idx="minor">
+                <a:schemeClr val="lt1"/>
+              </a:fontRef>
+            </p:style>
+            <p:txBody>
+              <a:bodyPr rtlCol="0" anchor="ctr"/>
+              <a:lstStyle/>
+              <a:p>
+                <a:pPr algn="ctr"/>
+                <a:endParaRPr lang="pl-PL">
+                  <a:latin typeface="Din" panose="02000504040000020003" pitchFamily="2" charset="0"/>
+                </a:endParaRPr>
+              </a:p>
+            </p:txBody>
+          </p:sp>
+        </p:grpSp>
+      </p:grpSp>
+      <p:grpSp>
+        <p:nvGrpSpPr>
+          <p:cNvPr id="88" name="Switch_Button_Left">
+            <a:extLst>
+              <a:ext uri="{FF2B5EF4-FFF2-40B4-BE49-F238E27FC236}">
+                <a16:creationId xmlns:a16="http://schemas.microsoft.com/office/drawing/2014/main" id="{F631B5FC-3984-A30F-24FF-7EE598C5D69D}"/>
+              </a:ext>
+            </a:extLst>
+          </p:cNvPr>
+          <p:cNvGrpSpPr>
+            <a:grpSpLocks noGrp="1" noUngrp="1" noRot="1" noMove="1" noResize="1"/>
+          </p:cNvGrpSpPr>
+          <p:nvPr/>
+        </p:nvGrpSpPr>
+        <p:grpSpPr>
+          <a:xfrm flipH="1">
+            <a:off x="1937544" y="9655175"/>
+            <a:ext cx="247650" cy="2749392"/>
+            <a:chOff x="12219781" y="9655175"/>
+            <a:chExt cx="247650" cy="2749392"/>
+          </a:xfrm>
+        </p:grpSpPr>
+        <p:cxnSp>
+          <p:nvCxnSpPr>
+            <p:cNvPr id="89" name="2.2_Line">
+              <a:extLst>
+                <a:ext uri="{FF2B5EF4-FFF2-40B4-BE49-F238E27FC236}">
+                  <a16:creationId xmlns:a16="http://schemas.microsoft.com/office/drawing/2014/main" id="{36AED766-B8CC-8FF0-F43C-D2E5AD68F6F3}"/>
+                </a:ext>
+              </a:extLst>
+            </p:cNvPr>
+            <p:cNvCxnSpPr>
+              <a:cxnSpLocks noGrp="1" noRot="1" noMove="1" noResize="1" noEditPoints="1" noAdjustHandles="1" noChangeArrowheads="1" noChangeShapeType="1"/>
+            </p:cNvCxnSpPr>
+            <p:nvPr/>
+          </p:nvCxnSpPr>
+          <p:spPr>
+            <a:xfrm flipV="1">
+              <a:off x="12334877" y="12400623"/>
+              <a:ext cx="131762" cy="0"/>
+            </a:xfrm>
+            <a:prstGeom prst="line">
+              <a:avLst/>
+            </a:prstGeom>
+            <a:ln w="12700">
+              <a:solidFill>
+                <a:srgbClr val="B1B8C5">
+                  <a:alpha val="65000"/>
+                </a:srgbClr>
+              </a:solidFill>
+            </a:ln>
+          </p:spPr>
+          <p:style>
+            <a:lnRef idx="2">
+              <a:schemeClr val="accent1"/>
+            </a:lnRef>
+            <a:fillRef idx="0">
+              <a:schemeClr val="accent1"/>
+            </a:fillRef>
+            <a:effectRef idx="1">
+              <a:schemeClr val="accent1"/>
+            </a:effectRef>
+            <a:fontRef idx="minor">
+              <a:schemeClr val="tx1"/>
+            </a:fontRef>
+          </p:style>
+        </p:cxnSp>
+        <p:cxnSp>
+          <p:nvCxnSpPr>
+            <p:cNvPr id="90" name="2.1_Line">
+              <a:extLst>
+                <a:ext uri="{FF2B5EF4-FFF2-40B4-BE49-F238E27FC236}">
+                  <a16:creationId xmlns:a16="http://schemas.microsoft.com/office/drawing/2014/main" id="{3D6BC1AC-9C67-CF9C-1BDA-75A8AD071F57}"/>
+                </a:ext>
+              </a:extLst>
+            </p:cNvPr>
+            <p:cNvCxnSpPr>
+              <a:cxnSpLocks noGrp="1" noRot="1" noMove="1" noResize="1" noEditPoints="1" noAdjustHandles="1" noChangeArrowheads="1" noChangeShapeType="1"/>
+            </p:cNvCxnSpPr>
+            <p:nvPr/>
+          </p:nvCxnSpPr>
+          <p:spPr>
+            <a:xfrm flipH="1">
+              <a:off x="12339641" y="11467173"/>
+              <a:ext cx="7935" cy="937394"/>
+            </a:xfrm>
+            <a:prstGeom prst="line">
+              <a:avLst/>
+            </a:prstGeom>
+            <a:ln w="12700">
+              <a:solidFill>
+                <a:srgbClr val="B1B8C5">
+                  <a:alpha val="65000"/>
+                </a:srgbClr>
+              </a:solidFill>
+            </a:ln>
+          </p:spPr>
+          <p:style>
+            <a:lnRef idx="2">
+              <a:schemeClr val="accent1"/>
+            </a:lnRef>
+            <a:fillRef idx="0">
+              <a:schemeClr val="accent1"/>
+            </a:fillRef>
+            <a:effectRef idx="1">
+              <a:schemeClr val="accent1"/>
+            </a:effectRef>
+            <a:fontRef idx="minor">
+              <a:schemeClr val="tx1"/>
+            </a:fontRef>
+          </p:style>
+        </p:cxnSp>
+        <p:cxnSp>
+          <p:nvCxnSpPr>
+            <p:cNvPr id="91" name="1.2_Line">
+              <a:extLst>
+                <a:ext uri="{FF2B5EF4-FFF2-40B4-BE49-F238E27FC236}">
+                  <a16:creationId xmlns:a16="http://schemas.microsoft.com/office/drawing/2014/main" id="{3AB7D25F-6CB7-582C-7E06-B525D6E498C3}"/>
+                </a:ext>
+              </a:extLst>
+            </p:cNvPr>
+            <p:cNvCxnSpPr>
+              <a:cxnSpLocks noGrp="1" noRot="1" noMove="1" noResize="1" noEditPoints="1" noAdjustHandles="1" noChangeArrowheads="1" noChangeShapeType="1"/>
+            </p:cNvCxnSpPr>
+            <p:nvPr/>
+          </p:nvCxnSpPr>
+          <p:spPr>
+            <a:xfrm>
+              <a:off x="12333288" y="9659119"/>
+              <a:ext cx="131762" cy="0"/>
+            </a:xfrm>
+            <a:prstGeom prst="line">
+              <a:avLst/>
+            </a:prstGeom>
+            <a:ln w="12700">
+              <a:solidFill>
+                <a:srgbClr val="B1B8C5">
+                  <a:alpha val="65000"/>
+                </a:srgbClr>
+              </a:solidFill>
+            </a:ln>
+          </p:spPr>
+          <p:style>
+            <a:lnRef idx="2">
+              <a:schemeClr val="accent1"/>
+            </a:lnRef>
+            <a:fillRef idx="0">
+              <a:schemeClr val="accent1"/>
+            </a:fillRef>
+            <a:effectRef idx="1">
+              <a:schemeClr val="accent1"/>
+            </a:effectRef>
+            <a:fontRef idx="minor">
+              <a:schemeClr val="tx1"/>
+            </a:fontRef>
+          </p:style>
+        </p:cxnSp>
+        <p:cxnSp>
+          <p:nvCxnSpPr>
+            <p:cNvPr id="92" name="1.1_Line">
+              <a:extLst>
+                <a:ext uri="{FF2B5EF4-FFF2-40B4-BE49-F238E27FC236}">
+                  <a16:creationId xmlns:a16="http://schemas.microsoft.com/office/drawing/2014/main" id="{8E1DF185-517C-C0F4-248B-16B897BD903B}"/>
+                </a:ext>
+              </a:extLst>
+            </p:cNvPr>
+            <p:cNvCxnSpPr>
+              <a:cxnSpLocks noGrp="1" noRot="1" noMove="1" noResize="1" noEditPoints="1" noAdjustHandles="1" noChangeArrowheads="1" noChangeShapeType="1"/>
+            </p:cNvCxnSpPr>
+            <p:nvPr/>
+          </p:nvCxnSpPr>
+          <p:spPr>
+            <a:xfrm flipH="1" flipV="1">
+              <a:off x="12338052" y="9655175"/>
+              <a:ext cx="7935" cy="937394"/>
+            </a:xfrm>
+            <a:prstGeom prst="line">
+              <a:avLst/>
+            </a:prstGeom>
+            <a:ln w="12700">
+              <a:solidFill>
+                <a:srgbClr val="B1B8C5">
+                  <a:alpha val="65000"/>
+                </a:srgbClr>
+              </a:solidFill>
+            </a:ln>
+          </p:spPr>
+          <p:style>
+            <a:lnRef idx="2">
+              <a:schemeClr val="accent1"/>
+            </a:lnRef>
+            <a:fillRef idx="0">
+              <a:schemeClr val="accent1"/>
+            </a:fillRef>
+            <a:effectRef idx="1">
+              <a:schemeClr val="accent1"/>
+            </a:effectRef>
+            <a:fontRef idx="minor">
+              <a:schemeClr val="tx1"/>
+            </a:fontRef>
+          </p:style>
+        </p:cxnSp>
+        <p:sp>
+          <p:nvSpPr>
+            <p:cNvPr id="93" name="Button">
+              <a:extLst>
+                <a:ext uri="{FF2B5EF4-FFF2-40B4-BE49-F238E27FC236}">
+                  <a16:creationId xmlns:a16="http://schemas.microsoft.com/office/drawing/2014/main" id="{D716CB4E-4A76-DB73-F7AF-026AB3E2F406}"/>
+                </a:ext>
+              </a:extLst>
+            </p:cNvPr>
+            <p:cNvSpPr>
+              <a:spLocks noGrp="1" noRot="1" noMove="1" noResize="1" noEditPoints="1" noAdjustHandles="1" noChangeArrowheads="1" noChangeShapeType="1"/>
+            </p:cNvSpPr>
+            <p:nvPr/>
+          </p:nvSpPr>
+          <p:spPr>
+            <a:xfrm>
+              <a:off x="12219781" y="10678291"/>
+              <a:ext cx="247650" cy="703160"/>
+            </a:xfrm>
+            <a:prstGeom prst="roundRect">
+              <a:avLst/>
+            </a:prstGeom>
+            <a:gradFill flip="none" rotWithShape="1">
+              <a:gsLst>
+                <a:gs pos="0">
+                  <a:srgbClr val="FBFBFB">
+                    <a:alpha val="80000"/>
+                  </a:srgbClr>
+                </a:gs>
+                <a:gs pos="20000">
+                  <a:schemeClr val="bg1">
+                    <a:lumMod val="95000"/>
+                    <a:alpha val="80000"/>
+                  </a:schemeClr>
+                </a:gs>
+                <a:gs pos="100000">
+                  <a:schemeClr val="bg2">
+                    <a:lumMod val="90000"/>
+                    <a:alpha val="80000"/>
+                  </a:schemeClr>
+                </a:gs>
+              </a:gsLst>
+              <a:lin ang="0" scaled="1"/>
+              <a:tileRect/>
+            </a:gradFill>
+            <a:ln w="6350">
+              <a:solidFill>
+                <a:srgbClr val="B1B8C5">
+                  <a:alpha val="80000"/>
+                </a:srgbClr>
+              </a:solidFill>
+            </a:ln>
+          </p:spPr>
+          <p:style>
+            <a:lnRef idx="2">
+              <a:schemeClr val="accent1">
+                <a:shade val="15000"/>
+              </a:schemeClr>
+            </a:lnRef>
+            <a:fillRef idx="1">
+              <a:schemeClr val="accent1"/>
+            </a:fillRef>
+            <a:effectRef idx="0">
+              <a:schemeClr val="accent1"/>
+            </a:effectRef>
+            <a:fontRef idx="minor">
+              <a:schemeClr val="lt1"/>
+            </a:fontRef>
+          </p:style>
+          <p:txBody>
+            <a:bodyPr rtlCol="0" anchor="ctr"/>
+            <a:lstStyle/>
+            <a:p>
+              <a:pPr algn="ctr"/>
+              <a:endParaRPr lang="pl-PL"/>
+            </a:p>
+          </p:txBody>
+        </p:sp>
+        <p:cxnSp>
+          <p:nvCxnSpPr>
+            <p:cNvPr id="94" name="Arrow_Bottom">
+              <a:extLst>
+                <a:ext uri="{FF2B5EF4-FFF2-40B4-BE49-F238E27FC236}">
+                  <a16:creationId xmlns:a16="http://schemas.microsoft.com/office/drawing/2014/main" id="{C1467DF7-D23D-370D-8B39-F079F3C60EFE}"/>
+                </a:ext>
+              </a:extLst>
+            </p:cNvPr>
+            <p:cNvCxnSpPr>
+              <a:cxnSpLocks noGrp="1" noRot="1" noMove="1" noResize="1" noEditPoints="1" noAdjustHandles="1" noChangeArrowheads="1" noChangeShapeType="1"/>
+            </p:cNvCxnSpPr>
+            <p:nvPr/>
+          </p:nvCxnSpPr>
+          <p:spPr>
+            <a:xfrm flipV="1">
+              <a:off x="12300744" y="11025109"/>
+              <a:ext cx="123825" cy="227064"/>
+            </a:xfrm>
+            <a:prstGeom prst="line">
+              <a:avLst/>
+            </a:prstGeom>
+            <a:ln w="31750">
+              <a:gradFill flip="none" rotWithShape="1">
+                <a:gsLst>
+                  <a:gs pos="0">
+                    <a:srgbClr val="B1B8C5">
+                      <a:lumMod val="80000"/>
+                      <a:lumOff val="20000"/>
+                      <a:alpha val="65000"/>
+                    </a:srgbClr>
+                  </a:gs>
+                  <a:gs pos="26000">
+                    <a:srgbClr val="959FB1">
+                      <a:lumMod val="80000"/>
+                      <a:lumOff val="20000"/>
+                    </a:srgbClr>
+                  </a:gs>
+                  <a:gs pos="100000">
+                    <a:srgbClr val="6E7B92">
+                      <a:lumMod val="70000"/>
+                      <a:lumOff val="30000"/>
+                    </a:srgbClr>
+                  </a:gs>
+                </a:gsLst>
+                <a:path path="circle">
+                  <a:fillToRect r="100000" b="100000"/>
+                </a:path>
+                <a:tileRect l="-100000" t="-100000"/>
+              </a:gradFill>
+            </a:ln>
+          </p:spPr>
+          <p:style>
+            <a:lnRef idx="2">
+              <a:schemeClr val="accent1"/>
+            </a:lnRef>
+            <a:fillRef idx="0">
+              <a:schemeClr val="accent1"/>
+            </a:fillRef>
+            <a:effectRef idx="1">
+              <a:schemeClr val="accent1"/>
+            </a:effectRef>
+            <a:fontRef idx="minor">
+              <a:schemeClr val="tx1"/>
+            </a:fontRef>
+          </p:style>
+        </p:cxnSp>
+        <p:cxnSp>
+          <p:nvCxnSpPr>
+            <p:cNvPr id="95" name="Arrow_Top">
+              <a:extLst>
+                <a:ext uri="{FF2B5EF4-FFF2-40B4-BE49-F238E27FC236}">
+                  <a16:creationId xmlns:a16="http://schemas.microsoft.com/office/drawing/2014/main" id="{FF090BA4-1F07-8D66-0EF3-855C4B9A948C}"/>
+                </a:ext>
+              </a:extLst>
+            </p:cNvPr>
+            <p:cNvCxnSpPr>
+              <a:cxnSpLocks noGrp="1" noRot="1" noMove="1" noResize="1" noEditPoints="1" noAdjustHandles="1" noChangeArrowheads="1" noChangeShapeType="1"/>
+            </p:cNvCxnSpPr>
+            <p:nvPr/>
+          </p:nvCxnSpPr>
+          <p:spPr>
+            <a:xfrm>
+              <a:off x="12300744" y="10810793"/>
+              <a:ext cx="123825" cy="227064"/>
+            </a:xfrm>
+            <a:prstGeom prst="line">
+              <a:avLst/>
+            </a:prstGeom>
+            <a:ln w="31750">
+              <a:gradFill flip="none" rotWithShape="1">
+                <a:gsLst>
+                  <a:gs pos="0">
+                    <a:srgbClr val="B1B8C5">
+                      <a:lumMod val="80000"/>
+                      <a:lumOff val="20000"/>
+                      <a:alpha val="65000"/>
+                    </a:srgbClr>
+                  </a:gs>
+                  <a:gs pos="26000">
+                    <a:srgbClr val="959FB1">
+                      <a:lumMod val="80000"/>
+                      <a:lumOff val="20000"/>
+                    </a:srgbClr>
+                  </a:gs>
+                  <a:gs pos="100000">
+                    <a:srgbClr val="6E7B92">
+                      <a:lumMod val="70000"/>
+                      <a:lumOff val="30000"/>
+                    </a:srgbClr>
+                  </a:gs>
+                </a:gsLst>
+                <a:path path="circle">
+                  <a:fillToRect r="100000" b="100000"/>
+                </a:path>
+                <a:tileRect l="-100000" t="-100000"/>
+              </a:gradFill>
+            </a:ln>
+          </p:spPr>
+          <p:style>
+            <a:lnRef idx="2">
+              <a:schemeClr val="accent1"/>
+            </a:lnRef>
+            <a:fillRef idx="0">
+              <a:schemeClr val="accent1"/>
+            </a:fillRef>
+            <a:effectRef idx="1">
+              <a:schemeClr val="accent1"/>
+            </a:effectRef>
+            <a:fontRef idx="minor">
+              <a:schemeClr val="tx1"/>
+            </a:fontRef>
+          </p:style>
+        </p:cxnSp>
+      </p:grpSp>
+      <p:grpSp>
+        <p:nvGrpSpPr>
+          <p:cNvPr id="84" name="Switch_Button_Right">
+            <a:extLst>
+              <a:ext uri="{FF2B5EF4-FFF2-40B4-BE49-F238E27FC236}">
+                <a16:creationId xmlns:a16="http://schemas.microsoft.com/office/drawing/2014/main" id="{7585C776-2286-FCC9-E26B-83D128CB4263}"/>
+              </a:ext>
+            </a:extLst>
+          </p:cNvPr>
+          <p:cNvGrpSpPr>
+            <a:grpSpLocks noGrp="1" noUngrp="1" noRot="1" noMove="1" noResize="1"/>
+          </p:cNvGrpSpPr>
+          <p:nvPr/>
+        </p:nvGrpSpPr>
+        <p:grpSpPr>
+          <a:xfrm>
+            <a:off x="12219781" y="9655175"/>
+            <a:ext cx="247650" cy="2749392"/>
+            <a:chOff x="12219781" y="9655175"/>
+            <a:chExt cx="247650" cy="2749392"/>
+          </a:xfrm>
+        </p:grpSpPr>
+        <p:cxnSp>
+          <p:nvCxnSpPr>
+            <p:cNvPr id="81" name="2.2_Line">
+              <a:extLst>
+                <a:ext uri="{FF2B5EF4-FFF2-40B4-BE49-F238E27FC236}">
+                  <a16:creationId xmlns:a16="http://schemas.microsoft.com/office/drawing/2014/main" id="{0750E59D-9BA3-6FB2-54D0-04681D74CD29}"/>
+                </a:ext>
+              </a:extLst>
+            </p:cNvPr>
+            <p:cNvCxnSpPr>
+              <a:cxnSpLocks noGrp="1" noRot="1" noMove="1" noResize="1" noEditPoints="1" noAdjustHandles="1" noChangeArrowheads="1" noChangeShapeType="1"/>
+            </p:cNvCxnSpPr>
+            <p:nvPr/>
+          </p:nvCxnSpPr>
+          <p:spPr>
+            <a:xfrm flipV="1">
+              <a:off x="12334877" y="12400623"/>
+              <a:ext cx="131762" cy="0"/>
+            </a:xfrm>
+            <a:prstGeom prst="line">
+              <a:avLst/>
+            </a:prstGeom>
+            <a:ln w="12700">
+              <a:solidFill>
+                <a:srgbClr val="B1B8C5">
+                  <a:alpha val="65000"/>
+                </a:srgbClr>
+              </a:solidFill>
+            </a:ln>
+          </p:spPr>
+          <p:style>
+            <a:lnRef idx="2">
+              <a:schemeClr val="accent1"/>
+            </a:lnRef>
+            <a:fillRef idx="0">
+              <a:schemeClr val="accent1"/>
+            </a:fillRef>
+            <a:effectRef idx="1">
+              <a:schemeClr val="accent1"/>
+            </a:effectRef>
+            <a:fontRef idx="minor">
+              <a:schemeClr val="tx1"/>
+            </a:fontRef>
+          </p:style>
+        </p:cxnSp>
+        <p:cxnSp>
+          <p:nvCxnSpPr>
+            <p:cNvPr id="80" name="2.1_Line">
+              <a:extLst>
+                <a:ext uri="{FF2B5EF4-FFF2-40B4-BE49-F238E27FC236}">
+                  <a16:creationId xmlns:a16="http://schemas.microsoft.com/office/drawing/2014/main" id="{7FEDA156-2837-D607-4C3D-558180B69680}"/>
+                </a:ext>
+              </a:extLst>
+            </p:cNvPr>
+            <p:cNvCxnSpPr>
+              <a:cxnSpLocks noGrp="1" noRot="1" noMove="1" noResize="1" noEditPoints="1" noAdjustHandles="1" noChangeArrowheads="1" noChangeShapeType="1"/>
+            </p:cNvCxnSpPr>
+            <p:nvPr/>
+          </p:nvCxnSpPr>
+          <p:spPr>
+            <a:xfrm flipH="1">
+              <a:off x="12339641" y="11467173"/>
+              <a:ext cx="7935" cy="937394"/>
+            </a:xfrm>
+            <a:prstGeom prst="line">
+              <a:avLst/>
+            </a:prstGeom>
+            <a:ln w="12700">
+              <a:solidFill>
+                <a:srgbClr val="B1B8C5">
+                  <a:alpha val="65000"/>
+                </a:srgbClr>
+              </a:solidFill>
+            </a:ln>
+          </p:spPr>
+          <p:style>
+            <a:lnRef idx="2">
+              <a:schemeClr val="accent1"/>
+            </a:lnRef>
+            <a:fillRef idx="0">
+              <a:schemeClr val="accent1"/>
+            </a:fillRef>
+            <a:effectRef idx="1">
+              <a:schemeClr val="accent1"/>
+            </a:effectRef>
+            <a:fontRef idx="minor">
+              <a:schemeClr val="tx1"/>
+            </a:fontRef>
+          </p:style>
+        </p:cxnSp>
+        <p:cxnSp>
+          <p:nvCxnSpPr>
+            <p:cNvPr id="51" name="1.2_Line">
+              <a:extLst>
+                <a:ext uri="{FF2B5EF4-FFF2-40B4-BE49-F238E27FC236}">
+                  <a16:creationId xmlns:a16="http://schemas.microsoft.com/office/drawing/2014/main" id="{7DE5CFB7-DA7E-1087-859C-60F5C56DADEF}"/>
+                </a:ext>
+              </a:extLst>
+            </p:cNvPr>
+            <p:cNvCxnSpPr>
+              <a:cxnSpLocks noGrp="1" noRot="1" noMove="1" noResize="1" noEditPoints="1" noAdjustHandles="1" noChangeArrowheads="1" noChangeShapeType="1"/>
+            </p:cNvCxnSpPr>
+            <p:nvPr/>
+          </p:nvCxnSpPr>
+          <p:spPr>
+            <a:xfrm>
+              <a:off x="12333288" y="9659119"/>
+              <a:ext cx="131762" cy="0"/>
+            </a:xfrm>
+            <a:prstGeom prst="line">
+              <a:avLst/>
+            </a:prstGeom>
+            <a:ln w="12700">
+              <a:solidFill>
+                <a:srgbClr val="B1B8C5">
+                  <a:alpha val="65000"/>
+                </a:srgbClr>
+              </a:solidFill>
+            </a:ln>
+          </p:spPr>
+          <p:style>
+            <a:lnRef idx="2">
+              <a:schemeClr val="accent1"/>
+            </a:lnRef>
+            <a:fillRef idx="0">
+              <a:schemeClr val="accent1"/>
+            </a:fillRef>
+            <a:effectRef idx="1">
+              <a:schemeClr val="accent1"/>
+            </a:effectRef>
+            <a:fontRef idx="minor">
+              <a:schemeClr val="tx1"/>
+            </a:fontRef>
+          </p:style>
+        </p:cxnSp>
+        <p:cxnSp>
+          <p:nvCxnSpPr>
+            <p:cNvPr id="48" name="1.1_Line">
+              <a:extLst>
+                <a:ext uri="{FF2B5EF4-FFF2-40B4-BE49-F238E27FC236}">
+                  <a16:creationId xmlns:a16="http://schemas.microsoft.com/office/drawing/2014/main" id="{2612C30F-65D4-6A03-BB8E-5EF2ACB9D91F}"/>
+                </a:ext>
+              </a:extLst>
+            </p:cNvPr>
+            <p:cNvCxnSpPr>
+              <a:cxnSpLocks noGrp="1" noRot="1" noMove="1" noResize="1" noEditPoints="1" noAdjustHandles="1" noChangeArrowheads="1" noChangeShapeType="1"/>
+            </p:cNvCxnSpPr>
+            <p:nvPr/>
+          </p:nvCxnSpPr>
+          <p:spPr>
+            <a:xfrm flipH="1" flipV="1">
+              <a:off x="12338052" y="9655175"/>
+              <a:ext cx="7935" cy="937394"/>
+            </a:xfrm>
+            <a:prstGeom prst="line">
+              <a:avLst/>
+            </a:prstGeom>
+            <a:ln w="12700">
+              <a:solidFill>
+                <a:srgbClr val="B1B8C5">
+                  <a:alpha val="65000"/>
+                </a:srgbClr>
+              </a:solidFill>
+            </a:ln>
+          </p:spPr>
+          <p:style>
+            <a:lnRef idx="2">
+              <a:schemeClr val="accent1"/>
+            </a:lnRef>
+            <a:fillRef idx="0">
+              <a:schemeClr val="accent1"/>
+            </a:fillRef>
+            <a:effectRef idx="1">
+              <a:schemeClr val="accent1"/>
+            </a:effectRef>
+            <a:fontRef idx="minor">
+              <a:schemeClr val="tx1"/>
+            </a:fontRef>
+          </p:style>
+        </p:cxnSp>
+        <p:sp>
+          <p:nvSpPr>
+            <p:cNvPr id="16" name="Button">
+              <a:extLst>
+                <a:ext uri="{FF2B5EF4-FFF2-40B4-BE49-F238E27FC236}">
+                  <a16:creationId xmlns:a16="http://schemas.microsoft.com/office/drawing/2014/main" id="{8702C6F6-B3F5-66E3-D614-F665B877FEC8}"/>
+                </a:ext>
+              </a:extLst>
+            </p:cNvPr>
+            <p:cNvSpPr>
+              <a:spLocks noGrp="1" noRot="1" noMove="1" noResize="1" noEditPoints="1" noAdjustHandles="1" noChangeArrowheads="1" noChangeShapeType="1"/>
+            </p:cNvSpPr>
+            <p:nvPr/>
+          </p:nvSpPr>
+          <p:spPr>
+            <a:xfrm>
+              <a:off x="12219781" y="10678291"/>
+              <a:ext cx="247650" cy="703160"/>
+            </a:xfrm>
+            <a:prstGeom prst="roundRect">
+              <a:avLst/>
+            </a:prstGeom>
+            <a:gradFill flip="none" rotWithShape="1">
+              <a:gsLst>
+                <a:gs pos="0">
+                  <a:srgbClr val="FBFBFB">
+                    <a:alpha val="80000"/>
+                  </a:srgbClr>
+                </a:gs>
+                <a:gs pos="20000">
+                  <a:schemeClr val="bg1">
+                    <a:lumMod val="95000"/>
+                    <a:alpha val="80000"/>
+                  </a:schemeClr>
+                </a:gs>
+                <a:gs pos="100000">
+                  <a:schemeClr val="bg2">
+                    <a:lumMod val="90000"/>
+                    <a:alpha val="80000"/>
+                  </a:schemeClr>
+                </a:gs>
+              </a:gsLst>
+              <a:lin ang="0" scaled="1"/>
+              <a:tileRect/>
+            </a:gradFill>
+            <a:ln w="6350">
+              <a:solidFill>
+                <a:srgbClr val="B1B8C5">
+                  <a:alpha val="80000"/>
+                </a:srgbClr>
+              </a:solidFill>
+            </a:ln>
+          </p:spPr>
+          <p:style>
+            <a:lnRef idx="2">
+              <a:schemeClr val="accent1">
+                <a:shade val="15000"/>
+              </a:schemeClr>
+            </a:lnRef>
+            <a:fillRef idx="1">
+              <a:schemeClr val="accent1"/>
+            </a:fillRef>
+            <a:effectRef idx="0">
+              <a:schemeClr val="accent1"/>
+            </a:effectRef>
+            <a:fontRef idx="minor">
+              <a:schemeClr val="lt1"/>
+            </a:fontRef>
+          </p:style>
+          <p:txBody>
+            <a:bodyPr rtlCol="0" anchor="ctr"/>
+            <a:lstStyle/>
+            <a:p>
+              <a:pPr algn="ctr"/>
+              <a:endParaRPr lang="pl-PL"/>
+            </a:p>
+          </p:txBody>
+        </p:sp>
+        <p:cxnSp>
+          <p:nvCxnSpPr>
+            <p:cNvPr id="28" name="Arrow_Bottom">
+              <a:extLst>
+                <a:ext uri="{FF2B5EF4-FFF2-40B4-BE49-F238E27FC236}">
+                  <a16:creationId xmlns:a16="http://schemas.microsoft.com/office/drawing/2014/main" id="{37F10C8E-294D-41DC-07B3-63BC10075BC8}"/>
+                </a:ext>
+              </a:extLst>
+            </p:cNvPr>
+            <p:cNvCxnSpPr>
+              <a:cxnSpLocks noGrp="1" noRot="1" noMove="1" noResize="1" noEditPoints="1" noAdjustHandles="1" noChangeArrowheads="1" noChangeShapeType="1"/>
+            </p:cNvCxnSpPr>
+            <p:nvPr/>
+          </p:nvCxnSpPr>
+          <p:spPr>
+            <a:xfrm flipV="1">
+              <a:off x="12300744" y="11025109"/>
+              <a:ext cx="123825" cy="227064"/>
+            </a:xfrm>
+            <a:prstGeom prst="line">
+              <a:avLst/>
+            </a:prstGeom>
+            <a:ln w="31750">
+              <a:gradFill flip="none" rotWithShape="1">
+                <a:gsLst>
+                  <a:gs pos="0">
+                    <a:srgbClr val="B1B8C5">
+                      <a:lumMod val="80000"/>
+                      <a:lumOff val="20000"/>
+                      <a:alpha val="65000"/>
+                    </a:srgbClr>
+                  </a:gs>
+                  <a:gs pos="26000">
+                    <a:srgbClr val="959FB1">
+                      <a:lumMod val="80000"/>
+                      <a:lumOff val="20000"/>
+                    </a:srgbClr>
+                  </a:gs>
+                  <a:gs pos="100000">
+                    <a:srgbClr val="6E7B92">
+                      <a:lumMod val="70000"/>
+                      <a:lumOff val="30000"/>
+                    </a:srgbClr>
+                  </a:gs>
+                </a:gsLst>
+                <a:path path="circle">
+                  <a:fillToRect r="100000" b="100000"/>
+                </a:path>
+                <a:tileRect l="-100000" t="-100000"/>
+              </a:gradFill>
+            </a:ln>
+          </p:spPr>
+          <p:style>
+            <a:lnRef idx="2">
+              <a:schemeClr val="accent1"/>
+            </a:lnRef>
+            <a:fillRef idx="0">
+              <a:schemeClr val="accent1"/>
+            </a:fillRef>
+            <a:effectRef idx="1">
+              <a:schemeClr val="accent1"/>
+            </a:effectRef>
+            <a:fontRef idx="minor">
+              <a:schemeClr val="tx1"/>
+            </a:fontRef>
+          </p:style>
+        </p:cxnSp>
+        <p:cxnSp>
+          <p:nvCxnSpPr>
+            <p:cNvPr id="25" name="Arrow_Top">
+              <a:extLst>
+                <a:ext uri="{FF2B5EF4-FFF2-40B4-BE49-F238E27FC236}">
+                  <a16:creationId xmlns:a16="http://schemas.microsoft.com/office/drawing/2014/main" id="{23C5DB95-CFE6-0C31-ACB0-0DFA4D450E12}"/>
+                </a:ext>
+              </a:extLst>
+            </p:cNvPr>
+            <p:cNvCxnSpPr>
+              <a:cxnSpLocks noGrp="1" noRot="1" noMove="1" noResize="1" noEditPoints="1" noAdjustHandles="1" noChangeArrowheads="1" noChangeShapeType="1"/>
+            </p:cNvCxnSpPr>
+            <p:nvPr/>
+          </p:nvCxnSpPr>
+          <p:spPr>
+            <a:xfrm>
+              <a:off x="12300744" y="10810793"/>
+              <a:ext cx="123825" cy="227064"/>
+            </a:xfrm>
+            <a:prstGeom prst="line">
+              <a:avLst/>
+            </a:prstGeom>
+            <a:ln w="31750">
+              <a:gradFill flip="none" rotWithShape="1">
+                <a:gsLst>
+                  <a:gs pos="0">
+                    <a:srgbClr val="B1B8C5">
+                      <a:lumMod val="80000"/>
+                      <a:lumOff val="20000"/>
+                      <a:alpha val="65000"/>
+                    </a:srgbClr>
+                  </a:gs>
+                  <a:gs pos="26000">
+                    <a:srgbClr val="959FB1">
+                      <a:lumMod val="80000"/>
+                      <a:lumOff val="20000"/>
+                    </a:srgbClr>
+                  </a:gs>
+                  <a:gs pos="100000">
+                    <a:srgbClr val="6E7B92">
+                      <a:lumMod val="70000"/>
+                      <a:lumOff val="30000"/>
+                    </a:srgbClr>
+                  </a:gs>
+                </a:gsLst>
+                <a:path path="circle">
+                  <a:fillToRect r="100000" b="100000"/>
+                </a:path>
+                <a:tileRect l="-100000" t="-100000"/>
+              </a:gradFill>
+            </a:ln>
+          </p:spPr>
+          <p:style>
+            <a:lnRef idx="2">
+              <a:schemeClr val="accent1"/>
+            </a:lnRef>
+            <a:fillRef idx="0">
+              <a:schemeClr val="accent1"/>
+            </a:fillRef>
+            <a:effectRef idx="1">
+              <a:schemeClr val="accent1"/>
+            </a:effectRef>
+            <a:fontRef idx="minor">
+              <a:schemeClr val="tx1"/>
+            </a:fontRef>
+          </p:style>
+        </p:cxnSp>
+      </p:grpSp>
+      <p:grpSp>
+        <p:nvGrpSpPr>
+          <p:cNvPr id="18" name="Navigation_Icons">
+            <a:extLst>
+              <a:ext uri="{FF2B5EF4-FFF2-40B4-BE49-F238E27FC236}">
+                <a16:creationId xmlns:a16="http://schemas.microsoft.com/office/drawing/2014/main" id="{395E1018-9B2A-8758-C346-55DC0300B81D}"/>
+              </a:ext>
+            </a:extLst>
+          </p:cNvPr>
+          <p:cNvGrpSpPr>
+            <a:grpSpLocks noGrp="1" noUngrp="1" noRot="1" noMove="1" noResize="1"/>
+          </p:cNvGrpSpPr>
+          <p:nvPr/>
+        </p:nvGrpSpPr>
+        <p:grpSpPr>
+          <a:xfrm>
+            <a:off x="266700" y="7701191"/>
+            <a:ext cx="687601" cy="5405209"/>
+            <a:chOff x="266700" y="7701191"/>
+            <a:chExt cx="687601" cy="5405209"/>
+          </a:xfrm>
+        </p:grpSpPr>
+        <p:pic>
+          <p:nvPicPr>
+            <p:cNvPr id="19" name="Customer" descr="A white person with black background&#10;&#10;Description automatically generated" hidden="1">
+              <a:extLst>
+                <a:ext uri="{FF2B5EF4-FFF2-40B4-BE49-F238E27FC236}">
+                  <a16:creationId xmlns:a16="http://schemas.microsoft.com/office/drawing/2014/main" id="{34404271-7B4D-92D4-408E-2707F8AB708F}"/>
+                </a:ext>
+              </a:extLst>
+            </p:cNvPr>
+            <p:cNvPicPr>
+              <a:picLocks noGrp="1" noRot="1" noChangeAspect="1" noMove="1" noResize="1" noEditPoints="1" noAdjustHandles="1" noChangeArrowheads="1" noChangeShapeType="1" noCrop="1"/>
+            </p:cNvPicPr>
+            <p:nvPr/>
+          </p:nvPicPr>
+          <p:blipFill>
+            <a:blip r:embed="rId2">
+              <a:extLst>
+                <a:ext uri="{28A0092B-C50C-407E-A947-70E740481C1C}">
+                  <a14:useLocalDpi xmlns:a14="http://schemas.microsoft.com/office/drawing/2010/main" val="0"/>
+                </a:ext>
+              </a:extLst>
+            </a:blip>
+            <a:stretch>
+              <a:fillRect/>
+            </a:stretch>
+          </p:blipFill>
+          <p:spPr>
+            <a:xfrm>
+              <a:off x="266700" y="11488391"/>
+              <a:ext cx="685800" cy="677537"/>
+            </a:xfrm>
+            <a:prstGeom prst="rect">
+              <a:avLst/>
+            </a:prstGeom>
+          </p:spPr>
+        </p:pic>
+        <p:pic>
+          <p:nvPicPr>
+            <p:cNvPr id="31" name="Retention" hidden="1">
+              <a:extLst>
+                <a:ext uri="{FF2B5EF4-FFF2-40B4-BE49-F238E27FC236}">
+                  <a16:creationId xmlns:a16="http://schemas.microsoft.com/office/drawing/2014/main" id="{9E6125AA-6E70-F2E1-9175-DDAA0C00D03B}"/>
+                </a:ext>
+              </a:extLst>
+            </p:cNvPr>
+            <p:cNvPicPr>
+              <a:picLocks noGrp="1" noRot="1" noChangeAspect="1" noMove="1" noResize="1" noEditPoints="1" noAdjustHandles="1" noChangeArrowheads="1" noChangeShapeType="1" noCrop="1"/>
+            </p:cNvPicPr>
+            <p:nvPr/>
+          </p:nvPicPr>
+          <p:blipFill>
+            <a:blip r:embed="rId3">
+              <a:extLst>
+                <a:ext uri="{28A0092B-C50C-407E-A947-70E740481C1C}">
+                  <a14:useLocalDpi xmlns:a14="http://schemas.microsoft.com/office/drawing/2010/main" val="0"/>
+                </a:ext>
+              </a:extLst>
+            </a:blip>
+            <a:stretch>
+              <a:fillRect/>
+            </a:stretch>
+          </p:blipFill>
+          <p:spPr>
+            <a:xfrm>
+              <a:off x="266700" y="12435191"/>
+              <a:ext cx="685800" cy="671209"/>
+            </a:xfrm>
+            <a:prstGeom prst="rect">
+              <a:avLst/>
+            </a:prstGeom>
+          </p:spPr>
+        </p:pic>
+        <p:pic>
+          <p:nvPicPr>
+            <p:cNvPr id="17" name="Delivery_Active">
+              <a:extLst>
+                <a:ext uri="{FF2B5EF4-FFF2-40B4-BE49-F238E27FC236}">
+                  <a16:creationId xmlns:a16="http://schemas.microsoft.com/office/drawing/2014/main" id="{A6BB39AE-8F90-FD67-DFB7-141158E71DCA}"/>
+                </a:ext>
+              </a:extLst>
+            </p:cNvPr>
+            <p:cNvPicPr>
+              <a:picLocks noGrp="1" noRot="1" noChangeAspect="1" noMove="1" noResize="1" noEditPoints="1" noAdjustHandles="1" noChangeArrowheads="1" noChangeShapeType="1" noCrop="1"/>
+            </p:cNvPicPr>
+            <p:nvPr/>
+          </p:nvPicPr>
+          <p:blipFill>
+            <a:blip r:embed="rId4">
+              <a:extLst>
+                <a:ext uri="{28A0092B-C50C-407E-A947-70E740481C1C}">
+                  <a14:useLocalDpi xmlns:a14="http://schemas.microsoft.com/office/drawing/2010/main" val="0"/>
+                </a:ext>
+              </a:extLst>
+            </a:blip>
+            <a:stretch>
+              <a:fillRect/>
+            </a:stretch>
+          </p:blipFill>
+          <p:spPr>
+            <a:xfrm>
+              <a:off x="266701" y="10631590"/>
+              <a:ext cx="687600" cy="508225"/>
+            </a:xfrm>
+            <a:prstGeom prst="rect">
+              <a:avLst/>
+            </a:prstGeom>
+          </p:spPr>
+        </p:pic>
+        <p:pic>
+          <p:nvPicPr>
+            <p:cNvPr id="29" name="Product" hidden="1">
+              <a:extLst>
+                <a:ext uri="{FF2B5EF4-FFF2-40B4-BE49-F238E27FC236}">
+                  <a16:creationId xmlns:a16="http://schemas.microsoft.com/office/drawing/2014/main" id="{80E31AE1-D341-3938-E0BD-BF35A0B911A6}"/>
+                </a:ext>
+              </a:extLst>
+            </p:cNvPr>
+            <p:cNvPicPr>
+              <a:picLocks noGrp="1" noRot="1" noChangeAspect="1" noMove="1" noResize="1" noEditPoints="1" noAdjustHandles="1" noChangeArrowheads="1" noChangeShapeType="1" noCrop="1"/>
+            </p:cNvPicPr>
+            <p:nvPr/>
+          </p:nvPicPr>
+          <p:blipFill>
+            <a:blip r:embed="rId5">
+              <a:extLst>
+                <a:ext uri="{28A0092B-C50C-407E-A947-70E740481C1C}">
+                  <a14:useLocalDpi xmlns:a14="http://schemas.microsoft.com/office/drawing/2010/main" val="0"/>
+                </a:ext>
+              </a:extLst>
+            </a:blip>
+            <a:stretch>
+              <a:fillRect/>
+            </a:stretch>
+          </p:blipFill>
+          <p:spPr>
+            <a:xfrm>
+              <a:off x="266700" y="9594791"/>
+              <a:ext cx="685800" cy="671209"/>
+            </a:xfrm>
+            <a:prstGeom prst="rect">
+              <a:avLst/>
+            </a:prstGeom>
+          </p:spPr>
+        </p:pic>
+        <p:pic>
+          <p:nvPicPr>
+            <p:cNvPr id="33" name="Sales" hidden="1">
+              <a:extLst>
+                <a:ext uri="{FF2B5EF4-FFF2-40B4-BE49-F238E27FC236}">
+                  <a16:creationId xmlns:a16="http://schemas.microsoft.com/office/drawing/2014/main" id="{CF5A9ED8-F64A-99ED-10E5-433533D48A5A}"/>
+                </a:ext>
+              </a:extLst>
+            </p:cNvPr>
+            <p:cNvPicPr>
+              <a:picLocks noGrp="1" noRot="1" noChangeAspect="1" noMove="1" noResize="1" noEditPoints="1" noAdjustHandles="1" noChangeArrowheads="1" noChangeShapeType="1" noCrop="1"/>
+            </p:cNvPicPr>
+            <p:nvPr/>
+          </p:nvPicPr>
+          <p:blipFill>
+            <a:blip r:embed="rId6">
+              <a:extLst>
+                <a:ext uri="{28A0092B-C50C-407E-A947-70E740481C1C}">
+                  <a14:useLocalDpi xmlns:a14="http://schemas.microsoft.com/office/drawing/2010/main" val="0"/>
+                </a:ext>
+              </a:extLst>
+            </a:blip>
+            <a:stretch>
+              <a:fillRect/>
+            </a:stretch>
+          </p:blipFill>
+          <p:spPr>
+            <a:xfrm>
+              <a:off x="266700" y="8647991"/>
+              <a:ext cx="685800" cy="671209"/>
+            </a:xfrm>
+            <a:prstGeom prst="rect">
+              <a:avLst/>
+            </a:prstGeom>
+          </p:spPr>
+        </p:pic>
+        <p:pic>
+          <p:nvPicPr>
+            <p:cNvPr id="27" name="Overview" descr="A black and white bar chart&#10;&#10;Description automatically generated" hidden="1">
+              <a:extLst>
+                <a:ext uri="{FF2B5EF4-FFF2-40B4-BE49-F238E27FC236}">
+                  <a16:creationId xmlns:a16="http://schemas.microsoft.com/office/drawing/2014/main" id="{A4EFBC23-2DB6-68F1-7E3E-630BA7A0EA91}"/>
+                </a:ext>
+              </a:extLst>
+            </p:cNvPr>
+            <p:cNvPicPr>
+              <a:picLocks noGrp="1" noRot="1" noChangeAspect="1" noMove="1" noResize="1" noEditPoints="1" noAdjustHandles="1" noChangeArrowheads="1" noChangeShapeType="1" noCrop="1"/>
+            </p:cNvPicPr>
+            <p:nvPr/>
+          </p:nvPicPr>
+          <p:blipFill>
+            <a:blip r:embed="rId7">
+              <a:extLst>
+                <a:ext uri="{28A0092B-C50C-407E-A947-70E740481C1C}">
+                  <a14:useLocalDpi xmlns:a14="http://schemas.microsoft.com/office/drawing/2010/main" val="0"/>
+                </a:ext>
+              </a:extLst>
+            </a:blip>
+            <a:stretch>
+              <a:fillRect/>
+            </a:stretch>
+          </p:blipFill>
+          <p:spPr>
+            <a:xfrm>
+              <a:off x="266700" y="7701191"/>
+              <a:ext cx="685800" cy="678426"/>
+            </a:xfrm>
+            <a:prstGeom prst="rect">
+              <a:avLst/>
+            </a:prstGeom>
+          </p:spPr>
+        </p:pic>
+      </p:grpSp>
+      <p:grpSp>
+        <p:nvGrpSpPr>
+          <p:cNvPr id="36" name="Filter_Icons" hidden="1">
+            <a:extLst>
+              <a:ext uri="{FF2B5EF4-FFF2-40B4-BE49-F238E27FC236}">
+                <a16:creationId xmlns:a16="http://schemas.microsoft.com/office/drawing/2014/main" id="{55EA662A-9608-0E24-7544-CB16F74BB291}"/>
+              </a:ext>
+            </a:extLst>
+          </p:cNvPr>
+          <p:cNvGrpSpPr>
+            <a:grpSpLocks noGrp="1" noUngrp="1" noRot="1" noMove="1" noResize="1"/>
+          </p:cNvGrpSpPr>
+          <p:nvPr/>
+        </p:nvGrpSpPr>
+        <p:grpSpPr>
+          <a:xfrm>
+            <a:off x="266700" y="266700"/>
+            <a:ext cx="685800" cy="1565340"/>
+            <a:chOff x="266700" y="266700"/>
+            <a:chExt cx="685800" cy="1565340"/>
+          </a:xfrm>
+        </p:grpSpPr>
+        <p:pic>
+          <p:nvPicPr>
+            <p:cNvPr id="23" name="Filter">
+              <a:extLst>
+                <a:ext uri="{FF2B5EF4-FFF2-40B4-BE49-F238E27FC236}">
+                  <a16:creationId xmlns:a16="http://schemas.microsoft.com/office/drawing/2014/main" id="{0D31A7DD-06A0-277A-C8C8-9EEE57F3023A}"/>
+                </a:ext>
+              </a:extLst>
+            </p:cNvPr>
+            <p:cNvPicPr>
+              <a:picLocks noGrp="1" noRot="1" noChangeAspect="1" noMove="1" noResize="1" noEditPoints="1" noAdjustHandles="1" noChangeArrowheads="1" noChangeShapeType="1" noCrop="1"/>
+            </p:cNvPicPr>
+            <p:nvPr/>
+          </p:nvPicPr>
+          <p:blipFill>
+            <a:blip r:embed="rId8">
+              <a:extLst>
+                <a:ext uri="{28A0092B-C50C-407E-A947-70E740481C1C}">
+                  <a14:useLocalDpi xmlns:a14="http://schemas.microsoft.com/office/drawing/2010/main" val="0"/>
+                </a:ext>
+              </a:extLst>
+            </a:blip>
+            <a:stretch>
+              <a:fillRect/>
+            </a:stretch>
+          </p:blipFill>
+          <p:spPr>
+            <a:xfrm>
+              <a:off x="266700" y="1219200"/>
+              <a:ext cx="685800" cy="612840"/>
+            </a:xfrm>
+            <a:prstGeom prst="rect">
+              <a:avLst/>
+            </a:prstGeom>
+          </p:spPr>
+        </p:pic>
+        <p:pic>
+          <p:nvPicPr>
+            <p:cNvPr id="35" name="Clear_Filters">
+              <a:extLst>
+                <a:ext uri="{FF2B5EF4-FFF2-40B4-BE49-F238E27FC236}">
+                  <a16:creationId xmlns:a16="http://schemas.microsoft.com/office/drawing/2014/main" id="{CBD63BE9-A275-DB5C-AC04-D6942FAB87BF}"/>
+                </a:ext>
+              </a:extLst>
+            </p:cNvPr>
+            <p:cNvPicPr>
+              <a:picLocks noGrp="1" noRot="1" noChangeAspect="1" noMove="1" noResize="1" noEditPoints="1" noAdjustHandles="1" noChangeArrowheads="1" noChangeShapeType="1" noCrop="1"/>
+            </p:cNvPicPr>
+            <p:nvPr/>
+          </p:nvPicPr>
+          <p:blipFill>
+            <a:blip r:embed="rId9">
+              <a:extLst>
+                <a:ext uri="{28A0092B-C50C-407E-A947-70E740481C1C}">
+                  <a14:useLocalDpi xmlns:a14="http://schemas.microsoft.com/office/drawing/2010/main" val="0"/>
+                </a:ext>
+              </a:extLst>
+            </a:blip>
+            <a:stretch>
+              <a:fillRect/>
+            </a:stretch>
+          </p:blipFill>
+          <p:spPr>
+            <a:xfrm>
+              <a:off x="266700" y="266700"/>
+              <a:ext cx="685800" cy="685800"/>
+            </a:xfrm>
+            <a:prstGeom prst="rect">
+              <a:avLst/>
+            </a:prstGeom>
+          </p:spPr>
+        </p:pic>
+      </p:grpSp>
+      <p:grpSp>
+        <p:nvGrpSpPr>
+          <p:cNvPr id="15" name="Margins" hidden="1">
+            <a:extLst>
+              <a:ext uri="{FF2B5EF4-FFF2-40B4-BE49-F238E27FC236}">
+                <a16:creationId xmlns:a16="http://schemas.microsoft.com/office/drawing/2014/main" id="{3A7668E8-5B3C-6507-FA98-4CC00C9EA2A8}"/>
+              </a:ext>
+            </a:extLst>
+          </p:cNvPr>
+          <p:cNvGrpSpPr>
+            <a:grpSpLocks noGrp="1" noUngrp="1" noRot="1" noMove="1" noResize="1"/>
+          </p:cNvGrpSpPr>
+          <p:nvPr/>
+        </p:nvGrpSpPr>
+        <p:grpSpPr>
+          <a:xfrm>
+            <a:off x="1219200" y="0"/>
+            <a:ext cx="23164800" cy="13716000"/>
+            <a:chOff x="1219200" y="0"/>
+            <a:chExt cx="23164800" cy="13716000"/>
+          </a:xfrm>
+        </p:grpSpPr>
+        <p:grpSp>
+          <p:nvGrpSpPr>
+            <p:cNvPr id="13" name="Main">
+              <a:extLst>
+                <a:ext uri="{FF2B5EF4-FFF2-40B4-BE49-F238E27FC236}">
+                  <a16:creationId xmlns:a16="http://schemas.microsoft.com/office/drawing/2014/main" id="{F6F54732-847D-5C13-1DBD-FEC62B2DA619}"/>
+                </a:ext>
+              </a:extLst>
+            </p:cNvPr>
+            <p:cNvGrpSpPr>
+              <a:grpSpLocks noGrp="1" noUngrp="1" noRot="1" noMove="1" noResize="1"/>
+            </p:cNvGrpSpPr>
+            <p:nvPr/>
+          </p:nvGrpSpPr>
+          <p:grpSpPr>
+            <a:xfrm>
+              <a:off x="1219200" y="0"/>
+              <a:ext cx="23164800" cy="13716000"/>
+              <a:chOff x="1219200" y="0"/>
+              <a:chExt cx="23164800" cy="13716000"/>
+            </a:xfrm>
+          </p:grpSpPr>
+          <p:sp>
+            <p:nvSpPr>
+              <p:cNvPr id="4" name="H_Bottom_Margin">
+                <a:extLst>
+                  <a:ext uri="{FF2B5EF4-FFF2-40B4-BE49-F238E27FC236}">
+                    <a16:creationId xmlns:a16="http://schemas.microsoft.com/office/drawing/2014/main" id="{D9C46175-3CDD-2884-0097-0307AA41B9C2}"/>
+                  </a:ext>
+                </a:extLst>
+              </p:cNvPr>
+              <p:cNvSpPr>
+                <a:spLocks noGrp="1" noRot="1" noMove="1" noResize="1" noEditPoints="1" noAdjustHandles="1" noChangeArrowheads="1" noChangeShapeType="1"/>
+              </p:cNvSpPr>
+              <p:nvPr/>
+            </p:nvSpPr>
+            <p:spPr>
+              <a:xfrm>
+                <a:off x="1219200" y="13106400"/>
+                <a:ext cx="23164800" cy="609600"/>
+              </a:xfrm>
+              <a:prstGeom prst="rect">
+                <a:avLst/>
+              </a:prstGeom>
+              <a:solidFill>
+                <a:schemeClr val="accent2">
+                  <a:alpha val="30000"/>
+                </a:schemeClr>
+              </a:solidFill>
+              <a:ln>
+                <a:noFill/>
+              </a:ln>
+            </p:spPr>
+            <p:style>
+              <a:lnRef idx="2">
+                <a:schemeClr val="accent2">
+                  <a:shade val="15000"/>
+                </a:schemeClr>
+              </a:lnRef>
+              <a:fillRef idx="1">
+                <a:schemeClr val="accent2"/>
+              </a:fillRef>
+              <a:effectRef idx="0">
+                <a:schemeClr val="accent2"/>
+              </a:effectRef>
+              <a:fontRef idx="minor">
+                <a:schemeClr val="lt1"/>
+              </a:fontRef>
+            </p:style>
+            <p:txBody>
+              <a:bodyPr rtlCol="0" anchor="ctr"/>
+              <a:lstStyle/>
+              <a:p>
+                <a:pPr algn="ctr"/>
+                <a:endParaRPr lang="pl-PL"/>
+              </a:p>
+            </p:txBody>
+          </p:sp>
+          <p:sp>
+            <p:nvSpPr>
+              <p:cNvPr id="2" name="V_Left_Margin">
+                <a:extLst>
+                  <a:ext uri="{FF2B5EF4-FFF2-40B4-BE49-F238E27FC236}">
+                    <a16:creationId xmlns:a16="http://schemas.microsoft.com/office/drawing/2014/main" id="{EFBEE9D4-C37E-263C-5A6F-A2CA6967FA20}"/>
+                  </a:ext>
+                </a:extLst>
+              </p:cNvPr>
+              <p:cNvSpPr>
+                <a:spLocks noGrp="1" noRot="1" noMove="1" noResize="1" noEditPoints="1" noAdjustHandles="1" noChangeArrowheads="1" noChangeShapeType="1"/>
+              </p:cNvSpPr>
+              <p:nvPr/>
+            </p:nvSpPr>
+            <p:spPr>
+              <a:xfrm>
+                <a:off x="1219200" y="0"/>
+                <a:ext cx="609600" cy="13716000"/>
+              </a:xfrm>
+              <a:prstGeom prst="rect">
+                <a:avLst/>
+              </a:prstGeom>
+              <a:solidFill>
+                <a:schemeClr val="accent2">
+                  <a:alpha val="30000"/>
+                </a:schemeClr>
+              </a:solidFill>
+              <a:ln>
+                <a:noFill/>
+              </a:ln>
+            </p:spPr>
+            <p:style>
+              <a:lnRef idx="2">
+                <a:schemeClr val="accent2">
+                  <a:shade val="15000"/>
+                </a:schemeClr>
+              </a:lnRef>
+              <a:fillRef idx="1">
+                <a:schemeClr val="accent2"/>
+              </a:fillRef>
+              <a:effectRef idx="0">
+                <a:schemeClr val="accent2"/>
+              </a:effectRef>
+              <a:fontRef idx="minor">
+                <a:schemeClr val="lt1"/>
+              </a:fontRef>
+            </p:style>
+            <p:txBody>
+              <a:bodyPr rtlCol="0" anchor="ctr"/>
+              <a:lstStyle/>
+              <a:p>
+                <a:pPr algn="ctr"/>
+                <a:endParaRPr lang="pl-PL"/>
+              </a:p>
+            </p:txBody>
+          </p:sp>
+          <p:sp>
+            <p:nvSpPr>
+              <p:cNvPr id="3" name="V_Right_Margin">
+                <a:extLst>
+                  <a:ext uri="{FF2B5EF4-FFF2-40B4-BE49-F238E27FC236}">
+                    <a16:creationId xmlns:a16="http://schemas.microsoft.com/office/drawing/2014/main" id="{A7BB4A29-D641-7786-2AE0-59780B2DBF51}"/>
+                  </a:ext>
+                </a:extLst>
+              </p:cNvPr>
+              <p:cNvSpPr>
+                <a:spLocks noGrp="1" noRot="1" noMove="1" noResize="1" noEditPoints="1" noAdjustHandles="1" noChangeArrowheads="1" noChangeShapeType="1"/>
+              </p:cNvSpPr>
+              <p:nvPr/>
+            </p:nvSpPr>
+            <p:spPr>
+              <a:xfrm>
+                <a:off x="23774400" y="0"/>
+                <a:ext cx="609600" cy="13716000"/>
+              </a:xfrm>
+              <a:prstGeom prst="rect">
+                <a:avLst/>
+              </a:prstGeom>
+              <a:solidFill>
+                <a:schemeClr val="accent2">
+                  <a:alpha val="30000"/>
+                </a:schemeClr>
+              </a:solidFill>
+              <a:ln>
+                <a:noFill/>
+              </a:ln>
+            </p:spPr>
+            <p:style>
+              <a:lnRef idx="2">
+                <a:schemeClr val="accent2">
+                  <a:shade val="15000"/>
+                </a:schemeClr>
+              </a:lnRef>
+              <a:fillRef idx="1">
+                <a:schemeClr val="accent2"/>
+              </a:fillRef>
+              <a:effectRef idx="0">
+                <a:schemeClr val="accent2"/>
+              </a:effectRef>
+              <a:fontRef idx="minor">
+                <a:schemeClr val="lt1"/>
+              </a:fontRef>
+            </p:style>
+            <p:txBody>
+              <a:bodyPr rtlCol="0" anchor="ctr"/>
+              <a:lstStyle/>
+              <a:p>
+                <a:pPr algn="ctr"/>
+                <a:endParaRPr lang="pl-PL"/>
+              </a:p>
+            </p:txBody>
+          </p:sp>
+        </p:grpSp>
+        <p:grpSp>
+          <p:nvGrpSpPr>
+            <p:cNvPr id="14" name="Sub">
+              <a:extLst>
+                <a:ext uri="{FF2B5EF4-FFF2-40B4-BE49-F238E27FC236}">
+                  <a16:creationId xmlns:a16="http://schemas.microsoft.com/office/drawing/2014/main" id="{E869BBD6-CD1C-0A5B-97C4-2994694AAC50}"/>
+                </a:ext>
+              </a:extLst>
+            </p:cNvPr>
+            <p:cNvGrpSpPr>
+              <a:grpSpLocks noGrp="1" noUngrp="1" noRot="1" noMove="1" noResize="1"/>
+            </p:cNvGrpSpPr>
+            <p:nvPr/>
+          </p:nvGrpSpPr>
+          <p:grpSpPr>
+            <a:xfrm>
+              <a:off x="1219200" y="0"/>
+              <a:ext cx="23164800" cy="13716000"/>
+              <a:chOff x="1219200" y="0"/>
+              <a:chExt cx="23164800" cy="13716000"/>
+            </a:xfrm>
+          </p:grpSpPr>
+          <p:sp>
+            <p:nvSpPr>
+              <p:cNvPr id="11" name="H_3_Margin">
+                <a:extLst>
+                  <a:ext uri="{FF2B5EF4-FFF2-40B4-BE49-F238E27FC236}">
+                    <a16:creationId xmlns:a16="http://schemas.microsoft.com/office/drawing/2014/main" id="{7735B8AF-7C32-2059-5571-CFE9A6CAB35E}"/>
+                  </a:ext>
+                </a:extLst>
+              </p:cNvPr>
+              <p:cNvSpPr>
+                <a:spLocks noGrp="1" noRot="1" noMove="1" noResize="1" noEditPoints="1" noAdjustHandles="1" noChangeArrowheads="1" noChangeShapeType="1"/>
+              </p:cNvSpPr>
+              <p:nvPr/>
+            </p:nvSpPr>
+            <p:spPr>
+              <a:xfrm>
+                <a:off x="1219200" y="8496300"/>
+                <a:ext cx="23164800" cy="457200"/>
+              </a:xfrm>
+              <a:prstGeom prst="rect">
+                <a:avLst/>
+              </a:prstGeom>
+              <a:solidFill>
+                <a:schemeClr val="accent2">
+                  <a:alpha val="10000"/>
+                </a:schemeClr>
+              </a:solidFill>
+              <a:ln>
+                <a:noFill/>
+              </a:ln>
+            </p:spPr>
+            <p:style>
+              <a:lnRef idx="2">
+                <a:schemeClr val="accent2">
+                  <a:shade val="15000"/>
+                </a:schemeClr>
+              </a:lnRef>
+              <a:fillRef idx="1">
+                <a:schemeClr val="accent2"/>
+              </a:fillRef>
+              <a:effectRef idx="0">
+                <a:schemeClr val="accent2"/>
+              </a:effectRef>
+              <a:fontRef idx="minor">
+                <a:schemeClr val="lt1"/>
+              </a:fontRef>
+            </p:style>
+            <p:txBody>
+              <a:bodyPr rtlCol="0" anchor="ctr"/>
+              <a:lstStyle/>
+              <a:p>
+                <a:pPr algn="ctr"/>
+                <a:endParaRPr lang="pl-PL"/>
+              </a:p>
+            </p:txBody>
+          </p:sp>
+          <p:sp>
+            <p:nvSpPr>
+              <p:cNvPr id="10" name="H_2_Margin">
+                <a:extLst>
+                  <a:ext uri="{FF2B5EF4-FFF2-40B4-BE49-F238E27FC236}">
+                    <a16:creationId xmlns:a16="http://schemas.microsoft.com/office/drawing/2014/main" id="{63F25BB1-C29B-A354-2A7A-D2ED388B2734}"/>
+                  </a:ext>
+                </a:extLst>
+              </p:cNvPr>
+              <p:cNvSpPr>
+                <a:spLocks noGrp="1" noRot="1" noMove="1" noResize="1" noEditPoints="1" noAdjustHandles="1" noChangeArrowheads="1" noChangeShapeType="1"/>
+              </p:cNvSpPr>
+              <p:nvPr/>
+            </p:nvSpPr>
+            <p:spPr>
+              <a:xfrm>
+                <a:off x="1219200" y="3886200"/>
+                <a:ext cx="23164800" cy="457200"/>
+              </a:xfrm>
+              <a:prstGeom prst="rect">
+                <a:avLst/>
+              </a:prstGeom>
+              <a:solidFill>
+                <a:schemeClr val="accent2">
+                  <a:alpha val="10000"/>
+                </a:schemeClr>
+              </a:solidFill>
+              <a:ln>
+                <a:noFill/>
+              </a:ln>
+            </p:spPr>
+            <p:style>
+              <a:lnRef idx="2">
+                <a:schemeClr val="accent2">
+                  <a:shade val="15000"/>
+                </a:schemeClr>
+              </a:lnRef>
+              <a:fillRef idx="1">
+                <a:schemeClr val="accent2"/>
+              </a:fillRef>
+              <a:effectRef idx="0">
+                <a:schemeClr val="accent2"/>
+              </a:effectRef>
+              <a:fontRef idx="minor">
+                <a:schemeClr val="lt1"/>
+              </a:fontRef>
+            </p:style>
+            <p:txBody>
+              <a:bodyPr rtlCol="0" anchor="ctr"/>
+              <a:lstStyle/>
+              <a:p>
+                <a:pPr algn="ctr"/>
+                <a:endParaRPr lang="pl-PL"/>
+              </a:p>
+            </p:txBody>
+          </p:sp>
+          <p:sp>
+            <p:nvSpPr>
+              <p:cNvPr id="5" name="H_1_Margin">
+                <a:extLst>
+                  <a:ext uri="{FF2B5EF4-FFF2-40B4-BE49-F238E27FC236}">
+                    <a16:creationId xmlns:a16="http://schemas.microsoft.com/office/drawing/2014/main" id="{9968A711-BA69-1CB6-F295-6BAD89359B6F}"/>
+                  </a:ext>
+                </a:extLst>
+              </p:cNvPr>
+              <p:cNvSpPr>
+                <a:spLocks noGrp="1" noRot="1" noMove="1" noResize="1" noEditPoints="1" noAdjustHandles="1" noChangeArrowheads="1" noChangeShapeType="1"/>
+              </p:cNvSpPr>
+              <p:nvPr/>
+            </p:nvSpPr>
+            <p:spPr>
+              <a:xfrm>
+                <a:off x="1219200" y="1143000"/>
+                <a:ext cx="23164800" cy="457200"/>
+              </a:xfrm>
+              <a:prstGeom prst="rect">
+                <a:avLst/>
+              </a:prstGeom>
+              <a:solidFill>
+                <a:schemeClr val="accent2">
+                  <a:alpha val="10000"/>
+                </a:schemeClr>
+              </a:solidFill>
+              <a:ln>
+                <a:noFill/>
+              </a:ln>
+            </p:spPr>
+            <p:style>
+              <a:lnRef idx="2">
+                <a:schemeClr val="accent2">
+                  <a:shade val="15000"/>
+                </a:schemeClr>
+              </a:lnRef>
+              <a:fillRef idx="1">
+                <a:schemeClr val="accent2"/>
+              </a:fillRef>
+              <a:effectRef idx="0">
+                <a:schemeClr val="accent2"/>
+              </a:effectRef>
+              <a:fontRef idx="minor">
+                <a:schemeClr val="lt1"/>
+              </a:fontRef>
+            </p:style>
+            <p:txBody>
+              <a:bodyPr rtlCol="0" anchor="ctr"/>
+              <a:lstStyle/>
+              <a:p>
+                <a:pPr algn="ctr"/>
+                <a:endParaRPr lang="pl-PL"/>
+              </a:p>
+            </p:txBody>
+          </p:sp>
+          <p:sp>
+            <p:nvSpPr>
+              <p:cNvPr id="12" name="V_Center_Margin">
+                <a:extLst>
+                  <a:ext uri="{FF2B5EF4-FFF2-40B4-BE49-F238E27FC236}">
+                    <a16:creationId xmlns:a16="http://schemas.microsoft.com/office/drawing/2014/main" id="{64EA36DC-E110-36BA-53BE-5305ADE6E04A}"/>
+                  </a:ext>
+                </a:extLst>
+              </p:cNvPr>
+              <p:cNvSpPr>
+                <a:spLocks noGrp="1" noRot="1" noMove="1" noResize="1" noEditPoints="1" noAdjustHandles="1" noChangeArrowheads="1" noChangeShapeType="1"/>
+              </p:cNvSpPr>
+              <p:nvPr/>
+            </p:nvSpPr>
+            <p:spPr>
+              <a:xfrm>
+                <a:off x="12573000" y="0"/>
+                <a:ext cx="457200" cy="13716000"/>
+              </a:xfrm>
+              <a:prstGeom prst="rect">
+                <a:avLst/>
+              </a:prstGeom>
+              <a:solidFill>
+                <a:schemeClr val="accent2">
+                  <a:alpha val="10000"/>
+                </a:schemeClr>
+              </a:solidFill>
+              <a:ln>
+                <a:noFill/>
+              </a:ln>
+            </p:spPr>
+            <p:style>
+              <a:lnRef idx="2">
+                <a:schemeClr val="accent2">
+                  <a:shade val="15000"/>
+                </a:schemeClr>
+              </a:lnRef>
+              <a:fillRef idx="1">
+                <a:schemeClr val="accent2"/>
+              </a:fillRef>
+              <a:effectRef idx="0">
+                <a:schemeClr val="accent2"/>
+              </a:effectRef>
+              <a:fontRef idx="minor">
+                <a:schemeClr val="lt1"/>
+              </a:fontRef>
+            </p:style>
+            <p:txBody>
+              <a:bodyPr rtlCol="0" anchor="ctr"/>
+              <a:lstStyle/>
+              <a:p>
+                <a:pPr algn="ctr"/>
+                <a:endParaRPr lang="pl-PL"/>
+              </a:p>
+            </p:txBody>
+          </p:sp>
+        </p:grpSp>
+      </p:grpSp>
+      <p:sp>
+        <p:nvSpPr>
+          <p:cNvPr id="9" name="Text_Results_By" hidden="1">
+            <a:extLst>
+              <a:ext uri="{FF2B5EF4-FFF2-40B4-BE49-F238E27FC236}">
+                <a16:creationId xmlns:a16="http://schemas.microsoft.com/office/drawing/2014/main" id="{7658BB83-70B6-06BD-2168-03FCCE59DAF2}"/>
+              </a:ext>
+            </a:extLst>
+          </p:cNvPr>
+          <p:cNvSpPr txBox="1">
+            <a:spLocks noGrp="1" noRot="1" noMove="1" noResize="1" noEditPoints="1" noAdjustHandles="1" noChangeArrowheads="1" noChangeShapeType="1"/>
+          </p:cNvSpPr>
+          <p:nvPr/>
+        </p:nvSpPr>
+        <p:spPr>
+          <a:xfrm>
+            <a:off x="1873250" y="1202323"/>
+            <a:ext cx="21901150" cy="338554"/>
+          </a:xfrm>
+          <a:prstGeom prst="rect">
+            <a:avLst/>
+          </a:prstGeom>
+          <a:noFill/>
+        </p:spPr>
+        <p:txBody>
+          <a:bodyPr wrap="square" rtlCol="0">
+            <a:spAutoFit/>
+          </a:bodyPr>
+          <a:lstStyle/>
+          <a:p>
+            <a:r>
+              <a:rPr lang="pl-PL" sz="1600" dirty="0">
+                <a:solidFill>
+                  <a:srgbClr val="344C69"/>
+                </a:solidFill>
+                <a:latin typeface="DIN" panose="02000504040000020003" pitchFamily="2" charset="0"/>
+              </a:rPr>
+              <a:t>Show results by</a:t>
+            </a:r>
+          </a:p>
+        </p:txBody>
+      </p:sp>
+      <p:sp>
+        <p:nvSpPr>
+          <p:cNvPr id="22" name="Title">
+            <a:extLst>
+              <a:ext uri="{FF2B5EF4-FFF2-40B4-BE49-F238E27FC236}">
+                <a16:creationId xmlns:a16="http://schemas.microsoft.com/office/drawing/2014/main" id="{E8225F30-BC0F-8F7B-9723-5F424DE87109}"/>
+              </a:ext>
+            </a:extLst>
+          </p:cNvPr>
+          <p:cNvSpPr txBox="1">
+            <a:spLocks noGrp="1" noRot="1" noMove="1" noResize="1" noEditPoints="1" noAdjustHandles="1" noChangeArrowheads="1" noChangeShapeType="1"/>
+          </p:cNvSpPr>
+          <p:nvPr/>
+        </p:nvSpPr>
+        <p:spPr>
+          <a:xfrm>
+            <a:off x="1828800" y="190500"/>
+            <a:ext cx="21945600" cy="1015663"/>
+          </a:xfrm>
+          <a:prstGeom prst="rect">
+            <a:avLst/>
+          </a:prstGeom>
+          <a:noFill/>
+        </p:spPr>
+        <p:txBody>
+          <a:bodyPr wrap="square" rtlCol="0">
+            <a:spAutoFit/>
+          </a:bodyPr>
+          <a:lstStyle/>
+          <a:p>
+            <a:r>
+              <a:rPr lang="pl-PL" sz="6000" dirty="0">
+                <a:solidFill>
+                  <a:srgbClr val="344C69"/>
+                </a:solidFill>
+                <a:effectLst>
+                  <a:outerShdw blurRad="38100" dist="38100" dir="2700000" algn="tl">
+                    <a:srgbClr val="000000">
+                      <a:alpha val="43137"/>
+                    </a:srgbClr>
+                  </a:outerShdw>
+                </a:effectLst>
+                <a:latin typeface="DIN" panose="02000504040000020003" pitchFamily="2" charset="0"/>
+              </a:rPr>
+              <a:t>Delivery Performance Analysis</a:t>
+            </a:r>
+          </a:p>
+        </p:txBody>
+      </p:sp>
+    </p:spTree>
+    <p:extLst>
+      <p:ext uri="{BB962C8B-B14F-4D97-AF65-F5344CB8AC3E}">
+        <p14:creationId xmlns:p14="http://schemas.microsoft.com/office/powerpoint/2010/main" val="1942324848"/>
+      </p:ext>
+    </p:extLst>
+  </p:cSld>
+  <p:clrMapOvr>
+    <a:masterClrMapping/>
+  </p:clrMapOvr>
+</p:sld>
+</file>
+
+<file path=ppt/slides/slide6.xml><?xml version="1.0" encoding="utf-8"?>
+<p:sld xmlns:a="http://schemas.openxmlformats.org/drawingml/2006/main" xmlns:r="http://schemas.openxmlformats.org/officeDocument/2006/relationships" xmlns:p="http://schemas.openxmlformats.org/presentationml/2006/main">
+  <p:cSld>
+    <p:spTree>
+      <p:nvGrpSpPr>
+        <p:cNvPr id="1" name=""/>
+        <p:cNvGrpSpPr/>
+        <p:nvPr/>
+      </p:nvGrpSpPr>
+      <p:grpSpPr>
+        <a:xfrm>
+          <a:off x="0" y="0"/>
+          <a:ext cx="0" cy="0"/>
+          <a:chOff x="0" y="0"/>
+          <a:chExt cx="0" cy="0"/>
+        </a:xfrm>
+      </p:grpSpPr>
+      <p:grpSp>
+        <p:nvGrpSpPr>
           <p:cNvPr id="46" name="Backgrounds">
             <a:extLst>
               <a:ext uri="{FF2B5EF4-FFF2-40B4-BE49-F238E27FC236}">

</xml_diff>

<commit_message>
Segmentacja RFM klientów; Ilość klientów w podziale na stany; Porównanie i udział metod płatności
</commit_message>
<xml_diff>
--- a/BrazilianECommerce/Background/Backgrounds.pptx
+++ b/BrazilianECommerce/Background/Backgrounds.pptx
@@ -8,9 +8,10 @@
     <p:sldId id="256" r:id="rId2"/>
     <p:sldId id="260" r:id="rId3"/>
     <p:sldId id="261" r:id="rId4"/>
-    <p:sldId id="262" r:id="rId5"/>
-    <p:sldId id="263" r:id="rId6"/>
-    <p:sldId id="259" r:id="rId7"/>
+    <p:sldId id="263" r:id="rId5"/>
+    <p:sldId id="264" r:id="rId6"/>
+    <p:sldId id="265" r:id="rId7"/>
+    <p:sldId id="259" r:id="rId8"/>
   </p:sldIdLst>
   <p:sldSz cx="24384000" cy="13716000"/>
   <p:notesSz cx="6858000" cy="9144000"/>
@@ -248,7 +249,7 @@
           <a:p>
             <a:fld id="{B4AF9752-CF4F-4FCB-AD1E-762587F45785}" type="datetimeFigureOut">
               <a:rPr lang="pl-PL" smtClean="0"/>
-              <a:t>20.10.2024</a:t>
+              <a:t>25.10.2024</a:t>
             </a:fld>
             <a:endParaRPr lang="pl-PL"/>
           </a:p>
@@ -418,7 +419,7 @@
           <a:p>
             <a:fld id="{B4AF9752-CF4F-4FCB-AD1E-762587F45785}" type="datetimeFigureOut">
               <a:rPr lang="pl-PL" smtClean="0"/>
-              <a:t>20.10.2024</a:t>
+              <a:t>25.10.2024</a:t>
             </a:fld>
             <a:endParaRPr lang="pl-PL"/>
           </a:p>
@@ -598,7 +599,7 @@
           <a:p>
             <a:fld id="{B4AF9752-CF4F-4FCB-AD1E-762587F45785}" type="datetimeFigureOut">
               <a:rPr lang="pl-PL" smtClean="0"/>
-              <a:t>20.10.2024</a:t>
+              <a:t>25.10.2024</a:t>
             </a:fld>
             <a:endParaRPr lang="pl-PL"/>
           </a:p>
@@ -768,7 +769,7 @@
           <a:p>
             <a:fld id="{B4AF9752-CF4F-4FCB-AD1E-762587F45785}" type="datetimeFigureOut">
               <a:rPr lang="pl-PL" smtClean="0"/>
-              <a:t>20.10.2024</a:t>
+              <a:t>25.10.2024</a:t>
             </a:fld>
             <a:endParaRPr lang="pl-PL"/>
           </a:p>
@@ -1014,7 +1015,7 @@
           <a:p>
             <a:fld id="{B4AF9752-CF4F-4FCB-AD1E-762587F45785}" type="datetimeFigureOut">
               <a:rPr lang="pl-PL" smtClean="0"/>
-              <a:t>20.10.2024</a:t>
+              <a:t>25.10.2024</a:t>
             </a:fld>
             <a:endParaRPr lang="pl-PL"/>
           </a:p>
@@ -1246,7 +1247,7 @@
           <a:p>
             <a:fld id="{B4AF9752-CF4F-4FCB-AD1E-762587F45785}" type="datetimeFigureOut">
               <a:rPr lang="pl-PL" smtClean="0"/>
-              <a:t>20.10.2024</a:t>
+              <a:t>25.10.2024</a:t>
             </a:fld>
             <a:endParaRPr lang="pl-PL"/>
           </a:p>
@@ -1613,7 +1614,7 @@
           <a:p>
             <a:fld id="{B4AF9752-CF4F-4FCB-AD1E-762587F45785}" type="datetimeFigureOut">
               <a:rPr lang="pl-PL" smtClean="0"/>
-              <a:t>20.10.2024</a:t>
+              <a:t>25.10.2024</a:t>
             </a:fld>
             <a:endParaRPr lang="pl-PL"/>
           </a:p>
@@ -1731,7 +1732,7 @@
           <a:p>
             <a:fld id="{B4AF9752-CF4F-4FCB-AD1E-762587F45785}" type="datetimeFigureOut">
               <a:rPr lang="pl-PL" smtClean="0"/>
-              <a:t>20.10.2024</a:t>
+              <a:t>25.10.2024</a:t>
             </a:fld>
             <a:endParaRPr lang="pl-PL"/>
           </a:p>
@@ -1826,7 +1827,7 @@
           <a:p>
             <a:fld id="{B4AF9752-CF4F-4FCB-AD1E-762587F45785}" type="datetimeFigureOut">
               <a:rPr lang="pl-PL" smtClean="0"/>
-              <a:t>20.10.2024</a:t>
+              <a:t>25.10.2024</a:t>
             </a:fld>
             <a:endParaRPr lang="pl-PL"/>
           </a:p>
@@ -2103,7 +2104,7 @@
           <a:p>
             <a:fld id="{B4AF9752-CF4F-4FCB-AD1E-762587F45785}" type="datetimeFigureOut">
               <a:rPr lang="pl-PL" smtClean="0"/>
-              <a:t>20.10.2024</a:t>
+              <a:t>25.10.2024</a:t>
             </a:fld>
             <a:endParaRPr lang="pl-PL"/>
           </a:p>
@@ -2360,7 +2361,7 @@
           <a:p>
             <a:fld id="{B4AF9752-CF4F-4FCB-AD1E-762587F45785}" type="datetimeFigureOut">
               <a:rPr lang="pl-PL" smtClean="0"/>
-              <a:t>20.10.2024</a:t>
+              <a:t>25.10.2024</a:t>
             </a:fld>
             <a:endParaRPr lang="pl-PL"/>
           </a:p>
@@ -2573,7 +2574,7 @@
           <a:p>
             <a:fld id="{B4AF9752-CF4F-4FCB-AD1E-762587F45785}" type="datetimeFigureOut">
               <a:rPr lang="pl-PL" smtClean="0"/>
-              <a:t>20.10.2024</a:t>
+              <a:t>25.10.2024</a:t>
             </a:fld>
             <a:endParaRPr lang="pl-PL"/>
           </a:p>
@@ -7670,1420 +7671,6 @@
       </p:grpSp>
       <p:grpSp>
         <p:nvGrpSpPr>
-          <p:cNvPr id="18" name="Navigation_Icons">
-            <a:extLst>
-              <a:ext uri="{FF2B5EF4-FFF2-40B4-BE49-F238E27FC236}">
-                <a16:creationId xmlns:a16="http://schemas.microsoft.com/office/drawing/2014/main" id="{395E1018-9B2A-8758-C346-55DC0300B81D}"/>
-              </a:ext>
-            </a:extLst>
-          </p:cNvPr>
-          <p:cNvGrpSpPr>
-            <a:grpSpLocks noGrp="1" noUngrp="1" noRot="1" noMove="1" noResize="1"/>
-          </p:cNvGrpSpPr>
-          <p:nvPr/>
-        </p:nvGrpSpPr>
-        <p:grpSpPr>
-          <a:xfrm>
-            <a:off x="266700" y="7701191"/>
-            <a:ext cx="687601" cy="5405209"/>
-            <a:chOff x="266700" y="7701191"/>
-            <a:chExt cx="687601" cy="5405209"/>
-          </a:xfrm>
-        </p:grpSpPr>
-        <p:pic>
-          <p:nvPicPr>
-            <p:cNvPr id="19" name="Customer" descr="A white person with black background&#10;&#10;Description automatically generated" hidden="1">
-              <a:extLst>
-                <a:ext uri="{FF2B5EF4-FFF2-40B4-BE49-F238E27FC236}">
-                  <a16:creationId xmlns:a16="http://schemas.microsoft.com/office/drawing/2014/main" id="{34404271-7B4D-92D4-408E-2707F8AB708F}"/>
-                </a:ext>
-              </a:extLst>
-            </p:cNvPr>
-            <p:cNvPicPr>
-              <a:picLocks noGrp="1" noRot="1" noChangeAspect="1" noMove="1" noResize="1" noEditPoints="1" noAdjustHandles="1" noChangeArrowheads="1" noChangeShapeType="1" noCrop="1"/>
-            </p:cNvPicPr>
-            <p:nvPr/>
-          </p:nvPicPr>
-          <p:blipFill>
-            <a:blip r:embed="rId2">
-              <a:extLst>
-                <a:ext uri="{28A0092B-C50C-407E-A947-70E740481C1C}">
-                  <a14:useLocalDpi xmlns:a14="http://schemas.microsoft.com/office/drawing/2010/main" val="0"/>
-                </a:ext>
-              </a:extLst>
-            </a:blip>
-            <a:stretch>
-              <a:fillRect/>
-            </a:stretch>
-          </p:blipFill>
-          <p:spPr>
-            <a:xfrm>
-              <a:off x="266700" y="11488391"/>
-              <a:ext cx="685800" cy="677537"/>
-            </a:xfrm>
-            <a:prstGeom prst="rect">
-              <a:avLst/>
-            </a:prstGeom>
-          </p:spPr>
-        </p:pic>
-        <p:pic>
-          <p:nvPicPr>
-            <p:cNvPr id="31" name="Retention" hidden="1">
-              <a:extLst>
-                <a:ext uri="{FF2B5EF4-FFF2-40B4-BE49-F238E27FC236}">
-                  <a16:creationId xmlns:a16="http://schemas.microsoft.com/office/drawing/2014/main" id="{9E6125AA-6E70-F2E1-9175-DDAA0C00D03B}"/>
-                </a:ext>
-              </a:extLst>
-            </p:cNvPr>
-            <p:cNvPicPr>
-              <a:picLocks noGrp="1" noRot="1" noChangeAspect="1" noMove="1" noResize="1" noEditPoints="1" noAdjustHandles="1" noChangeArrowheads="1" noChangeShapeType="1" noCrop="1"/>
-            </p:cNvPicPr>
-            <p:nvPr/>
-          </p:nvPicPr>
-          <p:blipFill>
-            <a:blip r:embed="rId3">
-              <a:extLst>
-                <a:ext uri="{28A0092B-C50C-407E-A947-70E740481C1C}">
-                  <a14:useLocalDpi xmlns:a14="http://schemas.microsoft.com/office/drawing/2010/main" val="0"/>
-                </a:ext>
-              </a:extLst>
-            </a:blip>
-            <a:stretch>
-              <a:fillRect/>
-            </a:stretch>
-          </p:blipFill>
-          <p:spPr>
-            <a:xfrm>
-              <a:off x="266700" y="12435191"/>
-              <a:ext cx="685800" cy="671209"/>
-            </a:xfrm>
-            <a:prstGeom prst="rect">
-              <a:avLst/>
-            </a:prstGeom>
-          </p:spPr>
-        </p:pic>
-        <p:pic>
-          <p:nvPicPr>
-            <p:cNvPr id="17" name="Delivery_Active">
-              <a:extLst>
-                <a:ext uri="{FF2B5EF4-FFF2-40B4-BE49-F238E27FC236}">
-                  <a16:creationId xmlns:a16="http://schemas.microsoft.com/office/drawing/2014/main" id="{A6BB39AE-8F90-FD67-DFB7-141158E71DCA}"/>
-                </a:ext>
-              </a:extLst>
-            </p:cNvPr>
-            <p:cNvPicPr>
-              <a:picLocks noGrp="1" noRot="1" noChangeAspect="1" noMove="1" noResize="1" noEditPoints="1" noAdjustHandles="1" noChangeArrowheads="1" noChangeShapeType="1" noCrop="1"/>
-            </p:cNvPicPr>
-            <p:nvPr/>
-          </p:nvPicPr>
-          <p:blipFill>
-            <a:blip r:embed="rId4">
-              <a:extLst>
-                <a:ext uri="{28A0092B-C50C-407E-A947-70E740481C1C}">
-                  <a14:useLocalDpi xmlns:a14="http://schemas.microsoft.com/office/drawing/2010/main" val="0"/>
-                </a:ext>
-              </a:extLst>
-            </a:blip>
-            <a:stretch>
-              <a:fillRect/>
-            </a:stretch>
-          </p:blipFill>
-          <p:spPr>
-            <a:xfrm>
-              <a:off x="266701" y="10631590"/>
-              <a:ext cx="687600" cy="508225"/>
-            </a:xfrm>
-            <a:prstGeom prst="rect">
-              <a:avLst/>
-            </a:prstGeom>
-          </p:spPr>
-        </p:pic>
-        <p:pic>
-          <p:nvPicPr>
-            <p:cNvPr id="29" name="Product" hidden="1">
-              <a:extLst>
-                <a:ext uri="{FF2B5EF4-FFF2-40B4-BE49-F238E27FC236}">
-                  <a16:creationId xmlns:a16="http://schemas.microsoft.com/office/drawing/2014/main" id="{80E31AE1-D341-3938-E0BD-BF35A0B911A6}"/>
-                </a:ext>
-              </a:extLst>
-            </p:cNvPr>
-            <p:cNvPicPr>
-              <a:picLocks noGrp="1" noRot="1" noChangeAspect="1" noMove="1" noResize="1" noEditPoints="1" noAdjustHandles="1" noChangeArrowheads="1" noChangeShapeType="1" noCrop="1"/>
-            </p:cNvPicPr>
-            <p:nvPr/>
-          </p:nvPicPr>
-          <p:blipFill>
-            <a:blip r:embed="rId5">
-              <a:extLst>
-                <a:ext uri="{28A0092B-C50C-407E-A947-70E740481C1C}">
-                  <a14:useLocalDpi xmlns:a14="http://schemas.microsoft.com/office/drawing/2010/main" val="0"/>
-                </a:ext>
-              </a:extLst>
-            </a:blip>
-            <a:stretch>
-              <a:fillRect/>
-            </a:stretch>
-          </p:blipFill>
-          <p:spPr>
-            <a:xfrm>
-              <a:off x="266700" y="9594791"/>
-              <a:ext cx="685800" cy="671209"/>
-            </a:xfrm>
-            <a:prstGeom prst="rect">
-              <a:avLst/>
-            </a:prstGeom>
-          </p:spPr>
-        </p:pic>
-        <p:pic>
-          <p:nvPicPr>
-            <p:cNvPr id="33" name="Sales" hidden="1">
-              <a:extLst>
-                <a:ext uri="{FF2B5EF4-FFF2-40B4-BE49-F238E27FC236}">
-                  <a16:creationId xmlns:a16="http://schemas.microsoft.com/office/drawing/2014/main" id="{CF5A9ED8-F64A-99ED-10E5-433533D48A5A}"/>
-                </a:ext>
-              </a:extLst>
-            </p:cNvPr>
-            <p:cNvPicPr>
-              <a:picLocks noGrp="1" noRot="1" noChangeAspect="1" noMove="1" noResize="1" noEditPoints="1" noAdjustHandles="1" noChangeArrowheads="1" noChangeShapeType="1" noCrop="1"/>
-            </p:cNvPicPr>
-            <p:nvPr/>
-          </p:nvPicPr>
-          <p:blipFill>
-            <a:blip r:embed="rId6">
-              <a:extLst>
-                <a:ext uri="{28A0092B-C50C-407E-A947-70E740481C1C}">
-                  <a14:useLocalDpi xmlns:a14="http://schemas.microsoft.com/office/drawing/2010/main" val="0"/>
-                </a:ext>
-              </a:extLst>
-            </a:blip>
-            <a:stretch>
-              <a:fillRect/>
-            </a:stretch>
-          </p:blipFill>
-          <p:spPr>
-            <a:xfrm>
-              <a:off x="266700" y="8647991"/>
-              <a:ext cx="685800" cy="671209"/>
-            </a:xfrm>
-            <a:prstGeom prst="rect">
-              <a:avLst/>
-            </a:prstGeom>
-          </p:spPr>
-        </p:pic>
-        <p:pic>
-          <p:nvPicPr>
-            <p:cNvPr id="27" name="Overview" descr="A black and white bar chart&#10;&#10;Description automatically generated" hidden="1">
-              <a:extLst>
-                <a:ext uri="{FF2B5EF4-FFF2-40B4-BE49-F238E27FC236}">
-                  <a16:creationId xmlns:a16="http://schemas.microsoft.com/office/drawing/2014/main" id="{A4EFBC23-2DB6-68F1-7E3E-630BA7A0EA91}"/>
-                </a:ext>
-              </a:extLst>
-            </p:cNvPr>
-            <p:cNvPicPr>
-              <a:picLocks noGrp="1" noRot="1" noChangeAspect="1" noMove="1" noResize="1" noEditPoints="1" noAdjustHandles="1" noChangeArrowheads="1" noChangeShapeType="1" noCrop="1"/>
-            </p:cNvPicPr>
-            <p:nvPr/>
-          </p:nvPicPr>
-          <p:blipFill>
-            <a:blip r:embed="rId7">
-              <a:extLst>
-                <a:ext uri="{28A0092B-C50C-407E-A947-70E740481C1C}">
-                  <a14:useLocalDpi xmlns:a14="http://schemas.microsoft.com/office/drawing/2010/main" val="0"/>
-                </a:ext>
-              </a:extLst>
-            </a:blip>
-            <a:stretch>
-              <a:fillRect/>
-            </a:stretch>
-          </p:blipFill>
-          <p:spPr>
-            <a:xfrm>
-              <a:off x="266700" y="7701191"/>
-              <a:ext cx="685800" cy="678426"/>
-            </a:xfrm>
-            <a:prstGeom prst="rect">
-              <a:avLst/>
-            </a:prstGeom>
-          </p:spPr>
-        </p:pic>
-      </p:grpSp>
-      <p:grpSp>
-        <p:nvGrpSpPr>
-          <p:cNvPr id="36" name="Filter_Icons" hidden="1">
-            <a:extLst>
-              <a:ext uri="{FF2B5EF4-FFF2-40B4-BE49-F238E27FC236}">
-                <a16:creationId xmlns:a16="http://schemas.microsoft.com/office/drawing/2014/main" id="{55EA662A-9608-0E24-7544-CB16F74BB291}"/>
-              </a:ext>
-            </a:extLst>
-          </p:cNvPr>
-          <p:cNvGrpSpPr>
-            <a:grpSpLocks noGrp="1" noUngrp="1" noRot="1" noMove="1" noResize="1"/>
-          </p:cNvGrpSpPr>
-          <p:nvPr/>
-        </p:nvGrpSpPr>
-        <p:grpSpPr>
-          <a:xfrm>
-            <a:off x="266700" y="266700"/>
-            <a:ext cx="685800" cy="1565340"/>
-            <a:chOff x="266700" y="266700"/>
-            <a:chExt cx="685800" cy="1565340"/>
-          </a:xfrm>
-        </p:grpSpPr>
-        <p:pic>
-          <p:nvPicPr>
-            <p:cNvPr id="23" name="Filter">
-              <a:extLst>
-                <a:ext uri="{FF2B5EF4-FFF2-40B4-BE49-F238E27FC236}">
-                  <a16:creationId xmlns:a16="http://schemas.microsoft.com/office/drawing/2014/main" id="{0D31A7DD-06A0-277A-C8C8-9EEE57F3023A}"/>
-                </a:ext>
-              </a:extLst>
-            </p:cNvPr>
-            <p:cNvPicPr>
-              <a:picLocks noGrp="1" noRot="1" noChangeAspect="1" noMove="1" noResize="1" noEditPoints="1" noAdjustHandles="1" noChangeArrowheads="1" noChangeShapeType="1" noCrop="1"/>
-            </p:cNvPicPr>
-            <p:nvPr/>
-          </p:nvPicPr>
-          <p:blipFill>
-            <a:blip r:embed="rId8">
-              <a:extLst>
-                <a:ext uri="{28A0092B-C50C-407E-A947-70E740481C1C}">
-                  <a14:useLocalDpi xmlns:a14="http://schemas.microsoft.com/office/drawing/2010/main" val="0"/>
-                </a:ext>
-              </a:extLst>
-            </a:blip>
-            <a:stretch>
-              <a:fillRect/>
-            </a:stretch>
-          </p:blipFill>
-          <p:spPr>
-            <a:xfrm>
-              <a:off x="266700" y="1219200"/>
-              <a:ext cx="685800" cy="612840"/>
-            </a:xfrm>
-            <a:prstGeom prst="rect">
-              <a:avLst/>
-            </a:prstGeom>
-          </p:spPr>
-        </p:pic>
-        <p:pic>
-          <p:nvPicPr>
-            <p:cNvPr id="35" name="Clear_Filters">
-              <a:extLst>
-                <a:ext uri="{FF2B5EF4-FFF2-40B4-BE49-F238E27FC236}">
-                  <a16:creationId xmlns:a16="http://schemas.microsoft.com/office/drawing/2014/main" id="{CBD63BE9-A275-DB5C-AC04-D6942FAB87BF}"/>
-                </a:ext>
-              </a:extLst>
-            </p:cNvPr>
-            <p:cNvPicPr>
-              <a:picLocks noGrp="1" noRot="1" noChangeAspect="1" noMove="1" noResize="1" noEditPoints="1" noAdjustHandles="1" noChangeArrowheads="1" noChangeShapeType="1" noCrop="1"/>
-            </p:cNvPicPr>
-            <p:nvPr/>
-          </p:nvPicPr>
-          <p:blipFill>
-            <a:blip r:embed="rId9">
-              <a:extLst>
-                <a:ext uri="{28A0092B-C50C-407E-A947-70E740481C1C}">
-                  <a14:useLocalDpi xmlns:a14="http://schemas.microsoft.com/office/drawing/2010/main" val="0"/>
-                </a:ext>
-              </a:extLst>
-            </a:blip>
-            <a:stretch>
-              <a:fillRect/>
-            </a:stretch>
-          </p:blipFill>
-          <p:spPr>
-            <a:xfrm>
-              <a:off x="266700" y="266700"/>
-              <a:ext cx="685800" cy="685800"/>
-            </a:xfrm>
-            <a:prstGeom prst="rect">
-              <a:avLst/>
-            </a:prstGeom>
-          </p:spPr>
-        </p:pic>
-      </p:grpSp>
-      <p:grpSp>
-        <p:nvGrpSpPr>
-          <p:cNvPr id="15" name="Margins" hidden="1">
-            <a:extLst>
-              <a:ext uri="{FF2B5EF4-FFF2-40B4-BE49-F238E27FC236}">
-                <a16:creationId xmlns:a16="http://schemas.microsoft.com/office/drawing/2014/main" id="{3A7668E8-5B3C-6507-FA98-4CC00C9EA2A8}"/>
-              </a:ext>
-            </a:extLst>
-          </p:cNvPr>
-          <p:cNvGrpSpPr>
-            <a:grpSpLocks noGrp="1" noUngrp="1" noRot="1" noMove="1" noResize="1"/>
-          </p:cNvGrpSpPr>
-          <p:nvPr/>
-        </p:nvGrpSpPr>
-        <p:grpSpPr>
-          <a:xfrm>
-            <a:off x="1219200" y="0"/>
-            <a:ext cx="23164800" cy="13716000"/>
-            <a:chOff x="1219200" y="0"/>
-            <a:chExt cx="23164800" cy="13716000"/>
-          </a:xfrm>
-        </p:grpSpPr>
-        <p:grpSp>
-          <p:nvGrpSpPr>
-            <p:cNvPr id="13" name="Main">
-              <a:extLst>
-                <a:ext uri="{FF2B5EF4-FFF2-40B4-BE49-F238E27FC236}">
-                  <a16:creationId xmlns:a16="http://schemas.microsoft.com/office/drawing/2014/main" id="{F6F54732-847D-5C13-1DBD-FEC62B2DA619}"/>
-                </a:ext>
-              </a:extLst>
-            </p:cNvPr>
-            <p:cNvGrpSpPr>
-              <a:grpSpLocks noGrp="1" noUngrp="1" noRot="1" noMove="1" noResize="1"/>
-            </p:cNvGrpSpPr>
-            <p:nvPr/>
-          </p:nvGrpSpPr>
-          <p:grpSpPr>
-            <a:xfrm>
-              <a:off x="1219200" y="0"/>
-              <a:ext cx="23164800" cy="13716000"/>
-              <a:chOff x="1219200" y="0"/>
-              <a:chExt cx="23164800" cy="13716000"/>
-            </a:xfrm>
-          </p:grpSpPr>
-          <p:sp>
-            <p:nvSpPr>
-              <p:cNvPr id="4" name="H_Bottom_Margin">
-                <a:extLst>
-                  <a:ext uri="{FF2B5EF4-FFF2-40B4-BE49-F238E27FC236}">
-                    <a16:creationId xmlns:a16="http://schemas.microsoft.com/office/drawing/2014/main" id="{D9C46175-3CDD-2884-0097-0307AA41B9C2}"/>
-                  </a:ext>
-                </a:extLst>
-              </p:cNvPr>
-              <p:cNvSpPr>
-                <a:spLocks noGrp="1" noRot="1" noMove="1" noResize="1" noEditPoints="1" noAdjustHandles="1" noChangeArrowheads="1" noChangeShapeType="1"/>
-              </p:cNvSpPr>
-              <p:nvPr/>
-            </p:nvSpPr>
-            <p:spPr>
-              <a:xfrm>
-                <a:off x="1219200" y="13106400"/>
-                <a:ext cx="23164800" cy="609600"/>
-              </a:xfrm>
-              <a:prstGeom prst="rect">
-                <a:avLst/>
-              </a:prstGeom>
-              <a:solidFill>
-                <a:schemeClr val="accent2">
-                  <a:alpha val="30000"/>
-                </a:schemeClr>
-              </a:solidFill>
-              <a:ln>
-                <a:noFill/>
-              </a:ln>
-            </p:spPr>
-            <p:style>
-              <a:lnRef idx="2">
-                <a:schemeClr val="accent2">
-                  <a:shade val="15000"/>
-                </a:schemeClr>
-              </a:lnRef>
-              <a:fillRef idx="1">
-                <a:schemeClr val="accent2"/>
-              </a:fillRef>
-              <a:effectRef idx="0">
-                <a:schemeClr val="accent2"/>
-              </a:effectRef>
-              <a:fontRef idx="minor">
-                <a:schemeClr val="lt1"/>
-              </a:fontRef>
-            </p:style>
-            <p:txBody>
-              <a:bodyPr rtlCol="0" anchor="ctr"/>
-              <a:lstStyle/>
-              <a:p>
-                <a:pPr algn="ctr"/>
-                <a:endParaRPr lang="pl-PL"/>
-              </a:p>
-            </p:txBody>
-          </p:sp>
-          <p:sp>
-            <p:nvSpPr>
-              <p:cNvPr id="2" name="V_Left_Margin">
-                <a:extLst>
-                  <a:ext uri="{FF2B5EF4-FFF2-40B4-BE49-F238E27FC236}">
-                    <a16:creationId xmlns:a16="http://schemas.microsoft.com/office/drawing/2014/main" id="{EFBEE9D4-C37E-263C-5A6F-A2CA6967FA20}"/>
-                  </a:ext>
-                </a:extLst>
-              </p:cNvPr>
-              <p:cNvSpPr>
-                <a:spLocks noGrp="1" noRot="1" noMove="1" noResize="1" noEditPoints="1" noAdjustHandles="1" noChangeArrowheads="1" noChangeShapeType="1"/>
-              </p:cNvSpPr>
-              <p:nvPr/>
-            </p:nvSpPr>
-            <p:spPr>
-              <a:xfrm>
-                <a:off x="1219200" y="0"/>
-                <a:ext cx="609600" cy="13716000"/>
-              </a:xfrm>
-              <a:prstGeom prst="rect">
-                <a:avLst/>
-              </a:prstGeom>
-              <a:solidFill>
-                <a:schemeClr val="accent2">
-                  <a:alpha val="30000"/>
-                </a:schemeClr>
-              </a:solidFill>
-              <a:ln>
-                <a:noFill/>
-              </a:ln>
-            </p:spPr>
-            <p:style>
-              <a:lnRef idx="2">
-                <a:schemeClr val="accent2">
-                  <a:shade val="15000"/>
-                </a:schemeClr>
-              </a:lnRef>
-              <a:fillRef idx="1">
-                <a:schemeClr val="accent2"/>
-              </a:fillRef>
-              <a:effectRef idx="0">
-                <a:schemeClr val="accent2"/>
-              </a:effectRef>
-              <a:fontRef idx="minor">
-                <a:schemeClr val="lt1"/>
-              </a:fontRef>
-            </p:style>
-            <p:txBody>
-              <a:bodyPr rtlCol="0" anchor="ctr"/>
-              <a:lstStyle/>
-              <a:p>
-                <a:pPr algn="ctr"/>
-                <a:endParaRPr lang="pl-PL"/>
-              </a:p>
-            </p:txBody>
-          </p:sp>
-          <p:sp>
-            <p:nvSpPr>
-              <p:cNvPr id="3" name="V_Right_Margin">
-                <a:extLst>
-                  <a:ext uri="{FF2B5EF4-FFF2-40B4-BE49-F238E27FC236}">
-                    <a16:creationId xmlns:a16="http://schemas.microsoft.com/office/drawing/2014/main" id="{A7BB4A29-D641-7786-2AE0-59780B2DBF51}"/>
-                  </a:ext>
-                </a:extLst>
-              </p:cNvPr>
-              <p:cNvSpPr>
-                <a:spLocks noGrp="1" noRot="1" noMove="1" noResize="1" noEditPoints="1" noAdjustHandles="1" noChangeArrowheads="1" noChangeShapeType="1"/>
-              </p:cNvSpPr>
-              <p:nvPr/>
-            </p:nvSpPr>
-            <p:spPr>
-              <a:xfrm>
-                <a:off x="23774400" y="0"/>
-                <a:ext cx="609600" cy="13716000"/>
-              </a:xfrm>
-              <a:prstGeom prst="rect">
-                <a:avLst/>
-              </a:prstGeom>
-              <a:solidFill>
-                <a:schemeClr val="accent2">
-                  <a:alpha val="30000"/>
-                </a:schemeClr>
-              </a:solidFill>
-              <a:ln>
-                <a:noFill/>
-              </a:ln>
-            </p:spPr>
-            <p:style>
-              <a:lnRef idx="2">
-                <a:schemeClr val="accent2">
-                  <a:shade val="15000"/>
-                </a:schemeClr>
-              </a:lnRef>
-              <a:fillRef idx="1">
-                <a:schemeClr val="accent2"/>
-              </a:fillRef>
-              <a:effectRef idx="0">
-                <a:schemeClr val="accent2"/>
-              </a:effectRef>
-              <a:fontRef idx="minor">
-                <a:schemeClr val="lt1"/>
-              </a:fontRef>
-            </p:style>
-            <p:txBody>
-              <a:bodyPr rtlCol="0" anchor="ctr"/>
-              <a:lstStyle/>
-              <a:p>
-                <a:pPr algn="ctr"/>
-                <a:endParaRPr lang="pl-PL"/>
-              </a:p>
-            </p:txBody>
-          </p:sp>
-        </p:grpSp>
-        <p:grpSp>
-          <p:nvGrpSpPr>
-            <p:cNvPr id="14" name="Sub">
-              <a:extLst>
-                <a:ext uri="{FF2B5EF4-FFF2-40B4-BE49-F238E27FC236}">
-                  <a16:creationId xmlns:a16="http://schemas.microsoft.com/office/drawing/2014/main" id="{E869BBD6-CD1C-0A5B-97C4-2994694AAC50}"/>
-                </a:ext>
-              </a:extLst>
-            </p:cNvPr>
-            <p:cNvGrpSpPr>
-              <a:grpSpLocks noGrp="1" noUngrp="1" noRot="1" noMove="1" noResize="1"/>
-            </p:cNvGrpSpPr>
-            <p:nvPr/>
-          </p:nvGrpSpPr>
-          <p:grpSpPr>
-            <a:xfrm>
-              <a:off x="1219200" y="0"/>
-              <a:ext cx="23164800" cy="13716000"/>
-              <a:chOff x="1219200" y="0"/>
-              <a:chExt cx="23164800" cy="13716000"/>
-            </a:xfrm>
-          </p:grpSpPr>
-          <p:sp>
-            <p:nvSpPr>
-              <p:cNvPr id="11" name="H_3_Margin">
-                <a:extLst>
-                  <a:ext uri="{FF2B5EF4-FFF2-40B4-BE49-F238E27FC236}">
-                    <a16:creationId xmlns:a16="http://schemas.microsoft.com/office/drawing/2014/main" id="{7735B8AF-7C32-2059-5571-CFE9A6CAB35E}"/>
-                  </a:ext>
-                </a:extLst>
-              </p:cNvPr>
-              <p:cNvSpPr>
-                <a:spLocks noGrp="1" noRot="1" noMove="1" noResize="1" noEditPoints="1" noAdjustHandles="1" noChangeArrowheads="1" noChangeShapeType="1"/>
-              </p:cNvSpPr>
-              <p:nvPr/>
-            </p:nvSpPr>
-            <p:spPr>
-              <a:xfrm>
-                <a:off x="1219200" y="8496300"/>
-                <a:ext cx="23164800" cy="457200"/>
-              </a:xfrm>
-              <a:prstGeom prst="rect">
-                <a:avLst/>
-              </a:prstGeom>
-              <a:solidFill>
-                <a:schemeClr val="accent2">
-                  <a:alpha val="10000"/>
-                </a:schemeClr>
-              </a:solidFill>
-              <a:ln>
-                <a:noFill/>
-              </a:ln>
-            </p:spPr>
-            <p:style>
-              <a:lnRef idx="2">
-                <a:schemeClr val="accent2">
-                  <a:shade val="15000"/>
-                </a:schemeClr>
-              </a:lnRef>
-              <a:fillRef idx="1">
-                <a:schemeClr val="accent2"/>
-              </a:fillRef>
-              <a:effectRef idx="0">
-                <a:schemeClr val="accent2"/>
-              </a:effectRef>
-              <a:fontRef idx="minor">
-                <a:schemeClr val="lt1"/>
-              </a:fontRef>
-            </p:style>
-            <p:txBody>
-              <a:bodyPr rtlCol="0" anchor="ctr"/>
-              <a:lstStyle/>
-              <a:p>
-                <a:pPr algn="ctr"/>
-                <a:endParaRPr lang="pl-PL"/>
-              </a:p>
-            </p:txBody>
-          </p:sp>
-          <p:sp>
-            <p:nvSpPr>
-              <p:cNvPr id="10" name="H_2_Margin">
-                <a:extLst>
-                  <a:ext uri="{FF2B5EF4-FFF2-40B4-BE49-F238E27FC236}">
-                    <a16:creationId xmlns:a16="http://schemas.microsoft.com/office/drawing/2014/main" id="{63F25BB1-C29B-A354-2A7A-D2ED388B2734}"/>
-                  </a:ext>
-                </a:extLst>
-              </p:cNvPr>
-              <p:cNvSpPr>
-                <a:spLocks noGrp="1" noRot="1" noMove="1" noResize="1" noEditPoints="1" noAdjustHandles="1" noChangeArrowheads="1" noChangeShapeType="1"/>
-              </p:cNvSpPr>
-              <p:nvPr/>
-            </p:nvSpPr>
-            <p:spPr>
-              <a:xfrm>
-                <a:off x="1219200" y="3886200"/>
-                <a:ext cx="23164800" cy="457200"/>
-              </a:xfrm>
-              <a:prstGeom prst="rect">
-                <a:avLst/>
-              </a:prstGeom>
-              <a:solidFill>
-                <a:schemeClr val="accent2">
-                  <a:alpha val="10000"/>
-                </a:schemeClr>
-              </a:solidFill>
-              <a:ln>
-                <a:noFill/>
-              </a:ln>
-            </p:spPr>
-            <p:style>
-              <a:lnRef idx="2">
-                <a:schemeClr val="accent2">
-                  <a:shade val="15000"/>
-                </a:schemeClr>
-              </a:lnRef>
-              <a:fillRef idx="1">
-                <a:schemeClr val="accent2"/>
-              </a:fillRef>
-              <a:effectRef idx="0">
-                <a:schemeClr val="accent2"/>
-              </a:effectRef>
-              <a:fontRef idx="minor">
-                <a:schemeClr val="lt1"/>
-              </a:fontRef>
-            </p:style>
-            <p:txBody>
-              <a:bodyPr rtlCol="0" anchor="ctr"/>
-              <a:lstStyle/>
-              <a:p>
-                <a:pPr algn="ctr"/>
-                <a:endParaRPr lang="pl-PL"/>
-              </a:p>
-            </p:txBody>
-          </p:sp>
-          <p:sp>
-            <p:nvSpPr>
-              <p:cNvPr id="5" name="H_1_Margin">
-                <a:extLst>
-                  <a:ext uri="{FF2B5EF4-FFF2-40B4-BE49-F238E27FC236}">
-                    <a16:creationId xmlns:a16="http://schemas.microsoft.com/office/drawing/2014/main" id="{9968A711-BA69-1CB6-F295-6BAD89359B6F}"/>
-                  </a:ext>
-                </a:extLst>
-              </p:cNvPr>
-              <p:cNvSpPr>
-                <a:spLocks noGrp="1" noRot="1" noMove="1" noResize="1" noEditPoints="1" noAdjustHandles="1" noChangeArrowheads="1" noChangeShapeType="1"/>
-              </p:cNvSpPr>
-              <p:nvPr/>
-            </p:nvSpPr>
-            <p:spPr>
-              <a:xfrm>
-                <a:off x="1219200" y="1143000"/>
-                <a:ext cx="23164800" cy="457200"/>
-              </a:xfrm>
-              <a:prstGeom prst="rect">
-                <a:avLst/>
-              </a:prstGeom>
-              <a:solidFill>
-                <a:schemeClr val="accent2">
-                  <a:alpha val="10000"/>
-                </a:schemeClr>
-              </a:solidFill>
-              <a:ln>
-                <a:noFill/>
-              </a:ln>
-            </p:spPr>
-            <p:style>
-              <a:lnRef idx="2">
-                <a:schemeClr val="accent2">
-                  <a:shade val="15000"/>
-                </a:schemeClr>
-              </a:lnRef>
-              <a:fillRef idx="1">
-                <a:schemeClr val="accent2"/>
-              </a:fillRef>
-              <a:effectRef idx="0">
-                <a:schemeClr val="accent2"/>
-              </a:effectRef>
-              <a:fontRef idx="minor">
-                <a:schemeClr val="lt1"/>
-              </a:fontRef>
-            </p:style>
-            <p:txBody>
-              <a:bodyPr rtlCol="0" anchor="ctr"/>
-              <a:lstStyle/>
-              <a:p>
-                <a:pPr algn="ctr"/>
-                <a:endParaRPr lang="pl-PL"/>
-              </a:p>
-            </p:txBody>
-          </p:sp>
-          <p:sp>
-            <p:nvSpPr>
-              <p:cNvPr id="12" name="V_Center_Margin">
-                <a:extLst>
-                  <a:ext uri="{FF2B5EF4-FFF2-40B4-BE49-F238E27FC236}">
-                    <a16:creationId xmlns:a16="http://schemas.microsoft.com/office/drawing/2014/main" id="{64EA36DC-E110-36BA-53BE-5305ADE6E04A}"/>
-                  </a:ext>
-                </a:extLst>
-              </p:cNvPr>
-              <p:cNvSpPr>
-                <a:spLocks noGrp="1" noRot="1" noMove="1" noResize="1" noEditPoints="1" noAdjustHandles="1" noChangeArrowheads="1" noChangeShapeType="1"/>
-              </p:cNvSpPr>
-              <p:nvPr/>
-            </p:nvSpPr>
-            <p:spPr>
-              <a:xfrm>
-                <a:off x="12573000" y="0"/>
-                <a:ext cx="457200" cy="13716000"/>
-              </a:xfrm>
-              <a:prstGeom prst="rect">
-                <a:avLst/>
-              </a:prstGeom>
-              <a:solidFill>
-                <a:schemeClr val="accent2">
-                  <a:alpha val="10000"/>
-                </a:schemeClr>
-              </a:solidFill>
-              <a:ln>
-                <a:noFill/>
-              </a:ln>
-            </p:spPr>
-            <p:style>
-              <a:lnRef idx="2">
-                <a:schemeClr val="accent2">
-                  <a:shade val="15000"/>
-                </a:schemeClr>
-              </a:lnRef>
-              <a:fillRef idx="1">
-                <a:schemeClr val="accent2"/>
-              </a:fillRef>
-              <a:effectRef idx="0">
-                <a:schemeClr val="accent2"/>
-              </a:effectRef>
-              <a:fontRef idx="minor">
-                <a:schemeClr val="lt1"/>
-              </a:fontRef>
-            </p:style>
-            <p:txBody>
-              <a:bodyPr rtlCol="0" anchor="ctr"/>
-              <a:lstStyle/>
-              <a:p>
-                <a:pPr algn="ctr"/>
-                <a:endParaRPr lang="pl-PL"/>
-              </a:p>
-            </p:txBody>
-          </p:sp>
-        </p:grpSp>
-      </p:grpSp>
-      <p:sp>
-        <p:nvSpPr>
-          <p:cNvPr id="9" name="Text_Results_By" hidden="1">
-            <a:extLst>
-              <a:ext uri="{FF2B5EF4-FFF2-40B4-BE49-F238E27FC236}">
-                <a16:creationId xmlns:a16="http://schemas.microsoft.com/office/drawing/2014/main" id="{7658BB83-70B6-06BD-2168-03FCCE59DAF2}"/>
-              </a:ext>
-            </a:extLst>
-          </p:cNvPr>
-          <p:cNvSpPr txBox="1">
-            <a:spLocks noGrp="1" noRot="1" noMove="1" noResize="1" noEditPoints="1" noAdjustHandles="1" noChangeArrowheads="1" noChangeShapeType="1"/>
-          </p:cNvSpPr>
-          <p:nvPr/>
-        </p:nvSpPr>
-        <p:spPr>
-          <a:xfrm>
-            <a:off x="1873250" y="1202323"/>
-            <a:ext cx="21901150" cy="338554"/>
-          </a:xfrm>
-          <a:prstGeom prst="rect">
-            <a:avLst/>
-          </a:prstGeom>
-          <a:noFill/>
-        </p:spPr>
-        <p:txBody>
-          <a:bodyPr wrap="square" rtlCol="0">
-            <a:spAutoFit/>
-          </a:bodyPr>
-          <a:lstStyle/>
-          <a:p>
-            <a:r>
-              <a:rPr lang="pl-PL" sz="1600" dirty="0">
-                <a:solidFill>
-                  <a:srgbClr val="344C69"/>
-                </a:solidFill>
-                <a:latin typeface="DIN" panose="02000504040000020003" pitchFamily="2" charset="0"/>
-              </a:rPr>
-              <a:t>Show results by</a:t>
-            </a:r>
-          </a:p>
-        </p:txBody>
-      </p:sp>
-      <p:sp>
-        <p:nvSpPr>
-          <p:cNvPr id="22" name="Title">
-            <a:extLst>
-              <a:ext uri="{FF2B5EF4-FFF2-40B4-BE49-F238E27FC236}">
-                <a16:creationId xmlns:a16="http://schemas.microsoft.com/office/drawing/2014/main" id="{E8225F30-BC0F-8F7B-9723-5F424DE87109}"/>
-              </a:ext>
-            </a:extLst>
-          </p:cNvPr>
-          <p:cNvSpPr txBox="1">
-            <a:spLocks noGrp="1" noRot="1" noMove="1" noResize="1" noEditPoints="1" noAdjustHandles="1" noChangeArrowheads="1" noChangeShapeType="1"/>
-          </p:cNvSpPr>
-          <p:nvPr/>
-        </p:nvSpPr>
-        <p:spPr>
-          <a:xfrm>
-            <a:off x="1828800" y="190500"/>
-            <a:ext cx="21945600" cy="1015663"/>
-          </a:xfrm>
-          <a:prstGeom prst="rect">
-            <a:avLst/>
-          </a:prstGeom>
-          <a:noFill/>
-        </p:spPr>
-        <p:txBody>
-          <a:bodyPr wrap="square" rtlCol="0">
-            <a:spAutoFit/>
-          </a:bodyPr>
-          <a:lstStyle/>
-          <a:p>
-            <a:r>
-              <a:rPr lang="pl-PL" sz="6000" dirty="0">
-                <a:solidFill>
-                  <a:srgbClr val="344C69"/>
-                </a:solidFill>
-                <a:effectLst>
-                  <a:outerShdw blurRad="38100" dist="38100" dir="2700000" algn="tl">
-                    <a:srgbClr val="000000">
-                      <a:alpha val="43137"/>
-                    </a:srgbClr>
-                  </a:outerShdw>
-                </a:effectLst>
-                <a:latin typeface="DIN" panose="02000504040000020003" pitchFamily="2" charset="0"/>
-              </a:rPr>
-              <a:t>Delivery Performance Analysis</a:t>
-            </a:r>
-          </a:p>
-        </p:txBody>
-      </p:sp>
-    </p:spTree>
-    <p:extLst>
-      <p:ext uri="{BB962C8B-B14F-4D97-AF65-F5344CB8AC3E}">
-        <p14:creationId xmlns:p14="http://schemas.microsoft.com/office/powerpoint/2010/main" val="2361358370"/>
-      </p:ext>
-    </p:extLst>
-  </p:cSld>
-  <p:clrMapOvr>
-    <a:masterClrMapping/>
-  </p:clrMapOvr>
-</p:sld>
-</file>
-
-<file path=ppt/slides/slide5.xml><?xml version="1.0" encoding="utf-8"?>
-<p:sld xmlns:a="http://schemas.openxmlformats.org/drawingml/2006/main" xmlns:r="http://schemas.openxmlformats.org/officeDocument/2006/relationships" xmlns:p="http://schemas.openxmlformats.org/presentationml/2006/main">
-  <p:cSld>
-    <p:spTree>
-      <p:nvGrpSpPr>
-        <p:cNvPr id="1" name=""/>
-        <p:cNvGrpSpPr/>
-        <p:nvPr/>
-      </p:nvGrpSpPr>
-      <p:grpSpPr>
-        <a:xfrm>
-          <a:off x="0" y="0"/>
-          <a:ext cx="0" cy="0"/>
-          <a:chOff x="0" y="0"/>
-          <a:chExt cx="0" cy="0"/>
-        </a:xfrm>
-      </p:grpSpPr>
-      <p:grpSp>
-        <p:nvGrpSpPr>
-          <p:cNvPr id="6" name="Backgrounds">
-            <a:extLst>
-              <a:ext uri="{FF2B5EF4-FFF2-40B4-BE49-F238E27FC236}">
-                <a16:creationId xmlns:a16="http://schemas.microsoft.com/office/drawing/2014/main" id="{5BE192BD-2182-D858-1776-9B1F943D3726}"/>
-              </a:ext>
-            </a:extLst>
-          </p:cNvPr>
-          <p:cNvGrpSpPr>
-            <a:grpSpLocks noGrp="1" noUngrp="1" noRot="1" noMove="1" noResize="1"/>
-          </p:cNvGrpSpPr>
-          <p:nvPr/>
-        </p:nvGrpSpPr>
-        <p:grpSpPr>
-          <a:xfrm>
-            <a:off x="0" y="0"/>
-            <a:ext cx="24384000" cy="13716000"/>
-            <a:chOff x="0" y="0"/>
-            <a:chExt cx="24384000" cy="13716000"/>
-          </a:xfrm>
-        </p:grpSpPr>
-        <p:sp>
-          <p:nvSpPr>
-            <p:cNvPr id="8" name="Canvas_BG">
-              <a:extLst>
-                <a:ext uri="{FF2B5EF4-FFF2-40B4-BE49-F238E27FC236}">
-                  <a16:creationId xmlns:a16="http://schemas.microsoft.com/office/drawing/2014/main" id="{107A83FF-6F34-9166-FDA5-FF2A441354C4}"/>
-                </a:ext>
-              </a:extLst>
-            </p:cNvPr>
-            <p:cNvSpPr>
-              <a:spLocks noGrp="1" noRot="1" noMove="1" noResize="1" noEditPoints="1" noAdjustHandles="1" noChangeArrowheads="1" noChangeShapeType="1"/>
-            </p:cNvSpPr>
-            <p:nvPr/>
-          </p:nvSpPr>
-          <p:spPr>
-            <a:xfrm>
-              <a:off x="1219200" y="0"/>
-              <a:ext cx="23164800" cy="13716000"/>
-            </a:xfrm>
-            <a:prstGeom prst="rect">
-              <a:avLst/>
-            </a:prstGeom>
-            <a:solidFill>
-              <a:srgbClr val="FBFBFB"/>
-            </a:solidFill>
-            <a:ln>
-              <a:noFill/>
-            </a:ln>
-          </p:spPr>
-          <p:style>
-            <a:lnRef idx="2">
-              <a:schemeClr val="accent1">
-                <a:shade val="15000"/>
-              </a:schemeClr>
-            </a:lnRef>
-            <a:fillRef idx="1">
-              <a:schemeClr val="accent1"/>
-            </a:fillRef>
-            <a:effectRef idx="0">
-              <a:schemeClr val="accent1"/>
-            </a:effectRef>
-            <a:fontRef idx="minor">
-              <a:schemeClr val="lt1"/>
-            </a:fontRef>
-          </p:style>
-          <p:txBody>
-            <a:bodyPr rtlCol="0" anchor="ctr"/>
-            <a:lstStyle/>
-            <a:p>
-              <a:pPr algn="ctr"/>
-              <a:endParaRPr lang="pl-PL" dirty="0">
-                <a:latin typeface="Din" panose="02000504040000020003" pitchFamily="2" charset="0"/>
-              </a:endParaRPr>
-            </a:p>
-          </p:txBody>
-        </p:sp>
-        <p:sp>
-          <p:nvSpPr>
-            <p:cNvPr id="7" name="Navigation_BG">
-              <a:extLst>
-                <a:ext uri="{FF2B5EF4-FFF2-40B4-BE49-F238E27FC236}">
-                  <a16:creationId xmlns:a16="http://schemas.microsoft.com/office/drawing/2014/main" id="{96ECBF68-D8E5-02F8-ED61-C5A371ECEFB1}"/>
-                </a:ext>
-              </a:extLst>
-            </p:cNvPr>
-            <p:cNvSpPr>
-              <a:spLocks noGrp="1" noRot="1" noMove="1" noResize="1" noEditPoints="1" noAdjustHandles="1" noChangeArrowheads="1" noChangeShapeType="1"/>
-            </p:cNvSpPr>
-            <p:nvPr/>
-          </p:nvSpPr>
-          <p:spPr>
-            <a:xfrm>
-              <a:off x="0" y="0"/>
-              <a:ext cx="1219200" cy="13716000"/>
-            </a:xfrm>
-            <a:prstGeom prst="rect">
-              <a:avLst/>
-            </a:prstGeom>
-            <a:gradFill flip="none" rotWithShape="1">
-              <a:gsLst>
-                <a:gs pos="0">
-                  <a:srgbClr val="375881"/>
-                </a:gs>
-                <a:gs pos="23000">
-                  <a:srgbClr val="314E72"/>
-                </a:gs>
-                <a:gs pos="69000">
-                  <a:srgbClr val="2B4564"/>
-                </a:gs>
-                <a:gs pos="97000">
-                  <a:srgbClr val="233851"/>
-                </a:gs>
-              </a:gsLst>
-              <a:path path="circle">
-                <a:fillToRect l="50000" t="50000" r="50000" b="50000"/>
-              </a:path>
-              <a:tileRect/>
-            </a:gradFill>
-            <a:ln>
-              <a:noFill/>
-            </a:ln>
-          </p:spPr>
-          <p:style>
-            <a:lnRef idx="2">
-              <a:schemeClr val="accent1">
-                <a:shade val="15000"/>
-              </a:schemeClr>
-            </a:lnRef>
-            <a:fillRef idx="1">
-              <a:schemeClr val="accent1"/>
-            </a:fillRef>
-            <a:effectRef idx="0">
-              <a:schemeClr val="accent1"/>
-            </a:effectRef>
-            <a:fontRef idx="minor">
-              <a:schemeClr val="lt1"/>
-            </a:fontRef>
-          </p:style>
-          <p:txBody>
-            <a:bodyPr rtlCol="0" anchor="ctr"/>
-            <a:lstStyle/>
-            <a:p>
-              <a:pPr algn="ctr"/>
-              <a:endParaRPr lang="pl-PL"/>
-            </a:p>
-          </p:txBody>
-        </p:sp>
-        <p:grpSp>
-          <p:nvGrpSpPr>
-            <p:cNvPr id="45" name="Chart_Backgrounds">
-              <a:extLst>
-                <a:ext uri="{FF2B5EF4-FFF2-40B4-BE49-F238E27FC236}">
-                  <a16:creationId xmlns:a16="http://schemas.microsoft.com/office/drawing/2014/main" id="{04B07420-461E-5790-CE3A-C073A76DDC27}"/>
-                </a:ext>
-              </a:extLst>
-            </p:cNvPr>
-            <p:cNvGrpSpPr>
-              <a:grpSpLocks noGrp="1" noUngrp="1" noRot="1" noMove="1" noResize="1"/>
-            </p:cNvGrpSpPr>
-            <p:nvPr/>
-          </p:nvGrpSpPr>
-          <p:grpSpPr>
-            <a:xfrm>
-              <a:off x="1828800" y="1581150"/>
-              <a:ext cx="21945600" cy="11525250"/>
-              <a:chOff x="1828800" y="1581150"/>
-              <a:chExt cx="21945600" cy="11525250"/>
-            </a:xfrm>
-          </p:grpSpPr>
-          <p:sp>
-            <p:nvSpPr>
-              <p:cNvPr id="44" name="3.2_Chart_BG">
-                <a:extLst>
-                  <a:ext uri="{FF2B5EF4-FFF2-40B4-BE49-F238E27FC236}">
-                    <a16:creationId xmlns:a16="http://schemas.microsoft.com/office/drawing/2014/main" id="{FB35D492-74F6-1167-AB44-0D0B2A794CB9}"/>
-                  </a:ext>
-                </a:extLst>
-              </p:cNvPr>
-              <p:cNvSpPr>
-                <a:spLocks noGrp="1" noRot="1" noMove="1" noResize="1" noEditPoints="1" noAdjustHandles="1" noChangeArrowheads="1" noChangeShapeType="1"/>
-              </p:cNvSpPr>
-              <p:nvPr/>
-            </p:nvSpPr>
-            <p:spPr>
-              <a:xfrm>
-                <a:off x="13030200" y="8953500"/>
-                <a:ext cx="10744200" cy="4152900"/>
-              </a:xfrm>
-              <a:prstGeom prst="rect">
-                <a:avLst/>
-              </a:prstGeom>
-              <a:solidFill>
-                <a:schemeClr val="bg1"/>
-              </a:solidFill>
-              <a:ln w="3175">
-                <a:solidFill>
-                  <a:srgbClr val="B1B8C5"/>
-                </a:solidFill>
-              </a:ln>
-              <a:effectLst>
-                <a:outerShdw blurRad="203200" dist="63500" dir="2700000" algn="tl" rotWithShape="0">
-                  <a:prstClr val="black">
-                    <a:alpha val="5000"/>
-                  </a:prstClr>
-                </a:outerShdw>
-              </a:effectLst>
-            </p:spPr>
-            <p:style>
-              <a:lnRef idx="2">
-                <a:schemeClr val="accent1">
-                  <a:shade val="15000"/>
-                </a:schemeClr>
-              </a:lnRef>
-              <a:fillRef idx="1">
-                <a:schemeClr val="accent1"/>
-              </a:fillRef>
-              <a:effectRef idx="0">
-                <a:schemeClr val="accent1"/>
-              </a:effectRef>
-              <a:fontRef idx="minor">
-                <a:schemeClr val="lt1"/>
-              </a:fontRef>
-            </p:style>
-            <p:txBody>
-              <a:bodyPr rtlCol="0" anchor="ctr"/>
-              <a:lstStyle/>
-              <a:p>
-                <a:pPr algn="ctr"/>
-                <a:endParaRPr lang="pl-PL">
-                  <a:latin typeface="Din" panose="02000504040000020003" pitchFamily="2" charset="0"/>
-                </a:endParaRPr>
-              </a:p>
-            </p:txBody>
-          </p:sp>
-          <p:sp>
-            <p:nvSpPr>
-              <p:cNvPr id="43" name="3.1_Chart_BG">
-                <a:extLst>
-                  <a:ext uri="{FF2B5EF4-FFF2-40B4-BE49-F238E27FC236}">
-                    <a16:creationId xmlns:a16="http://schemas.microsoft.com/office/drawing/2014/main" id="{983D6567-0339-D205-8CCC-3AFF6D8D0AC1}"/>
-                  </a:ext>
-                </a:extLst>
-              </p:cNvPr>
-              <p:cNvSpPr>
-                <a:spLocks noGrp="1" noRot="1" noMove="1" noResize="1" noEditPoints="1" noAdjustHandles="1" noChangeArrowheads="1" noChangeShapeType="1"/>
-              </p:cNvSpPr>
-              <p:nvPr/>
-            </p:nvSpPr>
-            <p:spPr>
-              <a:xfrm>
-                <a:off x="1828800" y="8953500"/>
-                <a:ext cx="10744200" cy="4152900"/>
-              </a:xfrm>
-              <a:prstGeom prst="rect">
-                <a:avLst/>
-              </a:prstGeom>
-              <a:solidFill>
-                <a:schemeClr val="bg1"/>
-              </a:solidFill>
-              <a:ln w="3175">
-                <a:solidFill>
-                  <a:srgbClr val="B1B8C5"/>
-                </a:solidFill>
-              </a:ln>
-              <a:effectLst>
-                <a:outerShdw blurRad="203200" dist="63500" dir="2700000" algn="tl" rotWithShape="0">
-                  <a:prstClr val="black">
-                    <a:alpha val="5000"/>
-                  </a:prstClr>
-                </a:outerShdw>
-              </a:effectLst>
-            </p:spPr>
-            <p:style>
-              <a:lnRef idx="2">
-                <a:schemeClr val="accent1">
-                  <a:shade val="15000"/>
-                </a:schemeClr>
-              </a:lnRef>
-              <a:fillRef idx="1">
-                <a:schemeClr val="accent1"/>
-              </a:fillRef>
-              <a:effectRef idx="0">
-                <a:schemeClr val="accent1"/>
-              </a:effectRef>
-              <a:fontRef idx="minor">
-                <a:schemeClr val="lt1"/>
-              </a:fontRef>
-            </p:style>
-            <p:txBody>
-              <a:bodyPr rtlCol="0" anchor="ctr"/>
-              <a:lstStyle/>
-              <a:p>
-                <a:pPr algn="ctr"/>
-                <a:endParaRPr lang="pl-PL">
-                  <a:latin typeface="Din" panose="02000504040000020003" pitchFamily="2" charset="0"/>
-                </a:endParaRPr>
-              </a:p>
-            </p:txBody>
-          </p:sp>
-          <p:sp>
-            <p:nvSpPr>
-              <p:cNvPr id="42" name="2.2_Chart_BG">
-                <a:extLst>
-                  <a:ext uri="{FF2B5EF4-FFF2-40B4-BE49-F238E27FC236}">
-                    <a16:creationId xmlns:a16="http://schemas.microsoft.com/office/drawing/2014/main" id="{48762949-D8C8-A905-3D78-58C155FF6D8E}"/>
-                  </a:ext>
-                </a:extLst>
-              </p:cNvPr>
-              <p:cNvSpPr>
-                <a:spLocks noGrp="1" noRot="1" noMove="1" noResize="1" noEditPoints="1" noAdjustHandles="1" noChangeArrowheads="1" noChangeShapeType="1"/>
-              </p:cNvSpPr>
-              <p:nvPr/>
-            </p:nvSpPr>
-            <p:spPr>
-              <a:xfrm>
-                <a:off x="13030200" y="1581150"/>
-                <a:ext cx="10744200" cy="6915150"/>
-              </a:xfrm>
-              <a:prstGeom prst="rect">
-                <a:avLst/>
-              </a:prstGeom>
-              <a:solidFill>
-                <a:schemeClr val="bg1"/>
-              </a:solidFill>
-              <a:ln w="3175">
-                <a:solidFill>
-                  <a:srgbClr val="B1B8C5"/>
-                </a:solidFill>
-              </a:ln>
-              <a:effectLst>
-                <a:outerShdw blurRad="203200" dist="63500" dir="2700000" algn="tl" rotWithShape="0">
-                  <a:prstClr val="black">
-                    <a:alpha val="5000"/>
-                  </a:prstClr>
-                </a:outerShdw>
-              </a:effectLst>
-            </p:spPr>
-            <p:style>
-              <a:lnRef idx="2">
-                <a:schemeClr val="accent1">
-                  <a:shade val="15000"/>
-                </a:schemeClr>
-              </a:lnRef>
-              <a:fillRef idx="1">
-                <a:schemeClr val="accent1"/>
-              </a:fillRef>
-              <a:effectRef idx="0">
-                <a:schemeClr val="accent1"/>
-              </a:effectRef>
-              <a:fontRef idx="minor">
-                <a:schemeClr val="lt1"/>
-              </a:fontRef>
-            </p:style>
-            <p:txBody>
-              <a:bodyPr rtlCol="0" anchor="ctr"/>
-              <a:lstStyle/>
-              <a:p>
-                <a:pPr algn="ctr"/>
-                <a:endParaRPr lang="pl-PL">
-                  <a:latin typeface="Din" panose="02000504040000020003" pitchFamily="2" charset="0"/>
-                </a:endParaRPr>
-              </a:p>
-            </p:txBody>
-          </p:sp>
-          <p:sp>
-            <p:nvSpPr>
-              <p:cNvPr id="41" name="2.1_Chart_BG">
-                <a:extLst>
-                  <a:ext uri="{FF2B5EF4-FFF2-40B4-BE49-F238E27FC236}">
-                    <a16:creationId xmlns:a16="http://schemas.microsoft.com/office/drawing/2014/main" id="{93046E24-79A1-E992-5964-9F00E433B134}"/>
-                  </a:ext>
-                </a:extLst>
-              </p:cNvPr>
-              <p:cNvSpPr>
-                <a:spLocks noGrp="1" noRot="1" noMove="1" noResize="1" noEditPoints="1" noAdjustHandles="1" noChangeArrowheads="1" noChangeShapeType="1"/>
-              </p:cNvSpPr>
-              <p:nvPr/>
-            </p:nvSpPr>
-            <p:spPr>
-              <a:xfrm>
-                <a:off x="1828800" y="4343400"/>
-                <a:ext cx="10744200" cy="4152900"/>
-              </a:xfrm>
-              <a:prstGeom prst="rect">
-                <a:avLst/>
-              </a:prstGeom>
-              <a:solidFill>
-                <a:schemeClr val="bg1"/>
-              </a:solidFill>
-              <a:ln w="3175">
-                <a:solidFill>
-                  <a:srgbClr val="B1B8C5"/>
-                </a:solidFill>
-              </a:ln>
-              <a:effectLst>
-                <a:outerShdw blurRad="203200" dist="63500" dir="2700000" algn="tl" rotWithShape="0">
-                  <a:prstClr val="black">
-                    <a:alpha val="5000"/>
-                  </a:prstClr>
-                </a:outerShdw>
-              </a:effectLst>
-            </p:spPr>
-            <p:style>
-              <a:lnRef idx="2">
-                <a:schemeClr val="accent1">
-                  <a:shade val="15000"/>
-                </a:schemeClr>
-              </a:lnRef>
-              <a:fillRef idx="1">
-                <a:schemeClr val="accent1"/>
-              </a:fillRef>
-              <a:effectRef idx="0">
-                <a:schemeClr val="accent1"/>
-              </a:effectRef>
-              <a:fontRef idx="minor">
-                <a:schemeClr val="lt1"/>
-              </a:fontRef>
-            </p:style>
-            <p:txBody>
-              <a:bodyPr rtlCol="0" anchor="ctr"/>
-              <a:lstStyle/>
-              <a:p>
-                <a:pPr algn="ctr"/>
-                <a:endParaRPr lang="pl-PL">
-                  <a:latin typeface="Din" panose="02000504040000020003" pitchFamily="2" charset="0"/>
-                </a:endParaRPr>
-              </a:p>
-            </p:txBody>
-          </p:sp>
-          <p:sp>
-            <p:nvSpPr>
-              <p:cNvPr id="39" name="1_Chart_BG">
-                <a:extLst>
-                  <a:ext uri="{FF2B5EF4-FFF2-40B4-BE49-F238E27FC236}">
-                    <a16:creationId xmlns:a16="http://schemas.microsoft.com/office/drawing/2014/main" id="{69E4849E-C540-F7C5-02C5-D4864113B474}"/>
-                  </a:ext>
-                </a:extLst>
-              </p:cNvPr>
-              <p:cNvSpPr>
-                <a:spLocks noGrp="1" noRot="1" noMove="1" noResize="1" noEditPoints="1" noAdjustHandles="1" noChangeArrowheads="1" noChangeShapeType="1"/>
-              </p:cNvSpPr>
-              <p:nvPr/>
-            </p:nvSpPr>
-            <p:spPr>
-              <a:xfrm>
-                <a:off x="1828800" y="1581150"/>
-                <a:ext cx="10744200" cy="2305050"/>
-              </a:xfrm>
-              <a:prstGeom prst="rect">
-                <a:avLst/>
-              </a:prstGeom>
-              <a:solidFill>
-                <a:schemeClr val="bg1"/>
-              </a:solidFill>
-              <a:ln w="3175">
-                <a:solidFill>
-                  <a:srgbClr val="B1B8C5"/>
-                </a:solidFill>
-              </a:ln>
-              <a:effectLst>
-                <a:outerShdw blurRad="203200" dist="63500" dir="2700000" algn="tl" rotWithShape="0">
-                  <a:prstClr val="black">
-                    <a:alpha val="5000"/>
-                  </a:prstClr>
-                </a:outerShdw>
-              </a:effectLst>
-            </p:spPr>
-            <p:style>
-              <a:lnRef idx="2">
-                <a:schemeClr val="accent1">
-                  <a:shade val="15000"/>
-                </a:schemeClr>
-              </a:lnRef>
-              <a:fillRef idx="1">
-                <a:schemeClr val="accent1"/>
-              </a:fillRef>
-              <a:effectRef idx="0">
-                <a:schemeClr val="accent1"/>
-              </a:effectRef>
-              <a:fontRef idx="minor">
-                <a:schemeClr val="lt1"/>
-              </a:fontRef>
-            </p:style>
-            <p:txBody>
-              <a:bodyPr rtlCol="0" anchor="ctr"/>
-              <a:lstStyle/>
-              <a:p>
-                <a:pPr algn="ctr"/>
-                <a:endParaRPr lang="pl-PL">
-                  <a:latin typeface="Din" panose="02000504040000020003" pitchFamily="2" charset="0"/>
-                </a:endParaRPr>
-              </a:p>
-            </p:txBody>
-          </p:sp>
-        </p:grpSp>
-      </p:grpSp>
-      <p:grpSp>
-        <p:nvGrpSpPr>
           <p:cNvPr id="88" name="Switch_Button_Left">
             <a:extLst>
               <a:ext uri="{FF2B5EF4-FFF2-40B4-BE49-F238E27FC236}">
@@ -10811,7 +9398,2843 @@
 </p:sld>
 </file>
 
+<file path=ppt/slides/slide5.xml><?xml version="1.0" encoding="utf-8"?>
+<p:sld xmlns:a="http://schemas.openxmlformats.org/drawingml/2006/main" xmlns:r="http://schemas.openxmlformats.org/officeDocument/2006/relationships" xmlns:p="http://schemas.openxmlformats.org/presentationml/2006/main">
+  <p:cSld>
+    <p:spTree>
+      <p:nvGrpSpPr>
+        <p:cNvPr id="1" name=""/>
+        <p:cNvGrpSpPr/>
+        <p:nvPr/>
+      </p:nvGrpSpPr>
+      <p:grpSpPr>
+        <a:xfrm>
+          <a:off x="0" y="0"/>
+          <a:ext cx="0" cy="0"/>
+          <a:chOff x="0" y="0"/>
+          <a:chExt cx="0" cy="0"/>
+        </a:xfrm>
+      </p:grpSpPr>
+      <p:grpSp>
+        <p:nvGrpSpPr>
+          <p:cNvPr id="6" name="Backgrounds">
+            <a:extLst>
+              <a:ext uri="{FF2B5EF4-FFF2-40B4-BE49-F238E27FC236}">
+                <a16:creationId xmlns:a16="http://schemas.microsoft.com/office/drawing/2014/main" id="{5BE192BD-2182-D858-1776-9B1F943D3726}"/>
+              </a:ext>
+            </a:extLst>
+          </p:cNvPr>
+          <p:cNvGrpSpPr>
+            <a:grpSpLocks noGrp="1" noUngrp="1" noRot="1" noMove="1" noResize="1"/>
+          </p:cNvGrpSpPr>
+          <p:nvPr/>
+        </p:nvGrpSpPr>
+        <p:grpSpPr>
+          <a:xfrm>
+            <a:off x="0" y="0"/>
+            <a:ext cx="24384000" cy="13716000"/>
+            <a:chOff x="0" y="0"/>
+            <a:chExt cx="24384000" cy="13716000"/>
+          </a:xfrm>
+        </p:grpSpPr>
+        <p:sp>
+          <p:nvSpPr>
+            <p:cNvPr id="8" name="Canvas_BG">
+              <a:extLst>
+                <a:ext uri="{FF2B5EF4-FFF2-40B4-BE49-F238E27FC236}">
+                  <a16:creationId xmlns:a16="http://schemas.microsoft.com/office/drawing/2014/main" id="{107A83FF-6F34-9166-FDA5-FF2A441354C4}"/>
+                </a:ext>
+              </a:extLst>
+            </p:cNvPr>
+            <p:cNvSpPr>
+              <a:spLocks noGrp="1" noRot="1" noMove="1" noResize="1" noEditPoints="1" noAdjustHandles="1" noChangeArrowheads="1" noChangeShapeType="1"/>
+            </p:cNvSpPr>
+            <p:nvPr/>
+          </p:nvSpPr>
+          <p:spPr>
+            <a:xfrm>
+              <a:off x="1219200" y="0"/>
+              <a:ext cx="23164800" cy="13716000"/>
+            </a:xfrm>
+            <a:prstGeom prst="rect">
+              <a:avLst/>
+            </a:prstGeom>
+            <a:solidFill>
+              <a:srgbClr val="FBFBFB"/>
+            </a:solidFill>
+            <a:ln>
+              <a:noFill/>
+            </a:ln>
+          </p:spPr>
+          <p:style>
+            <a:lnRef idx="2">
+              <a:schemeClr val="accent1">
+                <a:shade val="15000"/>
+              </a:schemeClr>
+            </a:lnRef>
+            <a:fillRef idx="1">
+              <a:schemeClr val="accent1"/>
+            </a:fillRef>
+            <a:effectRef idx="0">
+              <a:schemeClr val="accent1"/>
+            </a:effectRef>
+            <a:fontRef idx="minor">
+              <a:schemeClr val="lt1"/>
+            </a:fontRef>
+          </p:style>
+          <p:txBody>
+            <a:bodyPr rtlCol="0" anchor="ctr"/>
+            <a:lstStyle/>
+            <a:p>
+              <a:pPr algn="ctr"/>
+              <a:endParaRPr lang="pl-PL" dirty="0">
+                <a:latin typeface="Din" panose="02000504040000020003" pitchFamily="2" charset="0"/>
+              </a:endParaRPr>
+            </a:p>
+          </p:txBody>
+        </p:sp>
+        <p:sp>
+          <p:nvSpPr>
+            <p:cNvPr id="7" name="Navigation_BG">
+              <a:extLst>
+                <a:ext uri="{FF2B5EF4-FFF2-40B4-BE49-F238E27FC236}">
+                  <a16:creationId xmlns:a16="http://schemas.microsoft.com/office/drawing/2014/main" id="{96ECBF68-D8E5-02F8-ED61-C5A371ECEFB1}"/>
+                </a:ext>
+              </a:extLst>
+            </p:cNvPr>
+            <p:cNvSpPr>
+              <a:spLocks noGrp="1" noRot="1" noMove="1" noResize="1" noEditPoints="1" noAdjustHandles="1" noChangeArrowheads="1" noChangeShapeType="1"/>
+            </p:cNvSpPr>
+            <p:nvPr/>
+          </p:nvSpPr>
+          <p:spPr>
+            <a:xfrm>
+              <a:off x="0" y="0"/>
+              <a:ext cx="1219200" cy="13716000"/>
+            </a:xfrm>
+            <a:prstGeom prst="rect">
+              <a:avLst/>
+            </a:prstGeom>
+            <a:gradFill flip="none" rotWithShape="1">
+              <a:gsLst>
+                <a:gs pos="0">
+                  <a:srgbClr val="375881"/>
+                </a:gs>
+                <a:gs pos="23000">
+                  <a:srgbClr val="314E72"/>
+                </a:gs>
+                <a:gs pos="69000">
+                  <a:srgbClr val="2B4564"/>
+                </a:gs>
+                <a:gs pos="97000">
+                  <a:srgbClr val="233851"/>
+                </a:gs>
+              </a:gsLst>
+              <a:path path="circle">
+                <a:fillToRect l="50000" t="50000" r="50000" b="50000"/>
+              </a:path>
+              <a:tileRect/>
+            </a:gradFill>
+            <a:ln>
+              <a:noFill/>
+            </a:ln>
+          </p:spPr>
+          <p:style>
+            <a:lnRef idx="2">
+              <a:schemeClr val="accent1">
+                <a:shade val="15000"/>
+              </a:schemeClr>
+            </a:lnRef>
+            <a:fillRef idx="1">
+              <a:schemeClr val="accent1"/>
+            </a:fillRef>
+            <a:effectRef idx="0">
+              <a:schemeClr val="accent1"/>
+            </a:effectRef>
+            <a:fontRef idx="minor">
+              <a:schemeClr val="lt1"/>
+            </a:fontRef>
+          </p:style>
+          <p:txBody>
+            <a:bodyPr rtlCol="0" anchor="ctr"/>
+            <a:lstStyle/>
+            <a:p>
+              <a:pPr algn="ctr"/>
+              <a:endParaRPr lang="pl-PL"/>
+            </a:p>
+          </p:txBody>
+        </p:sp>
+        <p:grpSp>
+          <p:nvGrpSpPr>
+            <p:cNvPr id="45" name="Chart_Backgrounds">
+              <a:extLst>
+                <a:ext uri="{FF2B5EF4-FFF2-40B4-BE49-F238E27FC236}">
+                  <a16:creationId xmlns:a16="http://schemas.microsoft.com/office/drawing/2014/main" id="{04B07420-461E-5790-CE3A-C073A76DDC27}"/>
+                </a:ext>
+              </a:extLst>
+            </p:cNvPr>
+            <p:cNvGrpSpPr>
+              <a:grpSpLocks noGrp="1" noUngrp="1" noRot="1" noMove="1" noResize="1"/>
+            </p:cNvGrpSpPr>
+            <p:nvPr/>
+          </p:nvGrpSpPr>
+          <p:grpSpPr>
+            <a:xfrm>
+              <a:off x="1828800" y="1581150"/>
+              <a:ext cx="21945600" cy="11525250"/>
+              <a:chOff x="1828800" y="1581150"/>
+              <a:chExt cx="21945600" cy="11525250"/>
+            </a:xfrm>
+          </p:grpSpPr>
+          <p:sp>
+            <p:nvSpPr>
+              <p:cNvPr id="44" name="3.2_Chart_BG">
+                <a:extLst>
+                  <a:ext uri="{FF2B5EF4-FFF2-40B4-BE49-F238E27FC236}">
+                    <a16:creationId xmlns:a16="http://schemas.microsoft.com/office/drawing/2014/main" id="{FB35D492-74F6-1167-AB44-0D0B2A794CB9}"/>
+                  </a:ext>
+                </a:extLst>
+              </p:cNvPr>
+              <p:cNvSpPr>
+                <a:spLocks noGrp="1" noRot="1" noMove="1" noResize="1" noEditPoints="1" noAdjustHandles="1" noChangeArrowheads="1" noChangeShapeType="1"/>
+              </p:cNvSpPr>
+              <p:nvPr/>
+            </p:nvSpPr>
+            <p:spPr>
+              <a:xfrm>
+                <a:off x="13030200" y="8953500"/>
+                <a:ext cx="10744200" cy="4152900"/>
+              </a:xfrm>
+              <a:prstGeom prst="rect">
+                <a:avLst/>
+              </a:prstGeom>
+              <a:solidFill>
+                <a:schemeClr val="bg1"/>
+              </a:solidFill>
+              <a:ln w="3175">
+                <a:solidFill>
+                  <a:srgbClr val="B1B8C5"/>
+                </a:solidFill>
+              </a:ln>
+              <a:effectLst>
+                <a:outerShdw blurRad="203200" dist="63500" dir="2700000" algn="tl" rotWithShape="0">
+                  <a:prstClr val="black">
+                    <a:alpha val="5000"/>
+                  </a:prstClr>
+                </a:outerShdw>
+              </a:effectLst>
+            </p:spPr>
+            <p:style>
+              <a:lnRef idx="2">
+                <a:schemeClr val="accent1">
+                  <a:shade val="15000"/>
+                </a:schemeClr>
+              </a:lnRef>
+              <a:fillRef idx="1">
+                <a:schemeClr val="accent1"/>
+              </a:fillRef>
+              <a:effectRef idx="0">
+                <a:schemeClr val="accent1"/>
+              </a:effectRef>
+              <a:fontRef idx="minor">
+                <a:schemeClr val="lt1"/>
+              </a:fontRef>
+            </p:style>
+            <p:txBody>
+              <a:bodyPr rtlCol="0" anchor="ctr"/>
+              <a:lstStyle/>
+              <a:p>
+                <a:pPr algn="ctr"/>
+                <a:endParaRPr lang="pl-PL">
+                  <a:latin typeface="Din" panose="02000504040000020003" pitchFamily="2" charset="0"/>
+                </a:endParaRPr>
+              </a:p>
+            </p:txBody>
+          </p:sp>
+          <p:sp>
+            <p:nvSpPr>
+              <p:cNvPr id="43" name="3.1_Chart_BG">
+                <a:extLst>
+                  <a:ext uri="{FF2B5EF4-FFF2-40B4-BE49-F238E27FC236}">
+                    <a16:creationId xmlns:a16="http://schemas.microsoft.com/office/drawing/2014/main" id="{983D6567-0339-D205-8CCC-3AFF6D8D0AC1}"/>
+                  </a:ext>
+                </a:extLst>
+              </p:cNvPr>
+              <p:cNvSpPr>
+                <a:spLocks noGrp="1" noRot="1" noMove="1" noResize="1" noEditPoints="1" noAdjustHandles="1" noChangeArrowheads="1" noChangeShapeType="1"/>
+              </p:cNvSpPr>
+              <p:nvPr/>
+            </p:nvSpPr>
+            <p:spPr>
+              <a:xfrm>
+                <a:off x="1828800" y="8953500"/>
+                <a:ext cx="10744200" cy="4152900"/>
+              </a:xfrm>
+              <a:prstGeom prst="rect">
+                <a:avLst/>
+              </a:prstGeom>
+              <a:solidFill>
+                <a:schemeClr val="bg1"/>
+              </a:solidFill>
+              <a:ln w="3175">
+                <a:solidFill>
+                  <a:srgbClr val="B1B8C5"/>
+                </a:solidFill>
+              </a:ln>
+              <a:effectLst>
+                <a:outerShdw blurRad="203200" dist="63500" dir="2700000" algn="tl" rotWithShape="0">
+                  <a:prstClr val="black">
+                    <a:alpha val="5000"/>
+                  </a:prstClr>
+                </a:outerShdw>
+              </a:effectLst>
+            </p:spPr>
+            <p:style>
+              <a:lnRef idx="2">
+                <a:schemeClr val="accent1">
+                  <a:shade val="15000"/>
+                </a:schemeClr>
+              </a:lnRef>
+              <a:fillRef idx="1">
+                <a:schemeClr val="accent1"/>
+              </a:fillRef>
+              <a:effectRef idx="0">
+                <a:schemeClr val="accent1"/>
+              </a:effectRef>
+              <a:fontRef idx="minor">
+                <a:schemeClr val="lt1"/>
+              </a:fontRef>
+            </p:style>
+            <p:txBody>
+              <a:bodyPr rtlCol="0" anchor="ctr"/>
+              <a:lstStyle/>
+              <a:p>
+                <a:pPr algn="ctr"/>
+                <a:endParaRPr lang="pl-PL">
+                  <a:latin typeface="Din" panose="02000504040000020003" pitchFamily="2" charset="0"/>
+                </a:endParaRPr>
+              </a:p>
+            </p:txBody>
+          </p:sp>
+          <p:sp>
+            <p:nvSpPr>
+              <p:cNvPr id="42" name="2.2_Chart_BG">
+                <a:extLst>
+                  <a:ext uri="{FF2B5EF4-FFF2-40B4-BE49-F238E27FC236}">
+                    <a16:creationId xmlns:a16="http://schemas.microsoft.com/office/drawing/2014/main" id="{48762949-D8C8-A905-3D78-58C155FF6D8E}"/>
+                  </a:ext>
+                </a:extLst>
+              </p:cNvPr>
+              <p:cNvSpPr>
+                <a:spLocks noGrp="1" noRot="1" noMove="1" noResize="1" noEditPoints="1" noAdjustHandles="1" noChangeArrowheads="1" noChangeShapeType="1"/>
+              </p:cNvSpPr>
+              <p:nvPr/>
+            </p:nvSpPr>
+            <p:spPr>
+              <a:xfrm>
+                <a:off x="13030200" y="1581150"/>
+                <a:ext cx="10744200" cy="6915150"/>
+              </a:xfrm>
+              <a:prstGeom prst="rect">
+                <a:avLst/>
+              </a:prstGeom>
+              <a:solidFill>
+                <a:schemeClr val="bg1"/>
+              </a:solidFill>
+              <a:ln w="3175">
+                <a:solidFill>
+                  <a:srgbClr val="B1B8C5"/>
+                </a:solidFill>
+              </a:ln>
+              <a:effectLst>
+                <a:outerShdw blurRad="203200" dist="63500" dir="2700000" algn="tl" rotWithShape="0">
+                  <a:prstClr val="black">
+                    <a:alpha val="5000"/>
+                  </a:prstClr>
+                </a:outerShdw>
+              </a:effectLst>
+            </p:spPr>
+            <p:style>
+              <a:lnRef idx="2">
+                <a:schemeClr val="accent1">
+                  <a:shade val="15000"/>
+                </a:schemeClr>
+              </a:lnRef>
+              <a:fillRef idx="1">
+                <a:schemeClr val="accent1"/>
+              </a:fillRef>
+              <a:effectRef idx="0">
+                <a:schemeClr val="accent1"/>
+              </a:effectRef>
+              <a:fontRef idx="minor">
+                <a:schemeClr val="lt1"/>
+              </a:fontRef>
+            </p:style>
+            <p:txBody>
+              <a:bodyPr rtlCol="0" anchor="ctr"/>
+              <a:lstStyle/>
+              <a:p>
+                <a:pPr algn="ctr"/>
+                <a:endParaRPr lang="pl-PL">
+                  <a:latin typeface="Din" panose="02000504040000020003" pitchFamily="2" charset="0"/>
+                </a:endParaRPr>
+              </a:p>
+            </p:txBody>
+          </p:sp>
+          <p:sp>
+            <p:nvSpPr>
+              <p:cNvPr id="41" name="2.1_Chart_BG">
+                <a:extLst>
+                  <a:ext uri="{FF2B5EF4-FFF2-40B4-BE49-F238E27FC236}">
+                    <a16:creationId xmlns:a16="http://schemas.microsoft.com/office/drawing/2014/main" id="{93046E24-79A1-E992-5964-9F00E433B134}"/>
+                  </a:ext>
+                </a:extLst>
+              </p:cNvPr>
+              <p:cNvSpPr>
+                <a:spLocks noGrp="1" noRot="1" noMove="1" noResize="1" noEditPoints="1" noAdjustHandles="1" noChangeArrowheads="1" noChangeShapeType="1"/>
+              </p:cNvSpPr>
+              <p:nvPr/>
+            </p:nvSpPr>
+            <p:spPr>
+              <a:xfrm>
+                <a:off x="1828800" y="4343400"/>
+                <a:ext cx="10744200" cy="4152900"/>
+              </a:xfrm>
+              <a:prstGeom prst="rect">
+                <a:avLst/>
+              </a:prstGeom>
+              <a:solidFill>
+                <a:schemeClr val="bg1"/>
+              </a:solidFill>
+              <a:ln w="3175">
+                <a:solidFill>
+                  <a:srgbClr val="B1B8C5"/>
+                </a:solidFill>
+              </a:ln>
+              <a:effectLst>
+                <a:outerShdw blurRad="203200" dist="63500" dir="2700000" algn="tl" rotWithShape="0">
+                  <a:prstClr val="black">
+                    <a:alpha val="5000"/>
+                  </a:prstClr>
+                </a:outerShdw>
+              </a:effectLst>
+            </p:spPr>
+            <p:style>
+              <a:lnRef idx="2">
+                <a:schemeClr val="accent1">
+                  <a:shade val="15000"/>
+                </a:schemeClr>
+              </a:lnRef>
+              <a:fillRef idx="1">
+                <a:schemeClr val="accent1"/>
+              </a:fillRef>
+              <a:effectRef idx="0">
+                <a:schemeClr val="accent1"/>
+              </a:effectRef>
+              <a:fontRef idx="minor">
+                <a:schemeClr val="lt1"/>
+              </a:fontRef>
+            </p:style>
+            <p:txBody>
+              <a:bodyPr rtlCol="0" anchor="ctr"/>
+              <a:lstStyle/>
+              <a:p>
+                <a:pPr algn="ctr"/>
+                <a:endParaRPr lang="pl-PL">
+                  <a:latin typeface="Din" panose="02000504040000020003" pitchFamily="2" charset="0"/>
+                </a:endParaRPr>
+              </a:p>
+            </p:txBody>
+          </p:sp>
+          <p:sp>
+            <p:nvSpPr>
+              <p:cNvPr id="39" name="1_Chart_BG">
+                <a:extLst>
+                  <a:ext uri="{FF2B5EF4-FFF2-40B4-BE49-F238E27FC236}">
+                    <a16:creationId xmlns:a16="http://schemas.microsoft.com/office/drawing/2014/main" id="{69E4849E-C540-F7C5-02C5-D4864113B474}"/>
+                  </a:ext>
+                </a:extLst>
+              </p:cNvPr>
+              <p:cNvSpPr>
+                <a:spLocks noGrp="1" noRot="1" noMove="1" noResize="1" noEditPoints="1" noAdjustHandles="1" noChangeArrowheads="1" noChangeShapeType="1"/>
+              </p:cNvSpPr>
+              <p:nvPr/>
+            </p:nvSpPr>
+            <p:spPr>
+              <a:xfrm>
+                <a:off x="1828800" y="1581150"/>
+                <a:ext cx="10744200" cy="2305050"/>
+              </a:xfrm>
+              <a:prstGeom prst="rect">
+                <a:avLst/>
+              </a:prstGeom>
+              <a:solidFill>
+                <a:schemeClr val="bg1"/>
+              </a:solidFill>
+              <a:ln w="3175">
+                <a:solidFill>
+                  <a:srgbClr val="B1B8C5"/>
+                </a:solidFill>
+              </a:ln>
+              <a:effectLst>
+                <a:outerShdw blurRad="203200" dist="63500" dir="2700000" algn="tl" rotWithShape="0">
+                  <a:prstClr val="black">
+                    <a:alpha val="5000"/>
+                  </a:prstClr>
+                </a:outerShdw>
+              </a:effectLst>
+            </p:spPr>
+            <p:style>
+              <a:lnRef idx="2">
+                <a:schemeClr val="accent1">
+                  <a:shade val="15000"/>
+                </a:schemeClr>
+              </a:lnRef>
+              <a:fillRef idx="1">
+                <a:schemeClr val="accent1"/>
+              </a:fillRef>
+              <a:effectRef idx="0">
+                <a:schemeClr val="accent1"/>
+              </a:effectRef>
+              <a:fontRef idx="minor">
+                <a:schemeClr val="lt1"/>
+              </a:fontRef>
+            </p:style>
+            <p:txBody>
+              <a:bodyPr rtlCol="0" anchor="ctr"/>
+              <a:lstStyle/>
+              <a:p>
+                <a:pPr algn="ctr"/>
+                <a:endParaRPr lang="pl-PL">
+                  <a:latin typeface="Din" panose="02000504040000020003" pitchFamily="2" charset="0"/>
+                </a:endParaRPr>
+              </a:p>
+            </p:txBody>
+          </p:sp>
+        </p:grpSp>
+      </p:grpSp>
+      <p:grpSp>
+        <p:nvGrpSpPr>
+          <p:cNvPr id="66" name="Navigation_Icons">
+            <a:extLst>
+              <a:ext uri="{FF2B5EF4-FFF2-40B4-BE49-F238E27FC236}">
+                <a16:creationId xmlns:a16="http://schemas.microsoft.com/office/drawing/2014/main" id="{13873406-E2D1-ADFB-11C3-9C229A52148C}"/>
+              </a:ext>
+            </a:extLst>
+          </p:cNvPr>
+          <p:cNvGrpSpPr/>
+          <p:nvPr/>
+        </p:nvGrpSpPr>
+        <p:grpSpPr>
+          <a:xfrm>
+            <a:off x="265800" y="7701191"/>
+            <a:ext cx="687600" cy="5405209"/>
+            <a:chOff x="265800" y="7701191"/>
+            <a:chExt cx="687600" cy="5405209"/>
+          </a:xfrm>
+        </p:grpSpPr>
+        <p:pic>
+          <p:nvPicPr>
+            <p:cNvPr id="58" name="Retention" hidden="1">
+              <a:extLst>
+                <a:ext uri="{FF2B5EF4-FFF2-40B4-BE49-F238E27FC236}">
+                  <a16:creationId xmlns:a16="http://schemas.microsoft.com/office/drawing/2014/main" id="{2E4EAA46-1CF4-AEB5-5FE2-8EE15EE36894}"/>
+                </a:ext>
+              </a:extLst>
+            </p:cNvPr>
+            <p:cNvPicPr/>
+            <p:nvPr/>
+          </p:nvPicPr>
+          <p:blipFill>
+            <a:blip r:embed="rId2">
+              <a:extLst>
+                <a:ext uri="{28A0092B-C50C-407E-A947-70E740481C1C}">
+                  <a14:useLocalDpi xmlns:a14="http://schemas.microsoft.com/office/drawing/2010/main" val="0"/>
+                </a:ext>
+              </a:extLst>
+            </a:blip>
+            <a:stretch>
+              <a:fillRect/>
+            </a:stretch>
+          </p:blipFill>
+          <p:spPr>
+            <a:xfrm>
+              <a:off x="266700" y="12435191"/>
+              <a:ext cx="685800" cy="671209"/>
+            </a:xfrm>
+            <a:prstGeom prst="rect">
+              <a:avLst/>
+            </a:prstGeom>
+          </p:spPr>
+        </p:pic>
+        <p:pic>
+          <p:nvPicPr>
+            <p:cNvPr id="64" name="Customer_Active">
+              <a:extLst>
+                <a:ext uri="{FF2B5EF4-FFF2-40B4-BE49-F238E27FC236}">
+                  <a16:creationId xmlns:a16="http://schemas.microsoft.com/office/drawing/2014/main" id="{FEF9EE72-5DDC-B627-41BC-5030A94D1D42}"/>
+                </a:ext>
+              </a:extLst>
+            </p:cNvPr>
+            <p:cNvPicPr>
+              <a:picLocks noChangeAspect="1"/>
+            </p:cNvPicPr>
+            <p:nvPr/>
+          </p:nvPicPr>
+          <p:blipFill>
+            <a:blip r:embed="rId3">
+              <a:extLst>
+                <a:ext uri="{28A0092B-C50C-407E-A947-70E740481C1C}">
+                  <a14:useLocalDpi xmlns:a14="http://schemas.microsoft.com/office/drawing/2010/main" val="0"/>
+                </a:ext>
+              </a:extLst>
+            </a:blip>
+            <a:stretch>
+              <a:fillRect/>
+            </a:stretch>
+          </p:blipFill>
+          <p:spPr>
+            <a:xfrm>
+              <a:off x="265800" y="11478328"/>
+              <a:ext cx="687600" cy="687600"/>
+            </a:xfrm>
+            <a:prstGeom prst="rect">
+              <a:avLst/>
+            </a:prstGeom>
+          </p:spPr>
+        </p:pic>
+        <p:pic>
+          <p:nvPicPr>
+            <p:cNvPr id="59" name="Delivery" hidden="1">
+              <a:extLst>
+                <a:ext uri="{FF2B5EF4-FFF2-40B4-BE49-F238E27FC236}">
+                  <a16:creationId xmlns:a16="http://schemas.microsoft.com/office/drawing/2014/main" id="{17943907-D9B8-5167-8D9D-8369E19CACE6}"/>
+                </a:ext>
+              </a:extLst>
+            </p:cNvPr>
+            <p:cNvPicPr/>
+            <p:nvPr/>
+          </p:nvPicPr>
+          <p:blipFill>
+            <a:blip r:embed="rId4">
+              <a:extLst>
+                <a:ext uri="{28A0092B-C50C-407E-A947-70E740481C1C}">
+                  <a14:useLocalDpi xmlns:a14="http://schemas.microsoft.com/office/drawing/2010/main" val="0"/>
+                </a:ext>
+              </a:extLst>
+            </a:blip>
+            <a:stretch>
+              <a:fillRect/>
+            </a:stretch>
+          </p:blipFill>
+          <p:spPr>
+            <a:xfrm>
+              <a:off x="266700" y="10631591"/>
+              <a:ext cx="685800" cy="496111"/>
+            </a:xfrm>
+            <a:prstGeom prst="rect">
+              <a:avLst/>
+            </a:prstGeom>
+          </p:spPr>
+        </p:pic>
+        <p:pic>
+          <p:nvPicPr>
+            <p:cNvPr id="60" name="Product" hidden="1">
+              <a:extLst>
+                <a:ext uri="{FF2B5EF4-FFF2-40B4-BE49-F238E27FC236}">
+                  <a16:creationId xmlns:a16="http://schemas.microsoft.com/office/drawing/2014/main" id="{A12C5721-DBB4-8011-CA76-82B70677C720}"/>
+                </a:ext>
+              </a:extLst>
+            </p:cNvPr>
+            <p:cNvPicPr/>
+            <p:nvPr/>
+          </p:nvPicPr>
+          <p:blipFill>
+            <a:blip r:embed="rId5">
+              <a:extLst>
+                <a:ext uri="{28A0092B-C50C-407E-A947-70E740481C1C}">
+                  <a14:useLocalDpi xmlns:a14="http://schemas.microsoft.com/office/drawing/2010/main" val="0"/>
+                </a:ext>
+              </a:extLst>
+            </a:blip>
+            <a:stretch>
+              <a:fillRect/>
+            </a:stretch>
+          </p:blipFill>
+          <p:spPr>
+            <a:xfrm>
+              <a:off x="266700" y="9594791"/>
+              <a:ext cx="685800" cy="671209"/>
+            </a:xfrm>
+            <a:prstGeom prst="rect">
+              <a:avLst/>
+            </a:prstGeom>
+          </p:spPr>
+        </p:pic>
+        <p:pic>
+          <p:nvPicPr>
+            <p:cNvPr id="61" name="Sales" hidden="1">
+              <a:extLst>
+                <a:ext uri="{FF2B5EF4-FFF2-40B4-BE49-F238E27FC236}">
+                  <a16:creationId xmlns:a16="http://schemas.microsoft.com/office/drawing/2014/main" id="{0478B26F-BA12-16FC-0F13-48ED9041A38C}"/>
+                </a:ext>
+              </a:extLst>
+            </p:cNvPr>
+            <p:cNvPicPr/>
+            <p:nvPr/>
+          </p:nvPicPr>
+          <p:blipFill>
+            <a:blip r:embed="rId6">
+              <a:extLst>
+                <a:ext uri="{28A0092B-C50C-407E-A947-70E740481C1C}">
+                  <a14:useLocalDpi xmlns:a14="http://schemas.microsoft.com/office/drawing/2010/main" val="0"/>
+                </a:ext>
+              </a:extLst>
+            </a:blip>
+            <a:stretch>
+              <a:fillRect/>
+            </a:stretch>
+          </p:blipFill>
+          <p:spPr>
+            <a:xfrm>
+              <a:off x="266700" y="8647991"/>
+              <a:ext cx="685800" cy="671209"/>
+            </a:xfrm>
+            <a:prstGeom prst="rect">
+              <a:avLst/>
+            </a:prstGeom>
+          </p:spPr>
+        </p:pic>
+        <p:pic>
+          <p:nvPicPr>
+            <p:cNvPr id="62" name="Overview" descr="A black and white bar chart&#10;&#10;Description automatically generated" hidden="1">
+              <a:extLst>
+                <a:ext uri="{FF2B5EF4-FFF2-40B4-BE49-F238E27FC236}">
+                  <a16:creationId xmlns:a16="http://schemas.microsoft.com/office/drawing/2014/main" id="{6E255B01-5014-E9AB-A8FE-63B72C0B0AD6}"/>
+                </a:ext>
+              </a:extLst>
+            </p:cNvPr>
+            <p:cNvPicPr/>
+            <p:nvPr/>
+          </p:nvPicPr>
+          <p:blipFill>
+            <a:blip r:embed="rId7">
+              <a:extLst>
+                <a:ext uri="{28A0092B-C50C-407E-A947-70E740481C1C}">
+                  <a14:useLocalDpi xmlns:a14="http://schemas.microsoft.com/office/drawing/2010/main" val="0"/>
+                </a:ext>
+              </a:extLst>
+            </a:blip>
+            <a:stretch>
+              <a:fillRect/>
+            </a:stretch>
+          </p:blipFill>
+          <p:spPr>
+            <a:xfrm>
+              <a:off x="266700" y="7701191"/>
+              <a:ext cx="685800" cy="678426"/>
+            </a:xfrm>
+            <a:prstGeom prst="rect">
+              <a:avLst/>
+            </a:prstGeom>
+          </p:spPr>
+        </p:pic>
+      </p:grpSp>
+      <p:grpSp>
+        <p:nvGrpSpPr>
+          <p:cNvPr id="36" name="Filter_Icons" hidden="1">
+            <a:extLst>
+              <a:ext uri="{FF2B5EF4-FFF2-40B4-BE49-F238E27FC236}">
+                <a16:creationId xmlns:a16="http://schemas.microsoft.com/office/drawing/2014/main" id="{55EA662A-9608-0E24-7544-CB16F74BB291}"/>
+              </a:ext>
+            </a:extLst>
+          </p:cNvPr>
+          <p:cNvGrpSpPr>
+            <a:grpSpLocks noGrp="1" noUngrp="1" noRot="1" noMove="1" noResize="1"/>
+          </p:cNvGrpSpPr>
+          <p:nvPr/>
+        </p:nvGrpSpPr>
+        <p:grpSpPr>
+          <a:xfrm>
+            <a:off x="266700" y="266700"/>
+            <a:ext cx="685800" cy="1565340"/>
+            <a:chOff x="266700" y="266700"/>
+            <a:chExt cx="685800" cy="1565340"/>
+          </a:xfrm>
+        </p:grpSpPr>
+        <p:pic>
+          <p:nvPicPr>
+            <p:cNvPr id="23" name="Filter">
+              <a:extLst>
+                <a:ext uri="{FF2B5EF4-FFF2-40B4-BE49-F238E27FC236}">
+                  <a16:creationId xmlns:a16="http://schemas.microsoft.com/office/drawing/2014/main" id="{0D31A7DD-06A0-277A-C8C8-9EEE57F3023A}"/>
+                </a:ext>
+              </a:extLst>
+            </p:cNvPr>
+            <p:cNvPicPr>
+              <a:picLocks noGrp="1" noRot="1" noChangeAspect="1" noMove="1" noResize="1" noEditPoints="1" noAdjustHandles="1" noChangeArrowheads="1" noChangeShapeType="1" noCrop="1"/>
+            </p:cNvPicPr>
+            <p:nvPr/>
+          </p:nvPicPr>
+          <p:blipFill>
+            <a:blip r:embed="rId8">
+              <a:extLst>
+                <a:ext uri="{28A0092B-C50C-407E-A947-70E740481C1C}">
+                  <a14:useLocalDpi xmlns:a14="http://schemas.microsoft.com/office/drawing/2010/main" val="0"/>
+                </a:ext>
+              </a:extLst>
+            </a:blip>
+            <a:stretch>
+              <a:fillRect/>
+            </a:stretch>
+          </p:blipFill>
+          <p:spPr>
+            <a:xfrm>
+              <a:off x="266700" y="1219200"/>
+              <a:ext cx="685800" cy="612840"/>
+            </a:xfrm>
+            <a:prstGeom prst="rect">
+              <a:avLst/>
+            </a:prstGeom>
+          </p:spPr>
+        </p:pic>
+        <p:pic>
+          <p:nvPicPr>
+            <p:cNvPr id="35" name="Clear_Filters">
+              <a:extLst>
+                <a:ext uri="{FF2B5EF4-FFF2-40B4-BE49-F238E27FC236}">
+                  <a16:creationId xmlns:a16="http://schemas.microsoft.com/office/drawing/2014/main" id="{CBD63BE9-A275-DB5C-AC04-D6942FAB87BF}"/>
+                </a:ext>
+              </a:extLst>
+            </p:cNvPr>
+            <p:cNvPicPr>
+              <a:picLocks noGrp="1" noRot="1" noChangeAspect="1" noMove="1" noResize="1" noEditPoints="1" noAdjustHandles="1" noChangeArrowheads="1" noChangeShapeType="1" noCrop="1"/>
+            </p:cNvPicPr>
+            <p:nvPr/>
+          </p:nvPicPr>
+          <p:blipFill>
+            <a:blip r:embed="rId9">
+              <a:extLst>
+                <a:ext uri="{28A0092B-C50C-407E-A947-70E740481C1C}">
+                  <a14:useLocalDpi xmlns:a14="http://schemas.microsoft.com/office/drawing/2010/main" val="0"/>
+                </a:ext>
+              </a:extLst>
+            </a:blip>
+            <a:stretch>
+              <a:fillRect/>
+            </a:stretch>
+          </p:blipFill>
+          <p:spPr>
+            <a:xfrm>
+              <a:off x="266700" y="266700"/>
+              <a:ext cx="685800" cy="685800"/>
+            </a:xfrm>
+            <a:prstGeom prst="rect">
+              <a:avLst/>
+            </a:prstGeom>
+          </p:spPr>
+        </p:pic>
+      </p:grpSp>
+      <p:grpSp>
+        <p:nvGrpSpPr>
+          <p:cNvPr id="15" name="Margins" hidden="1">
+            <a:extLst>
+              <a:ext uri="{FF2B5EF4-FFF2-40B4-BE49-F238E27FC236}">
+                <a16:creationId xmlns:a16="http://schemas.microsoft.com/office/drawing/2014/main" id="{3A7668E8-5B3C-6507-FA98-4CC00C9EA2A8}"/>
+              </a:ext>
+            </a:extLst>
+          </p:cNvPr>
+          <p:cNvGrpSpPr>
+            <a:grpSpLocks noGrp="1" noUngrp="1" noRot="1" noMove="1" noResize="1"/>
+          </p:cNvGrpSpPr>
+          <p:nvPr/>
+        </p:nvGrpSpPr>
+        <p:grpSpPr>
+          <a:xfrm>
+            <a:off x="1219200" y="0"/>
+            <a:ext cx="23164800" cy="13716000"/>
+            <a:chOff x="1219200" y="0"/>
+            <a:chExt cx="23164800" cy="13716000"/>
+          </a:xfrm>
+        </p:grpSpPr>
+        <p:grpSp>
+          <p:nvGrpSpPr>
+            <p:cNvPr id="13" name="Main">
+              <a:extLst>
+                <a:ext uri="{FF2B5EF4-FFF2-40B4-BE49-F238E27FC236}">
+                  <a16:creationId xmlns:a16="http://schemas.microsoft.com/office/drawing/2014/main" id="{F6F54732-847D-5C13-1DBD-FEC62B2DA619}"/>
+                </a:ext>
+              </a:extLst>
+            </p:cNvPr>
+            <p:cNvGrpSpPr>
+              <a:grpSpLocks noGrp="1" noUngrp="1" noRot="1" noMove="1" noResize="1"/>
+            </p:cNvGrpSpPr>
+            <p:nvPr/>
+          </p:nvGrpSpPr>
+          <p:grpSpPr>
+            <a:xfrm>
+              <a:off x="1219200" y="0"/>
+              <a:ext cx="23164800" cy="13716000"/>
+              <a:chOff x="1219200" y="0"/>
+              <a:chExt cx="23164800" cy="13716000"/>
+            </a:xfrm>
+          </p:grpSpPr>
+          <p:sp>
+            <p:nvSpPr>
+              <p:cNvPr id="4" name="H_Bottom_Margin">
+                <a:extLst>
+                  <a:ext uri="{FF2B5EF4-FFF2-40B4-BE49-F238E27FC236}">
+                    <a16:creationId xmlns:a16="http://schemas.microsoft.com/office/drawing/2014/main" id="{D9C46175-3CDD-2884-0097-0307AA41B9C2}"/>
+                  </a:ext>
+                </a:extLst>
+              </p:cNvPr>
+              <p:cNvSpPr>
+                <a:spLocks noGrp="1" noRot="1" noMove="1" noResize="1" noEditPoints="1" noAdjustHandles="1" noChangeArrowheads="1" noChangeShapeType="1"/>
+              </p:cNvSpPr>
+              <p:nvPr/>
+            </p:nvSpPr>
+            <p:spPr>
+              <a:xfrm>
+                <a:off x="1219200" y="13106400"/>
+                <a:ext cx="23164800" cy="609600"/>
+              </a:xfrm>
+              <a:prstGeom prst="rect">
+                <a:avLst/>
+              </a:prstGeom>
+              <a:solidFill>
+                <a:schemeClr val="accent2">
+                  <a:alpha val="30000"/>
+                </a:schemeClr>
+              </a:solidFill>
+              <a:ln>
+                <a:noFill/>
+              </a:ln>
+            </p:spPr>
+            <p:style>
+              <a:lnRef idx="2">
+                <a:schemeClr val="accent2">
+                  <a:shade val="15000"/>
+                </a:schemeClr>
+              </a:lnRef>
+              <a:fillRef idx="1">
+                <a:schemeClr val="accent2"/>
+              </a:fillRef>
+              <a:effectRef idx="0">
+                <a:schemeClr val="accent2"/>
+              </a:effectRef>
+              <a:fontRef idx="minor">
+                <a:schemeClr val="lt1"/>
+              </a:fontRef>
+            </p:style>
+            <p:txBody>
+              <a:bodyPr rtlCol="0" anchor="ctr"/>
+              <a:lstStyle/>
+              <a:p>
+                <a:pPr algn="ctr"/>
+                <a:endParaRPr lang="pl-PL"/>
+              </a:p>
+            </p:txBody>
+          </p:sp>
+          <p:sp>
+            <p:nvSpPr>
+              <p:cNvPr id="2" name="V_Left_Margin">
+                <a:extLst>
+                  <a:ext uri="{FF2B5EF4-FFF2-40B4-BE49-F238E27FC236}">
+                    <a16:creationId xmlns:a16="http://schemas.microsoft.com/office/drawing/2014/main" id="{EFBEE9D4-C37E-263C-5A6F-A2CA6967FA20}"/>
+                  </a:ext>
+                </a:extLst>
+              </p:cNvPr>
+              <p:cNvSpPr>
+                <a:spLocks noGrp="1" noRot="1" noMove="1" noResize="1" noEditPoints="1" noAdjustHandles="1" noChangeArrowheads="1" noChangeShapeType="1"/>
+              </p:cNvSpPr>
+              <p:nvPr/>
+            </p:nvSpPr>
+            <p:spPr>
+              <a:xfrm>
+                <a:off x="1219200" y="0"/>
+                <a:ext cx="609600" cy="13716000"/>
+              </a:xfrm>
+              <a:prstGeom prst="rect">
+                <a:avLst/>
+              </a:prstGeom>
+              <a:solidFill>
+                <a:schemeClr val="accent2">
+                  <a:alpha val="30000"/>
+                </a:schemeClr>
+              </a:solidFill>
+              <a:ln>
+                <a:noFill/>
+              </a:ln>
+            </p:spPr>
+            <p:style>
+              <a:lnRef idx="2">
+                <a:schemeClr val="accent2">
+                  <a:shade val="15000"/>
+                </a:schemeClr>
+              </a:lnRef>
+              <a:fillRef idx="1">
+                <a:schemeClr val="accent2"/>
+              </a:fillRef>
+              <a:effectRef idx="0">
+                <a:schemeClr val="accent2"/>
+              </a:effectRef>
+              <a:fontRef idx="minor">
+                <a:schemeClr val="lt1"/>
+              </a:fontRef>
+            </p:style>
+            <p:txBody>
+              <a:bodyPr rtlCol="0" anchor="ctr"/>
+              <a:lstStyle/>
+              <a:p>
+                <a:pPr algn="ctr"/>
+                <a:endParaRPr lang="pl-PL"/>
+              </a:p>
+            </p:txBody>
+          </p:sp>
+          <p:sp>
+            <p:nvSpPr>
+              <p:cNvPr id="3" name="V_Right_Margin">
+                <a:extLst>
+                  <a:ext uri="{FF2B5EF4-FFF2-40B4-BE49-F238E27FC236}">
+                    <a16:creationId xmlns:a16="http://schemas.microsoft.com/office/drawing/2014/main" id="{A7BB4A29-D641-7786-2AE0-59780B2DBF51}"/>
+                  </a:ext>
+                </a:extLst>
+              </p:cNvPr>
+              <p:cNvSpPr>
+                <a:spLocks noGrp="1" noRot="1" noMove="1" noResize="1" noEditPoints="1" noAdjustHandles="1" noChangeArrowheads="1" noChangeShapeType="1"/>
+              </p:cNvSpPr>
+              <p:nvPr/>
+            </p:nvSpPr>
+            <p:spPr>
+              <a:xfrm>
+                <a:off x="23774400" y="0"/>
+                <a:ext cx="609600" cy="13716000"/>
+              </a:xfrm>
+              <a:prstGeom prst="rect">
+                <a:avLst/>
+              </a:prstGeom>
+              <a:solidFill>
+                <a:schemeClr val="accent2">
+                  <a:alpha val="30000"/>
+                </a:schemeClr>
+              </a:solidFill>
+              <a:ln>
+                <a:noFill/>
+              </a:ln>
+            </p:spPr>
+            <p:style>
+              <a:lnRef idx="2">
+                <a:schemeClr val="accent2">
+                  <a:shade val="15000"/>
+                </a:schemeClr>
+              </a:lnRef>
+              <a:fillRef idx="1">
+                <a:schemeClr val="accent2"/>
+              </a:fillRef>
+              <a:effectRef idx="0">
+                <a:schemeClr val="accent2"/>
+              </a:effectRef>
+              <a:fontRef idx="minor">
+                <a:schemeClr val="lt1"/>
+              </a:fontRef>
+            </p:style>
+            <p:txBody>
+              <a:bodyPr rtlCol="0" anchor="ctr"/>
+              <a:lstStyle/>
+              <a:p>
+                <a:pPr algn="ctr"/>
+                <a:endParaRPr lang="pl-PL"/>
+              </a:p>
+            </p:txBody>
+          </p:sp>
+        </p:grpSp>
+        <p:grpSp>
+          <p:nvGrpSpPr>
+            <p:cNvPr id="14" name="Sub">
+              <a:extLst>
+                <a:ext uri="{FF2B5EF4-FFF2-40B4-BE49-F238E27FC236}">
+                  <a16:creationId xmlns:a16="http://schemas.microsoft.com/office/drawing/2014/main" id="{E869BBD6-CD1C-0A5B-97C4-2994694AAC50}"/>
+                </a:ext>
+              </a:extLst>
+            </p:cNvPr>
+            <p:cNvGrpSpPr>
+              <a:grpSpLocks noGrp="1" noUngrp="1" noRot="1" noMove="1" noResize="1"/>
+            </p:cNvGrpSpPr>
+            <p:nvPr/>
+          </p:nvGrpSpPr>
+          <p:grpSpPr>
+            <a:xfrm>
+              <a:off x="1219200" y="0"/>
+              <a:ext cx="23164800" cy="13716000"/>
+              <a:chOff x="1219200" y="0"/>
+              <a:chExt cx="23164800" cy="13716000"/>
+            </a:xfrm>
+          </p:grpSpPr>
+          <p:sp>
+            <p:nvSpPr>
+              <p:cNvPr id="11" name="H_3_Margin">
+                <a:extLst>
+                  <a:ext uri="{FF2B5EF4-FFF2-40B4-BE49-F238E27FC236}">
+                    <a16:creationId xmlns:a16="http://schemas.microsoft.com/office/drawing/2014/main" id="{7735B8AF-7C32-2059-5571-CFE9A6CAB35E}"/>
+                  </a:ext>
+                </a:extLst>
+              </p:cNvPr>
+              <p:cNvSpPr>
+                <a:spLocks noGrp="1" noRot="1" noMove="1" noResize="1" noEditPoints="1" noAdjustHandles="1" noChangeArrowheads="1" noChangeShapeType="1"/>
+              </p:cNvSpPr>
+              <p:nvPr/>
+            </p:nvSpPr>
+            <p:spPr>
+              <a:xfrm>
+                <a:off x="1219200" y="8496300"/>
+                <a:ext cx="23164800" cy="457200"/>
+              </a:xfrm>
+              <a:prstGeom prst="rect">
+                <a:avLst/>
+              </a:prstGeom>
+              <a:solidFill>
+                <a:schemeClr val="accent2">
+                  <a:alpha val="10000"/>
+                </a:schemeClr>
+              </a:solidFill>
+              <a:ln>
+                <a:noFill/>
+              </a:ln>
+            </p:spPr>
+            <p:style>
+              <a:lnRef idx="2">
+                <a:schemeClr val="accent2">
+                  <a:shade val="15000"/>
+                </a:schemeClr>
+              </a:lnRef>
+              <a:fillRef idx="1">
+                <a:schemeClr val="accent2"/>
+              </a:fillRef>
+              <a:effectRef idx="0">
+                <a:schemeClr val="accent2"/>
+              </a:effectRef>
+              <a:fontRef idx="minor">
+                <a:schemeClr val="lt1"/>
+              </a:fontRef>
+            </p:style>
+            <p:txBody>
+              <a:bodyPr rtlCol="0" anchor="ctr"/>
+              <a:lstStyle/>
+              <a:p>
+                <a:pPr algn="ctr"/>
+                <a:endParaRPr lang="pl-PL"/>
+              </a:p>
+            </p:txBody>
+          </p:sp>
+          <p:sp>
+            <p:nvSpPr>
+              <p:cNvPr id="10" name="H_2_Margin">
+                <a:extLst>
+                  <a:ext uri="{FF2B5EF4-FFF2-40B4-BE49-F238E27FC236}">
+                    <a16:creationId xmlns:a16="http://schemas.microsoft.com/office/drawing/2014/main" id="{63F25BB1-C29B-A354-2A7A-D2ED388B2734}"/>
+                  </a:ext>
+                </a:extLst>
+              </p:cNvPr>
+              <p:cNvSpPr>
+                <a:spLocks noGrp="1" noRot="1" noMove="1" noResize="1" noEditPoints="1" noAdjustHandles="1" noChangeArrowheads="1" noChangeShapeType="1"/>
+              </p:cNvSpPr>
+              <p:nvPr/>
+            </p:nvSpPr>
+            <p:spPr>
+              <a:xfrm>
+                <a:off x="1219200" y="3886200"/>
+                <a:ext cx="23164800" cy="457200"/>
+              </a:xfrm>
+              <a:prstGeom prst="rect">
+                <a:avLst/>
+              </a:prstGeom>
+              <a:solidFill>
+                <a:schemeClr val="accent2">
+                  <a:alpha val="10000"/>
+                </a:schemeClr>
+              </a:solidFill>
+              <a:ln>
+                <a:noFill/>
+              </a:ln>
+            </p:spPr>
+            <p:style>
+              <a:lnRef idx="2">
+                <a:schemeClr val="accent2">
+                  <a:shade val="15000"/>
+                </a:schemeClr>
+              </a:lnRef>
+              <a:fillRef idx="1">
+                <a:schemeClr val="accent2"/>
+              </a:fillRef>
+              <a:effectRef idx="0">
+                <a:schemeClr val="accent2"/>
+              </a:effectRef>
+              <a:fontRef idx="minor">
+                <a:schemeClr val="lt1"/>
+              </a:fontRef>
+            </p:style>
+            <p:txBody>
+              <a:bodyPr rtlCol="0" anchor="ctr"/>
+              <a:lstStyle/>
+              <a:p>
+                <a:pPr algn="ctr"/>
+                <a:endParaRPr lang="pl-PL"/>
+              </a:p>
+            </p:txBody>
+          </p:sp>
+          <p:sp>
+            <p:nvSpPr>
+              <p:cNvPr id="5" name="H_1_Margin">
+                <a:extLst>
+                  <a:ext uri="{FF2B5EF4-FFF2-40B4-BE49-F238E27FC236}">
+                    <a16:creationId xmlns:a16="http://schemas.microsoft.com/office/drawing/2014/main" id="{9968A711-BA69-1CB6-F295-6BAD89359B6F}"/>
+                  </a:ext>
+                </a:extLst>
+              </p:cNvPr>
+              <p:cNvSpPr>
+                <a:spLocks noGrp="1" noRot="1" noMove="1" noResize="1" noEditPoints="1" noAdjustHandles="1" noChangeArrowheads="1" noChangeShapeType="1"/>
+              </p:cNvSpPr>
+              <p:nvPr/>
+            </p:nvSpPr>
+            <p:spPr>
+              <a:xfrm>
+                <a:off x="1219200" y="1143000"/>
+                <a:ext cx="23164800" cy="457200"/>
+              </a:xfrm>
+              <a:prstGeom prst="rect">
+                <a:avLst/>
+              </a:prstGeom>
+              <a:solidFill>
+                <a:schemeClr val="accent2">
+                  <a:alpha val="10000"/>
+                </a:schemeClr>
+              </a:solidFill>
+              <a:ln>
+                <a:noFill/>
+              </a:ln>
+            </p:spPr>
+            <p:style>
+              <a:lnRef idx="2">
+                <a:schemeClr val="accent2">
+                  <a:shade val="15000"/>
+                </a:schemeClr>
+              </a:lnRef>
+              <a:fillRef idx="1">
+                <a:schemeClr val="accent2"/>
+              </a:fillRef>
+              <a:effectRef idx="0">
+                <a:schemeClr val="accent2"/>
+              </a:effectRef>
+              <a:fontRef idx="minor">
+                <a:schemeClr val="lt1"/>
+              </a:fontRef>
+            </p:style>
+            <p:txBody>
+              <a:bodyPr rtlCol="0" anchor="ctr"/>
+              <a:lstStyle/>
+              <a:p>
+                <a:pPr algn="ctr"/>
+                <a:endParaRPr lang="pl-PL"/>
+              </a:p>
+            </p:txBody>
+          </p:sp>
+          <p:sp>
+            <p:nvSpPr>
+              <p:cNvPr id="12" name="V_Center_Margin">
+                <a:extLst>
+                  <a:ext uri="{FF2B5EF4-FFF2-40B4-BE49-F238E27FC236}">
+                    <a16:creationId xmlns:a16="http://schemas.microsoft.com/office/drawing/2014/main" id="{64EA36DC-E110-36BA-53BE-5305ADE6E04A}"/>
+                  </a:ext>
+                </a:extLst>
+              </p:cNvPr>
+              <p:cNvSpPr>
+                <a:spLocks noGrp="1" noRot="1" noMove="1" noResize="1" noEditPoints="1" noAdjustHandles="1" noChangeArrowheads="1" noChangeShapeType="1"/>
+              </p:cNvSpPr>
+              <p:nvPr/>
+            </p:nvSpPr>
+            <p:spPr>
+              <a:xfrm>
+                <a:off x="12573000" y="0"/>
+                <a:ext cx="457200" cy="13716000"/>
+              </a:xfrm>
+              <a:prstGeom prst="rect">
+                <a:avLst/>
+              </a:prstGeom>
+              <a:solidFill>
+                <a:schemeClr val="accent2">
+                  <a:alpha val="10000"/>
+                </a:schemeClr>
+              </a:solidFill>
+              <a:ln>
+                <a:noFill/>
+              </a:ln>
+            </p:spPr>
+            <p:style>
+              <a:lnRef idx="2">
+                <a:schemeClr val="accent2">
+                  <a:shade val="15000"/>
+                </a:schemeClr>
+              </a:lnRef>
+              <a:fillRef idx="1">
+                <a:schemeClr val="accent2"/>
+              </a:fillRef>
+              <a:effectRef idx="0">
+                <a:schemeClr val="accent2"/>
+              </a:effectRef>
+              <a:fontRef idx="minor">
+                <a:schemeClr val="lt1"/>
+              </a:fontRef>
+            </p:style>
+            <p:txBody>
+              <a:bodyPr rtlCol="0" anchor="ctr"/>
+              <a:lstStyle/>
+              <a:p>
+                <a:pPr algn="ctr"/>
+                <a:endParaRPr lang="pl-PL"/>
+              </a:p>
+            </p:txBody>
+          </p:sp>
+        </p:grpSp>
+      </p:grpSp>
+      <p:sp>
+        <p:nvSpPr>
+          <p:cNvPr id="9" name="Text_Results_By" hidden="1">
+            <a:extLst>
+              <a:ext uri="{FF2B5EF4-FFF2-40B4-BE49-F238E27FC236}">
+                <a16:creationId xmlns:a16="http://schemas.microsoft.com/office/drawing/2014/main" id="{7658BB83-70B6-06BD-2168-03FCCE59DAF2}"/>
+              </a:ext>
+            </a:extLst>
+          </p:cNvPr>
+          <p:cNvSpPr txBox="1">
+            <a:spLocks noGrp="1" noRot="1" noMove="1" noResize="1" noEditPoints="1" noAdjustHandles="1" noChangeArrowheads="1" noChangeShapeType="1"/>
+          </p:cNvSpPr>
+          <p:nvPr/>
+        </p:nvSpPr>
+        <p:spPr>
+          <a:xfrm>
+            <a:off x="1873250" y="1202323"/>
+            <a:ext cx="21901150" cy="338554"/>
+          </a:xfrm>
+          <a:prstGeom prst="rect">
+            <a:avLst/>
+          </a:prstGeom>
+          <a:noFill/>
+        </p:spPr>
+        <p:txBody>
+          <a:bodyPr wrap="square" rtlCol="0">
+            <a:spAutoFit/>
+          </a:bodyPr>
+          <a:lstStyle/>
+          <a:p>
+            <a:r>
+              <a:rPr lang="pl-PL" sz="1600" dirty="0">
+                <a:solidFill>
+                  <a:srgbClr val="344C69"/>
+                </a:solidFill>
+                <a:latin typeface="DIN" panose="02000504040000020003" pitchFamily="2" charset="0"/>
+              </a:rPr>
+              <a:t>Show results by</a:t>
+            </a:r>
+          </a:p>
+        </p:txBody>
+      </p:sp>
+      <p:sp>
+        <p:nvSpPr>
+          <p:cNvPr id="22" name="Title">
+            <a:extLst>
+              <a:ext uri="{FF2B5EF4-FFF2-40B4-BE49-F238E27FC236}">
+                <a16:creationId xmlns:a16="http://schemas.microsoft.com/office/drawing/2014/main" id="{E8225F30-BC0F-8F7B-9723-5F424DE87109}"/>
+              </a:ext>
+            </a:extLst>
+          </p:cNvPr>
+          <p:cNvSpPr txBox="1">
+            <a:spLocks noGrp="1" noRot="1" noMove="1" noResize="1" noEditPoints="1" noAdjustHandles="1" noChangeArrowheads="1" noChangeShapeType="1"/>
+          </p:cNvSpPr>
+          <p:nvPr/>
+        </p:nvSpPr>
+        <p:spPr>
+          <a:xfrm>
+            <a:off x="1828800" y="190500"/>
+            <a:ext cx="21945600" cy="1015663"/>
+          </a:xfrm>
+          <a:prstGeom prst="rect">
+            <a:avLst/>
+          </a:prstGeom>
+          <a:noFill/>
+        </p:spPr>
+        <p:txBody>
+          <a:bodyPr wrap="square" rtlCol="0">
+            <a:spAutoFit/>
+          </a:bodyPr>
+          <a:lstStyle/>
+          <a:p>
+            <a:r>
+              <a:rPr lang="pl-PL" sz="6000" dirty="0" err="1">
+                <a:solidFill>
+                  <a:srgbClr val="344C69"/>
+                </a:solidFill>
+                <a:effectLst>
+                  <a:outerShdw blurRad="38100" dist="38100" dir="2700000" algn="tl">
+                    <a:srgbClr val="000000">
+                      <a:alpha val="43137"/>
+                    </a:srgbClr>
+                  </a:outerShdw>
+                </a:effectLst>
+                <a:latin typeface="DIN" panose="02000504040000020003" pitchFamily="2" charset="0"/>
+              </a:rPr>
+              <a:t>Customer</a:t>
+            </a:r>
+            <a:r>
+              <a:rPr lang="pl-PL" sz="6000" dirty="0">
+                <a:solidFill>
+                  <a:srgbClr val="344C69"/>
+                </a:solidFill>
+                <a:effectLst>
+                  <a:outerShdw blurRad="38100" dist="38100" dir="2700000" algn="tl">
+                    <a:srgbClr val="000000">
+                      <a:alpha val="43137"/>
+                    </a:srgbClr>
+                  </a:outerShdw>
+                </a:effectLst>
+                <a:latin typeface="DIN" panose="02000504040000020003" pitchFamily="2" charset="0"/>
+              </a:rPr>
+              <a:t> Analysis</a:t>
+            </a:r>
+          </a:p>
+        </p:txBody>
+      </p:sp>
+    </p:spTree>
+    <p:extLst>
+      <p:ext uri="{BB962C8B-B14F-4D97-AF65-F5344CB8AC3E}">
+        <p14:creationId xmlns:p14="http://schemas.microsoft.com/office/powerpoint/2010/main" val="2440492755"/>
+      </p:ext>
+    </p:extLst>
+  </p:cSld>
+  <p:clrMapOvr>
+    <a:masterClrMapping/>
+  </p:clrMapOvr>
+</p:sld>
+</file>
+
 <file path=ppt/slides/slide6.xml><?xml version="1.0" encoding="utf-8"?>
+<p:sld xmlns:a="http://schemas.openxmlformats.org/drawingml/2006/main" xmlns:r="http://schemas.openxmlformats.org/officeDocument/2006/relationships" xmlns:p="http://schemas.openxmlformats.org/presentationml/2006/main">
+  <p:cSld>
+    <p:spTree>
+      <p:nvGrpSpPr>
+        <p:cNvPr id="1" name=""/>
+        <p:cNvGrpSpPr/>
+        <p:nvPr/>
+      </p:nvGrpSpPr>
+      <p:grpSpPr>
+        <a:xfrm>
+          <a:off x="0" y="0"/>
+          <a:ext cx="0" cy="0"/>
+          <a:chOff x="0" y="0"/>
+          <a:chExt cx="0" cy="0"/>
+        </a:xfrm>
+      </p:grpSpPr>
+      <p:grpSp>
+        <p:nvGrpSpPr>
+          <p:cNvPr id="6" name="Backgrounds">
+            <a:extLst>
+              <a:ext uri="{FF2B5EF4-FFF2-40B4-BE49-F238E27FC236}">
+                <a16:creationId xmlns:a16="http://schemas.microsoft.com/office/drawing/2014/main" id="{5BE192BD-2182-D858-1776-9B1F943D3726}"/>
+              </a:ext>
+            </a:extLst>
+          </p:cNvPr>
+          <p:cNvGrpSpPr>
+            <a:grpSpLocks/>
+          </p:cNvGrpSpPr>
+          <p:nvPr/>
+        </p:nvGrpSpPr>
+        <p:grpSpPr>
+          <a:xfrm>
+            <a:off x="0" y="0"/>
+            <a:ext cx="24384000" cy="13716000"/>
+            <a:chOff x="0" y="0"/>
+            <a:chExt cx="24384000" cy="13716000"/>
+          </a:xfrm>
+        </p:grpSpPr>
+        <p:sp>
+          <p:nvSpPr>
+            <p:cNvPr id="8" name="Canvas_BG">
+              <a:extLst>
+                <a:ext uri="{FF2B5EF4-FFF2-40B4-BE49-F238E27FC236}">
+                  <a16:creationId xmlns:a16="http://schemas.microsoft.com/office/drawing/2014/main" id="{107A83FF-6F34-9166-FDA5-FF2A441354C4}"/>
+                </a:ext>
+              </a:extLst>
+            </p:cNvPr>
+            <p:cNvSpPr>
+              <a:spLocks/>
+            </p:cNvSpPr>
+            <p:nvPr/>
+          </p:nvSpPr>
+          <p:spPr>
+            <a:xfrm>
+              <a:off x="1219200" y="0"/>
+              <a:ext cx="23164800" cy="13716000"/>
+            </a:xfrm>
+            <a:prstGeom prst="rect">
+              <a:avLst/>
+            </a:prstGeom>
+            <a:solidFill>
+              <a:srgbClr val="FBFBFB"/>
+            </a:solidFill>
+            <a:ln>
+              <a:noFill/>
+            </a:ln>
+          </p:spPr>
+          <p:style>
+            <a:lnRef idx="2">
+              <a:schemeClr val="accent1">
+                <a:shade val="15000"/>
+              </a:schemeClr>
+            </a:lnRef>
+            <a:fillRef idx="1">
+              <a:schemeClr val="accent1"/>
+            </a:fillRef>
+            <a:effectRef idx="0">
+              <a:schemeClr val="accent1"/>
+            </a:effectRef>
+            <a:fontRef idx="minor">
+              <a:schemeClr val="lt1"/>
+            </a:fontRef>
+          </p:style>
+          <p:txBody>
+            <a:bodyPr rtlCol="0" anchor="ctr"/>
+            <a:lstStyle/>
+            <a:p>
+              <a:pPr algn="ctr"/>
+              <a:endParaRPr lang="pl-PL" dirty="0">
+                <a:latin typeface="Din" panose="02000504040000020003" pitchFamily="2" charset="0"/>
+              </a:endParaRPr>
+            </a:p>
+          </p:txBody>
+        </p:sp>
+        <p:sp>
+          <p:nvSpPr>
+            <p:cNvPr id="7" name="Navigation_BG">
+              <a:extLst>
+                <a:ext uri="{FF2B5EF4-FFF2-40B4-BE49-F238E27FC236}">
+                  <a16:creationId xmlns:a16="http://schemas.microsoft.com/office/drawing/2014/main" id="{96ECBF68-D8E5-02F8-ED61-C5A371ECEFB1}"/>
+                </a:ext>
+              </a:extLst>
+            </p:cNvPr>
+            <p:cNvSpPr>
+              <a:spLocks/>
+            </p:cNvSpPr>
+            <p:nvPr/>
+          </p:nvSpPr>
+          <p:spPr>
+            <a:xfrm>
+              <a:off x="0" y="0"/>
+              <a:ext cx="1219200" cy="13716000"/>
+            </a:xfrm>
+            <a:prstGeom prst="rect">
+              <a:avLst/>
+            </a:prstGeom>
+            <a:gradFill flip="none" rotWithShape="1">
+              <a:gsLst>
+                <a:gs pos="0">
+                  <a:srgbClr val="375881"/>
+                </a:gs>
+                <a:gs pos="23000">
+                  <a:srgbClr val="314E72"/>
+                </a:gs>
+                <a:gs pos="69000">
+                  <a:srgbClr val="2B4564"/>
+                </a:gs>
+                <a:gs pos="97000">
+                  <a:srgbClr val="233851"/>
+                </a:gs>
+              </a:gsLst>
+              <a:path path="circle">
+                <a:fillToRect l="50000" t="50000" r="50000" b="50000"/>
+              </a:path>
+              <a:tileRect/>
+            </a:gradFill>
+            <a:ln>
+              <a:noFill/>
+            </a:ln>
+          </p:spPr>
+          <p:style>
+            <a:lnRef idx="2">
+              <a:schemeClr val="accent1">
+                <a:shade val="15000"/>
+              </a:schemeClr>
+            </a:lnRef>
+            <a:fillRef idx="1">
+              <a:schemeClr val="accent1"/>
+            </a:fillRef>
+            <a:effectRef idx="0">
+              <a:schemeClr val="accent1"/>
+            </a:effectRef>
+            <a:fontRef idx="minor">
+              <a:schemeClr val="lt1"/>
+            </a:fontRef>
+          </p:style>
+          <p:txBody>
+            <a:bodyPr rtlCol="0" anchor="ctr"/>
+            <a:lstStyle/>
+            <a:p>
+              <a:pPr algn="ctr"/>
+              <a:endParaRPr lang="pl-PL"/>
+            </a:p>
+          </p:txBody>
+        </p:sp>
+        <p:grpSp>
+          <p:nvGrpSpPr>
+            <p:cNvPr id="45" name="Chart_Backgrounds">
+              <a:extLst>
+                <a:ext uri="{FF2B5EF4-FFF2-40B4-BE49-F238E27FC236}">
+                  <a16:creationId xmlns:a16="http://schemas.microsoft.com/office/drawing/2014/main" id="{04B07420-461E-5790-CE3A-C073A76DDC27}"/>
+                </a:ext>
+              </a:extLst>
+            </p:cNvPr>
+            <p:cNvGrpSpPr>
+              <a:grpSpLocks/>
+            </p:cNvGrpSpPr>
+            <p:nvPr/>
+          </p:nvGrpSpPr>
+          <p:grpSpPr>
+            <a:xfrm>
+              <a:off x="1828800" y="1581150"/>
+              <a:ext cx="21945600" cy="11535167"/>
+              <a:chOff x="1828800" y="1581150"/>
+              <a:chExt cx="21945600" cy="11535167"/>
+            </a:xfrm>
+          </p:grpSpPr>
+          <p:sp>
+            <p:nvSpPr>
+              <p:cNvPr id="44" name="3.2_Chart_BG">
+                <a:extLst>
+                  <a:ext uri="{FF2B5EF4-FFF2-40B4-BE49-F238E27FC236}">
+                    <a16:creationId xmlns:a16="http://schemas.microsoft.com/office/drawing/2014/main" id="{FB35D492-74F6-1167-AB44-0D0B2A794CB9}"/>
+                  </a:ext>
+                </a:extLst>
+              </p:cNvPr>
+              <p:cNvSpPr>
+                <a:spLocks/>
+              </p:cNvSpPr>
+              <p:nvPr/>
+            </p:nvSpPr>
+            <p:spPr>
+              <a:xfrm>
+                <a:off x="13030200" y="7590317"/>
+                <a:ext cx="10744200" cy="5526000"/>
+              </a:xfrm>
+              <a:prstGeom prst="rect">
+                <a:avLst/>
+              </a:prstGeom>
+              <a:solidFill>
+                <a:schemeClr val="bg1"/>
+              </a:solidFill>
+              <a:ln w="3175">
+                <a:solidFill>
+                  <a:srgbClr val="B1B8C5"/>
+                </a:solidFill>
+              </a:ln>
+              <a:effectLst>
+                <a:outerShdw blurRad="203200" dist="63500" dir="2700000" algn="tl" rotWithShape="0">
+                  <a:prstClr val="black">
+                    <a:alpha val="5000"/>
+                  </a:prstClr>
+                </a:outerShdw>
+              </a:effectLst>
+            </p:spPr>
+            <p:style>
+              <a:lnRef idx="2">
+                <a:schemeClr val="accent1">
+                  <a:shade val="15000"/>
+                </a:schemeClr>
+              </a:lnRef>
+              <a:fillRef idx="1">
+                <a:schemeClr val="accent1"/>
+              </a:fillRef>
+              <a:effectRef idx="0">
+                <a:schemeClr val="accent1"/>
+              </a:effectRef>
+              <a:fontRef idx="minor">
+                <a:schemeClr val="lt1"/>
+              </a:fontRef>
+            </p:style>
+            <p:txBody>
+              <a:bodyPr rtlCol="0" anchor="ctr"/>
+              <a:lstStyle/>
+              <a:p>
+                <a:pPr algn="ctr"/>
+                <a:endParaRPr lang="pl-PL">
+                  <a:latin typeface="Din" panose="02000504040000020003" pitchFamily="2" charset="0"/>
+                </a:endParaRPr>
+              </a:p>
+            </p:txBody>
+          </p:sp>
+          <p:sp>
+            <p:nvSpPr>
+              <p:cNvPr id="43" name="3.1_Chart_BG">
+                <a:extLst>
+                  <a:ext uri="{FF2B5EF4-FFF2-40B4-BE49-F238E27FC236}">
+                    <a16:creationId xmlns:a16="http://schemas.microsoft.com/office/drawing/2014/main" id="{983D6567-0339-D205-8CCC-3AFF6D8D0AC1}"/>
+                  </a:ext>
+                </a:extLst>
+              </p:cNvPr>
+              <p:cNvSpPr>
+                <a:spLocks/>
+              </p:cNvSpPr>
+              <p:nvPr/>
+            </p:nvSpPr>
+            <p:spPr>
+              <a:xfrm>
+                <a:off x="1828800" y="8953500"/>
+                <a:ext cx="10744200" cy="4152900"/>
+              </a:xfrm>
+              <a:prstGeom prst="rect">
+                <a:avLst/>
+              </a:prstGeom>
+              <a:solidFill>
+                <a:schemeClr val="bg1"/>
+              </a:solidFill>
+              <a:ln w="3175">
+                <a:solidFill>
+                  <a:srgbClr val="B1B8C5"/>
+                </a:solidFill>
+              </a:ln>
+              <a:effectLst>
+                <a:outerShdw blurRad="203200" dist="63500" dir="2700000" algn="tl" rotWithShape="0">
+                  <a:prstClr val="black">
+                    <a:alpha val="5000"/>
+                  </a:prstClr>
+                </a:outerShdw>
+              </a:effectLst>
+            </p:spPr>
+            <p:style>
+              <a:lnRef idx="2">
+                <a:schemeClr val="accent1">
+                  <a:shade val="15000"/>
+                </a:schemeClr>
+              </a:lnRef>
+              <a:fillRef idx="1">
+                <a:schemeClr val="accent1"/>
+              </a:fillRef>
+              <a:effectRef idx="0">
+                <a:schemeClr val="accent1"/>
+              </a:effectRef>
+              <a:fontRef idx="minor">
+                <a:schemeClr val="lt1"/>
+              </a:fontRef>
+            </p:style>
+            <p:txBody>
+              <a:bodyPr rtlCol="0" anchor="ctr"/>
+              <a:lstStyle/>
+              <a:p>
+                <a:pPr algn="ctr"/>
+                <a:endParaRPr lang="pl-PL">
+                  <a:latin typeface="Din" panose="02000504040000020003" pitchFamily="2" charset="0"/>
+                </a:endParaRPr>
+              </a:p>
+            </p:txBody>
+          </p:sp>
+          <p:sp>
+            <p:nvSpPr>
+              <p:cNvPr id="42" name="2.2_Chart_BG">
+                <a:extLst>
+                  <a:ext uri="{FF2B5EF4-FFF2-40B4-BE49-F238E27FC236}">
+                    <a16:creationId xmlns:a16="http://schemas.microsoft.com/office/drawing/2014/main" id="{48762949-D8C8-A905-3D78-58C155FF6D8E}"/>
+                  </a:ext>
+                </a:extLst>
+              </p:cNvPr>
+              <p:cNvSpPr>
+                <a:spLocks/>
+              </p:cNvSpPr>
+              <p:nvPr/>
+            </p:nvSpPr>
+            <p:spPr>
+              <a:xfrm>
+                <a:off x="13030200" y="1581150"/>
+                <a:ext cx="10744200" cy="5524500"/>
+              </a:xfrm>
+              <a:prstGeom prst="rect">
+                <a:avLst/>
+              </a:prstGeom>
+              <a:solidFill>
+                <a:schemeClr val="bg1"/>
+              </a:solidFill>
+              <a:ln w="3175">
+                <a:solidFill>
+                  <a:srgbClr val="B1B8C5"/>
+                </a:solidFill>
+              </a:ln>
+              <a:effectLst>
+                <a:outerShdw blurRad="203200" dist="63500" dir="2700000" algn="tl" rotWithShape="0">
+                  <a:prstClr val="black">
+                    <a:alpha val="5000"/>
+                  </a:prstClr>
+                </a:outerShdw>
+              </a:effectLst>
+            </p:spPr>
+            <p:style>
+              <a:lnRef idx="2">
+                <a:schemeClr val="accent1">
+                  <a:shade val="15000"/>
+                </a:schemeClr>
+              </a:lnRef>
+              <a:fillRef idx="1">
+                <a:schemeClr val="accent1"/>
+              </a:fillRef>
+              <a:effectRef idx="0">
+                <a:schemeClr val="accent1"/>
+              </a:effectRef>
+              <a:fontRef idx="minor">
+                <a:schemeClr val="lt1"/>
+              </a:fontRef>
+            </p:style>
+            <p:txBody>
+              <a:bodyPr rtlCol="0" anchor="ctr"/>
+              <a:lstStyle/>
+              <a:p>
+                <a:pPr algn="ctr"/>
+                <a:endParaRPr lang="pl-PL">
+                  <a:latin typeface="Din" panose="02000504040000020003" pitchFamily="2" charset="0"/>
+                </a:endParaRPr>
+              </a:p>
+            </p:txBody>
+          </p:sp>
+          <p:sp>
+            <p:nvSpPr>
+              <p:cNvPr id="41" name="2.1_Chart_BG">
+                <a:extLst>
+                  <a:ext uri="{FF2B5EF4-FFF2-40B4-BE49-F238E27FC236}">
+                    <a16:creationId xmlns:a16="http://schemas.microsoft.com/office/drawing/2014/main" id="{93046E24-79A1-E992-5964-9F00E433B134}"/>
+                  </a:ext>
+                </a:extLst>
+              </p:cNvPr>
+              <p:cNvSpPr>
+                <a:spLocks/>
+              </p:cNvSpPr>
+              <p:nvPr/>
+            </p:nvSpPr>
+            <p:spPr>
+              <a:xfrm>
+                <a:off x="1828800" y="4343400"/>
+                <a:ext cx="10744200" cy="4152900"/>
+              </a:xfrm>
+              <a:prstGeom prst="rect">
+                <a:avLst/>
+              </a:prstGeom>
+              <a:solidFill>
+                <a:schemeClr val="bg1"/>
+              </a:solidFill>
+              <a:ln w="3175">
+                <a:solidFill>
+                  <a:srgbClr val="B1B8C5"/>
+                </a:solidFill>
+              </a:ln>
+              <a:effectLst>
+                <a:outerShdw blurRad="203200" dist="63500" dir="2700000" algn="tl" rotWithShape="0">
+                  <a:prstClr val="black">
+                    <a:alpha val="5000"/>
+                  </a:prstClr>
+                </a:outerShdw>
+              </a:effectLst>
+            </p:spPr>
+            <p:style>
+              <a:lnRef idx="2">
+                <a:schemeClr val="accent1">
+                  <a:shade val="15000"/>
+                </a:schemeClr>
+              </a:lnRef>
+              <a:fillRef idx="1">
+                <a:schemeClr val="accent1"/>
+              </a:fillRef>
+              <a:effectRef idx="0">
+                <a:schemeClr val="accent1"/>
+              </a:effectRef>
+              <a:fontRef idx="minor">
+                <a:schemeClr val="lt1"/>
+              </a:fontRef>
+            </p:style>
+            <p:txBody>
+              <a:bodyPr rtlCol="0" anchor="ctr"/>
+              <a:lstStyle/>
+              <a:p>
+                <a:pPr algn="ctr"/>
+                <a:endParaRPr lang="pl-PL">
+                  <a:latin typeface="Din" panose="02000504040000020003" pitchFamily="2" charset="0"/>
+                </a:endParaRPr>
+              </a:p>
+            </p:txBody>
+          </p:sp>
+          <p:sp>
+            <p:nvSpPr>
+              <p:cNvPr id="39" name="1_Chart_BG">
+                <a:extLst>
+                  <a:ext uri="{FF2B5EF4-FFF2-40B4-BE49-F238E27FC236}">
+                    <a16:creationId xmlns:a16="http://schemas.microsoft.com/office/drawing/2014/main" id="{69E4849E-C540-F7C5-02C5-D4864113B474}"/>
+                  </a:ext>
+                </a:extLst>
+              </p:cNvPr>
+              <p:cNvSpPr>
+                <a:spLocks/>
+              </p:cNvSpPr>
+              <p:nvPr/>
+            </p:nvSpPr>
+            <p:spPr>
+              <a:xfrm>
+                <a:off x="1828800" y="1581150"/>
+                <a:ext cx="10744200" cy="2305050"/>
+              </a:xfrm>
+              <a:prstGeom prst="rect">
+                <a:avLst/>
+              </a:prstGeom>
+              <a:solidFill>
+                <a:schemeClr val="bg1"/>
+              </a:solidFill>
+              <a:ln w="3175">
+                <a:solidFill>
+                  <a:srgbClr val="B1B8C5"/>
+                </a:solidFill>
+              </a:ln>
+              <a:effectLst>
+                <a:outerShdw blurRad="203200" dist="63500" dir="2700000" algn="tl" rotWithShape="0">
+                  <a:prstClr val="black">
+                    <a:alpha val="5000"/>
+                  </a:prstClr>
+                </a:outerShdw>
+              </a:effectLst>
+            </p:spPr>
+            <p:style>
+              <a:lnRef idx="2">
+                <a:schemeClr val="accent1">
+                  <a:shade val="15000"/>
+                </a:schemeClr>
+              </a:lnRef>
+              <a:fillRef idx="1">
+                <a:schemeClr val="accent1"/>
+              </a:fillRef>
+              <a:effectRef idx="0">
+                <a:schemeClr val="accent1"/>
+              </a:effectRef>
+              <a:fontRef idx="minor">
+                <a:schemeClr val="lt1"/>
+              </a:fontRef>
+            </p:style>
+            <p:txBody>
+              <a:bodyPr rtlCol="0" anchor="ctr"/>
+              <a:lstStyle/>
+              <a:p>
+                <a:pPr algn="ctr"/>
+                <a:endParaRPr lang="pl-PL">
+                  <a:latin typeface="Din" panose="02000504040000020003" pitchFamily="2" charset="0"/>
+                </a:endParaRPr>
+              </a:p>
+            </p:txBody>
+          </p:sp>
+        </p:grpSp>
+      </p:grpSp>
+      <p:grpSp>
+        <p:nvGrpSpPr>
+          <p:cNvPr id="18" name="Navigation_Icons">
+            <a:extLst>
+              <a:ext uri="{FF2B5EF4-FFF2-40B4-BE49-F238E27FC236}">
+                <a16:creationId xmlns:a16="http://schemas.microsoft.com/office/drawing/2014/main" id="{BBADFC7E-0F21-42B8-C3F1-4CD84F88481A}"/>
+              </a:ext>
+            </a:extLst>
+          </p:cNvPr>
+          <p:cNvGrpSpPr/>
+          <p:nvPr/>
+        </p:nvGrpSpPr>
+        <p:grpSpPr>
+          <a:xfrm>
+            <a:off x="265800" y="7701191"/>
+            <a:ext cx="687600" cy="5414733"/>
+            <a:chOff x="265800" y="7701191"/>
+            <a:chExt cx="687600" cy="5414733"/>
+          </a:xfrm>
+        </p:grpSpPr>
+        <p:pic>
+          <p:nvPicPr>
+            <p:cNvPr id="17" name="Retention_Active">
+              <a:extLst>
+                <a:ext uri="{FF2B5EF4-FFF2-40B4-BE49-F238E27FC236}">
+                  <a16:creationId xmlns:a16="http://schemas.microsoft.com/office/drawing/2014/main" id="{1C355D57-B454-AA99-D335-C6F68B5C0D93}"/>
+                </a:ext>
+              </a:extLst>
+            </p:cNvPr>
+            <p:cNvPicPr>
+              <a:picLocks noChangeAspect="1"/>
+            </p:cNvPicPr>
+            <p:nvPr/>
+          </p:nvPicPr>
+          <p:blipFill>
+            <a:blip r:embed="rId2">
+              <a:extLst>
+                <a:ext uri="{28A0092B-C50C-407E-A947-70E740481C1C}">
+                  <a14:useLocalDpi xmlns:a14="http://schemas.microsoft.com/office/drawing/2010/main" val="0"/>
+                </a:ext>
+              </a:extLst>
+            </a:blip>
+            <a:stretch>
+              <a:fillRect/>
+            </a:stretch>
+          </p:blipFill>
+          <p:spPr>
+            <a:xfrm>
+              <a:off x="265800" y="12428324"/>
+              <a:ext cx="687600" cy="687600"/>
+            </a:xfrm>
+            <a:prstGeom prst="rect">
+              <a:avLst/>
+            </a:prstGeom>
+          </p:spPr>
+        </p:pic>
+        <p:pic>
+          <p:nvPicPr>
+            <p:cNvPr id="57" name="Customer" descr="A white person with black background&#10;&#10;Description automatically generated" hidden="1">
+              <a:extLst>
+                <a:ext uri="{FF2B5EF4-FFF2-40B4-BE49-F238E27FC236}">
+                  <a16:creationId xmlns:a16="http://schemas.microsoft.com/office/drawing/2014/main" id="{B97DC522-3284-0B93-E78F-9ECAEA71CE3F}"/>
+                </a:ext>
+              </a:extLst>
+            </p:cNvPr>
+            <p:cNvPicPr/>
+            <p:nvPr/>
+          </p:nvPicPr>
+          <p:blipFill>
+            <a:blip r:embed="rId3">
+              <a:extLst>
+                <a:ext uri="{28A0092B-C50C-407E-A947-70E740481C1C}">
+                  <a14:useLocalDpi xmlns:a14="http://schemas.microsoft.com/office/drawing/2010/main" val="0"/>
+                </a:ext>
+              </a:extLst>
+            </a:blip>
+            <a:stretch>
+              <a:fillRect/>
+            </a:stretch>
+          </p:blipFill>
+          <p:spPr>
+            <a:xfrm>
+              <a:off x="266700" y="11488391"/>
+              <a:ext cx="685800" cy="677537"/>
+            </a:xfrm>
+            <a:prstGeom prst="rect">
+              <a:avLst/>
+            </a:prstGeom>
+          </p:spPr>
+        </p:pic>
+        <p:pic>
+          <p:nvPicPr>
+            <p:cNvPr id="59" name="Delivery" hidden="1">
+              <a:extLst>
+                <a:ext uri="{FF2B5EF4-FFF2-40B4-BE49-F238E27FC236}">
+                  <a16:creationId xmlns:a16="http://schemas.microsoft.com/office/drawing/2014/main" id="{17943907-D9B8-5167-8D9D-8369E19CACE6}"/>
+                </a:ext>
+              </a:extLst>
+            </p:cNvPr>
+            <p:cNvPicPr/>
+            <p:nvPr/>
+          </p:nvPicPr>
+          <p:blipFill>
+            <a:blip r:embed="rId4">
+              <a:extLst>
+                <a:ext uri="{28A0092B-C50C-407E-A947-70E740481C1C}">
+                  <a14:useLocalDpi xmlns:a14="http://schemas.microsoft.com/office/drawing/2010/main" val="0"/>
+                </a:ext>
+              </a:extLst>
+            </a:blip>
+            <a:stretch>
+              <a:fillRect/>
+            </a:stretch>
+          </p:blipFill>
+          <p:spPr>
+            <a:xfrm>
+              <a:off x="266700" y="10631591"/>
+              <a:ext cx="685800" cy="496111"/>
+            </a:xfrm>
+            <a:prstGeom prst="rect">
+              <a:avLst/>
+            </a:prstGeom>
+          </p:spPr>
+        </p:pic>
+        <p:pic>
+          <p:nvPicPr>
+            <p:cNvPr id="60" name="Product" hidden="1">
+              <a:extLst>
+                <a:ext uri="{FF2B5EF4-FFF2-40B4-BE49-F238E27FC236}">
+                  <a16:creationId xmlns:a16="http://schemas.microsoft.com/office/drawing/2014/main" id="{A12C5721-DBB4-8011-CA76-82B70677C720}"/>
+                </a:ext>
+              </a:extLst>
+            </p:cNvPr>
+            <p:cNvPicPr/>
+            <p:nvPr/>
+          </p:nvPicPr>
+          <p:blipFill>
+            <a:blip r:embed="rId5">
+              <a:extLst>
+                <a:ext uri="{28A0092B-C50C-407E-A947-70E740481C1C}">
+                  <a14:useLocalDpi xmlns:a14="http://schemas.microsoft.com/office/drawing/2010/main" val="0"/>
+                </a:ext>
+              </a:extLst>
+            </a:blip>
+            <a:stretch>
+              <a:fillRect/>
+            </a:stretch>
+          </p:blipFill>
+          <p:spPr>
+            <a:xfrm>
+              <a:off x="266700" y="9594791"/>
+              <a:ext cx="685800" cy="671209"/>
+            </a:xfrm>
+            <a:prstGeom prst="rect">
+              <a:avLst/>
+            </a:prstGeom>
+          </p:spPr>
+        </p:pic>
+        <p:pic>
+          <p:nvPicPr>
+            <p:cNvPr id="61" name="Sales" hidden="1">
+              <a:extLst>
+                <a:ext uri="{FF2B5EF4-FFF2-40B4-BE49-F238E27FC236}">
+                  <a16:creationId xmlns:a16="http://schemas.microsoft.com/office/drawing/2014/main" id="{0478B26F-BA12-16FC-0F13-48ED9041A38C}"/>
+                </a:ext>
+              </a:extLst>
+            </p:cNvPr>
+            <p:cNvPicPr/>
+            <p:nvPr/>
+          </p:nvPicPr>
+          <p:blipFill>
+            <a:blip r:embed="rId6">
+              <a:extLst>
+                <a:ext uri="{28A0092B-C50C-407E-A947-70E740481C1C}">
+                  <a14:useLocalDpi xmlns:a14="http://schemas.microsoft.com/office/drawing/2010/main" val="0"/>
+                </a:ext>
+              </a:extLst>
+            </a:blip>
+            <a:stretch>
+              <a:fillRect/>
+            </a:stretch>
+          </p:blipFill>
+          <p:spPr>
+            <a:xfrm>
+              <a:off x="266700" y="8647991"/>
+              <a:ext cx="685800" cy="671209"/>
+            </a:xfrm>
+            <a:prstGeom prst="rect">
+              <a:avLst/>
+            </a:prstGeom>
+          </p:spPr>
+        </p:pic>
+        <p:pic>
+          <p:nvPicPr>
+            <p:cNvPr id="62" name="Overview" descr="A black and white bar chart&#10;&#10;Description automatically generated" hidden="1">
+              <a:extLst>
+                <a:ext uri="{FF2B5EF4-FFF2-40B4-BE49-F238E27FC236}">
+                  <a16:creationId xmlns:a16="http://schemas.microsoft.com/office/drawing/2014/main" id="{6E255B01-5014-E9AB-A8FE-63B72C0B0AD6}"/>
+                </a:ext>
+              </a:extLst>
+            </p:cNvPr>
+            <p:cNvPicPr/>
+            <p:nvPr/>
+          </p:nvPicPr>
+          <p:blipFill>
+            <a:blip r:embed="rId7">
+              <a:extLst>
+                <a:ext uri="{28A0092B-C50C-407E-A947-70E740481C1C}">
+                  <a14:useLocalDpi xmlns:a14="http://schemas.microsoft.com/office/drawing/2010/main" val="0"/>
+                </a:ext>
+              </a:extLst>
+            </a:blip>
+            <a:stretch>
+              <a:fillRect/>
+            </a:stretch>
+          </p:blipFill>
+          <p:spPr>
+            <a:xfrm>
+              <a:off x="266700" y="7701191"/>
+              <a:ext cx="685800" cy="678426"/>
+            </a:xfrm>
+            <a:prstGeom prst="rect">
+              <a:avLst/>
+            </a:prstGeom>
+          </p:spPr>
+        </p:pic>
+      </p:grpSp>
+      <p:grpSp>
+        <p:nvGrpSpPr>
+          <p:cNvPr id="36" name="Filter_Icons" hidden="1">
+            <a:extLst>
+              <a:ext uri="{FF2B5EF4-FFF2-40B4-BE49-F238E27FC236}">
+                <a16:creationId xmlns:a16="http://schemas.microsoft.com/office/drawing/2014/main" id="{55EA662A-9608-0E24-7544-CB16F74BB291}"/>
+              </a:ext>
+            </a:extLst>
+          </p:cNvPr>
+          <p:cNvGrpSpPr>
+            <a:grpSpLocks noGrp="1" noUngrp="1" noRot="1" noMove="1" noResize="1"/>
+          </p:cNvGrpSpPr>
+          <p:nvPr/>
+        </p:nvGrpSpPr>
+        <p:grpSpPr>
+          <a:xfrm>
+            <a:off x="266700" y="266700"/>
+            <a:ext cx="685800" cy="1565340"/>
+            <a:chOff x="266700" y="266700"/>
+            <a:chExt cx="685800" cy="1565340"/>
+          </a:xfrm>
+        </p:grpSpPr>
+        <p:pic>
+          <p:nvPicPr>
+            <p:cNvPr id="23" name="Filter">
+              <a:extLst>
+                <a:ext uri="{FF2B5EF4-FFF2-40B4-BE49-F238E27FC236}">
+                  <a16:creationId xmlns:a16="http://schemas.microsoft.com/office/drawing/2014/main" id="{0D31A7DD-06A0-277A-C8C8-9EEE57F3023A}"/>
+                </a:ext>
+              </a:extLst>
+            </p:cNvPr>
+            <p:cNvPicPr>
+              <a:picLocks noGrp="1" noRot="1" noChangeAspect="1" noMove="1" noResize="1" noEditPoints="1" noAdjustHandles="1" noChangeArrowheads="1" noChangeShapeType="1" noCrop="1"/>
+            </p:cNvPicPr>
+            <p:nvPr/>
+          </p:nvPicPr>
+          <p:blipFill>
+            <a:blip r:embed="rId8">
+              <a:extLst>
+                <a:ext uri="{28A0092B-C50C-407E-A947-70E740481C1C}">
+                  <a14:useLocalDpi xmlns:a14="http://schemas.microsoft.com/office/drawing/2010/main" val="0"/>
+                </a:ext>
+              </a:extLst>
+            </a:blip>
+            <a:stretch>
+              <a:fillRect/>
+            </a:stretch>
+          </p:blipFill>
+          <p:spPr>
+            <a:xfrm>
+              <a:off x="266700" y="1219200"/>
+              <a:ext cx="685800" cy="612840"/>
+            </a:xfrm>
+            <a:prstGeom prst="rect">
+              <a:avLst/>
+            </a:prstGeom>
+          </p:spPr>
+        </p:pic>
+        <p:pic>
+          <p:nvPicPr>
+            <p:cNvPr id="35" name="Clear_Filters">
+              <a:extLst>
+                <a:ext uri="{FF2B5EF4-FFF2-40B4-BE49-F238E27FC236}">
+                  <a16:creationId xmlns:a16="http://schemas.microsoft.com/office/drawing/2014/main" id="{CBD63BE9-A275-DB5C-AC04-D6942FAB87BF}"/>
+                </a:ext>
+              </a:extLst>
+            </p:cNvPr>
+            <p:cNvPicPr>
+              <a:picLocks noGrp="1" noRot="1" noChangeAspect="1" noMove="1" noResize="1" noEditPoints="1" noAdjustHandles="1" noChangeArrowheads="1" noChangeShapeType="1" noCrop="1"/>
+            </p:cNvPicPr>
+            <p:nvPr/>
+          </p:nvPicPr>
+          <p:blipFill>
+            <a:blip r:embed="rId9">
+              <a:extLst>
+                <a:ext uri="{28A0092B-C50C-407E-A947-70E740481C1C}">
+                  <a14:useLocalDpi xmlns:a14="http://schemas.microsoft.com/office/drawing/2010/main" val="0"/>
+                </a:ext>
+              </a:extLst>
+            </a:blip>
+            <a:stretch>
+              <a:fillRect/>
+            </a:stretch>
+          </p:blipFill>
+          <p:spPr>
+            <a:xfrm>
+              <a:off x="266700" y="266700"/>
+              <a:ext cx="685800" cy="685800"/>
+            </a:xfrm>
+            <a:prstGeom prst="rect">
+              <a:avLst/>
+            </a:prstGeom>
+          </p:spPr>
+        </p:pic>
+      </p:grpSp>
+      <p:grpSp>
+        <p:nvGrpSpPr>
+          <p:cNvPr id="15" name="Margins" hidden="1">
+            <a:extLst>
+              <a:ext uri="{FF2B5EF4-FFF2-40B4-BE49-F238E27FC236}">
+                <a16:creationId xmlns:a16="http://schemas.microsoft.com/office/drawing/2014/main" id="{3A7668E8-5B3C-6507-FA98-4CC00C9EA2A8}"/>
+              </a:ext>
+            </a:extLst>
+          </p:cNvPr>
+          <p:cNvGrpSpPr>
+            <a:grpSpLocks noGrp="1" noUngrp="1" noRot="1" noMove="1" noResize="1"/>
+          </p:cNvGrpSpPr>
+          <p:nvPr/>
+        </p:nvGrpSpPr>
+        <p:grpSpPr>
+          <a:xfrm>
+            <a:off x="1219200" y="0"/>
+            <a:ext cx="23164800" cy="13716000"/>
+            <a:chOff x="1219200" y="0"/>
+            <a:chExt cx="23164800" cy="13716000"/>
+          </a:xfrm>
+        </p:grpSpPr>
+        <p:grpSp>
+          <p:nvGrpSpPr>
+            <p:cNvPr id="13" name="Main">
+              <a:extLst>
+                <a:ext uri="{FF2B5EF4-FFF2-40B4-BE49-F238E27FC236}">
+                  <a16:creationId xmlns:a16="http://schemas.microsoft.com/office/drawing/2014/main" id="{F6F54732-847D-5C13-1DBD-FEC62B2DA619}"/>
+                </a:ext>
+              </a:extLst>
+            </p:cNvPr>
+            <p:cNvGrpSpPr>
+              <a:grpSpLocks noGrp="1" noUngrp="1" noRot="1" noMove="1" noResize="1"/>
+            </p:cNvGrpSpPr>
+            <p:nvPr/>
+          </p:nvGrpSpPr>
+          <p:grpSpPr>
+            <a:xfrm>
+              <a:off x="1219200" y="0"/>
+              <a:ext cx="23164800" cy="13716000"/>
+              <a:chOff x="1219200" y="0"/>
+              <a:chExt cx="23164800" cy="13716000"/>
+            </a:xfrm>
+          </p:grpSpPr>
+          <p:sp>
+            <p:nvSpPr>
+              <p:cNvPr id="4" name="H_Bottom_Margin">
+                <a:extLst>
+                  <a:ext uri="{FF2B5EF4-FFF2-40B4-BE49-F238E27FC236}">
+                    <a16:creationId xmlns:a16="http://schemas.microsoft.com/office/drawing/2014/main" id="{D9C46175-3CDD-2884-0097-0307AA41B9C2}"/>
+                  </a:ext>
+                </a:extLst>
+              </p:cNvPr>
+              <p:cNvSpPr>
+                <a:spLocks noGrp="1" noRot="1" noMove="1" noResize="1" noEditPoints="1" noAdjustHandles="1" noChangeArrowheads="1" noChangeShapeType="1"/>
+              </p:cNvSpPr>
+              <p:nvPr/>
+            </p:nvSpPr>
+            <p:spPr>
+              <a:xfrm>
+                <a:off x="1219200" y="13106400"/>
+                <a:ext cx="23164800" cy="609600"/>
+              </a:xfrm>
+              <a:prstGeom prst="rect">
+                <a:avLst/>
+              </a:prstGeom>
+              <a:solidFill>
+                <a:schemeClr val="accent2">
+                  <a:alpha val="30000"/>
+                </a:schemeClr>
+              </a:solidFill>
+              <a:ln>
+                <a:noFill/>
+              </a:ln>
+            </p:spPr>
+            <p:style>
+              <a:lnRef idx="2">
+                <a:schemeClr val="accent2">
+                  <a:shade val="15000"/>
+                </a:schemeClr>
+              </a:lnRef>
+              <a:fillRef idx="1">
+                <a:schemeClr val="accent2"/>
+              </a:fillRef>
+              <a:effectRef idx="0">
+                <a:schemeClr val="accent2"/>
+              </a:effectRef>
+              <a:fontRef idx="minor">
+                <a:schemeClr val="lt1"/>
+              </a:fontRef>
+            </p:style>
+            <p:txBody>
+              <a:bodyPr rtlCol="0" anchor="ctr"/>
+              <a:lstStyle/>
+              <a:p>
+                <a:pPr algn="ctr"/>
+                <a:endParaRPr lang="pl-PL"/>
+              </a:p>
+            </p:txBody>
+          </p:sp>
+          <p:sp>
+            <p:nvSpPr>
+              <p:cNvPr id="2" name="V_Left_Margin">
+                <a:extLst>
+                  <a:ext uri="{FF2B5EF4-FFF2-40B4-BE49-F238E27FC236}">
+                    <a16:creationId xmlns:a16="http://schemas.microsoft.com/office/drawing/2014/main" id="{EFBEE9D4-C37E-263C-5A6F-A2CA6967FA20}"/>
+                  </a:ext>
+                </a:extLst>
+              </p:cNvPr>
+              <p:cNvSpPr>
+                <a:spLocks noGrp="1" noRot="1" noMove="1" noResize="1" noEditPoints="1" noAdjustHandles="1" noChangeArrowheads="1" noChangeShapeType="1"/>
+              </p:cNvSpPr>
+              <p:nvPr/>
+            </p:nvSpPr>
+            <p:spPr>
+              <a:xfrm>
+                <a:off x="1219200" y="0"/>
+                <a:ext cx="609600" cy="13716000"/>
+              </a:xfrm>
+              <a:prstGeom prst="rect">
+                <a:avLst/>
+              </a:prstGeom>
+              <a:solidFill>
+                <a:schemeClr val="accent2">
+                  <a:alpha val="30000"/>
+                </a:schemeClr>
+              </a:solidFill>
+              <a:ln>
+                <a:noFill/>
+              </a:ln>
+            </p:spPr>
+            <p:style>
+              <a:lnRef idx="2">
+                <a:schemeClr val="accent2">
+                  <a:shade val="15000"/>
+                </a:schemeClr>
+              </a:lnRef>
+              <a:fillRef idx="1">
+                <a:schemeClr val="accent2"/>
+              </a:fillRef>
+              <a:effectRef idx="0">
+                <a:schemeClr val="accent2"/>
+              </a:effectRef>
+              <a:fontRef idx="minor">
+                <a:schemeClr val="lt1"/>
+              </a:fontRef>
+            </p:style>
+            <p:txBody>
+              <a:bodyPr rtlCol="0" anchor="ctr"/>
+              <a:lstStyle/>
+              <a:p>
+                <a:pPr algn="ctr"/>
+                <a:endParaRPr lang="pl-PL"/>
+              </a:p>
+            </p:txBody>
+          </p:sp>
+          <p:sp>
+            <p:nvSpPr>
+              <p:cNvPr id="3" name="V_Right_Margin">
+                <a:extLst>
+                  <a:ext uri="{FF2B5EF4-FFF2-40B4-BE49-F238E27FC236}">
+                    <a16:creationId xmlns:a16="http://schemas.microsoft.com/office/drawing/2014/main" id="{A7BB4A29-D641-7786-2AE0-59780B2DBF51}"/>
+                  </a:ext>
+                </a:extLst>
+              </p:cNvPr>
+              <p:cNvSpPr>
+                <a:spLocks noGrp="1" noRot="1" noMove="1" noResize="1" noEditPoints="1" noAdjustHandles="1" noChangeArrowheads="1" noChangeShapeType="1"/>
+              </p:cNvSpPr>
+              <p:nvPr/>
+            </p:nvSpPr>
+            <p:spPr>
+              <a:xfrm>
+                <a:off x="23774400" y="0"/>
+                <a:ext cx="609600" cy="13716000"/>
+              </a:xfrm>
+              <a:prstGeom prst="rect">
+                <a:avLst/>
+              </a:prstGeom>
+              <a:solidFill>
+                <a:schemeClr val="accent2">
+                  <a:alpha val="30000"/>
+                </a:schemeClr>
+              </a:solidFill>
+              <a:ln>
+                <a:noFill/>
+              </a:ln>
+            </p:spPr>
+            <p:style>
+              <a:lnRef idx="2">
+                <a:schemeClr val="accent2">
+                  <a:shade val="15000"/>
+                </a:schemeClr>
+              </a:lnRef>
+              <a:fillRef idx="1">
+                <a:schemeClr val="accent2"/>
+              </a:fillRef>
+              <a:effectRef idx="0">
+                <a:schemeClr val="accent2"/>
+              </a:effectRef>
+              <a:fontRef idx="minor">
+                <a:schemeClr val="lt1"/>
+              </a:fontRef>
+            </p:style>
+            <p:txBody>
+              <a:bodyPr rtlCol="0" anchor="ctr"/>
+              <a:lstStyle/>
+              <a:p>
+                <a:pPr algn="ctr"/>
+                <a:endParaRPr lang="pl-PL"/>
+              </a:p>
+            </p:txBody>
+          </p:sp>
+        </p:grpSp>
+        <p:grpSp>
+          <p:nvGrpSpPr>
+            <p:cNvPr id="14" name="Sub">
+              <a:extLst>
+                <a:ext uri="{FF2B5EF4-FFF2-40B4-BE49-F238E27FC236}">
+                  <a16:creationId xmlns:a16="http://schemas.microsoft.com/office/drawing/2014/main" id="{E869BBD6-CD1C-0A5B-97C4-2994694AAC50}"/>
+                </a:ext>
+              </a:extLst>
+            </p:cNvPr>
+            <p:cNvGrpSpPr>
+              <a:grpSpLocks noGrp="1" noUngrp="1" noRot="1" noMove="1" noResize="1"/>
+            </p:cNvGrpSpPr>
+            <p:nvPr/>
+          </p:nvGrpSpPr>
+          <p:grpSpPr>
+            <a:xfrm>
+              <a:off x="1219200" y="0"/>
+              <a:ext cx="23164800" cy="13716000"/>
+              <a:chOff x="1219200" y="0"/>
+              <a:chExt cx="23164800" cy="13716000"/>
+            </a:xfrm>
+          </p:grpSpPr>
+          <p:sp>
+            <p:nvSpPr>
+              <p:cNvPr id="11" name="H_3_Margin">
+                <a:extLst>
+                  <a:ext uri="{FF2B5EF4-FFF2-40B4-BE49-F238E27FC236}">
+                    <a16:creationId xmlns:a16="http://schemas.microsoft.com/office/drawing/2014/main" id="{7735B8AF-7C32-2059-5571-CFE9A6CAB35E}"/>
+                  </a:ext>
+                </a:extLst>
+              </p:cNvPr>
+              <p:cNvSpPr>
+                <a:spLocks noGrp="1" noRot="1" noMove="1" noResize="1" noEditPoints="1" noAdjustHandles="1" noChangeArrowheads="1" noChangeShapeType="1"/>
+              </p:cNvSpPr>
+              <p:nvPr/>
+            </p:nvSpPr>
+            <p:spPr>
+              <a:xfrm>
+                <a:off x="1219200" y="8496300"/>
+                <a:ext cx="23164800" cy="457200"/>
+              </a:xfrm>
+              <a:prstGeom prst="rect">
+                <a:avLst/>
+              </a:prstGeom>
+              <a:solidFill>
+                <a:schemeClr val="accent2">
+                  <a:alpha val="10000"/>
+                </a:schemeClr>
+              </a:solidFill>
+              <a:ln>
+                <a:noFill/>
+              </a:ln>
+            </p:spPr>
+            <p:style>
+              <a:lnRef idx="2">
+                <a:schemeClr val="accent2">
+                  <a:shade val="15000"/>
+                </a:schemeClr>
+              </a:lnRef>
+              <a:fillRef idx="1">
+                <a:schemeClr val="accent2"/>
+              </a:fillRef>
+              <a:effectRef idx="0">
+                <a:schemeClr val="accent2"/>
+              </a:effectRef>
+              <a:fontRef idx="minor">
+                <a:schemeClr val="lt1"/>
+              </a:fontRef>
+            </p:style>
+            <p:txBody>
+              <a:bodyPr rtlCol="0" anchor="ctr"/>
+              <a:lstStyle/>
+              <a:p>
+                <a:pPr algn="ctr"/>
+                <a:endParaRPr lang="pl-PL"/>
+              </a:p>
+            </p:txBody>
+          </p:sp>
+          <p:sp>
+            <p:nvSpPr>
+              <p:cNvPr id="10" name="H_2_Margin">
+                <a:extLst>
+                  <a:ext uri="{FF2B5EF4-FFF2-40B4-BE49-F238E27FC236}">
+                    <a16:creationId xmlns:a16="http://schemas.microsoft.com/office/drawing/2014/main" id="{63F25BB1-C29B-A354-2A7A-D2ED388B2734}"/>
+                  </a:ext>
+                </a:extLst>
+              </p:cNvPr>
+              <p:cNvSpPr>
+                <a:spLocks noGrp="1" noRot="1" noMove="1" noResize="1" noEditPoints="1" noAdjustHandles="1" noChangeArrowheads="1" noChangeShapeType="1"/>
+              </p:cNvSpPr>
+              <p:nvPr/>
+            </p:nvSpPr>
+            <p:spPr>
+              <a:xfrm>
+                <a:off x="1219200" y="3886200"/>
+                <a:ext cx="23164800" cy="457200"/>
+              </a:xfrm>
+              <a:prstGeom prst="rect">
+                <a:avLst/>
+              </a:prstGeom>
+              <a:solidFill>
+                <a:schemeClr val="accent2">
+                  <a:alpha val="10000"/>
+                </a:schemeClr>
+              </a:solidFill>
+              <a:ln>
+                <a:noFill/>
+              </a:ln>
+            </p:spPr>
+            <p:style>
+              <a:lnRef idx="2">
+                <a:schemeClr val="accent2">
+                  <a:shade val="15000"/>
+                </a:schemeClr>
+              </a:lnRef>
+              <a:fillRef idx="1">
+                <a:schemeClr val="accent2"/>
+              </a:fillRef>
+              <a:effectRef idx="0">
+                <a:schemeClr val="accent2"/>
+              </a:effectRef>
+              <a:fontRef idx="minor">
+                <a:schemeClr val="lt1"/>
+              </a:fontRef>
+            </p:style>
+            <p:txBody>
+              <a:bodyPr rtlCol="0" anchor="ctr"/>
+              <a:lstStyle/>
+              <a:p>
+                <a:pPr algn="ctr"/>
+                <a:endParaRPr lang="pl-PL"/>
+              </a:p>
+            </p:txBody>
+          </p:sp>
+          <p:sp>
+            <p:nvSpPr>
+              <p:cNvPr id="5" name="H_1_Margin">
+                <a:extLst>
+                  <a:ext uri="{FF2B5EF4-FFF2-40B4-BE49-F238E27FC236}">
+                    <a16:creationId xmlns:a16="http://schemas.microsoft.com/office/drawing/2014/main" id="{9968A711-BA69-1CB6-F295-6BAD89359B6F}"/>
+                  </a:ext>
+                </a:extLst>
+              </p:cNvPr>
+              <p:cNvSpPr>
+                <a:spLocks noGrp="1" noRot="1" noMove="1" noResize="1" noEditPoints="1" noAdjustHandles="1" noChangeArrowheads="1" noChangeShapeType="1"/>
+              </p:cNvSpPr>
+              <p:nvPr/>
+            </p:nvSpPr>
+            <p:spPr>
+              <a:xfrm>
+                <a:off x="1219200" y="1143000"/>
+                <a:ext cx="23164800" cy="457200"/>
+              </a:xfrm>
+              <a:prstGeom prst="rect">
+                <a:avLst/>
+              </a:prstGeom>
+              <a:solidFill>
+                <a:schemeClr val="accent2">
+                  <a:alpha val="10000"/>
+                </a:schemeClr>
+              </a:solidFill>
+              <a:ln>
+                <a:noFill/>
+              </a:ln>
+            </p:spPr>
+            <p:style>
+              <a:lnRef idx="2">
+                <a:schemeClr val="accent2">
+                  <a:shade val="15000"/>
+                </a:schemeClr>
+              </a:lnRef>
+              <a:fillRef idx="1">
+                <a:schemeClr val="accent2"/>
+              </a:fillRef>
+              <a:effectRef idx="0">
+                <a:schemeClr val="accent2"/>
+              </a:effectRef>
+              <a:fontRef idx="minor">
+                <a:schemeClr val="lt1"/>
+              </a:fontRef>
+            </p:style>
+            <p:txBody>
+              <a:bodyPr rtlCol="0" anchor="ctr"/>
+              <a:lstStyle/>
+              <a:p>
+                <a:pPr algn="ctr"/>
+                <a:endParaRPr lang="pl-PL"/>
+              </a:p>
+            </p:txBody>
+          </p:sp>
+          <p:sp>
+            <p:nvSpPr>
+              <p:cNvPr id="12" name="V_Center_Margin">
+                <a:extLst>
+                  <a:ext uri="{FF2B5EF4-FFF2-40B4-BE49-F238E27FC236}">
+                    <a16:creationId xmlns:a16="http://schemas.microsoft.com/office/drawing/2014/main" id="{64EA36DC-E110-36BA-53BE-5305ADE6E04A}"/>
+                  </a:ext>
+                </a:extLst>
+              </p:cNvPr>
+              <p:cNvSpPr>
+                <a:spLocks noGrp="1" noRot="1" noMove="1" noResize="1" noEditPoints="1" noAdjustHandles="1" noChangeArrowheads="1" noChangeShapeType="1"/>
+              </p:cNvSpPr>
+              <p:nvPr/>
+            </p:nvSpPr>
+            <p:spPr>
+              <a:xfrm>
+                <a:off x="12573000" y="0"/>
+                <a:ext cx="457200" cy="13716000"/>
+              </a:xfrm>
+              <a:prstGeom prst="rect">
+                <a:avLst/>
+              </a:prstGeom>
+              <a:solidFill>
+                <a:schemeClr val="accent2">
+                  <a:alpha val="10000"/>
+                </a:schemeClr>
+              </a:solidFill>
+              <a:ln>
+                <a:noFill/>
+              </a:ln>
+            </p:spPr>
+            <p:style>
+              <a:lnRef idx="2">
+                <a:schemeClr val="accent2">
+                  <a:shade val="15000"/>
+                </a:schemeClr>
+              </a:lnRef>
+              <a:fillRef idx="1">
+                <a:schemeClr val="accent2"/>
+              </a:fillRef>
+              <a:effectRef idx="0">
+                <a:schemeClr val="accent2"/>
+              </a:effectRef>
+              <a:fontRef idx="minor">
+                <a:schemeClr val="lt1"/>
+              </a:fontRef>
+            </p:style>
+            <p:txBody>
+              <a:bodyPr rtlCol="0" anchor="ctr"/>
+              <a:lstStyle/>
+              <a:p>
+                <a:pPr algn="ctr"/>
+                <a:endParaRPr lang="pl-PL"/>
+              </a:p>
+            </p:txBody>
+          </p:sp>
+        </p:grpSp>
+      </p:grpSp>
+      <p:sp>
+        <p:nvSpPr>
+          <p:cNvPr id="9" name="Text_Results_By" hidden="1">
+            <a:extLst>
+              <a:ext uri="{FF2B5EF4-FFF2-40B4-BE49-F238E27FC236}">
+                <a16:creationId xmlns:a16="http://schemas.microsoft.com/office/drawing/2014/main" id="{7658BB83-70B6-06BD-2168-03FCCE59DAF2}"/>
+              </a:ext>
+            </a:extLst>
+          </p:cNvPr>
+          <p:cNvSpPr txBox="1">
+            <a:spLocks noGrp="1" noRot="1" noMove="1" noResize="1" noEditPoints="1" noAdjustHandles="1" noChangeArrowheads="1" noChangeShapeType="1"/>
+          </p:cNvSpPr>
+          <p:nvPr/>
+        </p:nvSpPr>
+        <p:spPr>
+          <a:xfrm>
+            <a:off x="1873250" y="1202323"/>
+            <a:ext cx="21901150" cy="338554"/>
+          </a:xfrm>
+          <a:prstGeom prst="rect">
+            <a:avLst/>
+          </a:prstGeom>
+          <a:noFill/>
+        </p:spPr>
+        <p:txBody>
+          <a:bodyPr wrap="square" rtlCol="0">
+            <a:spAutoFit/>
+          </a:bodyPr>
+          <a:lstStyle/>
+          <a:p>
+            <a:r>
+              <a:rPr lang="pl-PL" sz="1600" dirty="0">
+                <a:solidFill>
+                  <a:srgbClr val="344C69"/>
+                </a:solidFill>
+                <a:latin typeface="DIN" panose="02000504040000020003" pitchFamily="2" charset="0"/>
+              </a:rPr>
+              <a:t>Show results by</a:t>
+            </a:r>
+          </a:p>
+        </p:txBody>
+      </p:sp>
+      <p:sp>
+        <p:nvSpPr>
+          <p:cNvPr id="22" name="Title">
+            <a:extLst>
+              <a:ext uri="{FF2B5EF4-FFF2-40B4-BE49-F238E27FC236}">
+                <a16:creationId xmlns:a16="http://schemas.microsoft.com/office/drawing/2014/main" id="{E8225F30-BC0F-8F7B-9723-5F424DE87109}"/>
+              </a:ext>
+            </a:extLst>
+          </p:cNvPr>
+          <p:cNvSpPr txBox="1">
+            <a:spLocks noGrp="1" noRot="1" noMove="1" noResize="1" noEditPoints="1" noAdjustHandles="1" noChangeArrowheads="1" noChangeShapeType="1"/>
+          </p:cNvSpPr>
+          <p:nvPr/>
+        </p:nvSpPr>
+        <p:spPr>
+          <a:xfrm>
+            <a:off x="1828800" y="190500"/>
+            <a:ext cx="21945600" cy="1015663"/>
+          </a:xfrm>
+          <a:prstGeom prst="rect">
+            <a:avLst/>
+          </a:prstGeom>
+          <a:noFill/>
+        </p:spPr>
+        <p:txBody>
+          <a:bodyPr wrap="square" rtlCol="0">
+            <a:spAutoFit/>
+          </a:bodyPr>
+          <a:lstStyle/>
+          <a:p>
+            <a:r>
+              <a:rPr lang="pl-PL" sz="6000" dirty="0" err="1">
+                <a:solidFill>
+                  <a:srgbClr val="344C69"/>
+                </a:solidFill>
+                <a:effectLst>
+                  <a:outerShdw blurRad="38100" dist="38100" dir="2700000" algn="tl">
+                    <a:srgbClr val="000000">
+                      <a:alpha val="43137"/>
+                    </a:srgbClr>
+                  </a:outerShdw>
+                </a:effectLst>
+                <a:latin typeface="DIN" panose="02000504040000020003" pitchFamily="2" charset="0"/>
+              </a:rPr>
+              <a:t>Retention</a:t>
+            </a:r>
+            <a:r>
+              <a:rPr lang="pl-PL" sz="6000" dirty="0">
+                <a:solidFill>
+                  <a:srgbClr val="344C69"/>
+                </a:solidFill>
+                <a:effectLst>
+                  <a:outerShdw blurRad="38100" dist="38100" dir="2700000" algn="tl">
+                    <a:srgbClr val="000000">
+                      <a:alpha val="43137"/>
+                    </a:srgbClr>
+                  </a:outerShdw>
+                </a:effectLst>
+                <a:latin typeface="DIN" panose="02000504040000020003" pitchFamily="2" charset="0"/>
+              </a:rPr>
+              <a:t> Analysis</a:t>
+            </a:r>
+          </a:p>
+        </p:txBody>
+      </p:sp>
+    </p:spTree>
+    <p:extLst>
+      <p:ext uri="{BB962C8B-B14F-4D97-AF65-F5344CB8AC3E}">
+        <p14:creationId xmlns:p14="http://schemas.microsoft.com/office/powerpoint/2010/main" val="1626471128"/>
+      </p:ext>
+    </p:extLst>
+  </p:cSld>
+  <p:clrMapOvr>
+    <a:masterClrMapping/>
+  </p:clrMapOvr>
+</p:sld>
+</file>
+
+<file path=ppt/slides/slide7.xml><?xml version="1.0" encoding="utf-8"?>
 <p:sld xmlns:a="http://schemas.openxmlformats.org/drawingml/2006/main" xmlns:r="http://schemas.openxmlformats.org/officeDocument/2006/relationships" xmlns:p="http://schemas.openxmlformats.org/presentationml/2006/main">
   <p:cSld>
     <p:spTree>

</xml_diff>

<commit_message>
Budowanie raportu - Retention - Analiza kohortowa i wskaźnik retencji na macierzy
</commit_message>
<xml_diff>
--- a/BrazilianECommerce/Background/Backgrounds.pptx
+++ b/BrazilianECommerce/Background/Backgrounds.pptx
@@ -249,7 +249,7 @@
           <a:p>
             <a:fld id="{B4AF9752-CF4F-4FCB-AD1E-762587F45785}" type="datetimeFigureOut">
               <a:rPr lang="pl-PL" smtClean="0"/>
-              <a:t>25.10.2024</a:t>
+              <a:t>02.11.2024</a:t>
             </a:fld>
             <a:endParaRPr lang="pl-PL"/>
           </a:p>
@@ -419,7 +419,7 @@
           <a:p>
             <a:fld id="{B4AF9752-CF4F-4FCB-AD1E-762587F45785}" type="datetimeFigureOut">
               <a:rPr lang="pl-PL" smtClean="0"/>
-              <a:t>25.10.2024</a:t>
+              <a:t>02.11.2024</a:t>
             </a:fld>
             <a:endParaRPr lang="pl-PL"/>
           </a:p>
@@ -599,7 +599,7 @@
           <a:p>
             <a:fld id="{B4AF9752-CF4F-4FCB-AD1E-762587F45785}" type="datetimeFigureOut">
               <a:rPr lang="pl-PL" smtClean="0"/>
-              <a:t>25.10.2024</a:t>
+              <a:t>02.11.2024</a:t>
             </a:fld>
             <a:endParaRPr lang="pl-PL"/>
           </a:p>
@@ -769,7 +769,7 @@
           <a:p>
             <a:fld id="{B4AF9752-CF4F-4FCB-AD1E-762587F45785}" type="datetimeFigureOut">
               <a:rPr lang="pl-PL" smtClean="0"/>
-              <a:t>25.10.2024</a:t>
+              <a:t>02.11.2024</a:t>
             </a:fld>
             <a:endParaRPr lang="pl-PL"/>
           </a:p>
@@ -1015,7 +1015,7 @@
           <a:p>
             <a:fld id="{B4AF9752-CF4F-4FCB-AD1E-762587F45785}" type="datetimeFigureOut">
               <a:rPr lang="pl-PL" smtClean="0"/>
-              <a:t>25.10.2024</a:t>
+              <a:t>02.11.2024</a:t>
             </a:fld>
             <a:endParaRPr lang="pl-PL"/>
           </a:p>
@@ -1247,7 +1247,7 @@
           <a:p>
             <a:fld id="{B4AF9752-CF4F-4FCB-AD1E-762587F45785}" type="datetimeFigureOut">
               <a:rPr lang="pl-PL" smtClean="0"/>
-              <a:t>25.10.2024</a:t>
+              <a:t>02.11.2024</a:t>
             </a:fld>
             <a:endParaRPr lang="pl-PL"/>
           </a:p>
@@ -1614,7 +1614,7 @@
           <a:p>
             <a:fld id="{B4AF9752-CF4F-4FCB-AD1E-762587F45785}" type="datetimeFigureOut">
               <a:rPr lang="pl-PL" smtClean="0"/>
-              <a:t>25.10.2024</a:t>
+              <a:t>02.11.2024</a:t>
             </a:fld>
             <a:endParaRPr lang="pl-PL"/>
           </a:p>
@@ -1732,7 +1732,7 @@
           <a:p>
             <a:fld id="{B4AF9752-CF4F-4FCB-AD1E-762587F45785}" type="datetimeFigureOut">
               <a:rPr lang="pl-PL" smtClean="0"/>
-              <a:t>25.10.2024</a:t>
+              <a:t>02.11.2024</a:t>
             </a:fld>
             <a:endParaRPr lang="pl-PL"/>
           </a:p>
@@ -1827,7 +1827,7 @@
           <a:p>
             <a:fld id="{B4AF9752-CF4F-4FCB-AD1E-762587F45785}" type="datetimeFigureOut">
               <a:rPr lang="pl-PL" smtClean="0"/>
-              <a:t>25.10.2024</a:t>
+              <a:t>02.11.2024</a:t>
             </a:fld>
             <a:endParaRPr lang="pl-PL"/>
           </a:p>
@@ -2104,7 +2104,7 @@
           <a:p>
             <a:fld id="{B4AF9752-CF4F-4FCB-AD1E-762587F45785}" type="datetimeFigureOut">
               <a:rPr lang="pl-PL" smtClean="0"/>
-              <a:t>25.10.2024</a:t>
+              <a:t>02.11.2024</a:t>
             </a:fld>
             <a:endParaRPr lang="pl-PL"/>
           </a:p>
@@ -2361,7 +2361,7 @@
           <a:p>
             <a:fld id="{B4AF9752-CF4F-4FCB-AD1E-762587F45785}" type="datetimeFigureOut">
               <a:rPr lang="pl-PL" smtClean="0"/>
-              <a:t>25.10.2024</a:t>
+              <a:t>02.11.2024</a:t>
             </a:fld>
             <a:endParaRPr lang="pl-PL"/>
           </a:p>
@@ -2574,7 +2574,7 @@
           <a:p>
             <a:fld id="{B4AF9752-CF4F-4FCB-AD1E-762587F45785}" type="datetimeFigureOut">
               <a:rPr lang="pl-PL" smtClean="0"/>
-              <a:t>25.10.2024</a:t>
+              <a:t>02.11.2024</a:t>
             </a:fld>
             <a:endParaRPr lang="pl-PL"/>
           </a:p>
@@ -11006,7 +11006,7 @@
           </p:grpSpPr>
           <p:sp>
             <p:nvSpPr>
-              <p:cNvPr id="44" name="3.2_Chart_BG">
+              <p:cNvPr id="44" name="3.2_Chart_BG" hidden="1">
                 <a:extLst>
                   <a:ext uri="{FF2B5EF4-FFF2-40B4-BE49-F238E27FC236}">
                     <a16:creationId xmlns:a16="http://schemas.microsoft.com/office/drawing/2014/main" id="{FB35D492-74F6-1167-AB44-0D0B2A794CB9}"/>
@@ -11071,71 +11071,6 @@
           </p:sp>
           <p:sp>
             <p:nvSpPr>
-              <p:cNvPr id="43" name="3.1_Chart_BG">
-                <a:extLst>
-                  <a:ext uri="{FF2B5EF4-FFF2-40B4-BE49-F238E27FC236}">
-                    <a16:creationId xmlns:a16="http://schemas.microsoft.com/office/drawing/2014/main" id="{983D6567-0339-D205-8CCC-3AFF6D8D0AC1}"/>
-                  </a:ext>
-                </a:extLst>
-              </p:cNvPr>
-              <p:cNvSpPr>
-                <a:spLocks/>
-              </p:cNvSpPr>
-              <p:nvPr/>
-            </p:nvSpPr>
-            <p:spPr>
-              <a:xfrm>
-                <a:off x="1828800" y="8953500"/>
-                <a:ext cx="10744200" cy="4152900"/>
-              </a:xfrm>
-              <a:prstGeom prst="rect">
-                <a:avLst/>
-              </a:prstGeom>
-              <a:solidFill>
-                <a:schemeClr val="bg1"/>
-              </a:solidFill>
-              <a:ln w="3175">
-                <a:solidFill>
-                  <a:srgbClr val="B1B8C5"/>
-                </a:solidFill>
-              </a:ln>
-              <a:effectLst>
-                <a:outerShdw blurRad="203200" dist="63500" dir="2700000" algn="tl" rotWithShape="0">
-                  <a:prstClr val="black">
-                    <a:alpha val="5000"/>
-                  </a:prstClr>
-                </a:outerShdw>
-              </a:effectLst>
-            </p:spPr>
-            <p:style>
-              <a:lnRef idx="2">
-                <a:schemeClr val="accent1">
-                  <a:shade val="15000"/>
-                </a:schemeClr>
-              </a:lnRef>
-              <a:fillRef idx="1">
-                <a:schemeClr val="accent1"/>
-              </a:fillRef>
-              <a:effectRef idx="0">
-                <a:schemeClr val="accent1"/>
-              </a:effectRef>
-              <a:fontRef idx="minor">
-                <a:schemeClr val="lt1"/>
-              </a:fontRef>
-            </p:style>
-            <p:txBody>
-              <a:bodyPr rtlCol="0" anchor="ctr"/>
-              <a:lstStyle/>
-              <a:p>
-                <a:pPr algn="ctr"/>
-                <a:endParaRPr lang="pl-PL">
-                  <a:latin typeface="Din" panose="02000504040000020003" pitchFamily="2" charset="0"/>
-                </a:endParaRPr>
-              </a:p>
-            </p:txBody>
-          </p:sp>
-          <p:sp>
-            <p:nvSpPr>
               <p:cNvPr id="42" name="2.2_Chart_BG">
                 <a:extLst>
                   <a:ext uri="{FF2B5EF4-FFF2-40B4-BE49-F238E27FC236}">
@@ -11151,72 +11086,7 @@
             <p:spPr>
               <a:xfrm>
                 <a:off x="13030200" y="1581150"/>
-                <a:ext cx="10744200" cy="5524500"/>
-              </a:xfrm>
-              <a:prstGeom prst="rect">
-                <a:avLst/>
-              </a:prstGeom>
-              <a:solidFill>
-                <a:schemeClr val="bg1"/>
-              </a:solidFill>
-              <a:ln w="3175">
-                <a:solidFill>
-                  <a:srgbClr val="B1B8C5"/>
-                </a:solidFill>
-              </a:ln>
-              <a:effectLst>
-                <a:outerShdw blurRad="203200" dist="63500" dir="2700000" algn="tl" rotWithShape="0">
-                  <a:prstClr val="black">
-                    <a:alpha val="5000"/>
-                  </a:prstClr>
-                </a:outerShdw>
-              </a:effectLst>
-            </p:spPr>
-            <p:style>
-              <a:lnRef idx="2">
-                <a:schemeClr val="accent1">
-                  <a:shade val="15000"/>
-                </a:schemeClr>
-              </a:lnRef>
-              <a:fillRef idx="1">
-                <a:schemeClr val="accent1"/>
-              </a:fillRef>
-              <a:effectRef idx="0">
-                <a:schemeClr val="accent1"/>
-              </a:effectRef>
-              <a:fontRef idx="minor">
-                <a:schemeClr val="lt1"/>
-              </a:fontRef>
-            </p:style>
-            <p:txBody>
-              <a:bodyPr rtlCol="0" anchor="ctr"/>
-              <a:lstStyle/>
-              <a:p>
-                <a:pPr algn="ctr"/>
-                <a:endParaRPr lang="pl-PL">
-                  <a:latin typeface="Din" panose="02000504040000020003" pitchFamily="2" charset="0"/>
-                </a:endParaRPr>
-              </a:p>
-            </p:txBody>
-          </p:sp>
-          <p:sp>
-            <p:nvSpPr>
-              <p:cNvPr id="41" name="2.1_Chart_BG">
-                <a:extLst>
-                  <a:ext uri="{FF2B5EF4-FFF2-40B4-BE49-F238E27FC236}">
-                    <a16:creationId xmlns:a16="http://schemas.microsoft.com/office/drawing/2014/main" id="{93046E24-79A1-E992-5964-9F00E433B134}"/>
-                  </a:ext>
-                </a:extLst>
-              </p:cNvPr>
-              <p:cNvSpPr>
-                <a:spLocks/>
-              </p:cNvSpPr>
-              <p:nvPr/>
-            </p:nvSpPr>
-            <p:spPr>
-              <a:xfrm>
-                <a:off x="1828800" y="4343400"/>
-                <a:ext cx="10744200" cy="4152900"/>
+                <a:ext cx="10744200" cy="11506200"/>
               </a:xfrm>
               <a:prstGeom prst="rect">
                 <a:avLst/>
@@ -11281,7 +11151,7 @@
             <p:spPr>
               <a:xfrm>
                 <a:off x="1828800" y="1581150"/>
-                <a:ext cx="10744200" cy="2305050"/>
+                <a:ext cx="10744200" cy="11506200"/>
               </a:xfrm>
               <a:prstGeom prst="rect">
                 <a:avLst/>
@@ -12186,6 +12056,38 @@
           </a:bodyPr>
           <a:lstStyle/>
           <a:p>
+            <a:r>
+              <a:rPr lang="pl-PL" sz="6000" dirty="0" err="1">
+                <a:solidFill>
+                  <a:srgbClr val="344C69"/>
+                </a:solidFill>
+                <a:effectLst>
+                  <a:outerShdw blurRad="38100" dist="38100" dir="2700000" algn="tl">
+                    <a:srgbClr val="000000">
+                      <a:alpha val="43137"/>
+                    </a:srgbClr>
+                  </a:outerShdw>
+                </a:effectLst>
+                <a:latin typeface="DIN" panose="02000504040000020003" pitchFamily="2" charset="0"/>
+              </a:rPr>
+              <a:t>Customer</a:t>
+            </a:r>
+            <a:r>
+              <a:rPr lang="pl-PL" sz="6000" dirty="0">
+                <a:solidFill>
+                  <a:srgbClr val="344C69"/>
+                </a:solidFill>
+                <a:effectLst>
+                  <a:outerShdw blurRad="38100" dist="38100" dir="2700000" algn="tl">
+                    <a:srgbClr val="000000">
+                      <a:alpha val="43137"/>
+                    </a:srgbClr>
+                  </a:outerShdw>
+                </a:effectLst>
+                <a:latin typeface="DIN" panose="02000504040000020003" pitchFamily="2" charset="0"/>
+              </a:rPr>
+              <a:t> </a:t>
+            </a:r>
             <a:r>
               <a:rPr lang="pl-PL" sz="6000" dirty="0" err="1">
                 <a:solidFill>

</xml_diff>

<commit_message>
Budowanie raportu - Overview - Kluczowe wizualizacje
</commit_message>
<xml_diff>
--- a/BrazilianECommerce/Background/Backgrounds.pptx
+++ b/BrazilianECommerce/Background/Backgrounds.pptx
@@ -6,12 +6,13 @@
   </p:sldMasterIdLst>
   <p:sldIdLst>
     <p:sldId id="256" r:id="rId2"/>
-    <p:sldId id="260" r:id="rId3"/>
-    <p:sldId id="261" r:id="rId4"/>
-    <p:sldId id="263" r:id="rId5"/>
-    <p:sldId id="264" r:id="rId6"/>
-    <p:sldId id="265" r:id="rId7"/>
-    <p:sldId id="259" r:id="rId8"/>
+    <p:sldId id="266" r:id="rId3"/>
+    <p:sldId id="260" r:id="rId4"/>
+    <p:sldId id="261" r:id="rId5"/>
+    <p:sldId id="263" r:id="rId6"/>
+    <p:sldId id="264" r:id="rId7"/>
+    <p:sldId id="265" r:id="rId8"/>
+    <p:sldId id="259" r:id="rId9"/>
   </p:sldIdLst>
   <p:sldSz cx="24384000" cy="13716000"/>
   <p:notesSz cx="6858000" cy="9144000"/>
@@ -249,7 +250,7 @@
           <a:p>
             <a:fld id="{B4AF9752-CF4F-4FCB-AD1E-762587F45785}" type="datetimeFigureOut">
               <a:rPr lang="pl-PL" smtClean="0"/>
-              <a:t>02.11.2024</a:t>
+              <a:t>03.12.2024</a:t>
             </a:fld>
             <a:endParaRPr lang="pl-PL"/>
           </a:p>
@@ -419,7 +420,7 @@
           <a:p>
             <a:fld id="{B4AF9752-CF4F-4FCB-AD1E-762587F45785}" type="datetimeFigureOut">
               <a:rPr lang="pl-PL" smtClean="0"/>
-              <a:t>02.11.2024</a:t>
+              <a:t>03.12.2024</a:t>
             </a:fld>
             <a:endParaRPr lang="pl-PL"/>
           </a:p>
@@ -599,7 +600,7 @@
           <a:p>
             <a:fld id="{B4AF9752-CF4F-4FCB-AD1E-762587F45785}" type="datetimeFigureOut">
               <a:rPr lang="pl-PL" smtClean="0"/>
-              <a:t>02.11.2024</a:t>
+              <a:t>03.12.2024</a:t>
             </a:fld>
             <a:endParaRPr lang="pl-PL"/>
           </a:p>
@@ -769,7 +770,7 @@
           <a:p>
             <a:fld id="{B4AF9752-CF4F-4FCB-AD1E-762587F45785}" type="datetimeFigureOut">
               <a:rPr lang="pl-PL" smtClean="0"/>
-              <a:t>02.11.2024</a:t>
+              <a:t>03.12.2024</a:t>
             </a:fld>
             <a:endParaRPr lang="pl-PL"/>
           </a:p>
@@ -1015,7 +1016,7 @@
           <a:p>
             <a:fld id="{B4AF9752-CF4F-4FCB-AD1E-762587F45785}" type="datetimeFigureOut">
               <a:rPr lang="pl-PL" smtClean="0"/>
-              <a:t>02.11.2024</a:t>
+              <a:t>03.12.2024</a:t>
             </a:fld>
             <a:endParaRPr lang="pl-PL"/>
           </a:p>
@@ -1247,7 +1248,7 @@
           <a:p>
             <a:fld id="{B4AF9752-CF4F-4FCB-AD1E-762587F45785}" type="datetimeFigureOut">
               <a:rPr lang="pl-PL" smtClean="0"/>
-              <a:t>02.11.2024</a:t>
+              <a:t>03.12.2024</a:t>
             </a:fld>
             <a:endParaRPr lang="pl-PL"/>
           </a:p>
@@ -1614,7 +1615,7 @@
           <a:p>
             <a:fld id="{B4AF9752-CF4F-4FCB-AD1E-762587F45785}" type="datetimeFigureOut">
               <a:rPr lang="pl-PL" smtClean="0"/>
-              <a:t>02.11.2024</a:t>
+              <a:t>03.12.2024</a:t>
             </a:fld>
             <a:endParaRPr lang="pl-PL"/>
           </a:p>
@@ -1732,7 +1733,7 @@
           <a:p>
             <a:fld id="{B4AF9752-CF4F-4FCB-AD1E-762587F45785}" type="datetimeFigureOut">
               <a:rPr lang="pl-PL" smtClean="0"/>
-              <a:t>02.11.2024</a:t>
+              <a:t>03.12.2024</a:t>
             </a:fld>
             <a:endParaRPr lang="pl-PL"/>
           </a:p>
@@ -1827,7 +1828,7 @@
           <a:p>
             <a:fld id="{B4AF9752-CF4F-4FCB-AD1E-762587F45785}" type="datetimeFigureOut">
               <a:rPr lang="pl-PL" smtClean="0"/>
-              <a:t>02.11.2024</a:t>
+              <a:t>03.12.2024</a:t>
             </a:fld>
             <a:endParaRPr lang="pl-PL"/>
           </a:p>
@@ -2104,7 +2105,7 @@
           <a:p>
             <a:fld id="{B4AF9752-CF4F-4FCB-AD1E-762587F45785}" type="datetimeFigureOut">
               <a:rPr lang="pl-PL" smtClean="0"/>
-              <a:t>02.11.2024</a:t>
+              <a:t>03.12.2024</a:t>
             </a:fld>
             <a:endParaRPr lang="pl-PL"/>
           </a:p>
@@ -2361,7 +2362,7 @@
           <a:p>
             <a:fld id="{B4AF9752-CF4F-4FCB-AD1E-762587F45785}" type="datetimeFigureOut">
               <a:rPr lang="pl-PL" smtClean="0"/>
-              <a:t>02.11.2024</a:t>
+              <a:t>03.12.2024</a:t>
             </a:fld>
             <a:endParaRPr lang="pl-PL"/>
           </a:p>
@@ -2574,7 +2575,7 @@
           <a:p>
             <a:fld id="{B4AF9752-CF4F-4FCB-AD1E-762587F45785}" type="datetimeFigureOut">
               <a:rPr lang="pl-PL" smtClean="0"/>
-              <a:t>02.11.2024</a:t>
+              <a:t>03.12.2024</a:t>
             </a:fld>
             <a:endParaRPr lang="pl-PL"/>
           </a:p>
@@ -4379,6 +4380,1435 @@
   <p:cSld>
     <p:spTree>
       <p:nvGrpSpPr>
+        <p:cNvPr id="1" name="">
+          <a:extLst>
+            <a:ext uri="{FF2B5EF4-FFF2-40B4-BE49-F238E27FC236}">
+              <a16:creationId xmlns:a16="http://schemas.microsoft.com/office/drawing/2014/main" id="{CF504F65-4EBE-ADB2-4090-274D90798A87}"/>
+            </a:ext>
+          </a:extLst>
+        </p:cNvPr>
+        <p:cNvGrpSpPr/>
+        <p:nvPr/>
+      </p:nvGrpSpPr>
+      <p:grpSpPr>
+        <a:xfrm>
+          <a:off x="0" y="0"/>
+          <a:ext cx="0" cy="0"/>
+          <a:chOff x="0" y="0"/>
+          <a:chExt cx="0" cy="0"/>
+        </a:xfrm>
+      </p:grpSpPr>
+      <p:grpSp>
+        <p:nvGrpSpPr>
+          <p:cNvPr id="6" name="Backgrounds">
+            <a:extLst>
+              <a:ext uri="{FF2B5EF4-FFF2-40B4-BE49-F238E27FC236}">
+                <a16:creationId xmlns:a16="http://schemas.microsoft.com/office/drawing/2014/main" id="{C66ABF36-DB6F-1033-0258-D4CBDA58E04B}"/>
+              </a:ext>
+            </a:extLst>
+          </p:cNvPr>
+          <p:cNvGrpSpPr/>
+          <p:nvPr/>
+        </p:nvGrpSpPr>
+        <p:grpSpPr>
+          <a:xfrm>
+            <a:off x="0" y="0"/>
+            <a:ext cx="24384000" cy="13716000"/>
+            <a:chOff x="0" y="0"/>
+            <a:chExt cx="24384000" cy="13716000"/>
+          </a:xfrm>
+        </p:grpSpPr>
+        <p:sp>
+          <p:nvSpPr>
+            <p:cNvPr id="8" name="Canvas_BG">
+              <a:extLst>
+                <a:ext uri="{FF2B5EF4-FFF2-40B4-BE49-F238E27FC236}">
+                  <a16:creationId xmlns:a16="http://schemas.microsoft.com/office/drawing/2014/main" id="{86C56ECB-F574-AC43-7810-BEE997148820}"/>
+                </a:ext>
+              </a:extLst>
+            </p:cNvPr>
+            <p:cNvSpPr>
+              <a:spLocks/>
+            </p:cNvSpPr>
+            <p:nvPr/>
+          </p:nvSpPr>
+          <p:spPr>
+            <a:xfrm>
+              <a:off x="1219200" y="0"/>
+              <a:ext cx="23164800" cy="13716000"/>
+            </a:xfrm>
+            <a:prstGeom prst="rect">
+              <a:avLst/>
+            </a:prstGeom>
+            <a:solidFill>
+              <a:srgbClr val="FBFBFB"/>
+            </a:solidFill>
+            <a:ln>
+              <a:noFill/>
+            </a:ln>
+          </p:spPr>
+          <p:style>
+            <a:lnRef idx="2">
+              <a:schemeClr val="accent1">
+                <a:shade val="15000"/>
+              </a:schemeClr>
+            </a:lnRef>
+            <a:fillRef idx="1">
+              <a:schemeClr val="accent1"/>
+            </a:fillRef>
+            <a:effectRef idx="0">
+              <a:schemeClr val="accent1"/>
+            </a:effectRef>
+            <a:fontRef idx="minor">
+              <a:schemeClr val="lt1"/>
+            </a:fontRef>
+          </p:style>
+          <p:txBody>
+            <a:bodyPr rtlCol="0" anchor="ctr"/>
+            <a:lstStyle/>
+            <a:p>
+              <a:pPr algn="ctr"/>
+              <a:endParaRPr lang="pl-PL" dirty="0">
+                <a:latin typeface="Din" panose="02000504040000020003" pitchFamily="2" charset="0"/>
+              </a:endParaRPr>
+            </a:p>
+          </p:txBody>
+        </p:sp>
+        <p:sp>
+          <p:nvSpPr>
+            <p:cNvPr id="7" name="Navigation_BG">
+              <a:extLst>
+                <a:ext uri="{FF2B5EF4-FFF2-40B4-BE49-F238E27FC236}">
+                  <a16:creationId xmlns:a16="http://schemas.microsoft.com/office/drawing/2014/main" id="{95CF7B99-E37C-9A0B-D328-90EDFACDE9C2}"/>
+                </a:ext>
+              </a:extLst>
+            </p:cNvPr>
+            <p:cNvSpPr>
+              <a:spLocks/>
+            </p:cNvSpPr>
+            <p:nvPr/>
+          </p:nvSpPr>
+          <p:spPr>
+            <a:xfrm>
+              <a:off x="0" y="0"/>
+              <a:ext cx="1219200" cy="13716000"/>
+            </a:xfrm>
+            <a:prstGeom prst="rect">
+              <a:avLst/>
+            </a:prstGeom>
+            <a:gradFill flip="none" rotWithShape="1">
+              <a:gsLst>
+                <a:gs pos="0">
+                  <a:srgbClr val="375881"/>
+                </a:gs>
+                <a:gs pos="23000">
+                  <a:srgbClr val="314E72"/>
+                </a:gs>
+                <a:gs pos="69000">
+                  <a:srgbClr val="2B4564"/>
+                </a:gs>
+                <a:gs pos="97000">
+                  <a:srgbClr val="233851"/>
+                </a:gs>
+              </a:gsLst>
+              <a:path path="circle">
+                <a:fillToRect l="50000" t="50000" r="50000" b="50000"/>
+              </a:path>
+              <a:tileRect/>
+            </a:gradFill>
+            <a:ln>
+              <a:noFill/>
+            </a:ln>
+          </p:spPr>
+          <p:style>
+            <a:lnRef idx="2">
+              <a:schemeClr val="accent1">
+                <a:shade val="15000"/>
+              </a:schemeClr>
+            </a:lnRef>
+            <a:fillRef idx="1">
+              <a:schemeClr val="accent1"/>
+            </a:fillRef>
+            <a:effectRef idx="0">
+              <a:schemeClr val="accent1"/>
+            </a:effectRef>
+            <a:fontRef idx="minor">
+              <a:schemeClr val="lt1"/>
+            </a:fontRef>
+          </p:style>
+          <p:txBody>
+            <a:bodyPr rtlCol="0" anchor="ctr"/>
+            <a:lstStyle/>
+            <a:p>
+              <a:pPr algn="ctr"/>
+              <a:endParaRPr lang="pl-PL"/>
+            </a:p>
+          </p:txBody>
+        </p:sp>
+        <p:grpSp>
+          <p:nvGrpSpPr>
+            <p:cNvPr id="45" name="Chart_Backgrounds">
+              <a:extLst>
+                <a:ext uri="{FF2B5EF4-FFF2-40B4-BE49-F238E27FC236}">
+                  <a16:creationId xmlns:a16="http://schemas.microsoft.com/office/drawing/2014/main" id="{BBD6B574-844F-AF65-58AB-02A903FA36E5}"/>
+                </a:ext>
+              </a:extLst>
+            </p:cNvPr>
+            <p:cNvGrpSpPr>
+              <a:grpSpLocks/>
+            </p:cNvGrpSpPr>
+            <p:nvPr/>
+          </p:nvGrpSpPr>
+          <p:grpSpPr>
+            <a:xfrm>
+              <a:off x="1828800" y="1581150"/>
+              <a:ext cx="21945600" cy="11525250"/>
+              <a:chOff x="1828800" y="1581150"/>
+              <a:chExt cx="21945600" cy="11525250"/>
+            </a:xfrm>
+          </p:grpSpPr>
+          <p:sp>
+            <p:nvSpPr>
+              <p:cNvPr id="44" name="3.2_Chart_BG">
+                <a:extLst>
+                  <a:ext uri="{FF2B5EF4-FFF2-40B4-BE49-F238E27FC236}">
+                    <a16:creationId xmlns:a16="http://schemas.microsoft.com/office/drawing/2014/main" id="{36EDC927-563E-4D7E-4018-62CB6931D068}"/>
+                  </a:ext>
+                </a:extLst>
+              </p:cNvPr>
+              <p:cNvSpPr>
+                <a:spLocks/>
+              </p:cNvSpPr>
+              <p:nvPr/>
+            </p:nvSpPr>
+            <p:spPr>
+              <a:xfrm>
+                <a:off x="13030200" y="8953500"/>
+                <a:ext cx="10744200" cy="4152900"/>
+              </a:xfrm>
+              <a:prstGeom prst="rect">
+                <a:avLst/>
+              </a:prstGeom>
+              <a:solidFill>
+                <a:schemeClr val="bg1"/>
+              </a:solidFill>
+              <a:ln w="3175">
+                <a:solidFill>
+                  <a:srgbClr val="B1B8C5"/>
+                </a:solidFill>
+              </a:ln>
+              <a:effectLst>
+                <a:outerShdw blurRad="203200" dist="63500" dir="2700000" algn="tl" rotWithShape="0">
+                  <a:prstClr val="black">
+                    <a:alpha val="5000"/>
+                  </a:prstClr>
+                </a:outerShdw>
+              </a:effectLst>
+            </p:spPr>
+            <p:style>
+              <a:lnRef idx="2">
+                <a:schemeClr val="accent1">
+                  <a:shade val="15000"/>
+                </a:schemeClr>
+              </a:lnRef>
+              <a:fillRef idx="1">
+                <a:schemeClr val="accent1"/>
+              </a:fillRef>
+              <a:effectRef idx="0">
+                <a:schemeClr val="accent1"/>
+              </a:effectRef>
+              <a:fontRef idx="minor">
+                <a:schemeClr val="lt1"/>
+              </a:fontRef>
+            </p:style>
+            <p:txBody>
+              <a:bodyPr rtlCol="0" anchor="ctr"/>
+              <a:lstStyle/>
+              <a:p>
+                <a:pPr algn="ctr"/>
+                <a:endParaRPr lang="pl-PL">
+                  <a:latin typeface="Din" panose="02000504040000020003" pitchFamily="2" charset="0"/>
+                </a:endParaRPr>
+              </a:p>
+            </p:txBody>
+          </p:sp>
+          <p:sp>
+            <p:nvSpPr>
+              <p:cNvPr id="43" name="3.1_Chart_BG">
+                <a:extLst>
+                  <a:ext uri="{FF2B5EF4-FFF2-40B4-BE49-F238E27FC236}">
+                    <a16:creationId xmlns:a16="http://schemas.microsoft.com/office/drawing/2014/main" id="{57661F78-F195-5668-6521-15A2E3DA4925}"/>
+                  </a:ext>
+                </a:extLst>
+              </p:cNvPr>
+              <p:cNvSpPr>
+                <a:spLocks/>
+              </p:cNvSpPr>
+              <p:nvPr/>
+            </p:nvSpPr>
+            <p:spPr>
+              <a:xfrm>
+                <a:off x="1828800" y="8953500"/>
+                <a:ext cx="10744200" cy="4152900"/>
+              </a:xfrm>
+              <a:prstGeom prst="rect">
+                <a:avLst/>
+              </a:prstGeom>
+              <a:solidFill>
+                <a:schemeClr val="bg1"/>
+              </a:solidFill>
+              <a:ln w="3175">
+                <a:solidFill>
+                  <a:srgbClr val="B1B8C5"/>
+                </a:solidFill>
+              </a:ln>
+              <a:effectLst>
+                <a:outerShdw blurRad="203200" dist="63500" dir="2700000" algn="tl" rotWithShape="0">
+                  <a:prstClr val="black">
+                    <a:alpha val="5000"/>
+                  </a:prstClr>
+                </a:outerShdw>
+              </a:effectLst>
+            </p:spPr>
+            <p:style>
+              <a:lnRef idx="2">
+                <a:schemeClr val="accent1">
+                  <a:shade val="15000"/>
+                </a:schemeClr>
+              </a:lnRef>
+              <a:fillRef idx="1">
+                <a:schemeClr val="accent1"/>
+              </a:fillRef>
+              <a:effectRef idx="0">
+                <a:schemeClr val="accent1"/>
+              </a:effectRef>
+              <a:fontRef idx="minor">
+                <a:schemeClr val="lt1"/>
+              </a:fontRef>
+            </p:style>
+            <p:txBody>
+              <a:bodyPr rtlCol="0" anchor="ctr"/>
+              <a:lstStyle/>
+              <a:p>
+                <a:pPr algn="ctr"/>
+                <a:endParaRPr lang="pl-PL">
+                  <a:latin typeface="Din" panose="02000504040000020003" pitchFamily="2" charset="0"/>
+                </a:endParaRPr>
+              </a:p>
+            </p:txBody>
+          </p:sp>
+          <p:sp>
+            <p:nvSpPr>
+              <p:cNvPr id="42" name="2.2_Chart_BG">
+                <a:extLst>
+                  <a:ext uri="{FF2B5EF4-FFF2-40B4-BE49-F238E27FC236}">
+                    <a16:creationId xmlns:a16="http://schemas.microsoft.com/office/drawing/2014/main" id="{48822661-A1A9-8E0E-734D-84E87D7271E6}"/>
+                  </a:ext>
+                </a:extLst>
+              </p:cNvPr>
+              <p:cNvSpPr>
+                <a:spLocks/>
+              </p:cNvSpPr>
+              <p:nvPr/>
+            </p:nvSpPr>
+            <p:spPr>
+              <a:xfrm>
+                <a:off x="13030200" y="4343400"/>
+                <a:ext cx="10744200" cy="4152900"/>
+              </a:xfrm>
+              <a:prstGeom prst="rect">
+                <a:avLst/>
+              </a:prstGeom>
+              <a:solidFill>
+                <a:schemeClr val="bg1"/>
+              </a:solidFill>
+              <a:ln w="3175">
+                <a:solidFill>
+                  <a:srgbClr val="B1B8C5"/>
+                </a:solidFill>
+              </a:ln>
+              <a:effectLst>
+                <a:outerShdw blurRad="203200" dist="63500" dir="2700000" algn="tl" rotWithShape="0">
+                  <a:prstClr val="black">
+                    <a:alpha val="5000"/>
+                  </a:prstClr>
+                </a:outerShdw>
+              </a:effectLst>
+            </p:spPr>
+            <p:style>
+              <a:lnRef idx="2">
+                <a:schemeClr val="accent1">
+                  <a:shade val="15000"/>
+                </a:schemeClr>
+              </a:lnRef>
+              <a:fillRef idx="1">
+                <a:schemeClr val="accent1"/>
+              </a:fillRef>
+              <a:effectRef idx="0">
+                <a:schemeClr val="accent1"/>
+              </a:effectRef>
+              <a:fontRef idx="minor">
+                <a:schemeClr val="lt1"/>
+              </a:fontRef>
+            </p:style>
+            <p:txBody>
+              <a:bodyPr rtlCol="0" anchor="ctr"/>
+              <a:lstStyle/>
+              <a:p>
+                <a:pPr algn="ctr"/>
+                <a:endParaRPr lang="pl-PL">
+                  <a:latin typeface="Din" panose="02000504040000020003" pitchFamily="2" charset="0"/>
+                </a:endParaRPr>
+              </a:p>
+            </p:txBody>
+          </p:sp>
+          <p:sp>
+            <p:nvSpPr>
+              <p:cNvPr id="41" name="2.1_Chart_BG">
+                <a:extLst>
+                  <a:ext uri="{FF2B5EF4-FFF2-40B4-BE49-F238E27FC236}">
+                    <a16:creationId xmlns:a16="http://schemas.microsoft.com/office/drawing/2014/main" id="{33FC52CD-7441-DB5B-D325-E6647B7F307B}"/>
+                  </a:ext>
+                </a:extLst>
+              </p:cNvPr>
+              <p:cNvSpPr>
+                <a:spLocks/>
+              </p:cNvSpPr>
+              <p:nvPr/>
+            </p:nvSpPr>
+            <p:spPr>
+              <a:xfrm>
+                <a:off x="1828800" y="4343400"/>
+                <a:ext cx="10744200" cy="4152900"/>
+              </a:xfrm>
+              <a:prstGeom prst="rect">
+                <a:avLst/>
+              </a:prstGeom>
+              <a:solidFill>
+                <a:schemeClr val="bg1"/>
+              </a:solidFill>
+              <a:ln w="3175">
+                <a:solidFill>
+                  <a:srgbClr val="B1B8C5"/>
+                </a:solidFill>
+              </a:ln>
+              <a:effectLst>
+                <a:outerShdw blurRad="203200" dist="63500" dir="2700000" algn="tl" rotWithShape="0">
+                  <a:prstClr val="black">
+                    <a:alpha val="5000"/>
+                  </a:prstClr>
+                </a:outerShdw>
+              </a:effectLst>
+            </p:spPr>
+            <p:style>
+              <a:lnRef idx="2">
+                <a:schemeClr val="accent1">
+                  <a:shade val="15000"/>
+                </a:schemeClr>
+              </a:lnRef>
+              <a:fillRef idx="1">
+                <a:schemeClr val="accent1"/>
+              </a:fillRef>
+              <a:effectRef idx="0">
+                <a:schemeClr val="accent1"/>
+              </a:effectRef>
+              <a:fontRef idx="minor">
+                <a:schemeClr val="lt1"/>
+              </a:fontRef>
+            </p:style>
+            <p:txBody>
+              <a:bodyPr rtlCol="0" anchor="ctr"/>
+              <a:lstStyle/>
+              <a:p>
+                <a:pPr algn="ctr"/>
+                <a:endParaRPr lang="pl-PL">
+                  <a:latin typeface="Din" panose="02000504040000020003" pitchFamily="2" charset="0"/>
+                </a:endParaRPr>
+              </a:p>
+            </p:txBody>
+          </p:sp>
+          <p:sp>
+            <p:nvSpPr>
+              <p:cNvPr id="39" name="1_Chart_BG">
+                <a:extLst>
+                  <a:ext uri="{FF2B5EF4-FFF2-40B4-BE49-F238E27FC236}">
+                    <a16:creationId xmlns:a16="http://schemas.microsoft.com/office/drawing/2014/main" id="{1792406A-5EE7-CEA5-DB6A-8179BB0EE959}"/>
+                  </a:ext>
+                </a:extLst>
+              </p:cNvPr>
+              <p:cNvSpPr>
+                <a:spLocks/>
+              </p:cNvSpPr>
+              <p:nvPr/>
+            </p:nvSpPr>
+            <p:spPr>
+              <a:xfrm>
+                <a:off x="1828800" y="1581150"/>
+                <a:ext cx="21945600" cy="2305050"/>
+              </a:xfrm>
+              <a:prstGeom prst="rect">
+                <a:avLst/>
+              </a:prstGeom>
+              <a:solidFill>
+                <a:schemeClr val="bg1"/>
+              </a:solidFill>
+              <a:ln w="3175">
+                <a:solidFill>
+                  <a:srgbClr val="B1B8C5"/>
+                </a:solidFill>
+              </a:ln>
+              <a:effectLst>
+                <a:outerShdw blurRad="203200" dist="63500" dir="2700000" algn="tl" rotWithShape="0">
+                  <a:prstClr val="black">
+                    <a:alpha val="5000"/>
+                  </a:prstClr>
+                </a:outerShdw>
+              </a:effectLst>
+            </p:spPr>
+            <p:style>
+              <a:lnRef idx="2">
+                <a:schemeClr val="accent1">
+                  <a:shade val="15000"/>
+                </a:schemeClr>
+              </a:lnRef>
+              <a:fillRef idx="1">
+                <a:schemeClr val="accent1"/>
+              </a:fillRef>
+              <a:effectRef idx="0">
+                <a:schemeClr val="accent1"/>
+              </a:effectRef>
+              <a:fontRef idx="minor">
+                <a:schemeClr val="lt1"/>
+              </a:fontRef>
+            </p:style>
+            <p:txBody>
+              <a:bodyPr rtlCol="0" anchor="ctr"/>
+              <a:lstStyle/>
+              <a:p>
+                <a:pPr algn="ctr"/>
+                <a:endParaRPr lang="pl-PL">
+                  <a:latin typeface="Din" panose="02000504040000020003" pitchFamily="2" charset="0"/>
+                </a:endParaRPr>
+              </a:p>
+            </p:txBody>
+          </p:sp>
+        </p:grpSp>
+      </p:grpSp>
+      <p:grpSp>
+        <p:nvGrpSpPr>
+          <p:cNvPr id="18" name="Navigation_Icons">
+            <a:extLst>
+              <a:ext uri="{FF2B5EF4-FFF2-40B4-BE49-F238E27FC236}">
+                <a16:creationId xmlns:a16="http://schemas.microsoft.com/office/drawing/2014/main" id="{31DF4991-DC6F-EBD1-E650-A8D17A55670B}"/>
+              </a:ext>
+            </a:extLst>
+          </p:cNvPr>
+          <p:cNvGrpSpPr/>
+          <p:nvPr/>
+        </p:nvGrpSpPr>
+        <p:grpSpPr>
+          <a:xfrm>
+            <a:off x="266700" y="7696194"/>
+            <a:ext cx="685800" cy="5410206"/>
+            <a:chOff x="266700" y="7696194"/>
+            <a:chExt cx="685800" cy="5410206"/>
+          </a:xfrm>
+        </p:grpSpPr>
+        <p:pic>
+          <p:nvPicPr>
+            <p:cNvPr id="19" name="Customer" descr="A white person with black background&#10;&#10;Description automatically generated" hidden="1">
+              <a:extLst>
+                <a:ext uri="{FF2B5EF4-FFF2-40B4-BE49-F238E27FC236}">
+                  <a16:creationId xmlns:a16="http://schemas.microsoft.com/office/drawing/2014/main" id="{AED5023E-E6D6-BBA7-3308-1A57CDE19559}"/>
+                </a:ext>
+              </a:extLst>
+            </p:cNvPr>
+            <p:cNvPicPr>
+              <a:picLocks noChangeAspect="1"/>
+            </p:cNvPicPr>
+            <p:nvPr/>
+          </p:nvPicPr>
+          <p:blipFill>
+            <a:blip r:embed="rId2">
+              <a:extLst>
+                <a:ext uri="{28A0092B-C50C-407E-A947-70E740481C1C}">
+                  <a14:useLocalDpi xmlns:a14="http://schemas.microsoft.com/office/drawing/2010/main" val="0"/>
+                </a:ext>
+              </a:extLst>
+            </a:blip>
+            <a:stretch>
+              <a:fillRect/>
+            </a:stretch>
+          </p:blipFill>
+          <p:spPr>
+            <a:xfrm>
+              <a:off x="266700" y="11488391"/>
+              <a:ext cx="685800" cy="677537"/>
+            </a:xfrm>
+            <a:prstGeom prst="rect">
+              <a:avLst/>
+            </a:prstGeom>
+          </p:spPr>
+        </p:pic>
+        <p:pic>
+          <p:nvPicPr>
+            <p:cNvPr id="31" name="Retention" hidden="1">
+              <a:extLst>
+                <a:ext uri="{FF2B5EF4-FFF2-40B4-BE49-F238E27FC236}">
+                  <a16:creationId xmlns:a16="http://schemas.microsoft.com/office/drawing/2014/main" id="{F4DEEEF5-B95C-8105-3155-F5279A1350FA}"/>
+                </a:ext>
+              </a:extLst>
+            </p:cNvPr>
+            <p:cNvPicPr>
+              <a:picLocks noChangeAspect="1"/>
+            </p:cNvPicPr>
+            <p:nvPr/>
+          </p:nvPicPr>
+          <p:blipFill>
+            <a:blip r:embed="rId3">
+              <a:extLst>
+                <a:ext uri="{28A0092B-C50C-407E-A947-70E740481C1C}">
+                  <a14:useLocalDpi xmlns:a14="http://schemas.microsoft.com/office/drawing/2010/main" val="0"/>
+                </a:ext>
+              </a:extLst>
+            </a:blip>
+            <a:stretch>
+              <a:fillRect/>
+            </a:stretch>
+          </p:blipFill>
+          <p:spPr>
+            <a:xfrm>
+              <a:off x="266700" y="12435191"/>
+              <a:ext cx="685800" cy="671209"/>
+            </a:xfrm>
+            <a:prstGeom prst="rect">
+              <a:avLst/>
+            </a:prstGeom>
+          </p:spPr>
+        </p:pic>
+        <p:pic>
+          <p:nvPicPr>
+            <p:cNvPr id="21" name="Delivery" hidden="1">
+              <a:extLst>
+                <a:ext uri="{FF2B5EF4-FFF2-40B4-BE49-F238E27FC236}">
+                  <a16:creationId xmlns:a16="http://schemas.microsoft.com/office/drawing/2014/main" id="{3D387E03-95AC-053A-BA12-AEFBF9AF1117}"/>
+                </a:ext>
+              </a:extLst>
+            </p:cNvPr>
+            <p:cNvPicPr>
+              <a:picLocks noChangeAspect="1"/>
+            </p:cNvPicPr>
+            <p:nvPr/>
+          </p:nvPicPr>
+          <p:blipFill>
+            <a:blip r:embed="rId4">
+              <a:extLst>
+                <a:ext uri="{28A0092B-C50C-407E-A947-70E740481C1C}">
+                  <a14:useLocalDpi xmlns:a14="http://schemas.microsoft.com/office/drawing/2010/main" val="0"/>
+                </a:ext>
+              </a:extLst>
+            </a:blip>
+            <a:stretch>
+              <a:fillRect/>
+            </a:stretch>
+          </p:blipFill>
+          <p:spPr>
+            <a:xfrm>
+              <a:off x="266700" y="10631591"/>
+              <a:ext cx="685800" cy="496111"/>
+            </a:xfrm>
+            <a:prstGeom prst="rect">
+              <a:avLst/>
+            </a:prstGeom>
+          </p:spPr>
+        </p:pic>
+        <p:pic>
+          <p:nvPicPr>
+            <p:cNvPr id="29" name="Product" hidden="1">
+              <a:extLst>
+                <a:ext uri="{FF2B5EF4-FFF2-40B4-BE49-F238E27FC236}">
+                  <a16:creationId xmlns:a16="http://schemas.microsoft.com/office/drawing/2014/main" id="{DA03B10D-9F68-44F0-3935-290DCAA6D35E}"/>
+                </a:ext>
+              </a:extLst>
+            </p:cNvPr>
+            <p:cNvPicPr>
+              <a:picLocks noChangeAspect="1"/>
+            </p:cNvPicPr>
+            <p:nvPr/>
+          </p:nvPicPr>
+          <p:blipFill>
+            <a:blip r:embed="rId5">
+              <a:extLst>
+                <a:ext uri="{28A0092B-C50C-407E-A947-70E740481C1C}">
+                  <a14:useLocalDpi xmlns:a14="http://schemas.microsoft.com/office/drawing/2010/main" val="0"/>
+                </a:ext>
+              </a:extLst>
+            </a:blip>
+            <a:stretch>
+              <a:fillRect/>
+            </a:stretch>
+          </p:blipFill>
+          <p:spPr>
+            <a:xfrm>
+              <a:off x="266700" y="9594791"/>
+              <a:ext cx="685800" cy="671209"/>
+            </a:xfrm>
+            <a:prstGeom prst="rect">
+              <a:avLst/>
+            </a:prstGeom>
+          </p:spPr>
+        </p:pic>
+        <p:pic>
+          <p:nvPicPr>
+            <p:cNvPr id="33" name="Sales" hidden="1">
+              <a:extLst>
+                <a:ext uri="{FF2B5EF4-FFF2-40B4-BE49-F238E27FC236}">
+                  <a16:creationId xmlns:a16="http://schemas.microsoft.com/office/drawing/2014/main" id="{F02C4E3F-E0AD-0510-3C06-8C07E33600B8}"/>
+                </a:ext>
+              </a:extLst>
+            </p:cNvPr>
+            <p:cNvPicPr>
+              <a:picLocks noChangeAspect="1"/>
+            </p:cNvPicPr>
+            <p:nvPr/>
+          </p:nvPicPr>
+          <p:blipFill>
+            <a:blip r:embed="rId6">
+              <a:extLst>
+                <a:ext uri="{28A0092B-C50C-407E-A947-70E740481C1C}">
+                  <a14:useLocalDpi xmlns:a14="http://schemas.microsoft.com/office/drawing/2010/main" val="0"/>
+                </a:ext>
+              </a:extLst>
+            </a:blip>
+            <a:stretch>
+              <a:fillRect/>
+            </a:stretch>
+          </p:blipFill>
+          <p:spPr>
+            <a:xfrm>
+              <a:off x="266700" y="8647991"/>
+              <a:ext cx="685800" cy="671209"/>
+            </a:xfrm>
+            <a:prstGeom prst="rect">
+              <a:avLst/>
+            </a:prstGeom>
+          </p:spPr>
+        </p:pic>
+        <p:pic>
+          <p:nvPicPr>
+            <p:cNvPr id="17" name="Overview_Active" descr="A blue bar chart with black background&#10;&#10;Description automatically generated">
+              <a:extLst>
+                <a:ext uri="{FF2B5EF4-FFF2-40B4-BE49-F238E27FC236}">
+                  <a16:creationId xmlns:a16="http://schemas.microsoft.com/office/drawing/2014/main" id="{BC712264-2A5A-E573-456E-FD6EB701C963}"/>
+                </a:ext>
+              </a:extLst>
+            </p:cNvPr>
+            <p:cNvPicPr>
+              <a:picLocks noChangeAspect="1"/>
+            </p:cNvPicPr>
+            <p:nvPr/>
+          </p:nvPicPr>
+          <p:blipFill>
+            <a:blip r:embed="rId7">
+              <a:extLst>
+                <a:ext uri="{28A0092B-C50C-407E-A947-70E740481C1C}">
+                  <a14:useLocalDpi xmlns:a14="http://schemas.microsoft.com/office/drawing/2010/main" val="0"/>
+                </a:ext>
+              </a:extLst>
+            </a:blip>
+            <a:stretch>
+              <a:fillRect/>
+            </a:stretch>
+          </p:blipFill>
+          <p:spPr>
+            <a:xfrm>
+              <a:off x="271462" y="7696194"/>
+              <a:ext cx="680400" cy="680400"/>
+            </a:xfrm>
+            <a:prstGeom prst="rect">
+              <a:avLst/>
+            </a:prstGeom>
+          </p:spPr>
+        </p:pic>
+      </p:grpSp>
+      <p:grpSp>
+        <p:nvGrpSpPr>
+          <p:cNvPr id="36" name="Filter_Icons" hidden="1">
+            <a:extLst>
+              <a:ext uri="{FF2B5EF4-FFF2-40B4-BE49-F238E27FC236}">
+                <a16:creationId xmlns:a16="http://schemas.microsoft.com/office/drawing/2014/main" id="{0261E5E3-6611-FB34-5BAE-3A5EF68B6867}"/>
+              </a:ext>
+            </a:extLst>
+          </p:cNvPr>
+          <p:cNvGrpSpPr>
+            <a:grpSpLocks noGrp="1" noUngrp="1" noRot="1" noMove="1" noResize="1"/>
+          </p:cNvGrpSpPr>
+          <p:nvPr/>
+        </p:nvGrpSpPr>
+        <p:grpSpPr>
+          <a:xfrm>
+            <a:off x="266700" y="266700"/>
+            <a:ext cx="685800" cy="1565340"/>
+            <a:chOff x="266700" y="266700"/>
+            <a:chExt cx="685800" cy="1565340"/>
+          </a:xfrm>
+        </p:grpSpPr>
+        <p:pic>
+          <p:nvPicPr>
+            <p:cNvPr id="23" name="Filter">
+              <a:extLst>
+                <a:ext uri="{FF2B5EF4-FFF2-40B4-BE49-F238E27FC236}">
+                  <a16:creationId xmlns:a16="http://schemas.microsoft.com/office/drawing/2014/main" id="{9B25FCAA-27E0-4097-70F1-DBDE9DA80B27}"/>
+                </a:ext>
+              </a:extLst>
+            </p:cNvPr>
+            <p:cNvPicPr>
+              <a:picLocks noGrp="1" noRot="1" noChangeAspect="1" noMove="1" noResize="1" noEditPoints="1" noAdjustHandles="1" noChangeArrowheads="1" noChangeShapeType="1" noCrop="1"/>
+            </p:cNvPicPr>
+            <p:nvPr/>
+          </p:nvPicPr>
+          <p:blipFill>
+            <a:blip r:embed="rId8">
+              <a:extLst>
+                <a:ext uri="{28A0092B-C50C-407E-A947-70E740481C1C}">
+                  <a14:useLocalDpi xmlns:a14="http://schemas.microsoft.com/office/drawing/2010/main" val="0"/>
+                </a:ext>
+              </a:extLst>
+            </a:blip>
+            <a:stretch>
+              <a:fillRect/>
+            </a:stretch>
+          </p:blipFill>
+          <p:spPr>
+            <a:xfrm>
+              <a:off x="266700" y="1219200"/>
+              <a:ext cx="685800" cy="612840"/>
+            </a:xfrm>
+            <a:prstGeom prst="rect">
+              <a:avLst/>
+            </a:prstGeom>
+          </p:spPr>
+        </p:pic>
+        <p:pic>
+          <p:nvPicPr>
+            <p:cNvPr id="35" name="Clear_Filters">
+              <a:extLst>
+                <a:ext uri="{FF2B5EF4-FFF2-40B4-BE49-F238E27FC236}">
+                  <a16:creationId xmlns:a16="http://schemas.microsoft.com/office/drawing/2014/main" id="{C97A63D5-6A51-7AB4-17B7-DCFD2A18ADC6}"/>
+                </a:ext>
+              </a:extLst>
+            </p:cNvPr>
+            <p:cNvPicPr>
+              <a:picLocks noGrp="1" noRot="1" noChangeAspect="1" noMove="1" noResize="1" noEditPoints="1" noAdjustHandles="1" noChangeArrowheads="1" noChangeShapeType="1" noCrop="1"/>
+            </p:cNvPicPr>
+            <p:nvPr/>
+          </p:nvPicPr>
+          <p:blipFill>
+            <a:blip r:embed="rId9">
+              <a:extLst>
+                <a:ext uri="{28A0092B-C50C-407E-A947-70E740481C1C}">
+                  <a14:useLocalDpi xmlns:a14="http://schemas.microsoft.com/office/drawing/2010/main" val="0"/>
+                </a:ext>
+              </a:extLst>
+            </a:blip>
+            <a:stretch>
+              <a:fillRect/>
+            </a:stretch>
+          </p:blipFill>
+          <p:spPr>
+            <a:xfrm>
+              <a:off x="266700" y="266700"/>
+              <a:ext cx="685800" cy="685800"/>
+            </a:xfrm>
+            <a:prstGeom prst="rect">
+              <a:avLst/>
+            </a:prstGeom>
+          </p:spPr>
+        </p:pic>
+      </p:grpSp>
+      <p:grpSp>
+        <p:nvGrpSpPr>
+          <p:cNvPr id="15" name="Margins" hidden="1">
+            <a:extLst>
+              <a:ext uri="{FF2B5EF4-FFF2-40B4-BE49-F238E27FC236}">
+                <a16:creationId xmlns:a16="http://schemas.microsoft.com/office/drawing/2014/main" id="{81732645-ACD2-1D62-3E61-708FD2C8D0C6}"/>
+              </a:ext>
+            </a:extLst>
+          </p:cNvPr>
+          <p:cNvGrpSpPr>
+            <a:grpSpLocks noGrp="1" noUngrp="1" noRot="1" noMove="1" noResize="1"/>
+          </p:cNvGrpSpPr>
+          <p:nvPr/>
+        </p:nvGrpSpPr>
+        <p:grpSpPr>
+          <a:xfrm>
+            <a:off x="1219200" y="0"/>
+            <a:ext cx="23164800" cy="13716000"/>
+            <a:chOff x="1219200" y="0"/>
+            <a:chExt cx="23164800" cy="13716000"/>
+          </a:xfrm>
+        </p:grpSpPr>
+        <p:grpSp>
+          <p:nvGrpSpPr>
+            <p:cNvPr id="13" name="Main">
+              <a:extLst>
+                <a:ext uri="{FF2B5EF4-FFF2-40B4-BE49-F238E27FC236}">
+                  <a16:creationId xmlns:a16="http://schemas.microsoft.com/office/drawing/2014/main" id="{BD89A0F8-E3A9-1A2D-009F-9468208343D3}"/>
+                </a:ext>
+              </a:extLst>
+            </p:cNvPr>
+            <p:cNvGrpSpPr>
+              <a:grpSpLocks noGrp="1" noUngrp="1" noRot="1" noMove="1" noResize="1"/>
+            </p:cNvGrpSpPr>
+            <p:nvPr/>
+          </p:nvGrpSpPr>
+          <p:grpSpPr>
+            <a:xfrm>
+              <a:off x="1219200" y="0"/>
+              <a:ext cx="23164800" cy="13716000"/>
+              <a:chOff x="1219200" y="0"/>
+              <a:chExt cx="23164800" cy="13716000"/>
+            </a:xfrm>
+          </p:grpSpPr>
+          <p:sp>
+            <p:nvSpPr>
+              <p:cNvPr id="4" name="H_Bottom_Margin">
+                <a:extLst>
+                  <a:ext uri="{FF2B5EF4-FFF2-40B4-BE49-F238E27FC236}">
+                    <a16:creationId xmlns:a16="http://schemas.microsoft.com/office/drawing/2014/main" id="{B27F89EE-3138-1AF8-0906-6DEC8E303CBB}"/>
+                  </a:ext>
+                </a:extLst>
+              </p:cNvPr>
+              <p:cNvSpPr>
+                <a:spLocks noGrp="1" noRot="1" noMove="1" noResize="1" noEditPoints="1" noAdjustHandles="1" noChangeArrowheads="1" noChangeShapeType="1"/>
+              </p:cNvSpPr>
+              <p:nvPr/>
+            </p:nvSpPr>
+            <p:spPr>
+              <a:xfrm>
+                <a:off x="1219200" y="13106400"/>
+                <a:ext cx="23164800" cy="609600"/>
+              </a:xfrm>
+              <a:prstGeom prst="rect">
+                <a:avLst/>
+              </a:prstGeom>
+              <a:solidFill>
+                <a:schemeClr val="accent2">
+                  <a:alpha val="30000"/>
+                </a:schemeClr>
+              </a:solidFill>
+              <a:ln>
+                <a:noFill/>
+              </a:ln>
+            </p:spPr>
+            <p:style>
+              <a:lnRef idx="2">
+                <a:schemeClr val="accent2">
+                  <a:shade val="15000"/>
+                </a:schemeClr>
+              </a:lnRef>
+              <a:fillRef idx="1">
+                <a:schemeClr val="accent2"/>
+              </a:fillRef>
+              <a:effectRef idx="0">
+                <a:schemeClr val="accent2"/>
+              </a:effectRef>
+              <a:fontRef idx="minor">
+                <a:schemeClr val="lt1"/>
+              </a:fontRef>
+            </p:style>
+            <p:txBody>
+              <a:bodyPr rtlCol="0" anchor="ctr"/>
+              <a:lstStyle/>
+              <a:p>
+                <a:pPr algn="ctr"/>
+                <a:endParaRPr lang="pl-PL"/>
+              </a:p>
+            </p:txBody>
+          </p:sp>
+          <p:sp>
+            <p:nvSpPr>
+              <p:cNvPr id="2" name="V_Left_Margin">
+                <a:extLst>
+                  <a:ext uri="{FF2B5EF4-FFF2-40B4-BE49-F238E27FC236}">
+                    <a16:creationId xmlns:a16="http://schemas.microsoft.com/office/drawing/2014/main" id="{F0120DF4-9B4E-38BC-5233-28E6887F91CF}"/>
+                  </a:ext>
+                </a:extLst>
+              </p:cNvPr>
+              <p:cNvSpPr>
+                <a:spLocks noGrp="1" noRot="1" noMove="1" noResize="1" noEditPoints="1" noAdjustHandles="1" noChangeArrowheads="1" noChangeShapeType="1"/>
+              </p:cNvSpPr>
+              <p:nvPr/>
+            </p:nvSpPr>
+            <p:spPr>
+              <a:xfrm>
+                <a:off x="1219200" y="0"/>
+                <a:ext cx="609600" cy="13716000"/>
+              </a:xfrm>
+              <a:prstGeom prst="rect">
+                <a:avLst/>
+              </a:prstGeom>
+              <a:solidFill>
+                <a:schemeClr val="accent2">
+                  <a:alpha val="30000"/>
+                </a:schemeClr>
+              </a:solidFill>
+              <a:ln>
+                <a:noFill/>
+              </a:ln>
+            </p:spPr>
+            <p:style>
+              <a:lnRef idx="2">
+                <a:schemeClr val="accent2">
+                  <a:shade val="15000"/>
+                </a:schemeClr>
+              </a:lnRef>
+              <a:fillRef idx="1">
+                <a:schemeClr val="accent2"/>
+              </a:fillRef>
+              <a:effectRef idx="0">
+                <a:schemeClr val="accent2"/>
+              </a:effectRef>
+              <a:fontRef idx="minor">
+                <a:schemeClr val="lt1"/>
+              </a:fontRef>
+            </p:style>
+            <p:txBody>
+              <a:bodyPr rtlCol="0" anchor="ctr"/>
+              <a:lstStyle/>
+              <a:p>
+                <a:pPr algn="ctr"/>
+                <a:endParaRPr lang="pl-PL"/>
+              </a:p>
+            </p:txBody>
+          </p:sp>
+          <p:sp>
+            <p:nvSpPr>
+              <p:cNvPr id="3" name="V_Right_Margin">
+                <a:extLst>
+                  <a:ext uri="{FF2B5EF4-FFF2-40B4-BE49-F238E27FC236}">
+                    <a16:creationId xmlns:a16="http://schemas.microsoft.com/office/drawing/2014/main" id="{68B42CC3-5F52-5131-C153-4ABAD337F76B}"/>
+                  </a:ext>
+                </a:extLst>
+              </p:cNvPr>
+              <p:cNvSpPr>
+                <a:spLocks noGrp="1" noRot="1" noMove="1" noResize="1" noEditPoints="1" noAdjustHandles="1" noChangeArrowheads="1" noChangeShapeType="1"/>
+              </p:cNvSpPr>
+              <p:nvPr/>
+            </p:nvSpPr>
+            <p:spPr>
+              <a:xfrm>
+                <a:off x="23774400" y="0"/>
+                <a:ext cx="609600" cy="13716000"/>
+              </a:xfrm>
+              <a:prstGeom prst="rect">
+                <a:avLst/>
+              </a:prstGeom>
+              <a:solidFill>
+                <a:schemeClr val="accent2">
+                  <a:alpha val="30000"/>
+                </a:schemeClr>
+              </a:solidFill>
+              <a:ln>
+                <a:noFill/>
+              </a:ln>
+            </p:spPr>
+            <p:style>
+              <a:lnRef idx="2">
+                <a:schemeClr val="accent2">
+                  <a:shade val="15000"/>
+                </a:schemeClr>
+              </a:lnRef>
+              <a:fillRef idx="1">
+                <a:schemeClr val="accent2"/>
+              </a:fillRef>
+              <a:effectRef idx="0">
+                <a:schemeClr val="accent2"/>
+              </a:effectRef>
+              <a:fontRef idx="minor">
+                <a:schemeClr val="lt1"/>
+              </a:fontRef>
+            </p:style>
+            <p:txBody>
+              <a:bodyPr rtlCol="0" anchor="ctr"/>
+              <a:lstStyle/>
+              <a:p>
+                <a:pPr algn="ctr"/>
+                <a:endParaRPr lang="pl-PL"/>
+              </a:p>
+            </p:txBody>
+          </p:sp>
+        </p:grpSp>
+        <p:grpSp>
+          <p:nvGrpSpPr>
+            <p:cNvPr id="14" name="Sub">
+              <a:extLst>
+                <a:ext uri="{FF2B5EF4-FFF2-40B4-BE49-F238E27FC236}">
+                  <a16:creationId xmlns:a16="http://schemas.microsoft.com/office/drawing/2014/main" id="{BE548927-6543-495E-95D5-D4F1A4847E69}"/>
+                </a:ext>
+              </a:extLst>
+            </p:cNvPr>
+            <p:cNvGrpSpPr>
+              <a:grpSpLocks noGrp="1" noUngrp="1" noRot="1" noMove="1" noResize="1"/>
+            </p:cNvGrpSpPr>
+            <p:nvPr/>
+          </p:nvGrpSpPr>
+          <p:grpSpPr>
+            <a:xfrm>
+              <a:off x="1219200" y="0"/>
+              <a:ext cx="23164800" cy="13716000"/>
+              <a:chOff x="1219200" y="0"/>
+              <a:chExt cx="23164800" cy="13716000"/>
+            </a:xfrm>
+          </p:grpSpPr>
+          <p:sp>
+            <p:nvSpPr>
+              <p:cNvPr id="11" name="H_3_Margin">
+                <a:extLst>
+                  <a:ext uri="{FF2B5EF4-FFF2-40B4-BE49-F238E27FC236}">
+                    <a16:creationId xmlns:a16="http://schemas.microsoft.com/office/drawing/2014/main" id="{4C858F39-3882-17A8-6192-D9E890E36062}"/>
+                  </a:ext>
+                </a:extLst>
+              </p:cNvPr>
+              <p:cNvSpPr>
+                <a:spLocks noGrp="1" noRot="1" noMove="1" noResize="1" noEditPoints="1" noAdjustHandles="1" noChangeArrowheads="1" noChangeShapeType="1"/>
+              </p:cNvSpPr>
+              <p:nvPr/>
+            </p:nvSpPr>
+            <p:spPr>
+              <a:xfrm>
+                <a:off x="1219200" y="8496300"/>
+                <a:ext cx="23164800" cy="457200"/>
+              </a:xfrm>
+              <a:prstGeom prst="rect">
+                <a:avLst/>
+              </a:prstGeom>
+              <a:solidFill>
+                <a:schemeClr val="accent2">
+                  <a:alpha val="10000"/>
+                </a:schemeClr>
+              </a:solidFill>
+              <a:ln>
+                <a:noFill/>
+              </a:ln>
+            </p:spPr>
+            <p:style>
+              <a:lnRef idx="2">
+                <a:schemeClr val="accent2">
+                  <a:shade val="15000"/>
+                </a:schemeClr>
+              </a:lnRef>
+              <a:fillRef idx="1">
+                <a:schemeClr val="accent2"/>
+              </a:fillRef>
+              <a:effectRef idx="0">
+                <a:schemeClr val="accent2"/>
+              </a:effectRef>
+              <a:fontRef idx="minor">
+                <a:schemeClr val="lt1"/>
+              </a:fontRef>
+            </p:style>
+            <p:txBody>
+              <a:bodyPr rtlCol="0" anchor="ctr"/>
+              <a:lstStyle/>
+              <a:p>
+                <a:pPr algn="ctr"/>
+                <a:endParaRPr lang="pl-PL"/>
+              </a:p>
+            </p:txBody>
+          </p:sp>
+          <p:sp>
+            <p:nvSpPr>
+              <p:cNvPr id="10" name="H_2_Margin">
+                <a:extLst>
+                  <a:ext uri="{FF2B5EF4-FFF2-40B4-BE49-F238E27FC236}">
+                    <a16:creationId xmlns:a16="http://schemas.microsoft.com/office/drawing/2014/main" id="{73D6301B-FF7B-B923-6FB7-E817D4EED31F}"/>
+                  </a:ext>
+                </a:extLst>
+              </p:cNvPr>
+              <p:cNvSpPr>
+                <a:spLocks noGrp="1" noRot="1" noMove="1" noResize="1" noEditPoints="1" noAdjustHandles="1" noChangeArrowheads="1" noChangeShapeType="1"/>
+              </p:cNvSpPr>
+              <p:nvPr/>
+            </p:nvSpPr>
+            <p:spPr>
+              <a:xfrm>
+                <a:off x="1219200" y="3886200"/>
+                <a:ext cx="23164800" cy="457200"/>
+              </a:xfrm>
+              <a:prstGeom prst="rect">
+                <a:avLst/>
+              </a:prstGeom>
+              <a:solidFill>
+                <a:schemeClr val="accent2">
+                  <a:alpha val="10000"/>
+                </a:schemeClr>
+              </a:solidFill>
+              <a:ln>
+                <a:noFill/>
+              </a:ln>
+            </p:spPr>
+            <p:style>
+              <a:lnRef idx="2">
+                <a:schemeClr val="accent2">
+                  <a:shade val="15000"/>
+                </a:schemeClr>
+              </a:lnRef>
+              <a:fillRef idx="1">
+                <a:schemeClr val="accent2"/>
+              </a:fillRef>
+              <a:effectRef idx="0">
+                <a:schemeClr val="accent2"/>
+              </a:effectRef>
+              <a:fontRef idx="minor">
+                <a:schemeClr val="lt1"/>
+              </a:fontRef>
+            </p:style>
+            <p:txBody>
+              <a:bodyPr rtlCol="0" anchor="ctr"/>
+              <a:lstStyle/>
+              <a:p>
+                <a:pPr algn="ctr"/>
+                <a:endParaRPr lang="pl-PL"/>
+              </a:p>
+            </p:txBody>
+          </p:sp>
+          <p:sp>
+            <p:nvSpPr>
+              <p:cNvPr id="5" name="H_1_Margin">
+                <a:extLst>
+                  <a:ext uri="{FF2B5EF4-FFF2-40B4-BE49-F238E27FC236}">
+                    <a16:creationId xmlns:a16="http://schemas.microsoft.com/office/drawing/2014/main" id="{E20B40F8-1567-A614-A36A-37586C118B71}"/>
+                  </a:ext>
+                </a:extLst>
+              </p:cNvPr>
+              <p:cNvSpPr>
+                <a:spLocks noGrp="1" noRot="1" noMove="1" noResize="1" noEditPoints="1" noAdjustHandles="1" noChangeArrowheads="1" noChangeShapeType="1"/>
+              </p:cNvSpPr>
+              <p:nvPr/>
+            </p:nvSpPr>
+            <p:spPr>
+              <a:xfrm>
+                <a:off x="1219200" y="1143000"/>
+                <a:ext cx="23164800" cy="457200"/>
+              </a:xfrm>
+              <a:prstGeom prst="rect">
+                <a:avLst/>
+              </a:prstGeom>
+              <a:solidFill>
+                <a:schemeClr val="accent2">
+                  <a:alpha val="10000"/>
+                </a:schemeClr>
+              </a:solidFill>
+              <a:ln>
+                <a:noFill/>
+              </a:ln>
+            </p:spPr>
+            <p:style>
+              <a:lnRef idx="2">
+                <a:schemeClr val="accent2">
+                  <a:shade val="15000"/>
+                </a:schemeClr>
+              </a:lnRef>
+              <a:fillRef idx="1">
+                <a:schemeClr val="accent2"/>
+              </a:fillRef>
+              <a:effectRef idx="0">
+                <a:schemeClr val="accent2"/>
+              </a:effectRef>
+              <a:fontRef idx="minor">
+                <a:schemeClr val="lt1"/>
+              </a:fontRef>
+            </p:style>
+            <p:txBody>
+              <a:bodyPr rtlCol="0" anchor="ctr"/>
+              <a:lstStyle/>
+              <a:p>
+                <a:pPr algn="ctr"/>
+                <a:endParaRPr lang="pl-PL"/>
+              </a:p>
+            </p:txBody>
+          </p:sp>
+          <p:sp>
+            <p:nvSpPr>
+              <p:cNvPr id="12" name="V_Center_Margin">
+                <a:extLst>
+                  <a:ext uri="{FF2B5EF4-FFF2-40B4-BE49-F238E27FC236}">
+                    <a16:creationId xmlns:a16="http://schemas.microsoft.com/office/drawing/2014/main" id="{2995A8A3-D4C9-7C7B-C298-8BCA23B6E54D}"/>
+                  </a:ext>
+                </a:extLst>
+              </p:cNvPr>
+              <p:cNvSpPr>
+                <a:spLocks noGrp="1" noRot="1" noMove="1" noResize="1" noEditPoints="1" noAdjustHandles="1" noChangeArrowheads="1" noChangeShapeType="1"/>
+              </p:cNvSpPr>
+              <p:nvPr/>
+            </p:nvSpPr>
+            <p:spPr>
+              <a:xfrm>
+                <a:off x="12573000" y="0"/>
+                <a:ext cx="457200" cy="13716000"/>
+              </a:xfrm>
+              <a:prstGeom prst="rect">
+                <a:avLst/>
+              </a:prstGeom>
+              <a:solidFill>
+                <a:schemeClr val="accent2">
+                  <a:alpha val="10000"/>
+                </a:schemeClr>
+              </a:solidFill>
+              <a:ln>
+                <a:noFill/>
+              </a:ln>
+            </p:spPr>
+            <p:style>
+              <a:lnRef idx="2">
+                <a:schemeClr val="accent2">
+                  <a:shade val="15000"/>
+                </a:schemeClr>
+              </a:lnRef>
+              <a:fillRef idx="1">
+                <a:schemeClr val="accent2"/>
+              </a:fillRef>
+              <a:effectRef idx="0">
+                <a:schemeClr val="accent2"/>
+              </a:effectRef>
+              <a:fontRef idx="minor">
+                <a:schemeClr val="lt1"/>
+              </a:fontRef>
+            </p:style>
+            <p:txBody>
+              <a:bodyPr rtlCol="0" anchor="ctr"/>
+              <a:lstStyle/>
+              <a:p>
+                <a:pPr algn="ctr"/>
+                <a:endParaRPr lang="pl-PL"/>
+              </a:p>
+            </p:txBody>
+          </p:sp>
+        </p:grpSp>
+      </p:grpSp>
+      <p:sp>
+        <p:nvSpPr>
+          <p:cNvPr id="9" name="Text_Results_By" hidden="1">
+            <a:extLst>
+              <a:ext uri="{FF2B5EF4-FFF2-40B4-BE49-F238E27FC236}">
+                <a16:creationId xmlns:a16="http://schemas.microsoft.com/office/drawing/2014/main" id="{322FE810-F954-E2B3-1AA8-79048DC6052C}"/>
+              </a:ext>
+            </a:extLst>
+          </p:cNvPr>
+          <p:cNvSpPr txBox="1">
+            <a:spLocks noGrp="1" noRot="1" noMove="1" noResize="1" noEditPoints="1" noAdjustHandles="1" noChangeArrowheads="1" noChangeShapeType="1"/>
+          </p:cNvSpPr>
+          <p:nvPr/>
+        </p:nvSpPr>
+        <p:spPr>
+          <a:xfrm>
+            <a:off x="1873250" y="1202323"/>
+            <a:ext cx="21901150" cy="338554"/>
+          </a:xfrm>
+          <a:prstGeom prst="rect">
+            <a:avLst/>
+          </a:prstGeom>
+          <a:noFill/>
+        </p:spPr>
+        <p:txBody>
+          <a:bodyPr wrap="square" rtlCol="0">
+            <a:spAutoFit/>
+          </a:bodyPr>
+          <a:lstStyle/>
+          <a:p>
+            <a:r>
+              <a:rPr lang="pl-PL" sz="1600" dirty="0">
+                <a:solidFill>
+                  <a:srgbClr val="344C69"/>
+                </a:solidFill>
+                <a:latin typeface="DIN" panose="02000504040000020003" pitchFamily="2" charset="0"/>
+              </a:rPr>
+              <a:t>Show results by</a:t>
+            </a:r>
+          </a:p>
+        </p:txBody>
+      </p:sp>
+      <p:sp>
+        <p:nvSpPr>
+          <p:cNvPr id="22" name="Title">
+            <a:extLst>
+              <a:ext uri="{FF2B5EF4-FFF2-40B4-BE49-F238E27FC236}">
+                <a16:creationId xmlns:a16="http://schemas.microsoft.com/office/drawing/2014/main" id="{1A1B5CEC-BF3E-CD68-860A-0036950B223E}"/>
+              </a:ext>
+            </a:extLst>
+          </p:cNvPr>
+          <p:cNvSpPr txBox="1">
+            <a:spLocks noGrp="1" noRot="1" noMove="1" noResize="1" noEditPoints="1" noAdjustHandles="1" noChangeArrowheads="1" noChangeShapeType="1"/>
+          </p:cNvSpPr>
+          <p:nvPr/>
+        </p:nvSpPr>
+        <p:spPr>
+          <a:xfrm>
+            <a:off x="1828800" y="190500"/>
+            <a:ext cx="21945600" cy="1015663"/>
+          </a:xfrm>
+          <a:prstGeom prst="rect">
+            <a:avLst/>
+          </a:prstGeom>
+          <a:noFill/>
+        </p:spPr>
+        <p:txBody>
+          <a:bodyPr wrap="square" rtlCol="0">
+            <a:spAutoFit/>
+          </a:bodyPr>
+          <a:lstStyle/>
+          <a:p>
+            <a:r>
+              <a:rPr lang="pl-PL" sz="6000" dirty="0" err="1">
+                <a:solidFill>
+                  <a:srgbClr val="344C69"/>
+                </a:solidFill>
+                <a:effectLst>
+                  <a:outerShdw blurRad="38100" dist="38100" dir="2700000" algn="tl">
+                    <a:srgbClr val="000000">
+                      <a:alpha val="43137"/>
+                    </a:srgbClr>
+                  </a:outerShdw>
+                </a:effectLst>
+                <a:latin typeface="DIN" panose="02000504040000020003" pitchFamily="2" charset="0"/>
+              </a:rPr>
+              <a:t>Overview</a:t>
+            </a:r>
+            <a:endParaRPr lang="pl-PL" sz="6000" dirty="0">
+              <a:solidFill>
+                <a:srgbClr val="344C69"/>
+              </a:solidFill>
+              <a:effectLst>
+                <a:outerShdw blurRad="38100" dist="38100" dir="2700000" algn="tl">
+                  <a:srgbClr val="000000">
+                    <a:alpha val="43137"/>
+                  </a:srgbClr>
+                </a:outerShdw>
+              </a:effectLst>
+              <a:latin typeface="DIN" panose="02000504040000020003" pitchFamily="2" charset="0"/>
+            </a:endParaRPr>
+          </a:p>
+        </p:txBody>
+      </p:sp>
+    </p:spTree>
+    <p:extLst>
+      <p:ext uri="{BB962C8B-B14F-4D97-AF65-F5344CB8AC3E}">
+        <p14:creationId xmlns:p14="http://schemas.microsoft.com/office/powerpoint/2010/main" val="3917094028"/>
+      </p:ext>
+    </p:extLst>
+  </p:cSld>
+  <p:clrMapOvr>
+    <a:masterClrMapping/>
+  </p:clrMapOvr>
+</p:sld>
+</file>
+
+<file path=ppt/slides/slide3.xml><?xml version="1.0" encoding="utf-8"?>
+<p:sld xmlns:a="http://schemas.openxmlformats.org/drawingml/2006/main" xmlns:r="http://schemas.openxmlformats.org/officeDocument/2006/relationships" xmlns:p="http://schemas.openxmlformats.org/presentationml/2006/main">
+  <p:cSld>
+    <p:spTree>
+      <p:nvGrpSpPr>
         <p:cNvPr id="1" name=""/>
         <p:cNvGrpSpPr/>
         <p:nvPr/>
@@ -5742,7 +7172,7 @@
 </p:sld>
 </file>
 
-<file path=ppt/slides/slide3.xml><?xml version="1.0" encoding="utf-8"?>
+<file path=ppt/slides/slide4.xml><?xml version="1.0" encoding="utf-8"?>
 <p:sld xmlns:a="http://schemas.openxmlformats.org/drawingml/2006/main" xmlns:r="http://schemas.openxmlformats.org/officeDocument/2006/relationships" xmlns:p="http://schemas.openxmlformats.org/presentationml/2006/main">
   <p:cSld>
     <p:spTree>
@@ -7154,7 +8584,7 @@
 </p:sld>
 </file>
 
-<file path=ppt/slides/slide4.xml><?xml version="1.0" encoding="utf-8"?>
+<file path=ppt/slides/slide5.xml><?xml version="1.0" encoding="utf-8"?>
 <p:sld xmlns:a="http://schemas.openxmlformats.org/drawingml/2006/main" xmlns:r="http://schemas.openxmlformats.org/officeDocument/2006/relationships" xmlns:p="http://schemas.openxmlformats.org/presentationml/2006/main">
   <p:cSld>
     <p:spTree>
@@ -9398,7 +10828,7 @@
 </p:sld>
 </file>
 
-<file path=ppt/slides/slide5.xml><?xml version="1.0" encoding="utf-8"?>
+<file path=ppt/slides/slide6.xml><?xml version="1.0" encoding="utf-8"?>
 <p:sld xmlns:a="http://schemas.openxmlformats.org/drawingml/2006/main" xmlns:r="http://schemas.openxmlformats.org/officeDocument/2006/relationships" xmlns:p="http://schemas.openxmlformats.org/presentationml/2006/main">
   <p:cSld>
     <p:spTree>
@@ -10816,7 +12246,7 @@
 </p:sld>
 </file>
 
-<file path=ppt/slides/slide6.xml><?xml version="1.0" encoding="utf-8"?>
+<file path=ppt/slides/slide7.xml><?xml version="1.0" encoding="utf-8"?>
 <p:sld xmlns:a="http://schemas.openxmlformats.org/drawingml/2006/main" xmlns:r="http://schemas.openxmlformats.org/officeDocument/2006/relationships" xmlns:p="http://schemas.openxmlformats.org/presentationml/2006/main">
   <p:cSld>
     <p:spTree>
@@ -12136,7 +13566,7 @@
 </p:sld>
 </file>
 
-<file path=ppt/slides/slide7.xml><?xml version="1.0" encoding="utf-8"?>
+<file path=ppt/slides/slide8.xml><?xml version="1.0" encoding="utf-8"?>
 <p:sld xmlns:a="http://schemas.openxmlformats.org/drawingml/2006/main" xmlns:r="http://schemas.openxmlformats.org/officeDocument/2006/relationships" xmlns:p="http://schemas.openxmlformats.org/presentationml/2006/main">
   <p:cSld>
     <p:spTree>

</xml_diff>